<commit_message>
Added comments TBD after talk with Asaf
</commit_message>
<xml_diff>
--- a/presentation/2019-02-03 - Presentation for the 9th class action conference.pptx
+++ b/presentation/2019-02-03 - Presentation for the 9th class action conference.pptx
@@ -5,7 +5,7 @@
     <p:sldMasterId id="2147483648" r:id="rId1"/>
   </p:sldMasterIdLst>
   <p:notesMasterIdLst>
-    <p:notesMasterId r:id="rId19"/>
+    <p:notesMasterId r:id="rId22"/>
   </p:notesMasterIdLst>
   <p:sldIdLst>
     <p:sldId id="256" r:id="rId2"/>
@@ -18,13 +18,16 @@
     <p:sldId id="266" r:id="rId9"/>
     <p:sldId id="264" r:id="rId10"/>
     <p:sldId id="261" r:id="rId11"/>
-    <p:sldId id="267" r:id="rId12"/>
-    <p:sldId id="269" r:id="rId13"/>
-    <p:sldId id="270" r:id="rId14"/>
-    <p:sldId id="271" r:id="rId15"/>
-    <p:sldId id="272" r:id="rId16"/>
-    <p:sldId id="273" r:id="rId17"/>
-    <p:sldId id="265" r:id="rId18"/>
+    <p:sldId id="280" r:id="rId12"/>
+    <p:sldId id="267" r:id="rId13"/>
+    <p:sldId id="269" r:id="rId14"/>
+    <p:sldId id="270" r:id="rId15"/>
+    <p:sldId id="271" r:id="rId16"/>
+    <p:sldId id="272" r:id="rId17"/>
+    <p:sldId id="273" r:id="rId18"/>
+    <p:sldId id="274" r:id="rId19"/>
+    <p:sldId id="276" r:id="rId20"/>
+    <p:sldId id="279" r:id="rId21"/>
   </p:sldIdLst>
   <p:sldSz cx="12192000" cy="6858000"/>
   <p:notesSz cx="6858000" cy="9144000"/>
@@ -142,6 +145,32 @@
 </p:presentation>
 </file>
 
+<file path=ppt/commentAuthors.xml><?xml version="1.0" encoding="utf-8"?>
+<p:cmAuthorLst xmlns:a="http://schemas.openxmlformats.org/drawingml/2006/main" xmlns:r="http://schemas.openxmlformats.org/officeDocument/2006/relationships" xmlns:p="http://schemas.openxmlformats.org/presentationml/2006/main">
+  <p:cmAuthor id="1" name="Adi Adi" initials="AA" lastIdx="2" clrIdx="0">
+    <p:extLst>
+      <p:ext uri="{19B8F6BF-5375-455C-9EA6-DF929625EA0E}">
+        <p15:presenceInfo xmlns:p15="http://schemas.microsoft.com/office/powerpoint/2012/main" userId="Adi Adi" providerId="None"/>
+      </p:ext>
+    </p:extLst>
+  </p:cmAuthor>
+</p:cmAuthorLst>
+</file>
+
+<file path=ppt/comments/comment1.xml><?xml version="1.0" encoding="utf-8"?>
+<p:cmLst xmlns:a="http://schemas.openxmlformats.org/drawingml/2006/main" xmlns:r="http://schemas.openxmlformats.org/officeDocument/2006/relationships" xmlns:p="http://schemas.openxmlformats.org/presentationml/2006/main">
+  <p:cm authorId="1" dt="2019-01-31T15:19:24.860" idx="2">
+    <p:pos x="7670" y="10"/>
+    <p:text/>
+    <p:extLst>
+      <p:ext uri="{C676402C-5697-4E1C-873F-D02D1690AC5C}">
+        <p15:threadingInfo xmlns:p15="http://schemas.microsoft.com/office/powerpoint/2012/main" timeZoneBias="-120"/>
+      </p:ext>
+    </p:extLst>
+  </p:cm>
+</p:cmLst>
+</file>
+
 <file path=ppt/notesMasters/notesMaster1.xml><?xml version="1.0" encoding="utf-8"?>
 <p:notesMaster xmlns:a="http://schemas.openxmlformats.org/drawingml/2006/main" xmlns:r="http://schemas.openxmlformats.org/officeDocument/2006/relationships" xmlns:p="http://schemas.openxmlformats.org/presentationml/2006/main">
   <p:cSld>
@@ -224,7 +253,7 @@
           <a:p>
             <a:fld id="{73BF8E3D-5E22-4059-9A35-78124FC50279}" type="datetimeFigureOut">
               <a:rPr lang="en-IL" smtClean="0"/>
-              <a:t>30/01/2019</a:t>
+              <a:t>31/01/2019</a:t>
             </a:fld>
             <a:endParaRPr lang="en-IL"/>
           </a:p>
@@ -691,7 +720,7 @@
           <a:p>
             <a:fld id="{F76F7359-3BC2-4986-8A2B-31103FDDAE1C}" type="datetime8">
               <a:rPr lang="he-IL" smtClean="0"/>
-              <a:t>30 ינואר 19</a:t>
+              <a:t>31 ינואר 19</a:t>
             </a:fld>
             <a:endParaRPr lang="he-IL"/>
           </a:p>
@@ -865,7 +894,7 @@
           <a:p>
             <a:fld id="{5C1CAD4F-A081-4FDA-92F2-AA51A957AE39}" type="datetime8">
               <a:rPr lang="he-IL" smtClean="0"/>
-              <a:t>30 ינואר 19</a:t>
+              <a:t>31 ינואר 19</a:t>
             </a:fld>
             <a:endParaRPr lang="he-IL"/>
           </a:p>
@@ -1212,7 +1241,7 @@
           <a:p>
             <a:fld id="{D07BAE3C-A9EF-4863-8620-284FD195C69B}" type="datetime8">
               <a:rPr lang="he-IL" smtClean="0"/>
-              <a:t>30 ינואר 19</a:t>
+              <a:t>31 ינואר 19</a:t>
             </a:fld>
             <a:endParaRPr lang="he-IL"/>
           </a:p>
@@ -1664,7 +1693,7 @@
           <a:p>
             <a:fld id="{3C55EC17-C85B-464F-8188-434EB50AC50E}" type="datetime8">
               <a:rPr lang="he-IL" smtClean="0"/>
-              <a:t>30 ינואר 19</a:t>
+              <a:t>31 ינואר 19</a:t>
             </a:fld>
             <a:endParaRPr lang="he-IL"/>
           </a:p>
@@ -1812,7 +1841,7 @@
           <a:p>
             <a:fld id="{C30FEFB3-9777-4A1D-AF5C-BE325C0489A5}" type="datetime8">
               <a:rPr lang="he-IL" smtClean="0"/>
-              <a:t>30 ינואר 19</a:t>
+              <a:t>31 ינואר 19</a:t>
             </a:fld>
             <a:endParaRPr lang="he-IL"/>
           </a:p>
@@ -1937,7 +1966,7 @@
           <a:p>
             <a:fld id="{588A6826-0F8D-44BE-84F0-748C5D8D10C4}" type="datetime8">
               <a:rPr lang="he-IL" smtClean="0"/>
-              <a:t>30 ינואר 19</a:t>
+              <a:t>31 ינואר 19</a:t>
             </a:fld>
             <a:endParaRPr lang="he-IL"/>
           </a:p>
@@ -2189,7 +2218,7 @@
           <a:p>
             <a:fld id="{EF44FB19-2E14-401A-9632-489004493145}" type="datetime8">
               <a:rPr lang="he-IL" smtClean="0"/>
-              <a:t>30 ינואר 19</a:t>
+              <a:t>31 ינואר 19</a:t>
             </a:fld>
             <a:endParaRPr lang="he-IL" dirty="0"/>
           </a:p>
@@ -2664,7 +2693,7 @@
 </file>
 
 <file path=ppt/slides/slide10.xml><?xml version="1.0" encoding="utf-8"?>
-<p:sld xmlns:a="http://schemas.openxmlformats.org/drawingml/2006/main" xmlns:r="http://schemas.openxmlformats.org/officeDocument/2006/relationships" xmlns:p="http://schemas.openxmlformats.org/presentationml/2006/main">
+<p:sld xmlns:a="http://schemas.openxmlformats.org/drawingml/2006/main" xmlns:r="http://schemas.openxmlformats.org/officeDocument/2006/relationships" xmlns:p="http://schemas.openxmlformats.org/presentationml/2006/main" show="0">
   <p:cSld>
     <p:spTree>
       <p:nvGrpSpPr>
@@ -2816,47 +2845,12 @@
           </a:p>
         </p:txBody>
       </p:sp>
-      <p:pic>
-        <p:nvPicPr>
-          <p:cNvPr id="16" name="Picture 15">
-            <a:extLst>
-              <a:ext uri="{FF2B5EF4-FFF2-40B4-BE49-F238E27FC236}">
-                <a16:creationId xmlns:a16="http://schemas.microsoft.com/office/drawing/2014/main" id="{B80DB7E3-F520-4531-91D6-706BE87F0B50}"/>
-              </a:ext>
-            </a:extLst>
-          </p:cNvPr>
-          <p:cNvPicPr>
-            <a:picLocks noChangeAspect="1"/>
-          </p:cNvPicPr>
-          <p:nvPr/>
-        </p:nvPicPr>
-        <p:blipFill rotWithShape="1">
-          <a:blip r:embed="rId3" cstate="print">
-            <a:extLst>
-              <a:ext uri="{28A0092B-C50C-407E-A947-70E740481C1C}">
-                <a14:useLocalDpi xmlns:a14="http://schemas.microsoft.com/office/drawing/2010/main" val="0"/>
-              </a:ext>
-            </a:extLst>
-          </a:blip>
-          <a:srcRect l="33980"/>
-          <a:stretch/>
-        </p:blipFill>
-        <p:spPr>
-          <a:xfrm>
-            <a:off x="6829426" y="2501471"/>
-            <a:ext cx="4752974" cy="3599695"/>
-          </a:xfrm>
-          <a:prstGeom prst="rect">
-            <a:avLst/>
-          </a:prstGeom>
-        </p:spPr>
-      </p:pic>
       <p:grpSp>
         <p:nvGrpSpPr>
-          <p:cNvPr id="25" name="Group 24">
-            <a:extLst>
-              <a:ext uri="{FF2B5EF4-FFF2-40B4-BE49-F238E27FC236}">
-                <a16:creationId xmlns:a16="http://schemas.microsoft.com/office/drawing/2014/main" id="{39B82269-7B53-48AB-A0C9-3B4E7BA277FF}"/>
+          <p:cNvPr id="3" name="Group 2">
+            <a:extLst>
+              <a:ext uri="{FF2B5EF4-FFF2-40B4-BE49-F238E27FC236}">
+                <a16:creationId xmlns:a16="http://schemas.microsoft.com/office/drawing/2014/main" id="{0176DA38-8EE6-4074-A417-1C88FC90FD84}"/>
               </a:ext>
             </a:extLst>
           </p:cNvPr>
@@ -2865,300 +2859,356 @@
         </p:nvGrpSpPr>
         <p:grpSpPr>
           <a:xfrm>
-            <a:off x="4300774" y="2939107"/>
-            <a:ext cx="2443298" cy="2807961"/>
-            <a:chOff x="1826003" y="2977207"/>
-            <a:chExt cx="2443298" cy="2807961"/>
+            <a:off x="4655840" y="2467841"/>
+            <a:ext cx="7199391" cy="3599695"/>
+            <a:chOff x="4655840" y="2467841"/>
+            <a:chExt cx="7199391" cy="3599695"/>
           </a:xfrm>
         </p:grpSpPr>
-        <p:sp>
-          <p:nvSpPr>
-            <p:cNvPr id="17" name="TextBox 16">
+        <p:grpSp>
+          <p:nvGrpSpPr>
+            <p:cNvPr id="25" name="Group 24">
               <a:extLst>
                 <a:ext uri="{FF2B5EF4-FFF2-40B4-BE49-F238E27FC236}">
-                  <a16:creationId xmlns:a16="http://schemas.microsoft.com/office/drawing/2014/main" id="{20093EA7-73EF-46E1-BB1C-4B2365E867DA}"/>
+                  <a16:creationId xmlns:a16="http://schemas.microsoft.com/office/drawing/2014/main" id="{39B82269-7B53-48AB-A0C9-3B4E7BA277FF}"/>
                 </a:ext>
               </a:extLst>
             </p:cNvPr>
-            <p:cNvSpPr txBox="1"/>
+            <p:cNvGrpSpPr/>
             <p:nvPr/>
-          </p:nvSpPr>
+          </p:nvGrpSpPr>
+          <p:grpSpPr>
+            <a:xfrm>
+              <a:off x="4655840" y="2822873"/>
+              <a:ext cx="2455041" cy="2775629"/>
+              <a:chOff x="5477478" y="2977207"/>
+              <a:chExt cx="2455041" cy="2775629"/>
+            </a:xfrm>
+          </p:grpSpPr>
+          <p:sp>
+            <p:nvSpPr>
+              <p:cNvPr id="17" name="TextBox 16">
+                <a:extLst>
+                  <a:ext uri="{FF2B5EF4-FFF2-40B4-BE49-F238E27FC236}">
+                    <a16:creationId xmlns:a16="http://schemas.microsoft.com/office/drawing/2014/main" id="{20093EA7-73EF-46E1-BB1C-4B2365E867DA}"/>
+                  </a:ext>
+                </a:extLst>
+              </p:cNvPr>
+              <p:cNvSpPr txBox="1"/>
+              <p:nvPr/>
+            </p:nvSpPr>
+            <p:spPr>
+              <a:xfrm>
+                <a:off x="6806890" y="5445059"/>
+                <a:ext cx="1125629" cy="307777"/>
+              </a:xfrm>
+              <a:prstGeom prst="rect">
+                <a:avLst/>
+              </a:prstGeom>
+              <a:noFill/>
+            </p:spPr>
+            <p:txBody>
+              <a:bodyPr wrap="none" rtlCol="0">
+                <a:spAutoFit/>
+              </a:bodyPr>
+              <a:lstStyle/>
+              <a:p>
+                <a:r>
+                  <a:rPr lang="he-IL" sz="1400" dirty="0"/>
+                  <a:t>כרטיס אשראי</a:t>
+                </a:r>
+                <a:endParaRPr lang="en-IL" sz="1400" dirty="0"/>
+              </a:p>
+            </p:txBody>
+          </p:sp>
+          <p:sp>
+            <p:nvSpPr>
+              <p:cNvPr id="18" name="TextBox 17">
+                <a:extLst>
+                  <a:ext uri="{FF2B5EF4-FFF2-40B4-BE49-F238E27FC236}">
+                    <a16:creationId xmlns:a16="http://schemas.microsoft.com/office/drawing/2014/main" id="{744B7FA2-963C-4E31-8D6A-206602DDA850}"/>
+                  </a:ext>
+                </a:extLst>
+              </p:cNvPr>
+              <p:cNvSpPr txBox="1"/>
+              <p:nvPr/>
+            </p:nvSpPr>
+            <p:spPr>
+              <a:xfrm>
+                <a:off x="7510886" y="5079189"/>
+                <a:ext cx="404278" cy="307777"/>
+              </a:xfrm>
+              <a:prstGeom prst="rect">
+                <a:avLst/>
+              </a:prstGeom>
+              <a:noFill/>
+            </p:spPr>
+            <p:txBody>
+              <a:bodyPr wrap="none" rtlCol="0">
+                <a:spAutoFit/>
+              </a:bodyPr>
+              <a:lstStyle/>
+              <a:p>
+                <a:r>
+                  <a:rPr lang="he-IL" sz="1400" dirty="0"/>
+                  <a:t>צ'ק</a:t>
+                </a:r>
+                <a:endParaRPr lang="en-IL" sz="1400" dirty="0"/>
+              </a:p>
+            </p:txBody>
+          </p:sp>
+          <p:sp>
+            <p:nvSpPr>
+              <p:cNvPr id="19" name="TextBox 18">
+                <a:extLst>
+                  <a:ext uri="{FF2B5EF4-FFF2-40B4-BE49-F238E27FC236}">
+                    <a16:creationId xmlns:a16="http://schemas.microsoft.com/office/drawing/2014/main" id="{0C79A459-A192-494A-A406-9A7D5E688CF3}"/>
+                  </a:ext>
+                </a:extLst>
+              </p:cNvPr>
+              <p:cNvSpPr txBox="1"/>
+              <p:nvPr/>
+            </p:nvSpPr>
+            <p:spPr>
+              <a:xfrm>
+                <a:off x="7393934" y="4720174"/>
+                <a:ext cx="516488" cy="307777"/>
+              </a:xfrm>
+              <a:prstGeom prst="rect">
+                <a:avLst/>
+              </a:prstGeom>
+              <a:noFill/>
+            </p:spPr>
+            <p:txBody>
+              <a:bodyPr wrap="none" rtlCol="0">
+                <a:spAutoFit/>
+              </a:bodyPr>
+              <a:lstStyle/>
+              <a:p>
+                <a:r>
+                  <a:rPr lang="he-IL" sz="1400" dirty="0"/>
+                  <a:t>קופון</a:t>
+                </a:r>
+                <a:endParaRPr lang="en-IL" sz="1400" dirty="0"/>
+              </a:p>
+            </p:txBody>
+          </p:sp>
+          <p:sp>
+            <p:nvSpPr>
+              <p:cNvPr id="20" name="TextBox 19">
+                <a:extLst>
+                  <a:ext uri="{FF2B5EF4-FFF2-40B4-BE49-F238E27FC236}">
+                    <a16:creationId xmlns:a16="http://schemas.microsoft.com/office/drawing/2014/main" id="{7BF37AF1-8A2D-441D-AFAF-90270F405EDF}"/>
+                  </a:ext>
+                </a:extLst>
+              </p:cNvPr>
+              <p:cNvSpPr txBox="1"/>
+              <p:nvPr/>
+            </p:nvSpPr>
+            <p:spPr>
+              <a:xfrm>
+                <a:off x="6306381" y="4372638"/>
+                <a:ext cx="1622560" cy="307777"/>
+              </a:xfrm>
+              <a:prstGeom prst="rect">
+                <a:avLst/>
+              </a:prstGeom>
+              <a:noFill/>
+            </p:spPr>
+            <p:txBody>
+              <a:bodyPr wrap="none" rtlCol="0">
+                <a:spAutoFit/>
+              </a:bodyPr>
+              <a:lstStyle/>
+              <a:p>
+                <a:r>
+                  <a:rPr lang="he-IL" sz="1400" dirty="0"/>
+                  <a:t>החזר ברכישה הבאה</a:t>
+                </a:r>
+                <a:endParaRPr lang="en-IL" sz="1400" dirty="0"/>
+              </a:p>
+            </p:txBody>
+          </p:sp>
+          <p:sp>
+            <p:nvSpPr>
+              <p:cNvPr id="21" name="TextBox 20">
+                <a:extLst>
+                  <a:ext uri="{FF2B5EF4-FFF2-40B4-BE49-F238E27FC236}">
+                    <a16:creationId xmlns:a16="http://schemas.microsoft.com/office/drawing/2014/main" id="{48965E88-F83F-4F23-AE91-08F228B45AC3}"/>
+                  </a:ext>
+                </a:extLst>
+              </p:cNvPr>
+              <p:cNvSpPr txBox="1"/>
+              <p:nvPr/>
+            </p:nvSpPr>
+            <p:spPr>
+              <a:xfrm>
+                <a:off x="5477478" y="4016713"/>
+                <a:ext cx="2443298" cy="307777"/>
+              </a:xfrm>
+              <a:prstGeom prst="rect">
+                <a:avLst/>
+              </a:prstGeom>
+              <a:noFill/>
+            </p:spPr>
+            <p:txBody>
+              <a:bodyPr wrap="none" rtlCol="0">
+                <a:spAutoFit/>
+              </a:bodyPr>
+              <a:lstStyle/>
+              <a:p>
+                <a:r>
+                  <a:rPr lang="he-IL" sz="1400" dirty="0"/>
+                  <a:t>גובה החזר 100 ש"ח (שווה ערך)</a:t>
+                </a:r>
+                <a:endParaRPr lang="en-IL" sz="1400" dirty="0"/>
+              </a:p>
+            </p:txBody>
+          </p:sp>
+          <p:sp>
+            <p:nvSpPr>
+              <p:cNvPr id="22" name="TextBox 21">
+                <a:extLst>
+                  <a:ext uri="{FF2B5EF4-FFF2-40B4-BE49-F238E27FC236}">
+                    <a16:creationId xmlns:a16="http://schemas.microsoft.com/office/drawing/2014/main" id="{E3227BFF-FC02-46AA-8598-8981834DF613}"/>
+                  </a:ext>
+                </a:extLst>
+              </p:cNvPr>
+              <p:cNvSpPr txBox="1"/>
+              <p:nvPr/>
+            </p:nvSpPr>
+            <p:spPr>
+              <a:xfrm>
+                <a:off x="5540356" y="3677566"/>
+                <a:ext cx="2343911" cy="307777"/>
+              </a:xfrm>
+              <a:prstGeom prst="rect">
+                <a:avLst/>
+              </a:prstGeom>
+              <a:noFill/>
+            </p:spPr>
+            <p:txBody>
+              <a:bodyPr wrap="none" rtlCol="0">
+                <a:spAutoFit/>
+              </a:bodyPr>
+              <a:lstStyle/>
+              <a:p>
+                <a:r>
+                  <a:rPr lang="he-IL" sz="1400" dirty="0"/>
+                  <a:t>גובה החזר 75 ש"ח (שווה ערך)</a:t>
+                </a:r>
+                <a:endParaRPr lang="en-IL" sz="1400" dirty="0"/>
+              </a:p>
+            </p:txBody>
+          </p:sp>
+          <p:sp>
+            <p:nvSpPr>
+              <p:cNvPr id="23" name="TextBox 22">
+                <a:extLst>
+                  <a:ext uri="{FF2B5EF4-FFF2-40B4-BE49-F238E27FC236}">
+                    <a16:creationId xmlns:a16="http://schemas.microsoft.com/office/drawing/2014/main" id="{E6B26AA5-D82F-4E12-BE2F-F9C2C848F71D}"/>
+                  </a:ext>
+                </a:extLst>
+              </p:cNvPr>
+              <p:cNvSpPr txBox="1"/>
+              <p:nvPr/>
+            </p:nvSpPr>
+            <p:spPr>
+              <a:xfrm>
+                <a:off x="5562864" y="3288290"/>
+                <a:ext cx="2343911" cy="307777"/>
+              </a:xfrm>
+              <a:prstGeom prst="rect">
+                <a:avLst/>
+              </a:prstGeom>
+              <a:noFill/>
+            </p:spPr>
+            <p:txBody>
+              <a:bodyPr wrap="none" rtlCol="0">
+                <a:spAutoFit/>
+              </a:bodyPr>
+              <a:lstStyle/>
+              <a:p>
+                <a:r>
+                  <a:rPr lang="he-IL" sz="1400" dirty="0"/>
+                  <a:t>גובה החזר 50 ש"ח (שווה ערך)</a:t>
+                </a:r>
+                <a:endParaRPr lang="en-IL" sz="1400" dirty="0"/>
+              </a:p>
+            </p:txBody>
+          </p:sp>
+          <p:sp>
+            <p:nvSpPr>
+              <p:cNvPr id="24" name="TextBox 23">
+                <a:extLst>
+                  <a:ext uri="{FF2B5EF4-FFF2-40B4-BE49-F238E27FC236}">
+                    <a16:creationId xmlns:a16="http://schemas.microsoft.com/office/drawing/2014/main" id="{C2561219-11C4-42ED-9CCB-8C68035827A2}"/>
+                  </a:ext>
+                </a:extLst>
+              </p:cNvPr>
+              <p:cNvSpPr txBox="1"/>
+              <p:nvPr/>
+            </p:nvSpPr>
+            <p:spPr>
+              <a:xfrm>
+                <a:off x="6142674" y="2977207"/>
+                <a:ext cx="1781257" cy="307777"/>
+              </a:xfrm>
+              <a:prstGeom prst="rect">
+                <a:avLst/>
+              </a:prstGeom>
+              <a:noFill/>
+            </p:spPr>
+            <p:txBody>
+              <a:bodyPr wrap="none" rtlCol="0">
+                <a:spAutoFit/>
+              </a:bodyPr>
+              <a:lstStyle/>
+              <a:p>
+                <a:r>
+                  <a:rPr lang="he-IL" sz="1400" dirty="0"/>
+                  <a:t>קבלת הפיצוי ב"דחיפה"</a:t>
+                </a:r>
+                <a:endParaRPr lang="en-IL" sz="1400" dirty="0"/>
+              </a:p>
+            </p:txBody>
+          </p:sp>
+        </p:grpSp>
+        <p:pic>
+          <p:nvPicPr>
+            <p:cNvPr id="4" name="Picture 3">
+              <a:extLst>
+                <a:ext uri="{FF2B5EF4-FFF2-40B4-BE49-F238E27FC236}">
+                  <a16:creationId xmlns:a16="http://schemas.microsoft.com/office/drawing/2014/main" id="{35B70C29-FD22-423F-B9AD-EA867179635A}"/>
+                </a:ext>
+              </a:extLst>
+            </p:cNvPr>
+            <p:cNvPicPr>
+              <a:picLocks noChangeAspect="1"/>
+            </p:cNvPicPr>
+            <p:nvPr/>
+          </p:nvPicPr>
+          <p:blipFill rotWithShape="1">
+            <a:blip r:embed="rId3" cstate="print">
+              <a:extLst>
+                <a:ext uri="{28A0092B-C50C-407E-A947-70E740481C1C}">
+                  <a14:useLocalDpi xmlns:a14="http://schemas.microsoft.com/office/drawing/2010/main" val="0"/>
+                </a:ext>
+              </a:extLst>
+            </a:blip>
+            <a:srcRect l="34006"/>
+            <a:stretch/>
+          </p:blipFill>
           <p:spPr>
             <a:xfrm>
-              <a:off x="3143672" y="2977207"/>
-              <a:ext cx="1125629" cy="307777"/>
+              <a:off x="7104112" y="2467841"/>
+              <a:ext cx="4751119" cy="3599695"/>
             </a:xfrm>
             <a:prstGeom prst="rect">
               <a:avLst/>
             </a:prstGeom>
-            <a:noFill/>
           </p:spPr>
-          <p:txBody>
-            <a:bodyPr wrap="none" rtlCol="0">
-              <a:spAutoFit/>
-            </a:bodyPr>
-            <a:lstStyle/>
-            <a:p>
-              <a:r>
-                <a:rPr lang="he-IL" sz="1400" dirty="0"/>
-                <a:t>כרטיס אשראי</a:t>
-              </a:r>
-              <a:endParaRPr lang="en-IL" sz="1400" dirty="0"/>
-            </a:p>
-          </p:txBody>
-        </p:sp>
-        <p:sp>
-          <p:nvSpPr>
-            <p:cNvPr id="18" name="TextBox 17">
-              <a:extLst>
-                <a:ext uri="{FF2B5EF4-FFF2-40B4-BE49-F238E27FC236}">
-                  <a16:creationId xmlns:a16="http://schemas.microsoft.com/office/drawing/2014/main" id="{744B7FA2-963C-4E31-8D6A-206602DDA850}"/>
-                </a:ext>
-              </a:extLst>
-            </p:cNvPr>
-            <p:cNvSpPr txBox="1"/>
-            <p:nvPr/>
-          </p:nvSpPr>
-          <p:spPr>
-            <a:xfrm>
-              <a:off x="3865023" y="3307519"/>
-              <a:ext cx="404278" cy="307777"/>
-            </a:xfrm>
-            <a:prstGeom prst="rect">
-              <a:avLst/>
-            </a:prstGeom>
-            <a:noFill/>
-          </p:spPr>
-          <p:txBody>
-            <a:bodyPr wrap="none" rtlCol="0">
-              <a:spAutoFit/>
-            </a:bodyPr>
-            <a:lstStyle/>
-            <a:p>
-              <a:r>
-                <a:rPr lang="he-IL" sz="1400" dirty="0"/>
-                <a:t>צ'ק</a:t>
-              </a:r>
-              <a:endParaRPr lang="en-IL" sz="1400" dirty="0"/>
-            </a:p>
-          </p:txBody>
-        </p:sp>
-        <p:sp>
-          <p:nvSpPr>
-            <p:cNvPr id="19" name="TextBox 18">
-              <a:extLst>
-                <a:ext uri="{FF2B5EF4-FFF2-40B4-BE49-F238E27FC236}">
-                  <a16:creationId xmlns:a16="http://schemas.microsoft.com/office/drawing/2014/main" id="{0C79A459-A192-494A-A406-9A7D5E688CF3}"/>
-                </a:ext>
-              </a:extLst>
-            </p:cNvPr>
-            <p:cNvSpPr txBox="1"/>
-            <p:nvPr/>
-          </p:nvSpPr>
-          <p:spPr>
-            <a:xfrm>
-              <a:off x="3752813" y="3702733"/>
-              <a:ext cx="516488" cy="307777"/>
-            </a:xfrm>
-            <a:prstGeom prst="rect">
-              <a:avLst/>
-            </a:prstGeom>
-            <a:noFill/>
-          </p:spPr>
-          <p:txBody>
-            <a:bodyPr wrap="none" rtlCol="0">
-              <a:spAutoFit/>
-            </a:bodyPr>
-            <a:lstStyle/>
-            <a:p>
-              <a:r>
-                <a:rPr lang="he-IL" sz="1400" dirty="0"/>
-                <a:t>קופון</a:t>
-              </a:r>
-              <a:endParaRPr lang="en-IL" sz="1400" dirty="0"/>
-            </a:p>
-          </p:txBody>
-        </p:sp>
-        <p:sp>
-          <p:nvSpPr>
-            <p:cNvPr id="20" name="TextBox 19">
-              <a:extLst>
-                <a:ext uri="{FF2B5EF4-FFF2-40B4-BE49-F238E27FC236}">
-                  <a16:creationId xmlns:a16="http://schemas.microsoft.com/office/drawing/2014/main" id="{7BF37AF1-8A2D-441D-AFAF-90270F405EDF}"/>
-                </a:ext>
-              </a:extLst>
-            </p:cNvPr>
-            <p:cNvSpPr txBox="1"/>
-            <p:nvPr/>
-          </p:nvSpPr>
-          <p:spPr>
-            <a:xfrm>
-              <a:off x="2646741" y="4028473"/>
-              <a:ext cx="1622560" cy="307777"/>
-            </a:xfrm>
-            <a:prstGeom prst="rect">
-              <a:avLst/>
-            </a:prstGeom>
-            <a:noFill/>
-          </p:spPr>
-          <p:txBody>
-            <a:bodyPr wrap="none" rtlCol="0">
-              <a:spAutoFit/>
-            </a:bodyPr>
-            <a:lstStyle/>
-            <a:p>
-              <a:r>
-                <a:rPr lang="he-IL" sz="1400" dirty="0"/>
-                <a:t>החזר ברכישה הבאה</a:t>
-              </a:r>
-              <a:endParaRPr lang="en-IL" sz="1400" dirty="0"/>
-            </a:p>
-          </p:txBody>
-        </p:sp>
-        <p:sp>
-          <p:nvSpPr>
-            <p:cNvPr id="21" name="TextBox 20">
-              <a:extLst>
-                <a:ext uri="{FF2B5EF4-FFF2-40B4-BE49-F238E27FC236}">
-                  <a16:creationId xmlns:a16="http://schemas.microsoft.com/office/drawing/2014/main" id="{48965E88-F83F-4F23-AE91-08F228B45AC3}"/>
-                </a:ext>
-              </a:extLst>
-            </p:cNvPr>
-            <p:cNvSpPr txBox="1"/>
-            <p:nvPr/>
-          </p:nvSpPr>
-          <p:spPr>
-            <a:xfrm>
-              <a:off x="1826003" y="4428259"/>
-              <a:ext cx="2443298" cy="307777"/>
-            </a:xfrm>
-            <a:prstGeom prst="rect">
-              <a:avLst/>
-            </a:prstGeom>
-            <a:noFill/>
-          </p:spPr>
-          <p:txBody>
-            <a:bodyPr wrap="none" rtlCol="0">
-              <a:spAutoFit/>
-            </a:bodyPr>
-            <a:lstStyle/>
-            <a:p>
-              <a:r>
-                <a:rPr lang="he-IL" sz="1400" dirty="0"/>
-                <a:t>גובה החזר 100 ש"ח (שווה ערך)</a:t>
-              </a:r>
-              <a:endParaRPr lang="en-IL" sz="1400" dirty="0"/>
-            </a:p>
-          </p:txBody>
-        </p:sp>
-        <p:sp>
-          <p:nvSpPr>
-            <p:cNvPr id="22" name="TextBox 21">
-              <a:extLst>
-                <a:ext uri="{FF2B5EF4-FFF2-40B4-BE49-F238E27FC236}">
-                  <a16:creationId xmlns:a16="http://schemas.microsoft.com/office/drawing/2014/main" id="{E3227BFF-FC02-46AA-8598-8981834DF613}"/>
-                </a:ext>
-              </a:extLst>
-            </p:cNvPr>
-            <p:cNvSpPr txBox="1"/>
-            <p:nvPr/>
-          </p:nvSpPr>
-          <p:spPr>
-            <a:xfrm>
-              <a:off x="1925390" y="4777407"/>
-              <a:ext cx="2343911" cy="307777"/>
-            </a:xfrm>
-            <a:prstGeom prst="rect">
-              <a:avLst/>
-            </a:prstGeom>
-            <a:noFill/>
-          </p:spPr>
-          <p:txBody>
-            <a:bodyPr wrap="none" rtlCol="0">
-              <a:spAutoFit/>
-            </a:bodyPr>
-            <a:lstStyle/>
-            <a:p>
-              <a:r>
-                <a:rPr lang="he-IL" sz="1400" dirty="0"/>
-                <a:t>גובה החזר 75 ש"ח (שווה ערך)</a:t>
-              </a:r>
-              <a:endParaRPr lang="en-IL" sz="1400" dirty="0"/>
-            </a:p>
-          </p:txBody>
-        </p:sp>
-        <p:sp>
-          <p:nvSpPr>
-            <p:cNvPr id="23" name="TextBox 22">
-              <a:extLst>
-                <a:ext uri="{FF2B5EF4-FFF2-40B4-BE49-F238E27FC236}">
-                  <a16:creationId xmlns:a16="http://schemas.microsoft.com/office/drawing/2014/main" id="{E6B26AA5-D82F-4E12-BE2F-F9C2C848F71D}"/>
-                </a:ext>
-              </a:extLst>
-            </p:cNvPr>
-            <p:cNvSpPr txBox="1"/>
-            <p:nvPr/>
-          </p:nvSpPr>
-          <p:spPr>
-            <a:xfrm>
-              <a:off x="1925390" y="5128029"/>
-              <a:ext cx="2343911" cy="307777"/>
-            </a:xfrm>
-            <a:prstGeom prst="rect">
-              <a:avLst/>
-            </a:prstGeom>
-            <a:noFill/>
-          </p:spPr>
-          <p:txBody>
-            <a:bodyPr wrap="none" rtlCol="0">
-              <a:spAutoFit/>
-            </a:bodyPr>
-            <a:lstStyle/>
-            <a:p>
-              <a:r>
-                <a:rPr lang="he-IL" sz="1400" dirty="0"/>
-                <a:t>גובה החזר 50 ש"ח (שווה ערך)</a:t>
-              </a:r>
-              <a:endParaRPr lang="en-IL" sz="1400" dirty="0"/>
-            </a:p>
-          </p:txBody>
-        </p:sp>
-        <p:sp>
-          <p:nvSpPr>
-            <p:cNvPr id="24" name="TextBox 23">
-              <a:extLst>
-                <a:ext uri="{FF2B5EF4-FFF2-40B4-BE49-F238E27FC236}">
-                  <a16:creationId xmlns:a16="http://schemas.microsoft.com/office/drawing/2014/main" id="{C2561219-11C4-42ED-9CCB-8C68035827A2}"/>
-                </a:ext>
-              </a:extLst>
-            </p:cNvPr>
-            <p:cNvSpPr txBox="1"/>
-            <p:nvPr/>
-          </p:nvSpPr>
-          <p:spPr>
-            <a:xfrm>
-              <a:off x="2488044" y="5477391"/>
-              <a:ext cx="1781257" cy="307777"/>
-            </a:xfrm>
-            <a:prstGeom prst="rect">
-              <a:avLst/>
-            </a:prstGeom>
-            <a:noFill/>
-          </p:spPr>
-          <p:txBody>
-            <a:bodyPr wrap="none" rtlCol="0">
-              <a:spAutoFit/>
-            </a:bodyPr>
-            <a:lstStyle/>
-            <a:p>
-              <a:r>
-                <a:rPr lang="he-IL" sz="1400" dirty="0"/>
-                <a:t>קבלת הפיצוי ב"דחיפה"</a:t>
-              </a:r>
-              <a:endParaRPr lang="en-IL" sz="1400" dirty="0"/>
-            </a:p>
-          </p:txBody>
-        </p:sp>
+        </p:pic>
       </p:grpSp>
     </p:spTree>
     <p:extLst>
@@ -3195,7 +3245,7 @@
           <p:cNvPr id="2" name="Title 1">
             <a:extLst>
               <a:ext uri="{FF2B5EF4-FFF2-40B4-BE49-F238E27FC236}">
-                <a16:creationId xmlns:a16="http://schemas.microsoft.com/office/drawing/2014/main" id="{2609094E-9AF4-4201-AA85-247329965CA6}"/>
+                <a16:creationId xmlns:a16="http://schemas.microsoft.com/office/drawing/2014/main" id="{5C4E8DB2-E678-4D90-9CC3-A6944442C11C}"/>
               </a:ext>
             </a:extLst>
           </p:cNvPr>
@@ -3213,7 +3263,1573 @@
           <a:p>
             <a:r>
               <a:rPr lang="he-IL" dirty="0"/>
-              <a:t>משרדים מובילים באיכות התובענות</a:t>
+              <a:t>איזה פיצוי מעדיף התובע?</a:t>
+            </a:r>
+            <a:endParaRPr lang="en-IL" dirty="0"/>
+          </a:p>
+        </p:txBody>
+      </p:sp>
+      <p:sp>
+        <p:nvSpPr>
+          <p:cNvPr id="4" name="Slide Number Placeholder 3">
+            <a:extLst>
+              <a:ext uri="{FF2B5EF4-FFF2-40B4-BE49-F238E27FC236}">
+                <a16:creationId xmlns:a16="http://schemas.microsoft.com/office/drawing/2014/main" id="{03237CCF-13D8-48F0-81C5-9CC0E66C46C7}"/>
+              </a:ext>
+            </a:extLst>
+          </p:cNvPr>
+          <p:cNvSpPr>
+            <a:spLocks noGrp="1"/>
+          </p:cNvSpPr>
+          <p:nvPr>
+            <p:ph type="sldNum" sz="quarter" idx="12"/>
+          </p:nvPr>
+        </p:nvSpPr>
+        <p:spPr/>
+        <p:txBody>
+          <a:bodyPr/>
+          <a:lstStyle/>
+          <a:p>
+            <a:fld id="{48C2FE54-953E-4268-8452-225DF8E36AC9}" type="slidenum">
+              <a:rPr lang="he-IL" smtClean="0"/>
+              <a:t>11</a:t>
+            </a:fld>
+            <a:endParaRPr lang="he-IL"/>
+          </a:p>
+        </p:txBody>
+      </p:sp>
+      <p:sp>
+        <p:nvSpPr>
+          <p:cNvPr id="5" name="Rectangle: Rounded Corners 4">
+            <a:extLst>
+              <a:ext uri="{FF2B5EF4-FFF2-40B4-BE49-F238E27FC236}">
+                <a16:creationId xmlns:a16="http://schemas.microsoft.com/office/drawing/2014/main" id="{347DC0E8-0FA1-46C1-B7F3-6F26D069F8B7}"/>
+              </a:ext>
+            </a:extLst>
+          </p:cNvPr>
+          <p:cNvSpPr/>
+          <p:nvPr/>
+        </p:nvSpPr>
+        <p:spPr>
+          <a:xfrm>
+            <a:off x="9552384" y="1772816"/>
+            <a:ext cx="2448272" cy="936104"/>
+          </a:xfrm>
+          <a:prstGeom prst="roundRect">
+            <a:avLst/>
+          </a:prstGeom>
+        </p:spPr>
+        <p:style>
+          <a:lnRef idx="1">
+            <a:schemeClr val="accent2"/>
+          </a:lnRef>
+          <a:fillRef idx="2">
+            <a:schemeClr val="accent2"/>
+          </a:fillRef>
+          <a:effectRef idx="1">
+            <a:schemeClr val="accent2"/>
+          </a:effectRef>
+          <a:fontRef idx="minor">
+            <a:schemeClr val="dk1"/>
+          </a:fontRef>
+        </p:style>
+        <p:txBody>
+          <a:bodyPr rtlCol="0" anchor="ctr"/>
+          <a:lstStyle/>
+          <a:p>
+            <a:pPr algn="ctr"/>
+            <a:r>
+              <a:rPr lang="he-IL" sz="1600" dirty="0"/>
+              <a:t>שווה ערך 25 ש"ח</a:t>
+            </a:r>
+          </a:p>
+          <a:p>
+            <a:pPr algn="ctr"/>
+            <a:r>
+              <a:rPr lang="he-IL" sz="1600" dirty="0"/>
+              <a:t>צריך לבקש (לא "בדחיפה")</a:t>
+            </a:r>
+          </a:p>
+          <a:p>
+            <a:pPr algn="ctr"/>
+            <a:r>
+              <a:rPr lang="he-IL" sz="1600" dirty="0"/>
+              <a:t>ניתן כמוצר משלים</a:t>
+            </a:r>
+            <a:endParaRPr lang="en-IL" sz="1600" dirty="0"/>
+          </a:p>
+        </p:txBody>
+      </p:sp>
+      <p:sp>
+        <p:nvSpPr>
+          <p:cNvPr id="6" name="Rectangle: Rounded Corners 5">
+            <a:extLst>
+              <a:ext uri="{FF2B5EF4-FFF2-40B4-BE49-F238E27FC236}">
+                <a16:creationId xmlns:a16="http://schemas.microsoft.com/office/drawing/2014/main" id="{FDE26540-F5C8-4C49-B557-1EF2A2CB0526}"/>
+              </a:ext>
+            </a:extLst>
+          </p:cNvPr>
+          <p:cNvSpPr/>
+          <p:nvPr/>
+        </p:nvSpPr>
+        <p:spPr>
+          <a:xfrm>
+            <a:off x="294128" y="1772816"/>
+            <a:ext cx="2844799" cy="936104"/>
+          </a:xfrm>
+          <a:prstGeom prst="roundRect">
+            <a:avLst/>
+          </a:prstGeom>
+        </p:spPr>
+        <p:style>
+          <a:lnRef idx="1">
+            <a:schemeClr val="accent3"/>
+          </a:lnRef>
+          <a:fillRef idx="2">
+            <a:schemeClr val="accent3"/>
+          </a:fillRef>
+          <a:effectRef idx="1">
+            <a:schemeClr val="accent3"/>
+          </a:effectRef>
+          <a:fontRef idx="minor">
+            <a:schemeClr val="dk1"/>
+          </a:fontRef>
+        </p:style>
+        <p:txBody>
+          <a:bodyPr rtlCol="0" anchor="ctr"/>
+          <a:lstStyle/>
+          <a:p>
+            <a:pPr algn="ctr"/>
+            <a:r>
+              <a:rPr lang="he-IL" sz="1600" dirty="0"/>
+              <a:t>שווה ערך 100 ש"ח</a:t>
+            </a:r>
+          </a:p>
+          <a:p>
+            <a:pPr algn="ctr"/>
+            <a:r>
+              <a:rPr lang="he-IL" sz="1600" dirty="0"/>
+              <a:t>לא צריך לבקש (ניתן "בדחיפה")</a:t>
+            </a:r>
+          </a:p>
+          <a:p>
+            <a:pPr algn="ctr"/>
+            <a:r>
+              <a:rPr lang="he-IL" sz="1600" dirty="0"/>
+              <a:t>מועבר כזיכוי בכרטיס אשראי</a:t>
+            </a:r>
+            <a:endParaRPr lang="en-IL" sz="1600" dirty="0"/>
+          </a:p>
+        </p:txBody>
+      </p:sp>
+      <p:cxnSp>
+        <p:nvCxnSpPr>
+          <p:cNvPr id="8" name="Straight Arrow Connector 7">
+            <a:extLst>
+              <a:ext uri="{FF2B5EF4-FFF2-40B4-BE49-F238E27FC236}">
+                <a16:creationId xmlns:a16="http://schemas.microsoft.com/office/drawing/2014/main" id="{97F4D373-F669-4002-8281-F721519CF9DB}"/>
+              </a:ext>
+            </a:extLst>
+          </p:cNvPr>
+          <p:cNvCxnSpPr>
+            <a:stCxn id="5" idx="1"/>
+            <a:endCxn id="6" idx="3"/>
+          </p:cNvCxnSpPr>
+          <p:nvPr/>
+        </p:nvCxnSpPr>
+        <p:spPr>
+          <a:xfrm flipH="1">
+            <a:off x="3138927" y="2240868"/>
+            <a:ext cx="6413457" cy="0"/>
+          </a:xfrm>
+          <a:prstGeom prst="straightConnector1">
+            <a:avLst/>
+          </a:prstGeom>
+          <a:ln>
+            <a:tailEnd type="triangle"/>
+          </a:ln>
+        </p:spPr>
+        <p:style>
+          <a:lnRef idx="3">
+            <a:schemeClr val="dk1"/>
+          </a:lnRef>
+          <a:fillRef idx="0">
+            <a:schemeClr val="dk1"/>
+          </a:fillRef>
+          <a:effectRef idx="2">
+            <a:schemeClr val="dk1"/>
+          </a:effectRef>
+          <a:fontRef idx="minor">
+            <a:schemeClr val="tx1"/>
+          </a:fontRef>
+        </p:style>
+      </p:cxnSp>
+      <p:grpSp>
+        <p:nvGrpSpPr>
+          <p:cNvPr id="39" name="Group 38">
+            <a:extLst>
+              <a:ext uri="{FF2B5EF4-FFF2-40B4-BE49-F238E27FC236}">
+                <a16:creationId xmlns:a16="http://schemas.microsoft.com/office/drawing/2014/main" id="{53F6390D-E4DE-452A-A5BB-A586454CB420}"/>
+              </a:ext>
+            </a:extLst>
+          </p:cNvPr>
+          <p:cNvGrpSpPr/>
+          <p:nvPr/>
+        </p:nvGrpSpPr>
+        <p:grpSpPr>
+          <a:xfrm>
+            <a:off x="5735960" y="3178517"/>
+            <a:ext cx="5040560" cy="873388"/>
+            <a:chOff x="5735960" y="3212976"/>
+            <a:chExt cx="5040560" cy="873388"/>
+          </a:xfrm>
+        </p:grpSpPr>
+        <p:cxnSp>
+          <p:nvCxnSpPr>
+            <p:cNvPr id="18" name="Connector: Elbow 17">
+              <a:extLst>
+                <a:ext uri="{FF2B5EF4-FFF2-40B4-BE49-F238E27FC236}">
+                  <a16:creationId xmlns:a16="http://schemas.microsoft.com/office/drawing/2014/main" id="{D844FE63-FDA0-4C8B-B99A-8CB061BEA088}"/>
+                </a:ext>
+              </a:extLst>
+            </p:cNvPr>
+            <p:cNvCxnSpPr>
+              <a:cxnSpLocks/>
+            </p:cNvCxnSpPr>
+            <p:nvPr/>
+          </p:nvCxnSpPr>
+          <p:spPr>
+            <a:xfrm rot="10800000" flipV="1">
+              <a:off x="5735960" y="3212976"/>
+              <a:ext cx="5040560" cy="873388"/>
+            </a:xfrm>
+            <a:prstGeom prst="bentConnector3">
+              <a:avLst>
+                <a:gd name="adj1" fmla="val 238"/>
+              </a:avLst>
+            </a:prstGeom>
+            <a:ln>
+              <a:tailEnd type="triangle"/>
+            </a:ln>
+          </p:spPr>
+          <p:style>
+            <a:lnRef idx="2">
+              <a:schemeClr val="dk1"/>
+            </a:lnRef>
+            <a:fillRef idx="0">
+              <a:schemeClr val="dk1"/>
+            </a:fillRef>
+            <a:effectRef idx="1">
+              <a:schemeClr val="dk1"/>
+            </a:effectRef>
+            <a:fontRef idx="minor">
+              <a:schemeClr val="tx1"/>
+            </a:fontRef>
+          </p:style>
+        </p:cxnSp>
+        <p:sp>
+          <p:nvSpPr>
+            <p:cNvPr id="19" name="TextBox 18">
+              <a:extLst>
+                <a:ext uri="{FF2B5EF4-FFF2-40B4-BE49-F238E27FC236}">
+                  <a16:creationId xmlns:a16="http://schemas.microsoft.com/office/drawing/2014/main" id="{D591CDF4-17BA-4E2C-BE63-200A8DF39E83}"/>
+                </a:ext>
+              </a:extLst>
+            </p:cNvPr>
+            <p:cNvSpPr txBox="1"/>
+            <p:nvPr/>
+          </p:nvSpPr>
+          <p:spPr>
+            <a:xfrm>
+              <a:off x="5879976" y="3717032"/>
+              <a:ext cx="1925527" cy="369332"/>
+            </a:xfrm>
+            <a:prstGeom prst="rect">
+              <a:avLst/>
+            </a:prstGeom>
+            <a:noFill/>
+          </p:spPr>
+          <p:txBody>
+            <a:bodyPr wrap="none" rtlCol="0">
+              <a:spAutoFit/>
+            </a:bodyPr>
+            <a:lstStyle/>
+            <a:p>
+              <a:r>
+                <a:rPr lang="he-IL" dirty="0"/>
+                <a:t>25 ש"ח -&gt; 75 ש"ח</a:t>
+              </a:r>
+              <a:endParaRPr lang="en-IL" dirty="0"/>
+            </a:p>
+          </p:txBody>
+        </p:sp>
+      </p:grpSp>
+      <p:grpSp>
+        <p:nvGrpSpPr>
+          <p:cNvPr id="40" name="Group 39">
+            <a:extLst>
+              <a:ext uri="{FF2B5EF4-FFF2-40B4-BE49-F238E27FC236}">
+                <a16:creationId xmlns:a16="http://schemas.microsoft.com/office/drawing/2014/main" id="{F081F209-72B0-41AB-9AC0-D9C90395FC39}"/>
+              </a:ext>
+            </a:extLst>
+          </p:cNvPr>
+          <p:cNvGrpSpPr/>
+          <p:nvPr/>
+        </p:nvGrpSpPr>
+        <p:grpSpPr>
+          <a:xfrm>
+            <a:off x="7161834" y="3556238"/>
+            <a:ext cx="3600400" cy="922625"/>
+            <a:chOff x="7176120" y="3658503"/>
+            <a:chExt cx="3600400" cy="922625"/>
+          </a:xfrm>
+        </p:grpSpPr>
+        <p:cxnSp>
+          <p:nvCxnSpPr>
+            <p:cNvPr id="20" name="Connector: Elbow 19">
+              <a:extLst>
+                <a:ext uri="{FF2B5EF4-FFF2-40B4-BE49-F238E27FC236}">
+                  <a16:creationId xmlns:a16="http://schemas.microsoft.com/office/drawing/2014/main" id="{F4D85FF0-7B60-4C1A-98AB-5431DB8831CE}"/>
+                </a:ext>
+              </a:extLst>
+            </p:cNvPr>
+            <p:cNvCxnSpPr>
+              <a:cxnSpLocks/>
+            </p:cNvCxnSpPr>
+            <p:nvPr/>
+          </p:nvCxnSpPr>
+          <p:spPr>
+            <a:xfrm rot="10800000" flipV="1">
+              <a:off x="7176120" y="3658503"/>
+              <a:ext cx="3600400" cy="922625"/>
+            </a:xfrm>
+            <a:prstGeom prst="bentConnector3">
+              <a:avLst>
+                <a:gd name="adj1" fmla="val -95"/>
+              </a:avLst>
+            </a:prstGeom>
+            <a:ln>
+              <a:tailEnd type="triangle"/>
+            </a:ln>
+          </p:spPr>
+          <p:style>
+            <a:lnRef idx="2">
+              <a:schemeClr val="dk1"/>
+            </a:lnRef>
+            <a:fillRef idx="0">
+              <a:schemeClr val="dk1"/>
+            </a:fillRef>
+            <a:effectRef idx="1">
+              <a:schemeClr val="dk1"/>
+            </a:effectRef>
+            <a:fontRef idx="minor">
+              <a:schemeClr val="tx1"/>
+            </a:fontRef>
+          </p:style>
+        </p:cxnSp>
+        <p:sp>
+          <p:nvSpPr>
+            <p:cNvPr id="21" name="TextBox 20">
+              <a:extLst>
+                <a:ext uri="{FF2B5EF4-FFF2-40B4-BE49-F238E27FC236}">
+                  <a16:creationId xmlns:a16="http://schemas.microsoft.com/office/drawing/2014/main" id="{F3849CF1-633B-4515-BACC-E04CED950B23}"/>
+                </a:ext>
+              </a:extLst>
+            </p:cNvPr>
+            <p:cNvSpPr txBox="1"/>
+            <p:nvPr/>
+          </p:nvSpPr>
+          <p:spPr>
+            <a:xfrm>
+              <a:off x="7214984" y="4211796"/>
+              <a:ext cx="465192" cy="369332"/>
+            </a:xfrm>
+            <a:prstGeom prst="rect">
+              <a:avLst/>
+            </a:prstGeom>
+            <a:noFill/>
+          </p:spPr>
+          <p:txBody>
+            <a:bodyPr wrap="none" rtlCol="0">
+              <a:spAutoFit/>
+            </a:bodyPr>
+            <a:lstStyle/>
+            <a:p>
+              <a:r>
+                <a:rPr lang="he-IL" dirty="0"/>
+                <a:t>צ'ק</a:t>
+              </a:r>
+              <a:endParaRPr lang="en-IL" dirty="0"/>
+            </a:p>
+          </p:txBody>
+        </p:sp>
+      </p:grpSp>
+      <p:grpSp>
+        <p:nvGrpSpPr>
+          <p:cNvPr id="41" name="Group 40">
+            <a:extLst>
+              <a:ext uri="{FF2B5EF4-FFF2-40B4-BE49-F238E27FC236}">
+                <a16:creationId xmlns:a16="http://schemas.microsoft.com/office/drawing/2014/main" id="{810B4CCE-D450-4E49-8608-EB53A512BC08}"/>
+              </a:ext>
+            </a:extLst>
+          </p:cNvPr>
+          <p:cNvGrpSpPr/>
+          <p:nvPr/>
+        </p:nvGrpSpPr>
+        <p:grpSpPr>
+          <a:xfrm>
+            <a:off x="8465121" y="4013453"/>
+            <a:ext cx="2304256" cy="918439"/>
+            <a:chOff x="8472264" y="4149080"/>
+            <a:chExt cx="2304256" cy="918439"/>
+          </a:xfrm>
+        </p:grpSpPr>
+        <p:cxnSp>
+          <p:nvCxnSpPr>
+            <p:cNvPr id="24" name="Connector: Elbow 23">
+              <a:extLst>
+                <a:ext uri="{FF2B5EF4-FFF2-40B4-BE49-F238E27FC236}">
+                  <a16:creationId xmlns:a16="http://schemas.microsoft.com/office/drawing/2014/main" id="{DC6C1D96-E9D9-4F95-BEBC-A050D5F69C56}"/>
+                </a:ext>
+              </a:extLst>
+            </p:cNvPr>
+            <p:cNvCxnSpPr>
+              <a:cxnSpLocks/>
+            </p:cNvCxnSpPr>
+            <p:nvPr/>
+          </p:nvCxnSpPr>
+          <p:spPr>
+            <a:xfrm rot="10800000" flipV="1">
+              <a:off x="8472264" y="4149080"/>
+              <a:ext cx="2304256" cy="918438"/>
+            </a:xfrm>
+            <a:prstGeom prst="bentConnector3">
+              <a:avLst>
+                <a:gd name="adj1" fmla="val 123"/>
+              </a:avLst>
+            </a:prstGeom>
+            <a:ln>
+              <a:tailEnd type="triangle"/>
+            </a:ln>
+          </p:spPr>
+          <p:style>
+            <a:lnRef idx="2">
+              <a:schemeClr val="dk1"/>
+            </a:lnRef>
+            <a:fillRef idx="0">
+              <a:schemeClr val="dk1"/>
+            </a:fillRef>
+            <a:effectRef idx="1">
+              <a:schemeClr val="dk1"/>
+            </a:effectRef>
+            <a:fontRef idx="minor">
+              <a:schemeClr val="tx1"/>
+            </a:fontRef>
+          </p:style>
+        </p:cxnSp>
+        <p:sp>
+          <p:nvSpPr>
+            <p:cNvPr id="28" name="TextBox 27">
+              <a:extLst>
+                <a:ext uri="{FF2B5EF4-FFF2-40B4-BE49-F238E27FC236}">
+                  <a16:creationId xmlns:a16="http://schemas.microsoft.com/office/drawing/2014/main" id="{0423E6E9-8FF6-4D40-873F-DB68AC241CA7}"/>
+                </a:ext>
+              </a:extLst>
+            </p:cNvPr>
+            <p:cNvSpPr txBox="1"/>
+            <p:nvPr/>
+          </p:nvSpPr>
+          <p:spPr>
+            <a:xfrm>
+              <a:off x="8472264" y="4698187"/>
+              <a:ext cx="611066" cy="369332"/>
+            </a:xfrm>
+            <a:prstGeom prst="rect">
+              <a:avLst/>
+            </a:prstGeom>
+            <a:noFill/>
+          </p:spPr>
+          <p:txBody>
+            <a:bodyPr wrap="none" rtlCol="0">
+              <a:spAutoFit/>
+            </a:bodyPr>
+            <a:lstStyle/>
+            <a:p>
+              <a:r>
+                <a:rPr lang="he-IL" dirty="0"/>
+                <a:t>קופון</a:t>
+              </a:r>
+              <a:endParaRPr lang="en-IL" dirty="0"/>
+            </a:p>
+          </p:txBody>
+        </p:sp>
+      </p:grpSp>
+      <p:grpSp>
+        <p:nvGrpSpPr>
+          <p:cNvPr id="42" name="Group 41">
+            <a:extLst>
+              <a:ext uri="{FF2B5EF4-FFF2-40B4-BE49-F238E27FC236}">
+                <a16:creationId xmlns:a16="http://schemas.microsoft.com/office/drawing/2014/main" id="{CD29611F-D27E-485F-B405-ADD47A2424B1}"/>
+              </a:ext>
+            </a:extLst>
+          </p:cNvPr>
+          <p:cNvGrpSpPr/>
+          <p:nvPr/>
+        </p:nvGrpSpPr>
+        <p:grpSpPr>
+          <a:xfrm>
+            <a:off x="8785960" y="4479057"/>
+            <a:ext cx="1981036" cy="918439"/>
+            <a:chOff x="8795484" y="4670800"/>
+            <a:chExt cx="1981036" cy="918439"/>
+          </a:xfrm>
+        </p:grpSpPr>
+        <p:cxnSp>
+          <p:nvCxnSpPr>
+            <p:cNvPr id="29" name="Connector: Elbow 28">
+              <a:extLst>
+                <a:ext uri="{FF2B5EF4-FFF2-40B4-BE49-F238E27FC236}">
+                  <a16:creationId xmlns:a16="http://schemas.microsoft.com/office/drawing/2014/main" id="{19733553-6080-4703-A865-5E426D1ABD19}"/>
+                </a:ext>
+              </a:extLst>
+            </p:cNvPr>
+            <p:cNvCxnSpPr>
+              <a:cxnSpLocks/>
+            </p:cNvCxnSpPr>
+            <p:nvPr/>
+          </p:nvCxnSpPr>
+          <p:spPr>
+            <a:xfrm rot="10800000" flipV="1">
+              <a:off x="9083330" y="4670800"/>
+              <a:ext cx="1693190" cy="918439"/>
+            </a:xfrm>
+            <a:prstGeom prst="bentConnector3">
+              <a:avLst>
+                <a:gd name="adj1" fmla="val -41"/>
+              </a:avLst>
+            </a:prstGeom>
+            <a:ln>
+              <a:tailEnd type="triangle"/>
+            </a:ln>
+          </p:spPr>
+          <p:style>
+            <a:lnRef idx="2">
+              <a:schemeClr val="dk1"/>
+            </a:lnRef>
+            <a:fillRef idx="0">
+              <a:schemeClr val="dk1"/>
+            </a:fillRef>
+            <a:effectRef idx="1">
+              <a:schemeClr val="dk1"/>
+            </a:effectRef>
+            <a:fontRef idx="minor">
+              <a:schemeClr val="tx1"/>
+            </a:fontRef>
+          </p:style>
+        </p:cxnSp>
+        <p:sp>
+          <p:nvSpPr>
+            <p:cNvPr id="30" name="TextBox 29">
+              <a:extLst>
+                <a:ext uri="{FF2B5EF4-FFF2-40B4-BE49-F238E27FC236}">
+                  <a16:creationId xmlns:a16="http://schemas.microsoft.com/office/drawing/2014/main" id="{79F36E5A-DEF3-41E3-BB7A-79B6880970C9}"/>
+                </a:ext>
+              </a:extLst>
+            </p:cNvPr>
+            <p:cNvSpPr txBox="1"/>
+            <p:nvPr/>
+          </p:nvSpPr>
+          <p:spPr>
+            <a:xfrm>
+              <a:off x="8795484" y="5211519"/>
+              <a:ext cx="1925527" cy="369332"/>
+            </a:xfrm>
+            <a:prstGeom prst="rect">
+              <a:avLst/>
+            </a:prstGeom>
+            <a:noFill/>
+          </p:spPr>
+          <p:txBody>
+            <a:bodyPr wrap="none" rtlCol="0">
+              <a:spAutoFit/>
+            </a:bodyPr>
+            <a:lstStyle/>
+            <a:p>
+              <a:r>
+                <a:rPr lang="he-IL" dirty="0"/>
+                <a:t>25 ש"ח -&gt; 50 ש"ח</a:t>
+              </a:r>
+              <a:endParaRPr lang="en-IL" dirty="0"/>
+            </a:p>
+          </p:txBody>
+        </p:sp>
+      </p:grpSp>
+      <p:grpSp>
+        <p:nvGrpSpPr>
+          <p:cNvPr id="43" name="Group 42">
+            <a:extLst>
+              <a:ext uri="{FF2B5EF4-FFF2-40B4-BE49-F238E27FC236}">
+                <a16:creationId xmlns:a16="http://schemas.microsoft.com/office/drawing/2014/main" id="{5F07DDE1-BBEE-4CAF-B9B5-3DFD6ABE4072}"/>
+              </a:ext>
+            </a:extLst>
+          </p:cNvPr>
+          <p:cNvGrpSpPr/>
+          <p:nvPr/>
+        </p:nvGrpSpPr>
+        <p:grpSpPr>
+          <a:xfrm>
+            <a:off x="8639261" y="4797152"/>
+            <a:ext cx="2130116" cy="1094446"/>
+            <a:chOff x="8646404" y="5099754"/>
+            <a:chExt cx="2130116" cy="1094446"/>
+          </a:xfrm>
+        </p:grpSpPr>
+        <p:cxnSp>
+          <p:nvCxnSpPr>
+            <p:cNvPr id="33" name="Connector: Elbow 32">
+              <a:extLst>
+                <a:ext uri="{FF2B5EF4-FFF2-40B4-BE49-F238E27FC236}">
+                  <a16:creationId xmlns:a16="http://schemas.microsoft.com/office/drawing/2014/main" id="{F26884C5-E36A-47E9-84D0-A874E0A5EB19}"/>
+                </a:ext>
+              </a:extLst>
+            </p:cNvPr>
+            <p:cNvCxnSpPr>
+              <a:cxnSpLocks/>
+            </p:cNvCxnSpPr>
+            <p:nvPr/>
+          </p:nvCxnSpPr>
+          <p:spPr>
+            <a:xfrm rot="5400000">
+              <a:off x="9905261" y="5322941"/>
+              <a:ext cx="1094446" cy="648072"/>
+            </a:xfrm>
+            <a:prstGeom prst="bentConnector3">
+              <a:avLst>
+                <a:gd name="adj1" fmla="val 99823"/>
+              </a:avLst>
+            </a:prstGeom>
+            <a:ln>
+              <a:tailEnd type="triangle"/>
+            </a:ln>
+          </p:spPr>
+          <p:style>
+            <a:lnRef idx="2">
+              <a:schemeClr val="dk1"/>
+            </a:lnRef>
+            <a:fillRef idx="0">
+              <a:schemeClr val="dk1"/>
+            </a:fillRef>
+            <a:effectRef idx="1">
+              <a:schemeClr val="dk1"/>
+            </a:effectRef>
+            <a:fontRef idx="minor">
+              <a:schemeClr val="tx1"/>
+            </a:fontRef>
+          </p:style>
+        </p:cxnSp>
+        <p:sp>
+          <p:nvSpPr>
+            <p:cNvPr id="34" name="TextBox 33">
+              <a:extLst>
+                <a:ext uri="{FF2B5EF4-FFF2-40B4-BE49-F238E27FC236}">
+                  <a16:creationId xmlns:a16="http://schemas.microsoft.com/office/drawing/2014/main" id="{ECF94F68-7B7B-43F5-9E47-6FA9DF6A7D06}"/>
+                </a:ext>
+              </a:extLst>
+            </p:cNvPr>
+            <p:cNvSpPr txBox="1"/>
+            <p:nvPr/>
+          </p:nvSpPr>
+          <p:spPr>
+            <a:xfrm>
+              <a:off x="8646404" y="5795972"/>
+              <a:ext cx="2074607" cy="369332"/>
+            </a:xfrm>
+            <a:prstGeom prst="rect">
+              <a:avLst/>
+            </a:prstGeom>
+            <a:noFill/>
+          </p:spPr>
+          <p:txBody>
+            <a:bodyPr wrap="none" rtlCol="0">
+              <a:spAutoFit/>
+            </a:bodyPr>
+            <a:lstStyle/>
+            <a:p>
+              <a:r>
+                <a:rPr lang="he-IL" dirty="0"/>
+                <a:t>קבלת הפיצוי בדחיפה</a:t>
+              </a:r>
+              <a:endParaRPr lang="en-IL" dirty="0"/>
+            </a:p>
+          </p:txBody>
+        </p:sp>
+      </p:grpSp>
+      <p:grpSp>
+        <p:nvGrpSpPr>
+          <p:cNvPr id="57" name="Group 56">
+            <a:extLst>
+              <a:ext uri="{FF2B5EF4-FFF2-40B4-BE49-F238E27FC236}">
+                <a16:creationId xmlns:a16="http://schemas.microsoft.com/office/drawing/2014/main" id="{4467333D-D5AC-4769-8681-460A089E3F66}"/>
+              </a:ext>
+            </a:extLst>
+          </p:cNvPr>
+          <p:cNvGrpSpPr/>
+          <p:nvPr/>
+        </p:nvGrpSpPr>
+        <p:grpSpPr>
+          <a:xfrm>
+            <a:off x="4031958" y="2240868"/>
+            <a:ext cx="6732657" cy="837384"/>
+            <a:chOff x="4043863" y="2240868"/>
+            <a:chExt cx="6732657" cy="837384"/>
+          </a:xfrm>
+        </p:grpSpPr>
+        <p:grpSp>
+          <p:nvGrpSpPr>
+            <p:cNvPr id="37" name="Group 36">
+              <a:extLst>
+                <a:ext uri="{FF2B5EF4-FFF2-40B4-BE49-F238E27FC236}">
+                  <a16:creationId xmlns:a16="http://schemas.microsoft.com/office/drawing/2014/main" id="{55086FFA-113B-4F0E-A93B-329CD8FE1224}"/>
+                </a:ext>
+              </a:extLst>
+            </p:cNvPr>
+            <p:cNvGrpSpPr/>
+            <p:nvPr/>
+          </p:nvGrpSpPr>
+          <p:grpSpPr>
+            <a:xfrm>
+              <a:off x="4043863" y="2708920"/>
+              <a:ext cx="6732657" cy="369332"/>
+              <a:chOff x="4043863" y="2708920"/>
+              <a:chExt cx="6732657" cy="369332"/>
+            </a:xfrm>
+          </p:grpSpPr>
+          <p:cxnSp>
+            <p:nvCxnSpPr>
+              <p:cNvPr id="10" name="Connector: Elbow 9">
+                <a:extLst>
+                  <a:ext uri="{FF2B5EF4-FFF2-40B4-BE49-F238E27FC236}">
+                    <a16:creationId xmlns:a16="http://schemas.microsoft.com/office/drawing/2014/main" id="{1FF01699-B282-4423-AAF4-07DEC4FFE565}"/>
+                  </a:ext>
+                </a:extLst>
+              </p:cNvPr>
+              <p:cNvCxnSpPr>
+                <a:cxnSpLocks/>
+              </p:cNvCxnSpPr>
+              <p:nvPr/>
+            </p:nvCxnSpPr>
+            <p:spPr>
+              <a:xfrm rot="5400000">
+                <a:off x="7248128" y="-459432"/>
+                <a:ext cx="360040" cy="6696744"/>
+              </a:xfrm>
+              <a:prstGeom prst="bentConnector2">
+                <a:avLst/>
+              </a:prstGeom>
+              <a:ln>
+                <a:tailEnd type="triangle"/>
+              </a:ln>
+            </p:spPr>
+            <p:style>
+              <a:lnRef idx="2">
+                <a:schemeClr val="dk1"/>
+              </a:lnRef>
+              <a:fillRef idx="0">
+                <a:schemeClr val="dk1"/>
+              </a:fillRef>
+              <a:effectRef idx="1">
+                <a:schemeClr val="dk1"/>
+              </a:effectRef>
+              <a:fontRef idx="minor">
+                <a:schemeClr val="tx1"/>
+              </a:fontRef>
+            </p:style>
+          </p:cxnSp>
+          <p:sp>
+            <p:nvSpPr>
+              <p:cNvPr id="11" name="TextBox 10">
+                <a:extLst>
+                  <a:ext uri="{FF2B5EF4-FFF2-40B4-BE49-F238E27FC236}">
+                    <a16:creationId xmlns:a16="http://schemas.microsoft.com/office/drawing/2014/main" id="{45F00F2B-013E-4E4D-AC40-C9D5F58EEAFC}"/>
+                  </a:ext>
+                </a:extLst>
+              </p:cNvPr>
+              <p:cNvSpPr txBox="1"/>
+              <p:nvPr/>
+            </p:nvSpPr>
+            <p:spPr>
+              <a:xfrm>
+                <a:off x="4043863" y="2708920"/>
+                <a:ext cx="3852337" cy="369332"/>
+              </a:xfrm>
+              <a:prstGeom prst="rect">
+                <a:avLst/>
+              </a:prstGeom>
+              <a:noFill/>
+            </p:spPr>
+            <p:txBody>
+              <a:bodyPr wrap="none" rtlCol="0">
+                <a:spAutoFit/>
+              </a:bodyPr>
+              <a:lstStyle/>
+              <a:p>
+                <a:r>
+                  <a:rPr lang="he-IL" dirty="0"/>
+                  <a:t>25 ש"ח שווה ערך -&gt; 100 ש"ח שווה ערך</a:t>
+                </a:r>
+                <a:endParaRPr lang="en-IL" dirty="0"/>
+              </a:p>
+            </p:txBody>
+          </p:sp>
+        </p:grpSp>
+        <p:cxnSp>
+          <p:nvCxnSpPr>
+            <p:cNvPr id="56" name="Straight Connector 55">
+              <a:extLst>
+                <a:ext uri="{FF2B5EF4-FFF2-40B4-BE49-F238E27FC236}">
+                  <a16:creationId xmlns:a16="http://schemas.microsoft.com/office/drawing/2014/main" id="{72420334-2630-4750-88CB-5D3BE79BF72A}"/>
+                </a:ext>
+              </a:extLst>
+            </p:cNvPr>
+            <p:cNvCxnSpPr/>
+            <p:nvPr/>
+          </p:nvCxnSpPr>
+          <p:spPr>
+            <a:xfrm flipV="1">
+              <a:off x="4079776" y="2240868"/>
+              <a:ext cx="0" cy="837384"/>
+            </a:xfrm>
+            <a:prstGeom prst="line">
+              <a:avLst/>
+            </a:prstGeom>
+            <a:ln>
+              <a:prstDash val="dash"/>
+            </a:ln>
+          </p:spPr>
+          <p:style>
+            <a:lnRef idx="1">
+              <a:schemeClr val="dk1"/>
+            </a:lnRef>
+            <a:fillRef idx="0">
+              <a:schemeClr val="dk1"/>
+            </a:fillRef>
+            <a:effectRef idx="0">
+              <a:schemeClr val="dk1"/>
+            </a:effectRef>
+            <a:fontRef idx="minor">
+              <a:schemeClr val="tx1"/>
+            </a:fontRef>
+          </p:style>
+        </p:cxnSp>
+      </p:grpSp>
+      <p:grpSp>
+        <p:nvGrpSpPr>
+          <p:cNvPr id="60" name="Group 59">
+            <a:extLst>
+              <a:ext uri="{FF2B5EF4-FFF2-40B4-BE49-F238E27FC236}">
+                <a16:creationId xmlns:a16="http://schemas.microsoft.com/office/drawing/2014/main" id="{0CA9788B-CF34-46BC-A64E-72A4A33C7847}"/>
+              </a:ext>
+            </a:extLst>
+          </p:cNvPr>
+          <p:cNvGrpSpPr/>
+          <p:nvPr/>
+        </p:nvGrpSpPr>
+        <p:grpSpPr>
+          <a:xfrm>
+            <a:off x="5294388" y="2240868"/>
+            <a:ext cx="5472608" cy="1341440"/>
+            <a:chOff x="5303912" y="2240868"/>
+            <a:chExt cx="5472608" cy="1341440"/>
+          </a:xfrm>
+        </p:grpSpPr>
+        <p:grpSp>
+          <p:nvGrpSpPr>
+            <p:cNvPr id="38" name="Group 37">
+              <a:extLst>
+                <a:ext uri="{FF2B5EF4-FFF2-40B4-BE49-F238E27FC236}">
+                  <a16:creationId xmlns:a16="http://schemas.microsoft.com/office/drawing/2014/main" id="{C28AAF53-9B3A-42BC-865B-0C7098DB8BDC}"/>
+                </a:ext>
+              </a:extLst>
+            </p:cNvPr>
+            <p:cNvGrpSpPr/>
+            <p:nvPr/>
+          </p:nvGrpSpPr>
+          <p:grpSpPr>
+            <a:xfrm>
+              <a:off x="5303912" y="2708921"/>
+              <a:ext cx="5472608" cy="873387"/>
+              <a:chOff x="5303912" y="2708921"/>
+              <a:chExt cx="5472608" cy="873387"/>
+            </a:xfrm>
+          </p:grpSpPr>
+          <p:cxnSp>
+            <p:nvCxnSpPr>
+              <p:cNvPr id="14" name="Connector: Elbow 13">
+                <a:extLst>
+                  <a:ext uri="{FF2B5EF4-FFF2-40B4-BE49-F238E27FC236}">
+                    <a16:creationId xmlns:a16="http://schemas.microsoft.com/office/drawing/2014/main" id="{57737F52-D6B3-4842-A248-4E3B391A0F87}"/>
+                  </a:ext>
+                </a:extLst>
+              </p:cNvPr>
+              <p:cNvCxnSpPr>
+                <a:cxnSpLocks/>
+              </p:cNvCxnSpPr>
+              <p:nvPr/>
+            </p:nvCxnSpPr>
+            <p:spPr>
+              <a:xfrm rot="10800000" flipV="1">
+                <a:off x="5303912" y="2708921"/>
+                <a:ext cx="5472608" cy="864095"/>
+              </a:xfrm>
+              <a:prstGeom prst="bentConnector3">
+                <a:avLst>
+                  <a:gd name="adj1" fmla="val 27"/>
+                </a:avLst>
+              </a:prstGeom>
+              <a:ln>
+                <a:tailEnd type="triangle"/>
+              </a:ln>
+            </p:spPr>
+            <p:style>
+              <a:lnRef idx="2">
+                <a:schemeClr val="dk1"/>
+              </a:lnRef>
+              <a:fillRef idx="0">
+                <a:schemeClr val="dk1"/>
+              </a:fillRef>
+              <a:effectRef idx="1">
+                <a:schemeClr val="dk1"/>
+              </a:effectRef>
+              <a:fontRef idx="minor">
+                <a:schemeClr val="tx1"/>
+              </a:fontRef>
+            </p:style>
+          </p:cxnSp>
+          <p:sp>
+            <p:nvSpPr>
+              <p:cNvPr id="17" name="TextBox 16">
+                <a:extLst>
+                  <a:ext uri="{FF2B5EF4-FFF2-40B4-BE49-F238E27FC236}">
+                    <a16:creationId xmlns:a16="http://schemas.microsoft.com/office/drawing/2014/main" id="{61E760F9-149C-4D80-B8DC-4E1982EBF2B2}"/>
+                  </a:ext>
+                </a:extLst>
+              </p:cNvPr>
+              <p:cNvSpPr txBox="1"/>
+              <p:nvPr/>
+            </p:nvSpPr>
+            <p:spPr>
+              <a:xfrm>
+                <a:off x="5385444" y="3212976"/>
+                <a:ext cx="1949573" cy="369332"/>
+              </a:xfrm>
+              <a:prstGeom prst="rect">
+                <a:avLst/>
+              </a:prstGeom>
+              <a:noFill/>
+            </p:spPr>
+            <p:txBody>
+              <a:bodyPr wrap="none" rtlCol="0">
+                <a:spAutoFit/>
+              </a:bodyPr>
+              <a:lstStyle/>
+              <a:p>
+                <a:r>
+                  <a:rPr lang="he-IL" dirty="0"/>
+                  <a:t>זיכוי בכרטיס אשראי</a:t>
+                </a:r>
+                <a:endParaRPr lang="en-IL" dirty="0"/>
+              </a:p>
+            </p:txBody>
+          </p:sp>
+        </p:grpSp>
+        <p:cxnSp>
+          <p:nvCxnSpPr>
+            <p:cNvPr id="58" name="Straight Connector 57">
+              <a:extLst>
+                <a:ext uri="{FF2B5EF4-FFF2-40B4-BE49-F238E27FC236}">
+                  <a16:creationId xmlns:a16="http://schemas.microsoft.com/office/drawing/2014/main" id="{4DA5FAC6-65EF-4A1C-AF92-7A2C148275A4}"/>
+                </a:ext>
+              </a:extLst>
+            </p:cNvPr>
+            <p:cNvCxnSpPr>
+              <a:cxnSpLocks/>
+            </p:cNvCxnSpPr>
+            <p:nvPr/>
+          </p:nvCxnSpPr>
+          <p:spPr>
+            <a:xfrm flipV="1">
+              <a:off x="5316426" y="2240868"/>
+              <a:ext cx="0" cy="1341440"/>
+            </a:xfrm>
+            <a:prstGeom prst="line">
+              <a:avLst/>
+            </a:prstGeom>
+            <a:ln>
+              <a:prstDash val="dash"/>
+            </a:ln>
+          </p:spPr>
+          <p:style>
+            <a:lnRef idx="1">
+              <a:schemeClr val="dk1"/>
+            </a:lnRef>
+            <a:fillRef idx="0">
+              <a:schemeClr val="dk1"/>
+            </a:fillRef>
+            <a:effectRef idx="0">
+              <a:schemeClr val="dk1"/>
+            </a:effectRef>
+            <a:fontRef idx="minor">
+              <a:schemeClr val="tx1"/>
+            </a:fontRef>
+          </p:style>
+        </p:cxnSp>
+      </p:grpSp>
+      <p:grpSp>
+        <p:nvGrpSpPr>
+          <p:cNvPr id="67" name="Group 66">
+            <a:extLst>
+              <a:ext uri="{FF2B5EF4-FFF2-40B4-BE49-F238E27FC236}">
+                <a16:creationId xmlns:a16="http://schemas.microsoft.com/office/drawing/2014/main" id="{68C5C830-66AB-44A2-ACE1-A11C4DE002BA}"/>
+              </a:ext>
+            </a:extLst>
+          </p:cNvPr>
+          <p:cNvGrpSpPr/>
+          <p:nvPr/>
+        </p:nvGrpSpPr>
+        <p:grpSpPr>
+          <a:xfrm>
+            <a:off x="8679337" y="5256909"/>
+            <a:ext cx="2090041" cy="1124419"/>
+            <a:chOff x="8686480" y="5099754"/>
+            <a:chExt cx="2090041" cy="1124419"/>
+          </a:xfrm>
+        </p:grpSpPr>
+        <p:cxnSp>
+          <p:nvCxnSpPr>
+            <p:cNvPr id="68" name="Connector: Elbow 67">
+              <a:extLst>
+                <a:ext uri="{FF2B5EF4-FFF2-40B4-BE49-F238E27FC236}">
+                  <a16:creationId xmlns:a16="http://schemas.microsoft.com/office/drawing/2014/main" id="{0659DAD5-F70E-40C1-A83D-A4328BBE53C3}"/>
+                </a:ext>
+              </a:extLst>
+            </p:cNvPr>
+            <p:cNvCxnSpPr>
+              <a:cxnSpLocks/>
+            </p:cNvCxnSpPr>
+            <p:nvPr/>
+          </p:nvCxnSpPr>
+          <p:spPr>
+            <a:xfrm rot="5400000">
+              <a:off x="10145875" y="5593527"/>
+              <a:ext cx="1124419" cy="136873"/>
+            </a:xfrm>
+            <a:prstGeom prst="bentConnector3">
+              <a:avLst>
+                <a:gd name="adj1" fmla="val 99987"/>
+              </a:avLst>
+            </a:prstGeom>
+            <a:ln>
+              <a:tailEnd type="triangle"/>
+            </a:ln>
+          </p:spPr>
+          <p:style>
+            <a:lnRef idx="2">
+              <a:schemeClr val="dk1"/>
+            </a:lnRef>
+            <a:fillRef idx="0">
+              <a:schemeClr val="dk1"/>
+            </a:fillRef>
+            <a:effectRef idx="1">
+              <a:schemeClr val="dk1"/>
+            </a:effectRef>
+            <a:fontRef idx="minor">
+              <a:schemeClr val="tx1"/>
+            </a:fontRef>
+          </p:style>
+        </p:cxnSp>
+        <p:sp>
+          <p:nvSpPr>
+            <p:cNvPr id="69" name="TextBox 68">
+              <a:extLst>
+                <a:ext uri="{FF2B5EF4-FFF2-40B4-BE49-F238E27FC236}">
+                  <a16:creationId xmlns:a16="http://schemas.microsoft.com/office/drawing/2014/main" id="{BFFEFC4E-2A55-4604-A9D4-4CA325262C7A}"/>
+                </a:ext>
+              </a:extLst>
+            </p:cNvPr>
+            <p:cNvSpPr txBox="1"/>
+            <p:nvPr/>
+          </p:nvSpPr>
+          <p:spPr>
+            <a:xfrm>
+              <a:off x="8686480" y="5854841"/>
+              <a:ext cx="2034531" cy="369332"/>
+            </a:xfrm>
+            <a:prstGeom prst="rect">
+              <a:avLst/>
+            </a:prstGeom>
+            <a:noFill/>
+          </p:spPr>
+          <p:txBody>
+            <a:bodyPr wrap="none" rtlCol="0">
+              <a:spAutoFit/>
+            </a:bodyPr>
+            <a:lstStyle/>
+            <a:p>
+              <a:r>
+                <a:rPr lang="he-IL" dirty="0"/>
+                <a:t>החזר ברכישה הבאה</a:t>
+              </a:r>
+              <a:endParaRPr lang="en-IL" dirty="0"/>
+            </a:p>
+          </p:txBody>
+        </p:sp>
+      </p:grpSp>
+    </p:spTree>
+    <p:extLst>
+      <p:ext uri="{BB962C8B-B14F-4D97-AF65-F5344CB8AC3E}">
+        <p14:creationId xmlns:p14="http://schemas.microsoft.com/office/powerpoint/2010/main" val="1655729689"/>
+      </p:ext>
+    </p:extLst>
+  </p:cSld>
+  <p:clrMapOvr>
+    <a:masterClrMapping/>
+  </p:clrMapOvr>
+  <p:timing>
+    <p:tnLst>
+      <p:par>
+        <p:cTn id="1" dur="indefinite" restart="never" nodeType="tmRoot">
+          <p:childTnLst>
+            <p:seq concurrent="1" nextAc="seek">
+              <p:cTn id="2" dur="indefinite" nodeType="mainSeq">
+                <p:childTnLst>
+                  <p:par>
+                    <p:cTn id="3" fill="hold">
+                      <p:stCondLst>
+                        <p:cond delay="indefinite"/>
+                      </p:stCondLst>
+                      <p:childTnLst>
+                        <p:par>
+                          <p:cTn id="4" fill="hold">
+                            <p:stCondLst>
+                              <p:cond delay="0"/>
+                            </p:stCondLst>
+                            <p:childTnLst>
+                              <p:par>
+                                <p:cTn id="5" presetID="1" presetClass="entr" presetSubtype="0" fill="hold" nodeType="clickEffect">
+                                  <p:stCondLst>
+                                    <p:cond delay="0"/>
+                                  </p:stCondLst>
+                                  <p:childTnLst>
+                                    <p:set>
+                                      <p:cBhvr>
+                                        <p:cTn id="6" dur="1" fill="hold">
+                                          <p:stCondLst>
+                                            <p:cond delay="0"/>
+                                          </p:stCondLst>
+                                        </p:cTn>
+                                        <p:tgtEl>
+                                          <p:spTgt spid="57"/>
+                                        </p:tgtEl>
+                                        <p:attrNameLst>
+                                          <p:attrName>style.visibility</p:attrName>
+                                        </p:attrNameLst>
+                                      </p:cBhvr>
+                                      <p:to>
+                                        <p:strVal val="visible"/>
+                                      </p:to>
+                                    </p:set>
+                                  </p:childTnLst>
+                                </p:cTn>
+                              </p:par>
+                            </p:childTnLst>
+                          </p:cTn>
+                        </p:par>
+                      </p:childTnLst>
+                    </p:cTn>
+                  </p:par>
+                  <p:par>
+                    <p:cTn id="7" fill="hold">
+                      <p:stCondLst>
+                        <p:cond delay="indefinite"/>
+                      </p:stCondLst>
+                      <p:childTnLst>
+                        <p:par>
+                          <p:cTn id="8" fill="hold">
+                            <p:stCondLst>
+                              <p:cond delay="0"/>
+                            </p:stCondLst>
+                            <p:childTnLst>
+                              <p:par>
+                                <p:cTn id="9" presetID="1" presetClass="entr" presetSubtype="0" fill="hold" nodeType="clickEffect">
+                                  <p:stCondLst>
+                                    <p:cond delay="0"/>
+                                  </p:stCondLst>
+                                  <p:childTnLst>
+                                    <p:set>
+                                      <p:cBhvr>
+                                        <p:cTn id="10" dur="1" fill="hold">
+                                          <p:stCondLst>
+                                            <p:cond delay="0"/>
+                                          </p:stCondLst>
+                                        </p:cTn>
+                                        <p:tgtEl>
+                                          <p:spTgt spid="60"/>
+                                        </p:tgtEl>
+                                        <p:attrNameLst>
+                                          <p:attrName>style.visibility</p:attrName>
+                                        </p:attrNameLst>
+                                      </p:cBhvr>
+                                      <p:to>
+                                        <p:strVal val="visible"/>
+                                      </p:to>
+                                    </p:set>
+                                  </p:childTnLst>
+                                </p:cTn>
+                              </p:par>
+                            </p:childTnLst>
+                          </p:cTn>
+                        </p:par>
+                      </p:childTnLst>
+                    </p:cTn>
+                  </p:par>
+                  <p:par>
+                    <p:cTn id="11" fill="hold">
+                      <p:stCondLst>
+                        <p:cond delay="indefinite"/>
+                      </p:stCondLst>
+                      <p:childTnLst>
+                        <p:par>
+                          <p:cTn id="12" fill="hold">
+                            <p:stCondLst>
+                              <p:cond delay="0"/>
+                            </p:stCondLst>
+                            <p:childTnLst>
+                              <p:par>
+                                <p:cTn id="13" presetID="1" presetClass="entr" presetSubtype="0" fill="hold" nodeType="clickEffect">
+                                  <p:stCondLst>
+                                    <p:cond delay="0"/>
+                                  </p:stCondLst>
+                                  <p:childTnLst>
+                                    <p:set>
+                                      <p:cBhvr>
+                                        <p:cTn id="14" dur="1" fill="hold">
+                                          <p:stCondLst>
+                                            <p:cond delay="0"/>
+                                          </p:stCondLst>
+                                        </p:cTn>
+                                        <p:tgtEl>
+                                          <p:spTgt spid="39"/>
+                                        </p:tgtEl>
+                                        <p:attrNameLst>
+                                          <p:attrName>style.visibility</p:attrName>
+                                        </p:attrNameLst>
+                                      </p:cBhvr>
+                                      <p:to>
+                                        <p:strVal val="visible"/>
+                                      </p:to>
+                                    </p:set>
+                                  </p:childTnLst>
+                                </p:cTn>
+                              </p:par>
+                            </p:childTnLst>
+                          </p:cTn>
+                        </p:par>
+                      </p:childTnLst>
+                    </p:cTn>
+                  </p:par>
+                  <p:par>
+                    <p:cTn id="15" fill="hold">
+                      <p:stCondLst>
+                        <p:cond delay="indefinite"/>
+                      </p:stCondLst>
+                      <p:childTnLst>
+                        <p:par>
+                          <p:cTn id="16" fill="hold">
+                            <p:stCondLst>
+                              <p:cond delay="0"/>
+                            </p:stCondLst>
+                            <p:childTnLst>
+                              <p:par>
+                                <p:cTn id="17" presetID="1" presetClass="entr" presetSubtype="0" fill="hold" nodeType="clickEffect">
+                                  <p:stCondLst>
+                                    <p:cond delay="0"/>
+                                  </p:stCondLst>
+                                  <p:childTnLst>
+                                    <p:set>
+                                      <p:cBhvr>
+                                        <p:cTn id="18" dur="1" fill="hold">
+                                          <p:stCondLst>
+                                            <p:cond delay="0"/>
+                                          </p:stCondLst>
+                                        </p:cTn>
+                                        <p:tgtEl>
+                                          <p:spTgt spid="40"/>
+                                        </p:tgtEl>
+                                        <p:attrNameLst>
+                                          <p:attrName>style.visibility</p:attrName>
+                                        </p:attrNameLst>
+                                      </p:cBhvr>
+                                      <p:to>
+                                        <p:strVal val="visible"/>
+                                      </p:to>
+                                    </p:set>
+                                  </p:childTnLst>
+                                </p:cTn>
+                              </p:par>
+                            </p:childTnLst>
+                          </p:cTn>
+                        </p:par>
+                      </p:childTnLst>
+                    </p:cTn>
+                  </p:par>
+                  <p:par>
+                    <p:cTn id="19" fill="hold">
+                      <p:stCondLst>
+                        <p:cond delay="indefinite"/>
+                      </p:stCondLst>
+                      <p:childTnLst>
+                        <p:par>
+                          <p:cTn id="20" fill="hold">
+                            <p:stCondLst>
+                              <p:cond delay="0"/>
+                            </p:stCondLst>
+                            <p:childTnLst>
+                              <p:par>
+                                <p:cTn id="21" presetID="1" presetClass="entr" presetSubtype="0" fill="hold" nodeType="clickEffect">
+                                  <p:stCondLst>
+                                    <p:cond delay="0"/>
+                                  </p:stCondLst>
+                                  <p:childTnLst>
+                                    <p:set>
+                                      <p:cBhvr>
+                                        <p:cTn id="22" dur="1" fill="hold">
+                                          <p:stCondLst>
+                                            <p:cond delay="0"/>
+                                          </p:stCondLst>
+                                        </p:cTn>
+                                        <p:tgtEl>
+                                          <p:spTgt spid="41"/>
+                                        </p:tgtEl>
+                                        <p:attrNameLst>
+                                          <p:attrName>style.visibility</p:attrName>
+                                        </p:attrNameLst>
+                                      </p:cBhvr>
+                                      <p:to>
+                                        <p:strVal val="visible"/>
+                                      </p:to>
+                                    </p:set>
+                                  </p:childTnLst>
+                                </p:cTn>
+                              </p:par>
+                            </p:childTnLst>
+                          </p:cTn>
+                        </p:par>
+                      </p:childTnLst>
+                    </p:cTn>
+                  </p:par>
+                  <p:par>
+                    <p:cTn id="23" fill="hold">
+                      <p:stCondLst>
+                        <p:cond delay="indefinite"/>
+                      </p:stCondLst>
+                      <p:childTnLst>
+                        <p:par>
+                          <p:cTn id="24" fill="hold">
+                            <p:stCondLst>
+                              <p:cond delay="0"/>
+                            </p:stCondLst>
+                            <p:childTnLst>
+                              <p:par>
+                                <p:cTn id="25" presetID="1" presetClass="entr" presetSubtype="0" fill="hold" nodeType="clickEffect">
+                                  <p:stCondLst>
+                                    <p:cond delay="0"/>
+                                  </p:stCondLst>
+                                  <p:childTnLst>
+                                    <p:set>
+                                      <p:cBhvr>
+                                        <p:cTn id="26" dur="1" fill="hold">
+                                          <p:stCondLst>
+                                            <p:cond delay="0"/>
+                                          </p:stCondLst>
+                                        </p:cTn>
+                                        <p:tgtEl>
+                                          <p:spTgt spid="42"/>
+                                        </p:tgtEl>
+                                        <p:attrNameLst>
+                                          <p:attrName>style.visibility</p:attrName>
+                                        </p:attrNameLst>
+                                      </p:cBhvr>
+                                      <p:to>
+                                        <p:strVal val="visible"/>
+                                      </p:to>
+                                    </p:set>
+                                  </p:childTnLst>
+                                </p:cTn>
+                              </p:par>
+                            </p:childTnLst>
+                          </p:cTn>
+                        </p:par>
+                      </p:childTnLst>
+                    </p:cTn>
+                  </p:par>
+                  <p:par>
+                    <p:cTn id="27" fill="hold">
+                      <p:stCondLst>
+                        <p:cond delay="indefinite"/>
+                      </p:stCondLst>
+                      <p:childTnLst>
+                        <p:par>
+                          <p:cTn id="28" fill="hold">
+                            <p:stCondLst>
+                              <p:cond delay="0"/>
+                            </p:stCondLst>
+                            <p:childTnLst>
+                              <p:par>
+                                <p:cTn id="29" presetID="1" presetClass="entr" presetSubtype="0" fill="hold" nodeType="clickEffect">
+                                  <p:stCondLst>
+                                    <p:cond delay="0"/>
+                                  </p:stCondLst>
+                                  <p:childTnLst>
+                                    <p:set>
+                                      <p:cBhvr>
+                                        <p:cTn id="30" dur="1" fill="hold">
+                                          <p:stCondLst>
+                                            <p:cond delay="0"/>
+                                          </p:stCondLst>
+                                        </p:cTn>
+                                        <p:tgtEl>
+                                          <p:spTgt spid="43"/>
+                                        </p:tgtEl>
+                                        <p:attrNameLst>
+                                          <p:attrName>style.visibility</p:attrName>
+                                        </p:attrNameLst>
+                                      </p:cBhvr>
+                                      <p:to>
+                                        <p:strVal val="visible"/>
+                                      </p:to>
+                                    </p:set>
+                                  </p:childTnLst>
+                                </p:cTn>
+                              </p:par>
+                            </p:childTnLst>
+                          </p:cTn>
+                        </p:par>
+                      </p:childTnLst>
+                    </p:cTn>
+                  </p:par>
+                  <p:par>
+                    <p:cTn id="31" fill="hold">
+                      <p:stCondLst>
+                        <p:cond delay="indefinite"/>
+                      </p:stCondLst>
+                      <p:childTnLst>
+                        <p:par>
+                          <p:cTn id="32" fill="hold">
+                            <p:stCondLst>
+                              <p:cond delay="0"/>
+                            </p:stCondLst>
+                            <p:childTnLst>
+                              <p:par>
+                                <p:cTn id="33" presetID="1" presetClass="entr" presetSubtype="0" fill="hold" nodeType="clickEffect">
+                                  <p:stCondLst>
+                                    <p:cond delay="0"/>
+                                  </p:stCondLst>
+                                  <p:childTnLst>
+                                    <p:set>
+                                      <p:cBhvr>
+                                        <p:cTn id="34" dur="1" fill="hold">
+                                          <p:stCondLst>
+                                            <p:cond delay="0"/>
+                                          </p:stCondLst>
+                                        </p:cTn>
+                                        <p:tgtEl>
+                                          <p:spTgt spid="67"/>
+                                        </p:tgtEl>
+                                        <p:attrNameLst>
+                                          <p:attrName>style.visibility</p:attrName>
+                                        </p:attrNameLst>
+                                      </p:cBhvr>
+                                      <p:to>
+                                        <p:strVal val="visible"/>
+                                      </p:to>
+                                    </p:set>
+                                  </p:childTnLst>
+                                </p:cTn>
+                              </p:par>
+                            </p:childTnLst>
+                          </p:cTn>
+                        </p:par>
+                      </p:childTnLst>
+                    </p:cTn>
+                  </p:par>
+                </p:childTnLst>
+              </p:cTn>
+              <p:prevCondLst>
+                <p:cond evt="onPrev" delay="0">
+                  <p:tgtEl>
+                    <p:sldTgt/>
+                  </p:tgtEl>
+                </p:cond>
+              </p:prevCondLst>
+              <p:nextCondLst>
+                <p:cond evt="onNext" delay="0">
+                  <p:tgtEl>
+                    <p:sldTgt/>
+                  </p:tgtEl>
+                </p:cond>
+              </p:nextCondLst>
+            </p:seq>
+          </p:childTnLst>
+        </p:cTn>
+      </p:par>
+    </p:tnLst>
+  </p:timing>
+</p:sld>
+</file>
+
+<file path=ppt/slides/slide12.xml><?xml version="1.0" encoding="utf-8"?>
+<p:sld xmlns:a="http://schemas.openxmlformats.org/drawingml/2006/main" xmlns:r="http://schemas.openxmlformats.org/officeDocument/2006/relationships" xmlns:p="http://schemas.openxmlformats.org/presentationml/2006/main">
+  <p:cSld>
+    <p:spTree>
+      <p:nvGrpSpPr>
+        <p:cNvPr id="1" name=""/>
+        <p:cNvGrpSpPr/>
+        <p:nvPr/>
+      </p:nvGrpSpPr>
+      <p:grpSpPr>
+        <a:xfrm>
+          <a:off x="0" y="0"/>
+          <a:ext cx="0" cy="0"/>
+          <a:chOff x="0" y="0"/>
+          <a:chExt cx="0" cy="0"/>
+        </a:xfrm>
+      </p:grpSpPr>
+      <p:sp>
+        <p:nvSpPr>
+          <p:cNvPr id="2" name="Title 1">
+            <a:extLst>
+              <a:ext uri="{FF2B5EF4-FFF2-40B4-BE49-F238E27FC236}">
+                <a16:creationId xmlns:a16="http://schemas.microsoft.com/office/drawing/2014/main" id="{2609094E-9AF4-4201-AA85-247329965CA6}"/>
+              </a:ext>
+            </a:extLst>
+          </p:cNvPr>
+          <p:cNvSpPr>
+            <a:spLocks noGrp="1"/>
+          </p:cNvSpPr>
+          <p:nvPr>
+            <p:ph type="title"/>
+          </p:nvPr>
+        </p:nvSpPr>
+        <p:spPr/>
+        <p:txBody>
+          <a:bodyPr>
+            <a:normAutofit fontScale="90000"/>
+          </a:bodyPr>
+          <a:lstStyle/>
+          <a:p>
+            <a:r>
+              <a:rPr lang="he-IL" dirty="0"/>
+              <a:t>משרדי תובעים ייצוגיים המובילים באיכות התובענות</a:t>
             </a:r>
             <a:endParaRPr lang="en-IL" dirty="0"/>
           </a:p>
@@ -3283,7 +4899,7 @@
           <a:p>
             <a:fld id="{48C2FE54-953E-4268-8452-225DF8E36AC9}" type="slidenum">
               <a:rPr lang="he-IL" smtClean="0"/>
-              <a:t>11</a:t>
+              <a:t>12</a:t>
             </a:fld>
             <a:endParaRPr lang="he-IL"/>
           </a:p>
@@ -3387,7 +5003,7 @@
 </p:sld>
 </file>
 
-<file path=ppt/slides/slide12.xml><?xml version="1.0" encoding="utf-8"?>
+<file path=ppt/slides/slide13.xml><?xml version="1.0" encoding="utf-8"?>
 <p:sld xmlns:a="http://schemas.openxmlformats.org/drawingml/2006/main" xmlns:r="http://schemas.openxmlformats.org/officeDocument/2006/relationships" xmlns:p="http://schemas.openxmlformats.org/presentationml/2006/main" show="0">
   <p:cSld>
     <p:spTree>
@@ -3422,12 +5038,14 @@
         </p:nvSpPr>
         <p:spPr/>
         <p:txBody>
-          <a:bodyPr/>
+          <a:bodyPr>
+            <a:normAutofit fontScale="90000"/>
+          </a:bodyPr>
           <a:lstStyle/>
           <a:p>
             <a:r>
               <a:rPr lang="he-IL" dirty="0"/>
-              <a:t>משרדים מובילים באיכות התובענות</a:t>
+              <a:t>משרדי תובעים ייצוגיים המובילים באיכות התובענות</a:t>
             </a:r>
             <a:endParaRPr lang="en-IL" dirty="0"/>
           </a:p>
@@ -3497,7 +5115,7 @@
           <a:p>
             <a:fld id="{48C2FE54-953E-4268-8452-225DF8E36AC9}" type="slidenum">
               <a:rPr lang="he-IL" smtClean="0"/>
-              <a:t>12</a:t>
+              <a:t>13</a:t>
             </a:fld>
             <a:endParaRPr lang="he-IL"/>
           </a:p>
@@ -3600,7 +5218,7 @@
 </p:sld>
 </file>
 
-<file path=ppt/slides/slide13.xml><?xml version="1.0" encoding="utf-8"?>
+<file path=ppt/slides/slide14.xml><?xml version="1.0" encoding="utf-8"?>
 <p:sld xmlns:a="http://schemas.openxmlformats.org/drawingml/2006/main" xmlns:r="http://schemas.openxmlformats.org/officeDocument/2006/relationships" xmlns:p="http://schemas.openxmlformats.org/presentationml/2006/main">
   <p:cSld>
     <p:spTree>
@@ -3640,7 +5258,7 @@
           <a:p>
             <a:r>
               <a:rPr lang="he-IL" dirty="0"/>
-              <a:t>משרדים מובילים באיכות הייצוג</a:t>
+              <a:t>משרדים מובילים באיכות ייצוג חברות נתבעות</a:t>
             </a:r>
             <a:endParaRPr lang="en-IL" dirty="0"/>
           </a:p>
@@ -3710,7 +5328,7 @@
           <a:p>
             <a:fld id="{48C2FE54-953E-4268-8452-225DF8E36AC9}" type="slidenum">
               <a:rPr lang="he-IL" smtClean="0"/>
-              <a:t>13</a:t>
+              <a:t>14</a:t>
             </a:fld>
             <a:endParaRPr lang="he-IL"/>
           </a:p>
@@ -3814,7 +5432,7 @@
 </p:sld>
 </file>
 
-<file path=ppt/slides/slide14.xml><?xml version="1.0" encoding="utf-8"?>
+<file path=ppt/slides/slide15.xml><?xml version="1.0" encoding="utf-8"?>
 <p:sld xmlns:a="http://schemas.openxmlformats.org/drawingml/2006/main" xmlns:r="http://schemas.openxmlformats.org/officeDocument/2006/relationships" xmlns:p="http://schemas.openxmlformats.org/presentationml/2006/main" show="0">
   <p:cSld>
     <p:spTree>
@@ -3854,7 +5472,7 @@
           <a:p>
             <a:r>
               <a:rPr lang="he-IL" dirty="0"/>
-              <a:t>משרדים מובילים באיכות הייצוג</a:t>
+              <a:t>משרדים מובילים באיכות ייצוג חברות נתבעות</a:t>
             </a:r>
             <a:endParaRPr lang="en-IL" dirty="0"/>
           </a:p>
@@ -3924,7 +5542,7 @@
           <a:p>
             <a:fld id="{48C2FE54-953E-4268-8452-225DF8E36AC9}" type="slidenum">
               <a:rPr lang="he-IL" smtClean="0"/>
-              <a:t>14</a:t>
+              <a:t>15</a:t>
             </a:fld>
             <a:endParaRPr lang="he-IL"/>
           </a:p>
@@ -4028,7 +5646,7 @@
 </p:sld>
 </file>
 
-<file path=ppt/slides/slide15.xml><?xml version="1.0" encoding="utf-8"?>
+<file path=ppt/slides/slide16.xml><?xml version="1.0" encoding="utf-8"?>
 <p:sld xmlns:a="http://schemas.openxmlformats.org/drawingml/2006/main" xmlns:r="http://schemas.openxmlformats.org/officeDocument/2006/relationships" xmlns:p="http://schemas.openxmlformats.org/presentationml/2006/main">
   <p:cSld>
     <p:spTree>
@@ -4140,7 +5758,7 @@
           <a:p>
             <a:fld id="{48C2FE54-953E-4268-8452-225DF8E36AC9}" type="slidenum">
               <a:rPr lang="he-IL" smtClean="0"/>
-              <a:t>15</a:t>
+              <a:t>16</a:t>
             </a:fld>
             <a:endParaRPr lang="he-IL"/>
           </a:p>
@@ -4148,10 +5766,10 @@
       </p:sp>
       <p:pic>
         <p:nvPicPr>
-          <p:cNvPr id="20" name="Content Placeholder 19">
-            <a:extLst>
-              <a:ext uri="{FF2B5EF4-FFF2-40B4-BE49-F238E27FC236}">
-                <a16:creationId xmlns:a16="http://schemas.microsoft.com/office/drawing/2014/main" id="{DEE57553-5D5A-420B-8128-6DDC785BB4DC}"/>
+          <p:cNvPr id="12" name="Content Placeholder 11">
+            <a:extLst>
+              <a:ext uri="{FF2B5EF4-FFF2-40B4-BE49-F238E27FC236}">
+                <a16:creationId xmlns:a16="http://schemas.microsoft.com/office/drawing/2014/main" id="{84E9AEEE-4989-4C94-966C-7D355759AB1A}"/>
               </a:ext>
             </a:extLst>
           </p:cNvPr>
@@ -4191,6 +5809,139 @@
           </a:xfrm>
         </p:spPr>
       </p:pic>
+      <p:sp>
+        <p:nvSpPr>
+          <p:cNvPr id="13" name="Rectangle 12">
+            <a:extLst>
+              <a:ext uri="{FF2B5EF4-FFF2-40B4-BE49-F238E27FC236}">
+                <a16:creationId xmlns:a16="http://schemas.microsoft.com/office/drawing/2014/main" id="{C1F94B32-D74C-48A9-BD02-A42A31069B76}"/>
+              </a:ext>
+            </a:extLst>
+          </p:cNvPr>
+          <p:cNvSpPr/>
+          <p:nvPr/>
+        </p:nvSpPr>
+        <p:spPr>
+          <a:xfrm>
+            <a:off x="4223792" y="3068960"/>
+            <a:ext cx="4392488" cy="1800200"/>
+          </a:xfrm>
+          <a:prstGeom prst="rect">
+            <a:avLst/>
+          </a:prstGeom>
+        </p:spPr>
+        <p:style>
+          <a:lnRef idx="2">
+            <a:schemeClr val="accent2">
+              <a:shade val="50000"/>
+            </a:schemeClr>
+          </a:lnRef>
+          <a:fillRef idx="1">
+            <a:schemeClr val="accent2"/>
+          </a:fillRef>
+          <a:effectRef idx="0">
+            <a:schemeClr val="accent2"/>
+          </a:effectRef>
+          <a:fontRef idx="minor">
+            <a:schemeClr val="lt1"/>
+          </a:fontRef>
+        </p:style>
+        <p:txBody>
+          <a:bodyPr rtlCol="0" anchor="ctr"/>
+          <a:lstStyle/>
+          <a:p>
+            <a:pPr algn="ctr"/>
+            <a:r>
+              <a:rPr lang="he-IL" dirty="0"/>
+              <a:t>להחליף צבעים</a:t>
+            </a:r>
+          </a:p>
+          <a:p>
+            <a:pPr algn="ctr"/>
+            <a:r>
+              <a:rPr lang="he-IL" dirty="0"/>
+              <a:t>להוריד רקע אפור + </a:t>
+            </a:r>
+            <a:r>
+              <a:rPr lang="en-US" dirty="0"/>
+              <a:t>grid</a:t>
+            </a:r>
+            <a:endParaRPr lang="he-IL" dirty="0"/>
+          </a:p>
+          <a:p>
+            <a:pPr algn="ctr"/>
+            <a:r>
+              <a:rPr lang="he-IL" dirty="0"/>
+              <a:t>להוריד מקרא למטה</a:t>
+            </a:r>
+          </a:p>
+          <a:p>
+            <a:pPr algn="ctr"/>
+            <a:r>
+              <a:rPr lang="he-IL" dirty="0"/>
+              <a:t>להחליף ירוק באדום</a:t>
+            </a:r>
+          </a:p>
+          <a:p>
+            <a:pPr algn="ctr"/>
+            <a:r>
+              <a:rPr lang="he-IL" dirty="0"/>
+              <a:t>להגדיל למטה</a:t>
+            </a:r>
+            <a:endParaRPr lang="en-IL" dirty="0"/>
+          </a:p>
+        </p:txBody>
+      </p:sp>
+      <p:sp>
+        <p:nvSpPr>
+          <p:cNvPr id="3" name="Rectangle 2">
+            <a:extLst>
+              <a:ext uri="{FF2B5EF4-FFF2-40B4-BE49-F238E27FC236}">
+                <a16:creationId xmlns:a16="http://schemas.microsoft.com/office/drawing/2014/main" id="{CB8C2FF8-54B8-41C4-9A3C-B27C00E05392}"/>
+              </a:ext>
+            </a:extLst>
+          </p:cNvPr>
+          <p:cNvSpPr/>
+          <p:nvPr/>
+        </p:nvSpPr>
+        <p:spPr>
+          <a:xfrm>
+            <a:off x="7680176" y="5301208"/>
+            <a:ext cx="3902224" cy="1008112"/>
+          </a:xfrm>
+          <a:prstGeom prst="rect">
+            <a:avLst/>
+          </a:prstGeom>
+        </p:spPr>
+        <p:style>
+          <a:lnRef idx="2">
+            <a:schemeClr val="accent2">
+              <a:shade val="50000"/>
+            </a:schemeClr>
+          </a:lnRef>
+          <a:fillRef idx="1">
+            <a:schemeClr val="accent2"/>
+          </a:fillRef>
+          <a:effectRef idx="0">
+            <a:schemeClr val="accent2"/>
+          </a:effectRef>
+          <a:fontRef idx="minor">
+            <a:schemeClr val="lt1"/>
+          </a:fontRef>
+        </p:style>
+        <p:txBody>
+          <a:bodyPr rtlCol="0" anchor="ctr"/>
+          <a:lstStyle/>
+          <a:p>
+            <a:pPr algn="ctr"/>
+            <a:r>
+              <a:rPr lang="he-IL" dirty="0"/>
+              <a:t>להכניס סיכום של המלל</a:t>
+            </a:r>
+            <a:endParaRPr lang="en-IL" dirty="0"/>
+          </a:p>
+        </p:txBody>
+      </p:sp>
     </p:spTree>
     <p:extLst>
       <p:ext uri="{BB962C8B-B14F-4D97-AF65-F5344CB8AC3E}">
@@ -4204,8 +5955,8 @@
 </p:sld>
 </file>
 
-<file path=ppt/slides/slide16.xml><?xml version="1.0" encoding="utf-8"?>
-<p:sld xmlns:a="http://schemas.openxmlformats.org/drawingml/2006/main" xmlns:r="http://schemas.openxmlformats.org/officeDocument/2006/relationships" xmlns:p="http://schemas.openxmlformats.org/presentationml/2006/main">
+<file path=ppt/slides/slide17.xml><?xml version="1.0" encoding="utf-8"?>
+<p:sld xmlns:a="http://schemas.openxmlformats.org/drawingml/2006/main" xmlns:r="http://schemas.openxmlformats.org/officeDocument/2006/relationships" xmlns:p="http://schemas.openxmlformats.org/presentationml/2006/main" show="0">
   <p:cSld>
     <p:spTree>
       <p:nvGrpSpPr>
@@ -4323,7 +6074,7 @@
           <a:p>
             <a:fld id="{48C2FE54-953E-4268-8452-225DF8E36AC9}" type="slidenum">
               <a:rPr lang="he-IL" smtClean="0"/>
-              <a:t>16</a:t>
+              <a:t>17</a:t>
             </a:fld>
             <a:endParaRPr lang="he-IL"/>
           </a:p>
@@ -4331,10 +6082,10 @@
       </p:sp>
       <p:pic>
         <p:nvPicPr>
-          <p:cNvPr id="4" name="Content Placeholder 3">
-            <a:extLst>
-              <a:ext uri="{FF2B5EF4-FFF2-40B4-BE49-F238E27FC236}">
-                <a16:creationId xmlns:a16="http://schemas.microsoft.com/office/drawing/2014/main" id="{AFF6B733-699C-4D7B-9F78-29F23B80D45D}"/>
+          <p:cNvPr id="17" name="Content Placeholder 16">
+            <a:extLst>
+              <a:ext uri="{FF2B5EF4-FFF2-40B4-BE49-F238E27FC236}">
+                <a16:creationId xmlns:a16="http://schemas.microsoft.com/office/drawing/2014/main" id="{EFAA5BF6-4594-4043-BC9E-3C0428F4E619}"/>
               </a:ext>
             </a:extLst>
           </p:cNvPr>
@@ -4374,6 +6125,81 @@
           </a:xfrm>
         </p:spPr>
       </p:pic>
+      <p:sp>
+        <p:nvSpPr>
+          <p:cNvPr id="6" name="Rectangle 5">
+            <a:extLst>
+              <a:ext uri="{FF2B5EF4-FFF2-40B4-BE49-F238E27FC236}">
+                <a16:creationId xmlns:a16="http://schemas.microsoft.com/office/drawing/2014/main" id="{72F70934-B51D-413C-AAE9-98B886DC797A}"/>
+              </a:ext>
+            </a:extLst>
+          </p:cNvPr>
+          <p:cNvSpPr/>
+          <p:nvPr/>
+        </p:nvSpPr>
+        <p:spPr>
+          <a:xfrm>
+            <a:off x="4223792" y="3068960"/>
+            <a:ext cx="4392488" cy="1800200"/>
+          </a:xfrm>
+          <a:prstGeom prst="rect">
+            <a:avLst/>
+          </a:prstGeom>
+        </p:spPr>
+        <p:style>
+          <a:lnRef idx="2">
+            <a:schemeClr val="accent2">
+              <a:shade val="50000"/>
+            </a:schemeClr>
+          </a:lnRef>
+          <a:fillRef idx="1">
+            <a:schemeClr val="accent2"/>
+          </a:fillRef>
+          <a:effectRef idx="0">
+            <a:schemeClr val="accent2"/>
+          </a:effectRef>
+          <a:fontRef idx="minor">
+            <a:schemeClr val="lt1"/>
+          </a:fontRef>
+        </p:style>
+        <p:txBody>
+          <a:bodyPr rtlCol="0" anchor="ctr"/>
+          <a:lstStyle/>
+          <a:p>
+            <a:pPr algn="ctr"/>
+            <a:r>
+              <a:rPr lang="he-IL" dirty="0"/>
+              <a:t>להחליף צבעים</a:t>
+            </a:r>
+          </a:p>
+          <a:p>
+            <a:pPr algn="ctr"/>
+            <a:r>
+              <a:rPr lang="he-IL" dirty="0"/>
+              <a:t>להוריד רקע אפור + </a:t>
+            </a:r>
+            <a:r>
+              <a:rPr lang="en-US" dirty="0"/>
+              <a:t>grid</a:t>
+            </a:r>
+            <a:endParaRPr lang="he-IL" dirty="0"/>
+          </a:p>
+          <a:p>
+            <a:pPr algn="ctr"/>
+            <a:r>
+              <a:rPr lang="he-IL" dirty="0"/>
+              <a:t>להוריד מקרא למטה</a:t>
+            </a:r>
+          </a:p>
+          <a:p>
+            <a:pPr algn="ctr"/>
+            <a:r>
+              <a:rPr lang="he-IL" dirty="0"/>
+              <a:t>להחליף ירוק באדום</a:t>
+            </a:r>
+          </a:p>
+        </p:txBody>
+      </p:sp>
     </p:spTree>
     <p:extLst>
       <p:ext uri="{BB962C8B-B14F-4D97-AF65-F5344CB8AC3E}">
@@ -4387,8 +6213,8 @@
 </p:sld>
 </file>
 
-<file path=ppt/slides/slide17.xml><?xml version="1.0" encoding="utf-8"?>
-<p:sld xmlns:a="http://schemas.openxmlformats.org/drawingml/2006/main" xmlns:r="http://schemas.openxmlformats.org/officeDocument/2006/relationships" xmlns:p="http://schemas.openxmlformats.org/presentationml/2006/main">
+<file path=ppt/slides/slide18.xml><?xml version="1.0" encoding="utf-8"?>
+<p:sld xmlns:a="http://schemas.openxmlformats.org/drawingml/2006/main" xmlns:r="http://schemas.openxmlformats.org/officeDocument/2006/relationships" xmlns:p="http://schemas.openxmlformats.org/presentationml/2006/main" show="0">
   <p:cSld>
     <p:spTree>
       <p:nvGrpSpPr>
@@ -4409,7 +6235,7 @@
           <p:cNvPr id="2" name="Title 1">
             <a:extLst>
               <a:ext uri="{FF2B5EF4-FFF2-40B4-BE49-F238E27FC236}">
-                <a16:creationId xmlns:a16="http://schemas.microsoft.com/office/drawing/2014/main" id="{2609094E-9AF4-4201-AA85-247329965CA6}"/>
+                <a16:creationId xmlns:a16="http://schemas.microsoft.com/office/drawing/2014/main" id="{FE510CC9-7F92-4551-A3B8-9431C0584CBA}"/>
               </a:ext>
             </a:extLst>
           </p:cNvPr>
@@ -4427,18 +6253,72 @@
           <a:p>
             <a:r>
               <a:rPr lang="he-IL" dirty="0"/>
-              <a:t>ועכשיו שאלה... איזה פיצוי עדיף (לתובע)?</a:t>
+              <a:t>בית משפט מחוזי הכי אוהד תובענות</a:t>
             </a:r>
             <a:endParaRPr lang="en-IL" dirty="0"/>
+          </a:p>
+        </p:txBody>
+      </p:sp>
+      <p:sp>
+        <p:nvSpPr>
+          <p:cNvPr id="3" name="Content Placeholder 2">
+            <a:extLst>
+              <a:ext uri="{FF2B5EF4-FFF2-40B4-BE49-F238E27FC236}">
+                <a16:creationId xmlns:a16="http://schemas.microsoft.com/office/drawing/2014/main" id="{D10CC6AE-7432-497C-AF6D-FB2DD5D6352A}"/>
+              </a:ext>
+            </a:extLst>
+          </p:cNvPr>
+          <p:cNvSpPr>
+            <a:spLocks noGrp="1"/>
+          </p:cNvSpPr>
+          <p:nvPr>
+            <p:ph idx="1"/>
+          </p:nvPr>
+        </p:nvSpPr>
+        <p:spPr/>
+        <p:txBody>
+          <a:bodyPr/>
+          <a:lstStyle/>
+          <a:p>
+            <a:endParaRPr lang="en-IL"/>
+          </a:p>
+        </p:txBody>
+      </p:sp>
+      <p:sp>
+        <p:nvSpPr>
+          <p:cNvPr id="4" name="Slide Number Placeholder 3">
+            <a:extLst>
+              <a:ext uri="{FF2B5EF4-FFF2-40B4-BE49-F238E27FC236}">
+                <a16:creationId xmlns:a16="http://schemas.microsoft.com/office/drawing/2014/main" id="{8B9C404A-D927-4B5C-ABFD-AC622937B70F}"/>
+              </a:ext>
+            </a:extLst>
+          </p:cNvPr>
+          <p:cNvSpPr>
+            <a:spLocks noGrp="1"/>
+          </p:cNvSpPr>
+          <p:nvPr>
+            <p:ph type="sldNum" sz="quarter" idx="12"/>
+          </p:nvPr>
+        </p:nvSpPr>
+        <p:spPr/>
+        <p:txBody>
+          <a:bodyPr/>
+          <a:lstStyle/>
+          <a:p>
+            <a:fld id="{48C2FE54-953E-4268-8452-225DF8E36AC9}" type="slidenum">
+              <a:rPr lang="he-IL" smtClean="0"/>
+              <a:t>18</a:t>
+            </a:fld>
+            <a:endParaRPr lang="he-IL"/>
           </a:p>
         </p:txBody>
       </p:sp>
       <p:pic>
         <p:nvPicPr>
-          <p:cNvPr id="8" name="Picture 7">
-            <a:extLst>
-              <a:ext uri="{FF2B5EF4-FFF2-40B4-BE49-F238E27FC236}">
-                <a16:creationId xmlns:a16="http://schemas.microsoft.com/office/drawing/2014/main" id="{BD14DDC7-4338-4359-B609-615DFFC0238D}"/>
+          <p:cNvPr id="5" name="Picture 4">
+            <a:extLst>
+              <a:ext uri="{FF2B5EF4-FFF2-40B4-BE49-F238E27FC236}">
+                <a16:creationId xmlns:a16="http://schemas.microsoft.com/office/drawing/2014/main" id="{CB70EFA2-76A1-4BF6-98AF-DD70B3F255DC}"/>
               </a:ext>
             </a:extLst>
           </p:cNvPr>
@@ -4449,47 +6329,6 @@
         </p:nvPicPr>
         <p:blipFill>
           <a:blip r:embed="rId2">
-            <a:clrChange>
-              <a:clrFrom>
-                <a:srgbClr val="FFFFFF"/>
-              </a:clrFrom>
-              <a:clrTo>
-                <a:srgbClr val="FFFFFF">
-                  <a:alpha val="0"/>
-                </a:srgbClr>
-              </a:clrTo>
-            </a:clrChange>
-          </a:blip>
-          <a:stretch>
-            <a:fillRect/>
-          </a:stretch>
-        </p:blipFill>
-        <p:spPr>
-          <a:xfrm>
-            <a:off x="7941271" y="6101166"/>
-            <a:ext cx="946613" cy="631390"/>
-          </a:xfrm>
-          <a:prstGeom prst="rect">
-            <a:avLst/>
-          </a:prstGeom>
-        </p:spPr>
-      </p:pic>
-      <p:pic>
-        <p:nvPicPr>
-          <p:cNvPr id="9" name="Picture 8">
-            <a:extLst>
-              <a:ext uri="{FF2B5EF4-FFF2-40B4-BE49-F238E27FC236}">
-                <a16:creationId xmlns:a16="http://schemas.microsoft.com/office/drawing/2014/main" id="{54B5132B-76D7-434F-AE23-49E349FECCDB}"/>
-              </a:ext>
-            </a:extLst>
-          </p:cNvPr>
-          <p:cNvPicPr>
-            <a:picLocks noChangeAspect="1"/>
-          </p:cNvPicPr>
-          <p:nvPr/>
-        </p:nvPicPr>
-        <p:blipFill>
-          <a:blip r:embed="rId3">
             <a:clrChange>
               <a:clrFrom>
                 <a:srgbClr val="FFFFFF"/>
@@ -4515,12 +6354,96 @@
           </a:prstGeom>
         </p:spPr>
       </p:pic>
-      <p:sp>
-        <p:nvSpPr>
-          <p:cNvPr id="10" name="Slide Number Placeholder 9">
-            <a:extLst>
-              <a:ext uri="{FF2B5EF4-FFF2-40B4-BE49-F238E27FC236}">
-                <a16:creationId xmlns:a16="http://schemas.microsoft.com/office/drawing/2014/main" id="{687C9A4A-7E2D-4B6C-AB42-465F35240765}"/>
+    </p:spTree>
+    <p:extLst>
+      <p:ext uri="{BB962C8B-B14F-4D97-AF65-F5344CB8AC3E}">
+        <p14:creationId xmlns:p14="http://schemas.microsoft.com/office/powerpoint/2010/main" val="412715838"/>
+      </p:ext>
+    </p:extLst>
+  </p:cSld>
+  <p:clrMapOvr>
+    <a:masterClrMapping/>
+  </p:clrMapOvr>
+</p:sld>
+</file>
+
+<file path=ppt/slides/slide19.xml><?xml version="1.0" encoding="utf-8"?>
+<p:sld xmlns:a="http://schemas.openxmlformats.org/drawingml/2006/main" xmlns:r="http://schemas.openxmlformats.org/officeDocument/2006/relationships" xmlns:p="http://schemas.openxmlformats.org/presentationml/2006/main">
+  <p:cSld>
+    <p:spTree>
+      <p:nvGrpSpPr>
+        <p:cNvPr id="1" name=""/>
+        <p:cNvGrpSpPr/>
+        <p:nvPr/>
+      </p:nvGrpSpPr>
+      <p:grpSpPr>
+        <a:xfrm>
+          <a:off x="0" y="0"/>
+          <a:ext cx="0" cy="0"/>
+          <a:chOff x="0" y="0"/>
+          <a:chExt cx="0" cy="0"/>
+        </a:xfrm>
+      </p:grpSpPr>
+      <p:sp>
+        <p:nvSpPr>
+          <p:cNvPr id="2" name="Title 1">
+            <a:extLst>
+              <a:ext uri="{FF2B5EF4-FFF2-40B4-BE49-F238E27FC236}">
+                <a16:creationId xmlns:a16="http://schemas.microsoft.com/office/drawing/2014/main" id="{EA37C483-BD78-421F-A2FD-3715A004DB36}"/>
+              </a:ext>
+            </a:extLst>
+          </p:cNvPr>
+          <p:cNvSpPr>
+            <a:spLocks noGrp="1"/>
+          </p:cNvSpPr>
+          <p:nvPr>
+            <p:ph type="title"/>
+          </p:nvPr>
+        </p:nvSpPr>
+        <p:spPr/>
+        <p:txBody>
+          <a:bodyPr/>
+          <a:lstStyle/>
+          <a:p>
+            <a:r>
+              <a:rPr lang="he-IL" dirty="0"/>
+              <a:t>תחומי התביעות שבהם שכר הטרחה הכי משתלם</a:t>
+            </a:r>
+            <a:endParaRPr lang="en-IL" dirty="0"/>
+          </a:p>
+        </p:txBody>
+      </p:sp>
+      <p:sp>
+        <p:nvSpPr>
+          <p:cNvPr id="3" name="Content Placeholder 2">
+            <a:extLst>
+              <a:ext uri="{FF2B5EF4-FFF2-40B4-BE49-F238E27FC236}">
+                <a16:creationId xmlns:a16="http://schemas.microsoft.com/office/drawing/2014/main" id="{D006A046-C976-4B84-BA30-D490DFD8C8BD}"/>
+              </a:ext>
+            </a:extLst>
+          </p:cNvPr>
+          <p:cNvSpPr>
+            <a:spLocks noGrp="1"/>
+          </p:cNvSpPr>
+          <p:nvPr>
+            <p:ph idx="1"/>
+          </p:nvPr>
+        </p:nvSpPr>
+        <p:spPr/>
+        <p:txBody>
+          <a:bodyPr/>
+          <a:lstStyle/>
+          <a:p>
+            <a:endParaRPr lang="en-IL"/>
+          </a:p>
+        </p:txBody>
+      </p:sp>
+      <p:sp>
+        <p:nvSpPr>
+          <p:cNvPr id="4" name="Slide Number Placeholder 3">
+            <a:extLst>
+              <a:ext uri="{FF2B5EF4-FFF2-40B4-BE49-F238E27FC236}">
+                <a16:creationId xmlns:a16="http://schemas.microsoft.com/office/drawing/2014/main" id="{35ECA6D7-189B-43D7-BF1B-0E80C79B5C94}"/>
               </a:ext>
             </a:extLst>
           </p:cNvPr>
@@ -4538,41 +6461,57 @@
           <a:p>
             <a:fld id="{48C2FE54-953E-4268-8452-225DF8E36AC9}" type="slidenum">
               <a:rPr lang="he-IL" smtClean="0"/>
-              <a:t>17</a:t>
+              <a:t>19</a:t>
             </a:fld>
             <a:endParaRPr lang="he-IL"/>
           </a:p>
         </p:txBody>
       </p:sp>
-      <p:sp>
-        <p:nvSpPr>
-          <p:cNvPr id="7" name="Content Placeholder 6">
-            <a:extLst>
-              <a:ext uri="{FF2B5EF4-FFF2-40B4-BE49-F238E27FC236}">
-                <a16:creationId xmlns:a16="http://schemas.microsoft.com/office/drawing/2014/main" id="{B186FE6F-7191-4193-BC3C-CAFBBC4AE01F}"/>
-              </a:ext>
-            </a:extLst>
-          </p:cNvPr>
-          <p:cNvSpPr>
-            <a:spLocks noGrp="1"/>
-          </p:cNvSpPr>
-          <p:nvPr>
-            <p:ph idx="1"/>
-          </p:nvPr>
-        </p:nvSpPr>
-        <p:spPr/>
-        <p:txBody>
-          <a:bodyPr/>
-          <a:lstStyle/>
-          <a:p>
-            <a:endParaRPr lang="en-IL" dirty="0"/>
-          </a:p>
-        </p:txBody>
-      </p:sp>
+      <p:pic>
+        <p:nvPicPr>
+          <p:cNvPr id="5" name="Picture 4">
+            <a:extLst>
+              <a:ext uri="{FF2B5EF4-FFF2-40B4-BE49-F238E27FC236}">
+                <a16:creationId xmlns:a16="http://schemas.microsoft.com/office/drawing/2014/main" id="{4EC2D3D1-E1F1-4966-9587-70344C55CD0B}"/>
+              </a:ext>
+            </a:extLst>
+          </p:cNvPr>
+          <p:cNvPicPr>
+            <a:picLocks noChangeAspect="1"/>
+          </p:cNvPicPr>
+          <p:nvPr/>
+        </p:nvPicPr>
+        <p:blipFill>
+          <a:blip r:embed="rId2">
+            <a:clrChange>
+              <a:clrFrom>
+                <a:srgbClr val="FFFFFF"/>
+              </a:clrFrom>
+              <a:clrTo>
+                <a:srgbClr val="FFFFFF">
+                  <a:alpha val="0"/>
+                </a:srgbClr>
+              </a:clrTo>
+            </a:clrChange>
+          </a:blip>
+          <a:stretch>
+            <a:fillRect/>
+          </a:stretch>
+        </p:blipFill>
+        <p:spPr>
+          <a:xfrm>
+            <a:off x="6647146" y="6188980"/>
+            <a:ext cx="1186258" cy="543576"/>
+          </a:xfrm>
+          <a:prstGeom prst="rect">
+            <a:avLst/>
+          </a:prstGeom>
+        </p:spPr>
+      </p:pic>
     </p:spTree>
     <p:extLst>
       <p:ext uri="{BB962C8B-B14F-4D97-AF65-F5344CB8AC3E}">
-        <p14:creationId xmlns:p14="http://schemas.microsoft.com/office/powerpoint/2010/main" val="3482695944"/>
+        <p14:creationId xmlns:p14="http://schemas.microsoft.com/office/powerpoint/2010/main" val="122604295"/>
       </p:ext>
     </p:extLst>
   </p:cSld>
@@ -4904,6 +6843,212 @@
 </p:sld>
 </file>
 
+<file path=ppt/slides/slide20.xml><?xml version="1.0" encoding="utf-8"?>
+<p:sld xmlns:a="http://schemas.openxmlformats.org/drawingml/2006/main" xmlns:r="http://schemas.openxmlformats.org/officeDocument/2006/relationships" xmlns:p="http://schemas.openxmlformats.org/presentationml/2006/main">
+  <p:cSld>
+    <p:spTree>
+      <p:nvGrpSpPr>
+        <p:cNvPr id="1" name=""/>
+        <p:cNvGrpSpPr/>
+        <p:nvPr/>
+      </p:nvGrpSpPr>
+      <p:grpSpPr>
+        <a:xfrm>
+          <a:off x="0" y="0"/>
+          <a:ext cx="0" cy="0"/>
+          <a:chOff x="0" y="0"/>
+          <a:chExt cx="0" cy="0"/>
+        </a:xfrm>
+      </p:grpSpPr>
+      <p:sp>
+        <p:nvSpPr>
+          <p:cNvPr id="2" name="Title 1">
+            <a:extLst>
+              <a:ext uri="{FF2B5EF4-FFF2-40B4-BE49-F238E27FC236}">
+                <a16:creationId xmlns:a16="http://schemas.microsoft.com/office/drawing/2014/main" id="{EA37C483-BD78-421F-A2FD-3715A004DB36}"/>
+              </a:ext>
+            </a:extLst>
+          </p:cNvPr>
+          <p:cNvSpPr>
+            <a:spLocks noGrp="1"/>
+          </p:cNvSpPr>
+          <p:nvPr>
+            <p:ph type="title"/>
+          </p:nvPr>
+        </p:nvSpPr>
+        <p:spPr/>
+        <p:txBody>
+          <a:bodyPr>
+            <a:normAutofit/>
+          </a:bodyPr>
+          <a:lstStyle/>
+          <a:p>
+            <a:r>
+              <a:rPr lang="he-IL" dirty="0"/>
+              <a:t>עמדות עו"ד בנוגע לתביעות ייצוגיות</a:t>
+            </a:r>
+            <a:endParaRPr lang="en-IL" dirty="0"/>
+          </a:p>
+        </p:txBody>
+      </p:sp>
+      <p:sp>
+        <p:nvSpPr>
+          <p:cNvPr id="3" name="Content Placeholder 2">
+            <a:extLst>
+              <a:ext uri="{FF2B5EF4-FFF2-40B4-BE49-F238E27FC236}">
+                <a16:creationId xmlns:a16="http://schemas.microsoft.com/office/drawing/2014/main" id="{D006A046-C976-4B84-BA30-D490DFD8C8BD}"/>
+              </a:ext>
+            </a:extLst>
+          </p:cNvPr>
+          <p:cNvSpPr>
+            <a:spLocks noGrp="1"/>
+          </p:cNvSpPr>
+          <p:nvPr>
+            <p:ph idx="1"/>
+          </p:nvPr>
+        </p:nvSpPr>
+        <p:spPr/>
+        <p:txBody>
+          <a:bodyPr/>
+          <a:lstStyle/>
+          <a:p>
+            <a:endParaRPr lang="en-IL"/>
+          </a:p>
+        </p:txBody>
+      </p:sp>
+      <p:sp>
+        <p:nvSpPr>
+          <p:cNvPr id="4" name="Slide Number Placeholder 3">
+            <a:extLst>
+              <a:ext uri="{FF2B5EF4-FFF2-40B4-BE49-F238E27FC236}">
+                <a16:creationId xmlns:a16="http://schemas.microsoft.com/office/drawing/2014/main" id="{35ECA6D7-189B-43D7-BF1B-0E80C79B5C94}"/>
+              </a:ext>
+            </a:extLst>
+          </p:cNvPr>
+          <p:cNvSpPr>
+            <a:spLocks noGrp="1"/>
+          </p:cNvSpPr>
+          <p:nvPr>
+            <p:ph type="sldNum" sz="quarter" idx="12"/>
+          </p:nvPr>
+        </p:nvSpPr>
+        <p:spPr/>
+        <p:txBody>
+          <a:bodyPr/>
+          <a:lstStyle/>
+          <a:p>
+            <a:fld id="{48C2FE54-953E-4268-8452-225DF8E36AC9}" type="slidenum">
+              <a:rPr lang="he-IL" smtClean="0"/>
+              <a:t>20</a:t>
+            </a:fld>
+            <a:endParaRPr lang="he-IL"/>
+          </a:p>
+        </p:txBody>
+      </p:sp>
+      <p:pic>
+        <p:nvPicPr>
+          <p:cNvPr id="5" name="Picture 4">
+            <a:extLst>
+              <a:ext uri="{FF2B5EF4-FFF2-40B4-BE49-F238E27FC236}">
+                <a16:creationId xmlns:a16="http://schemas.microsoft.com/office/drawing/2014/main" id="{4EC2D3D1-E1F1-4966-9587-70344C55CD0B}"/>
+              </a:ext>
+            </a:extLst>
+          </p:cNvPr>
+          <p:cNvPicPr>
+            <a:picLocks noChangeAspect="1"/>
+          </p:cNvPicPr>
+          <p:nvPr/>
+        </p:nvPicPr>
+        <p:blipFill>
+          <a:blip r:embed="rId2">
+            <a:clrChange>
+              <a:clrFrom>
+                <a:srgbClr val="FFFFFF"/>
+              </a:clrFrom>
+              <a:clrTo>
+                <a:srgbClr val="FFFFFF">
+                  <a:alpha val="0"/>
+                </a:srgbClr>
+              </a:clrTo>
+            </a:clrChange>
+          </a:blip>
+          <a:stretch>
+            <a:fillRect/>
+          </a:stretch>
+        </p:blipFill>
+        <p:spPr>
+          <a:xfrm>
+            <a:off x="6647146" y="6188980"/>
+            <a:ext cx="1186258" cy="543576"/>
+          </a:xfrm>
+          <a:prstGeom prst="rect">
+            <a:avLst/>
+          </a:prstGeom>
+        </p:spPr>
+      </p:pic>
+      <p:sp>
+        <p:nvSpPr>
+          <p:cNvPr id="6" name="Rectangle: Rounded Corners 5">
+            <a:extLst>
+              <a:ext uri="{FF2B5EF4-FFF2-40B4-BE49-F238E27FC236}">
+                <a16:creationId xmlns:a16="http://schemas.microsoft.com/office/drawing/2014/main" id="{20C465D4-C22A-4094-BC37-013458685D43}"/>
+              </a:ext>
+            </a:extLst>
+          </p:cNvPr>
+          <p:cNvSpPr/>
+          <p:nvPr/>
+        </p:nvSpPr>
+        <p:spPr>
+          <a:xfrm>
+            <a:off x="4367808" y="2276872"/>
+            <a:ext cx="3528392" cy="1656184"/>
+          </a:xfrm>
+          <a:prstGeom prst="roundRect">
+            <a:avLst/>
+          </a:prstGeom>
+        </p:spPr>
+        <p:style>
+          <a:lnRef idx="2">
+            <a:schemeClr val="accent1">
+              <a:shade val="50000"/>
+            </a:schemeClr>
+          </a:lnRef>
+          <a:fillRef idx="1">
+            <a:schemeClr val="accent1"/>
+          </a:fillRef>
+          <a:effectRef idx="0">
+            <a:schemeClr val="accent1"/>
+          </a:effectRef>
+          <a:fontRef idx="minor">
+            <a:schemeClr val="lt1"/>
+          </a:fontRef>
+        </p:style>
+        <p:txBody>
+          <a:bodyPr rtlCol="0" anchor="ctr"/>
+          <a:lstStyle/>
+          <a:p>
+            <a:pPr algn="ctr"/>
+            <a:r>
+              <a:rPr lang="he-IL" dirty="0"/>
+              <a:t>להכניס + להוסיף עוד שקף שמפצל בין תובעים למייצגים חברות נתבעות</a:t>
+            </a:r>
+            <a:endParaRPr lang="en-IL" dirty="0"/>
+          </a:p>
+        </p:txBody>
+      </p:sp>
+    </p:spTree>
+    <p:extLst>
+      <p:ext uri="{BB962C8B-B14F-4D97-AF65-F5344CB8AC3E}">
+        <p14:creationId xmlns:p14="http://schemas.microsoft.com/office/powerpoint/2010/main" val="3040307342"/>
+      </p:ext>
+    </p:extLst>
+  </p:cSld>
+  <p:clrMapOvr>
+    <a:masterClrMapping/>
+  </p:clrMapOvr>
+</p:sld>
+</file>
+
 <file path=ppt/slides/slide3.xml><?xml version="1.0" encoding="utf-8"?>
 <p:sld xmlns:a="http://schemas.openxmlformats.org/drawingml/2006/main" xmlns:r="http://schemas.openxmlformats.org/officeDocument/2006/relationships" xmlns:p="http://schemas.openxmlformats.org/presentationml/2006/main">
   <p:cSld>
@@ -4944,15 +7089,19 @@
           <a:p>
             <a:r>
               <a:rPr lang="he-IL" dirty="0"/>
-              <a:t>מה </a:t>
-            </a:r>
-            <a:r>
-              <a:rPr lang="he-IL" strike="sngStrike" dirty="0"/>
-              <a:t>בדקנו</a:t>
+              <a:t>מה בדקנו </a:t>
+            </a:r>
+            <a:r>
+              <a:rPr lang="he-IL" dirty="0">
+                <a:highlight>
+                  <a:srgbClr val="FFFF00"/>
+                </a:highlight>
+              </a:rPr>
+              <a:t>נציג</a:t>
             </a:r>
             <a:r>
               <a:rPr lang="he-IL" dirty="0"/>
-              <a:t> נציג?</a:t>
+              <a:t>?</a:t>
             </a:r>
             <a:endParaRPr lang="en-IL" dirty="0"/>
           </a:p>
@@ -5065,7 +7214,7 @@
           </a:p>
           <a:p>
             <a:r>
-              <a:rPr lang="he-IL" strike="sngStrike" dirty="0"/>
+              <a:rPr lang="he-IL" dirty="0"/>
               <a:t>בתי דין</a:t>
             </a:r>
           </a:p>
@@ -5080,25 +7229,21 @@
             </a:r>
             <a:r>
               <a:rPr lang="he-IL" dirty="0"/>
-              <a:t>, </a:t>
-            </a:r>
-            <a:r>
-              <a:rPr lang="he-IL" strike="sngStrike" dirty="0"/>
-              <a:t>העדפות בנושא התגמול</a:t>
-            </a:r>
-          </a:p>
-          <a:p>
-            <a:r>
-              <a:rPr lang="he-IL" strike="sngStrike" dirty="0"/>
+              <a:t>, העדפות בנושא התגמול</a:t>
+            </a:r>
+          </a:p>
+          <a:p>
+            <a:r>
+              <a:rPr lang="he-IL" dirty="0"/>
               <a:t>תחומים "משתלמים"</a:t>
             </a:r>
           </a:p>
           <a:p>
             <a:r>
-              <a:rPr lang="he-IL" strike="sngStrike" dirty="0"/>
+              <a:rPr lang="he-IL" dirty="0"/>
               <a:t>ועוד...</a:t>
             </a:r>
-            <a:endParaRPr lang="en-IL" strike="sngStrike" dirty="0"/>
+            <a:endParaRPr lang="en-IL" dirty="0"/>
           </a:p>
         </p:txBody>
       </p:sp>
@@ -5157,7 +7302,7 @@
           <a:lstStyle/>
           <a:p>
             <a:r>
-              <a:rPr lang="he-IL" strike="sngStrike" dirty="0"/>
+              <a:rPr lang="he-IL" dirty="0"/>
               <a:t>איך תופסים / מבינים תובענות</a:t>
             </a:r>
           </a:p>
@@ -5183,7 +7328,7 @@
           </a:p>
           <a:p>
             <a:r>
-              <a:rPr lang="he-IL" strike="sngStrike" dirty="0"/>
+              <a:rPr lang="he-IL" dirty="0"/>
               <a:t>פיצוי שהתקבל (זכירות)</a:t>
             </a:r>
           </a:p>
@@ -5200,26 +7345,26 @@
           </a:p>
           <a:p>
             <a:r>
-              <a:rPr lang="he-IL" strike="sngStrike" dirty="0"/>
+              <a:rPr lang="he-IL" dirty="0"/>
               <a:t>תחומים בהם היו רוצים להגיש</a:t>
             </a:r>
           </a:p>
           <a:p>
             <a:r>
-              <a:rPr lang="he-IL" strike="sngStrike" dirty="0"/>
+              <a:rPr lang="he-IL" dirty="0"/>
               <a:t>הצהרת כוונות</a:t>
             </a:r>
           </a:p>
           <a:p>
             <a:pPr lvl="1"/>
             <a:r>
-              <a:rPr lang="he-IL" strike="sngStrike" dirty="0"/>
+              <a:rPr lang="he-IL" dirty="0"/>
               <a:t>אגרות</a:t>
             </a:r>
           </a:p>
           <a:p>
             <a:r>
-              <a:rPr lang="he-IL" strike="sngStrike" dirty="0"/>
+              <a:rPr lang="he-IL" dirty="0"/>
               <a:t>ועוד...</a:t>
             </a:r>
           </a:p>
@@ -5239,7 +7384,7 @@
         </p:nvSpPr>
         <p:spPr>
           <a:xfrm>
-            <a:off x="1847528" y="3183271"/>
+            <a:off x="3214445" y="3142407"/>
             <a:ext cx="5763110" cy="1008112"/>
           </a:xfrm>
           <a:prstGeom prst="roundRect">
@@ -6922,7 +9067,7 @@
 </file>
 
 <file path=ppt/slides/slide8.xml><?xml version="1.0" encoding="utf-8"?>
-<p:sld xmlns:a="http://schemas.openxmlformats.org/drawingml/2006/main" xmlns:r="http://schemas.openxmlformats.org/officeDocument/2006/relationships" xmlns:p="http://schemas.openxmlformats.org/presentationml/2006/main" show="0">
+<p:sld xmlns:a="http://schemas.openxmlformats.org/drawingml/2006/main" xmlns:r="http://schemas.openxmlformats.org/officeDocument/2006/relationships" xmlns:p="http://schemas.openxmlformats.org/presentationml/2006/main">
   <p:cSld>
     <p:spTree>
       <p:nvGrpSpPr>
@@ -7007,7 +9152,7 @@
         </p:blipFill>
         <p:spPr>
           <a:xfrm>
-            <a:off x="2496304" y="1902996"/>
+            <a:off x="4341575" y="1902996"/>
             <a:ext cx="7199391" cy="3599695"/>
           </a:xfrm>
         </p:spPr>
@@ -7082,6 +9227,56 @@
           </a:prstGeom>
         </p:spPr>
       </p:pic>
+      <p:sp>
+        <p:nvSpPr>
+          <p:cNvPr id="3" name="Rectangle 2">
+            <a:extLst>
+              <a:ext uri="{FF2B5EF4-FFF2-40B4-BE49-F238E27FC236}">
+                <a16:creationId xmlns:a16="http://schemas.microsoft.com/office/drawing/2014/main" id="{DF15A6A8-4711-4F2A-84C6-2A021AF4B3CE}"/>
+              </a:ext>
+            </a:extLst>
+          </p:cNvPr>
+          <p:cNvSpPr/>
+          <p:nvPr/>
+        </p:nvSpPr>
+        <p:spPr>
+          <a:xfrm>
+            <a:off x="479376" y="2996952"/>
+            <a:ext cx="3600400" cy="1641643"/>
+          </a:xfrm>
+          <a:prstGeom prst="rect">
+            <a:avLst/>
+          </a:prstGeom>
+        </p:spPr>
+        <p:style>
+          <a:lnRef idx="2">
+            <a:schemeClr val="accent2">
+              <a:shade val="50000"/>
+            </a:schemeClr>
+          </a:lnRef>
+          <a:fillRef idx="1">
+            <a:schemeClr val="accent2"/>
+          </a:fillRef>
+          <a:effectRef idx="0">
+            <a:schemeClr val="accent2"/>
+          </a:effectRef>
+          <a:fontRef idx="minor">
+            <a:schemeClr val="lt1"/>
+          </a:fontRef>
+        </p:style>
+        <p:txBody>
+          <a:bodyPr rtlCol="0" anchor="ctr"/>
+          <a:lstStyle/>
+          <a:p>
+            <a:pPr algn="ctr"/>
+            <a:r>
+              <a:rPr lang="he-IL" dirty="0"/>
+              <a:t>להוסיף את הכן/לא/לא יודע של האם זה ימנע ממך...</a:t>
+            </a:r>
+            <a:endParaRPr lang="en-IL" dirty="0"/>
+          </a:p>
+        </p:txBody>
+      </p:sp>
     </p:spTree>
     <p:extLst>
       <p:ext uri="{BB962C8B-B14F-4D97-AF65-F5344CB8AC3E}">
@@ -7741,6 +9936,54 @@
           </a:p>
         </p:txBody>
       </p:sp>
+      <p:sp>
+        <p:nvSpPr>
+          <p:cNvPr id="6" name="Rectangle: Rounded Corners 5">
+            <a:extLst>
+              <a:ext uri="{FF2B5EF4-FFF2-40B4-BE49-F238E27FC236}">
+                <a16:creationId xmlns:a16="http://schemas.microsoft.com/office/drawing/2014/main" id="{6E1363FC-05A2-4DD1-BE14-E93E816E7976}"/>
+              </a:ext>
+            </a:extLst>
+          </p:cNvPr>
+          <p:cNvSpPr/>
+          <p:nvPr/>
+        </p:nvSpPr>
+        <p:spPr>
+          <a:xfrm rot="19800000">
+            <a:off x="696930" y="4504442"/>
+            <a:ext cx="2462064" cy="658790"/>
+          </a:xfrm>
+          <a:prstGeom prst="roundRect">
+            <a:avLst/>
+          </a:prstGeom>
+        </p:spPr>
+        <p:style>
+          <a:lnRef idx="1">
+            <a:schemeClr val="accent6"/>
+          </a:lnRef>
+          <a:fillRef idx="2">
+            <a:schemeClr val="accent6"/>
+          </a:fillRef>
+          <a:effectRef idx="1">
+            <a:schemeClr val="accent6"/>
+          </a:effectRef>
+          <a:fontRef idx="minor">
+            <a:schemeClr val="dk1"/>
+          </a:fontRef>
+        </p:style>
+        <p:txBody>
+          <a:bodyPr rtlCol="0" anchor="ctr"/>
+          <a:lstStyle/>
+          <a:p>
+            <a:pPr algn="ctr"/>
+            <a:r>
+              <a:rPr lang="en-US" dirty="0"/>
+              <a:t>Conjoint Analysis</a:t>
+            </a:r>
+            <a:endParaRPr lang="en-IL" dirty="0"/>
+          </a:p>
+        </p:txBody>
+      </p:sp>
     </p:spTree>
     <p:extLst>
       <p:ext uri="{BB962C8B-B14F-4D97-AF65-F5344CB8AC3E}">
@@ -7894,6 +10137,51 @@
                       </p:childTnLst>
                     </p:cTn>
                   </p:par>
+                  <p:par>
+                    <p:cTn id="15" fill="hold">
+                      <p:stCondLst>
+                        <p:cond delay="indefinite"/>
+                      </p:stCondLst>
+                      <p:childTnLst>
+                        <p:par>
+                          <p:cTn id="16" fill="hold">
+                            <p:stCondLst>
+                              <p:cond delay="0"/>
+                            </p:stCondLst>
+                            <p:childTnLst>
+                              <p:par>
+                                <p:cTn id="17" presetID="1" presetClass="entr" presetSubtype="0" fill="hold" grpId="0" nodeType="clickEffect">
+                                  <p:stCondLst>
+                                    <p:cond delay="0"/>
+                                  </p:stCondLst>
+                                  <p:childTnLst>
+                                    <p:set>
+                                      <p:cBhvr>
+                                        <p:cTn id="18" dur="1" fill="hold">
+                                          <p:stCondLst>
+                                            <p:cond delay="0"/>
+                                          </p:stCondLst>
+                                        </p:cTn>
+                                        <p:tgtEl>
+                                          <p:spTgt spid="6"/>
+                                        </p:tgtEl>
+                                        <p:attrNameLst>
+                                          <p:attrName>style.visibility</p:attrName>
+                                        </p:attrNameLst>
+                                      </p:cBhvr>
+                                      <p:to>
+                                        <p:strVal val="visible"/>
+                                      </p:to>
+                                    </p:set>
+                                  </p:childTnLst>
+                                </p:cTn>
+                              </p:par>
+                            </p:childTnLst>
+                          </p:cTn>
+                        </p:par>
+                      </p:childTnLst>
+                    </p:cTn>
+                  </p:par>
                 </p:childTnLst>
               </p:cTn>
               <p:prevCondLst>
@@ -7919,6 +10207,7 @@
       <p:bldP spid="5" grpId="0"/>
       <p:bldP spid="3" grpId="0" animBg="1"/>
       <p:bldP spid="11" grpId="0" animBg="1"/>
+      <p:bldP spid="6" grpId="0" animBg="1"/>
     </p:bldLst>
   </p:timing>
 </p:sld>

</xml_diff>

<commit_message>
Updated analysis and presentation
</commit_message>
<xml_diff>
--- a/presentation/2019-02-03 - Presentation for the 9th class action conference.pptx
+++ b/presentation/2019-02-03 - Presentation for the 9th class action conference.pptx
@@ -5,7 +5,7 @@
     <p:sldMasterId id="2147483648" r:id="rId1"/>
   </p:sldMasterIdLst>
   <p:notesMasterIdLst>
-    <p:notesMasterId r:id="rId22"/>
+    <p:notesMasterId r:id="rId24"/>
   </p:notesMasterIdLst>
   <p:sldIdLst>
     <p:sldId id="256" r:id="rId2"/>
@@ -27,7 +27,9 @@
     <p:sldId id="273" r:id="rId18"/>
     <p:sldId id="274" r:id="rId19"/>
     <p:sldId id="276" r:id="rId20"/>
-    <p:sldId id="279" r:id="rId21"/>
+    <p:sldId id="281" r:id="rId21"/>
+    <p:sldId id="279" r:id="rId22"/>
+    <p:sldId id="282" r:id="rId23"/>
   </p:sldIdLst>
   <p:sldSz cx="12192000" cy="6858000"/>
   <p:notesSz cx="6858000" cy="9144000"/>
@@ -5766,19 +5768,17 @@
       </p:sp>
       <p:pic>
         <p:nvPicPr>
-          <p:cNvPr id="12" name="Content Placeholder 11">
-            <a:extLst>
-              <a:ext uri="{FF2B5EF4-FFF2-40B4-BE49-F238E27FC236}">
-                <a16:creationId xmlns:a16="http://schemas.microsoft.com/office/drawing/2014/main" id="{84E9AEEE-4989-4C94-966C-7D355759AB1A}"/>
+          <p:cNvPr id="19" name="Picture 18">
+            <a:extLst>
+              <a:ext uri="{FF2B5EF4-FFF2-40B4-BE49-F238E27FC236}">
+                <a16:creationId xmlns:a16="http://schemas.microsoft.com/office/drawing/2014/main" id="{8467F4BB-0A45-4FA3-89BC-D2B83F68D7D9}"/>
               </a:ext>
             </a:extLst>
           </p:cNvPr>
           <p:cNvPicPr>
-            <a:picLocks noGrp="1" noChangeAspect="1"/>
+            <a:picLocks noChangeAspect="1"/>
           </p:cNvPicPr>
-          <p:nvPr>
-            <p:ph idx="1"/>
-          </p:nvPr>
+          <p:nvPr/>
         </p:nvPicPr>
         <p:blipFill>
           <a:blip r:embed="rId3" cstate="print">
@@ -5804,17 +5804,20 @@
         </p:blipFill>
         <p:spPr>
           <a:xfrm>
-            <a:off x="696457" y="1902996"/>
-            <a:ext cx="10799086" cy="3599695"/>
+            <a:off x="336792" y="1505342"/>
+            <a:ext cx="11518415" cy="4319025"/>
           </a:xfrm>
+          <a:prstGeom prst="rect">
+            <a:avLst/>
+          </a:prstGeom>
         </p:spPr>
       </p:pic>
       <p:sp>
         <p:nvSpPr>
-          <p:cNvPr id="13" name="Rectangle 12">
-            <a:extLst>
-              <a:ext uri="{FF2B5EF4-FFF2-40B4-BE49-F238E27FC236}">
-                <a16:creationId xmlns:a16="http://schemas.microsoft.com/office/drawing/2014/main" id="{C1F94B32-D74C-48A9-BD02-A42A31069B76}"/>
+          <p:cNvPr id="3" name="Rectangle 2">
+            <a:extLst>
+              <a:ext uri="{FF2B5EF4-FFF2-40B4-BE49-F238E27FC236}">
+                <a16:creationId xmlns:a16="http://schemas.microsoft.com/office/drawing/2014/main" id="{CB8C2FF8-54B8-41C4-9A3C-B27C00E05392}"/>
               </a:ext>
             </a:extLst>
           </p:cNvPr>
@@ -5823,122 +5826,48 @@
         </p:nvSpPr>
         <p:spPr>
           <a:xfrm>
-            <a:off x="4223792" y="3068960"/>
-            <a:ext cx="4392488" cy="1800200"/>
+            <a:off x="191344" y="5085184"/>
+            <a:ext cx="4536504" cy="1008112"/>
           </a:xfrm>
           <a:prstGeom prst="rect">
             <a:avLst/>
           </a:prstGeom>
         </p:spPr>
         <p:style>
-          <a:lnRef idx="2">
-            <a:schemeClr val="accent2">
-              <a:shade val="50000"/>
-            </a:schemeClr>
+          <a:lnRef idx="1">
+            <a:schemeClr val="accent6"/>
           </a:lnRef>
-          <a:fillRef idx="1">
-            <a:schemeClr val="accent2"/>
+          <a:fillRef idx="2">
+            <a:schemeClr val="accent6"/>
           </a:fillRef>
-          <a:effectRef idx="0">
-            <a:schemeClr val="accent2"/>
+          <a:effectRef idx="1">
+            <a:schemeClr val="accent6"/>
           </a:effectRef>
           <a:fontRef idx="minor">
-            <a:schemeClr val="lt1"/>
+            <a:schemeClr val="dk1"/>
           </a:fontRef>
         </p:style>
         <p:txBody>
           <a:bodyPr rtlCol="0" anchor="ctr"/>
           <a:lstStyle/>
           <a:p>
-            <a:pPr algn="ctr"/>
-            <a:r>
-              <a:rPr lang="he-IL" dirty="0"/>
-              <a:t>להחליף צבעים</a:t>
-            </a:r>
-          </a:p>
-          <a:p>
-            <a:pPr algn="ctr"/>
-            <a:r>
-              <a:rPr lang="he-IL" dirty="0"/>
-              <a:t>להוריד רקע אפור + </a:t>
-            </a:r>
-            <a:r>
-              <a:rPr lang="en-US" dirty="0"/>
-              <a:t>grid</a:t>
-            </a:r>
-            <a:endParaRPr lang="he-IL" dirty="0"/>
-          </a:p>
-          <a:p>
-            <a:pPr algn="ctr"/>
-            <a:r>
-              <a:rPr lang="he-IL" dirty="0"/>
-              <a:t>להוריד מקרא למטה</a:t>
-            </a:r>
-          </a:p>
-          <a:p>
-            <a:pPr algn="ctr"/>
-            <a:r>
-              <a:rPr lang="he-IL" dirty="0"/>
-              <a:t>להחליף ירוק באדום</a:t>
-            </a:r>
-          </a:p>
-          <a:p>
-            <a:pPr algn="ctr"/>
-            <a:r>
-              <a:rPr lang="he-IL" dirty="0"/>
-              <a:t>להגדיל למטה</a:t>
-            </a:r>
-            <a:endParaRPr lang="en-IL" dirty="0"/>
-          </a:p>
-        </p:txBody>
-      </p:sp>
-      <p:sp>
-        <p:nvSpPr>
-          <p:cNvPr id="3" name="Rectangle 2">
-            <a:extLst>
-              <a:ext uri="{FF2B5EF4-FFF2-40B4-BE49-F238E27FC236}">
-                <a16:creationId xmlns:a16="http://schemas.microsoft.com/office/drawing/2014/main" id="{CB8C2FF8-54B8-41C4-9A3C-B27C00E05392}"/>
-              </a:ext>
-            </a:extLst>
-          </p:cNvPr>
-          <p:cNvSpPr/>
-          <p:nvPr/>
-        </p:nvSpPr>
-        <p:spPr>
-          <a:xfrm>
-            <a:off x="7680176" y="5301208"/>
-            <a:ext cx="3902224" cy="1008112"/>
-          </a:xfrm>
-          <a:prstGeom prst="rect">
-            <a:avLst/>
-          </a:prstGeom>
-        </p:spPr>
-        <p:style>
-          <a:lnRef idx="2">
-            <a:schemeClr val="accent2">
-              <a:shade val="50000"/>
-            </a:schemeClr>
-          </a:lnRef>
-          <a:fillRef idx="1">
-            <a:schemeClr val="accent2"/>
-          </a:fillRef>
-          <a:effectRef idx="0">
-            <a:schemeClr val="accent2"/>
-          </a:effectRef>
-          <a:fontRef idx="minor">
-            <a:schemeClr val="lt1"/>
-          </a:fontRef>
-        </p:style>
-        <p:txBody>
-          <a:bodyPr rtlCol="0" anchor="ctr"/>
-          <a:lstStyle/>
-          <a:p>
-            <a:pPr algn="ctr"/>
-            <a:r>
-              <a:rPr lang="he-IL" dirty="0"/>
-              <a:t>להכניס סיכום של המלל</a:t>
-            </a:r>
-            <a:endParaRPr lang="en-IL" dirty="0"/>
+            <a:r>
+              <a:rPr lang="he-IL" sz="1400" dirty="0"/>
+              <a:t>המתנגדים: צילה צפת, הדס עובדיה</a:t>
+            </a:r>
+          </a:p>
+          <a:p>
+            <a:r>
+              <a:rPr lang="he-IL" sz="1400" dirty="0"/>
+              <a:t>האוהדים: שושנה אלמגור, תמר בזק רפפורט, מיכל אגמון גונן</a:t>
+            </a:r>
+          </a:p>
+          <a:p>
+            <a:r>
+              <a:rPr lang="he-IL" sz="1400" dirty="0"/>
+              <a:t>דעות חלוקות: אסתר שטמר, מנחם רניאל</a:t>
+            </a:r>
+            <a:endParaRPr lang="en-IL" sz="1400" dirty="0"/>
           </a:p>
         </p:txBody>
       </p:sp>
@@ -6082,19 +6011,17 @@
       </p:sp>
       <p:pic>
         <p:nvPicPr>
-          <p:cNvPr id="17" name="Content Placeholder 16">
-            <a:extLst>
-              <a:ext uri="{FF2B5EF4-FFF2-40B4-BE49-F238E27FC236}">
-                <a16:creationId xmlns:a16="http://schemas.microsoft.com/office/drawing/2014/main" id="{EFAA5BF6-4594-4043-BC9E-3C0428F4E619}"/>
+          <p:cNvPr id="7" name="Picture 6">
+            <a:extLst>
+              <a:ext uri="{FF2B5EF4-FFF2-40B4-BE49-F238E27FC236}">
+                <a16:creationId xmlns:a16="http://schemas.microsoft.com/office/drawing/2014/main" id="{B00F5A83-E156-4BE5-A01D-6105F4BD3BF9}"/>
               </a:ext>
             </a:extLst>
           </p:cNvPr>
           <p:cNvPicPr>
-            <a:picLocks noGrp="1" noChangeAspect="1"/>
+            <a:picLocks noChangeAspect="1"/>
           </p:cNvPicPr>
-          <p:nvPr>
-            <p:ph idx="1"/>
-          </p:nvPr>
+          <p:nvPr/>
         </p:nvPicPr>
         <p:blipFill>
           <a:blip r:embed="rId3" cstate="print">
@@ -6120,86 +6047,14 @@
         </p:blipFill>
         <p:spPr>
           <a:xfrm>
-            <a:off x="696457" y="1902996"/>
-            <a:ext cx="10799086" cy="3599695"/>
-          </a:xfrm>
-        </p:spPr>
-      </p:pic>
-      <p:sp>
-        <p:nvSpPr>
-          <p:cNvPr id="6" name="Rectangle 5">
-            <a:extLst>
-              <a:ext uri="{FF2B5EF4-FFF2-40B4-BE49-F238E27FC236}">
-                <a16:creationId xmlns:a16="http://schemas.microsoft.com/office/drawing/2014/main" id="{72F70934-B51D-413C-AAE9-98B886DC797A}"/>
-              </a:ext>
-            </a:extLst>
-          </p:cNvPr>
-          <p:cNvSpPr/>
-          <p:nvPr/>
-        </p:nvSpPr>
-        <p:spPr>
-          <a:xfrm>
-            <a:off x="4223792" y="3068960"/>
-            <a:ext cx="4392488" cy="1800200"/>
+            <a:off x="336792" y="1768988"/>
+            <a:ext cx="11518415" cy="4319025"/>
           </a:xfrm>
           <a:prstGeom prst="rect">
             <a:avLst/>
           </a:prstGeom>
         </p:spPr>
-        <p:style>
-          <a:lnRef idx="2">
-            <a:schemeClr val="accent2">
-              <a:shade val="50000"/>
-            </a:schemeClr>
-          </a:lnRef>
-          <a:fillRef idx="1">
-            <a:schemeClr val="accent2"/>
-          </a:fillRef>
-          <a:effectRef idx="0">
-            <a:schemeClr val="accent2"/>
-          </a:effectRef>
-          <a:fontRef idx="minor">
-            <a:schemeClr val="lt1"/>
-          </a:fontRef>
-        </p:style>
-        <p:txBody>
-          <a:bodyPr rtlCol="0" anchor="ctr"/>
-          <a:lstStyle/>
-          <a:p>
-            <a:pPr algn="ctr"/>
-            <a:r>
-              <a:rPr lang="he-IL" dirty="0"/>
-              <a:t>להחליף צבעים</a:t>
-            </a:r>
-          </a:p>
-          <a:p>
-            <a:pPr algn="ctr"/>
-            <a:r>
-              <a:rPr lang="he-IL" dirty="0"/>
-              <a:t>להוריד רקע אפור + </a:t>
-            </a:r>
-            <a:r>
-              <a:rPr lang="en-US" dirty="0"/>
-              <a:t>grid</a:t>
-            </a:r>
-            <a:endParaRPr lang="he-IL" dirty="0"/>
-          </a:p>
-          <a:p>
-            <a:pPr algn="ctr"/>
-            <a:r>
-              <a:rPr lang="he-IL" dirty="0"/>
-              <a:t>להוריד מקרא למטה</a:t>
-            </a:r>
-          </a:p>
-          <a:p>
-            <a:pPr algn="ctr"/>
-            <a:r>
-              <a:rPr lang="he-IL" dirty="0"/>
-              <a:t>להחליף ירוק באדום</a:t>
-            </a:r>
-          </a:p>
-        </p:txBody>
-      </p:sp>
+      </p:pic>
     </p:spTree>
     <p:extLst>
       <p:ext uri="{BB962C8B-B14F-4D97-AF65-F5344CB8AC3E}">
@@ -6253,37 +6108,57 @@
           <a:p>
             <a:r>
               <a:rPr lang="he-IL" dirty="0"/>
-              <a:t>בית משפט מחוזי הכי אוהד תובענות</a:t>
+              <a:t>איזה בית משפט מחוזי הכי אוהד תובענות?</a:t>
             </a:r>
             <a:endParaRPr lang="en-IL" dirty="0"/>
           </a:p>
         </p:txBody>
       </p:sp>
-      <p:sp>
-        <p:nvSpPr>
-          <p:cNvPr id="3" name="Content Placeholder 2">
-            <a:extLst>
-              <a:ext uri="{FF2B5EF4-FFF2-40B4-BE49-F238E27FC236}">
-                <a16:creationId xmlns:a16="http://schemas.microsoft.com/office/drawing/2014/main" id="{D10CC6AE-7432-497C-AF6D-FB2DD5D6352A}"/>
-              </a:ext>
-            </a:extLst>
-          </p:cNvPr>
-          <p:cNvSpPr>
-            <a:spLocks noGrp="1"/>
-          </p:cNvSpPr>
+      <p:pic>
+        <p:nvPicPr>
+          <p:cNvPr id="7" name="Content Placeholder 6">
+            <a:extLst>
+              <a:ext uri="{FF2B5EF4-FFF2-40B4-BE49-F238E27FC236}">
+                <a16:creationId xmlns:a16="http://schemas.microsoft.com/office/drawing/2014/main" id="{9004AB96-604E-4251-8165-A6B141FEFEBF}"/>
+              </a:ext>
+            </a:extLst>
+          </p:cNvPr>
+          <p:cNvPicPr>
+            <a:picLocks noGrp="1" noChangeAspect="1"/>
+          </p:cNvPicPr>
           <p:nvPr>
             <p:ph idx="1"/>
           </p:nvPr>
-        </p:nvSpPr>
-        <p:spPr/>
-        <p:txBody>
-          <a:bodyPr/>
-          <a:lstStyle/>
-          <a:p>
-            <a:endParaRPr lang="en-IL"/>
-          </a:p>
-        </p:txBody>
-      </p:sp>
+        </p:nvPicPr>
+        <p:blipFill>
+          <a:blip r:embed="rId2" cstate="print">
+            <a:clrChange>
+              <a:clrFrom>
+                <a:srgbClr val="FFFFFF"/>
+              </a:clrFrom>
+              <a:clrTo>
+                <a:srgbClr val="FFFFFF">
+                  <a:alpha val="0"/>
+                </a:srgbClr>
+              </a:clrTo>
+            </a:clrChange>
+            <a:extLst>
+              <a:ext uri="{28A0092B-C50C-407E-A947-70E740481C1C}">
+                <a14:useLocalDpi xmlns:a14="http://schemas.microsoft.com/office/drawing/2010/main" val="0"/>
+              </a:ext>
+            </a:extLst>
+          </a:blip>
+          <a:stretch>
+            <a:fillRect/>
+          </a:stretch>
+        </p:blipFill>
+        <p:spPr>
+          <a:xfrm>
+            <a:off x="696457" y="1902996"/>
+            <a:ext cx="10799086" cy="3599695"/>
+          </a:xfrm>
+        </p:spPr>
+      </p:pic>
       <p:sp>
         <p:nvSpPr>
           <p:cNvPr id="4" name="Slide Number Placeholder 3">
@@ -6328,7 +6203,7 @@
           <p:nvPr/>
         </p:nvPicPr>
         <p:blipFill>
-          <a:blip r:embed="rId2">
+          <a:blip r:embed="rId3">
             <a:clrChange>
               <a:clrFrom>
                 <a:srgbClr val="FFFFFF"/>
@@ -6402,7 +6277,9 @@
         </p:nvSpPr>
         <p:spPr/>
         <p:txBody>
-          <a:bodyPr/>
+          <a:bodyPr>
+            <a:normAutofit/>
+          </a:bodyPr>
           <a:lstStyle/>
           <a:p>
             <a:r>
@@ -6410,31 +6287,6 @@
               <a:t>תחומי התביעות שבהם שכר הטרחה הכי משתלם</a:t>
             </a:r>
             <a:endParaRPr lang="en-IL" dirty="0"/>
-          </a:p>
-        </p:txBody>
-      </p:sp>
-      <p:sp>
-        <p:nvSpPr>
-          <p:cNvPr id="3" name="Content Placeholder 2">
-            <a:extLst>
-              <a:ext uri="{FF2B5EF4-FFF2-40B4-BE49-F238E27FC236}">
-                <a16:creationId xmlns:a16="http://schemas.microsoft.com/office/drawing/2014/main" id="{D006A046-C976-4B84-BA30-D490DFD8C8BD}"/>
-              </a:ext>
-            </a:extLst>
-          </p:cNvPr>
-          <p:cNvSpPr>
-            <a:spLocks noGrp="1"/>
-          </p:cNvSpPr>
-          <p:nvPr>
-            <p:ph idx="1"/>
-          </p:nvPr>
-        </p:nvSpPr>
-        <p:spPr/>
-        <p:txBody>
-          <a:bodyPr/>
-          <a:lstStyle/>
-          <a:p>
-            <a:endParaRPr lang="en-IL"/>
           </a:p>
         </p:txBody>
       </p:sp>
@@ -6508,6 +6360,51 @@
           </a:prstGeom>
         </p:spPr>
       </p:pic>
+      <p:pic>
+        <p:nvPicPr>
+          <p:cNvPr id="27" name="Content Placeholder 26">
+            <a:extLst>
+              <a:ext uri="{FF2B5EF4-FFF2-40B4-BE49-F238E27FC236}">
+                <a16:creationId xmlns:a16="http://schemas.microsoft.com/office/drawing/2014/main" id="{88DF7759-6FF1-4273-B4FE-31CACB708529}"/>
+              </a:ext>
+            </a:extLst>
+          </p:cNvPr>
+          <p:cNvPicPr>
+            <a:picLocks noGrp="1" noChangeAspect="1"/>
+          </p:cNvPicPr>
+          <p:nvPr>
+            <p:ph idx="1"/>
+          </p:nvPr>
+        </p:nvPicPr>
+        <p:blipFill>
+          <a:blip r:embed="rId3" cstate="print">
+            <a:clrChange>
+              <a:clrFrom>
+                <a:srgbClr val="FFFFFF"/>
+              </a:clrFrom>
+              <a:clrTo>
+                <a:srgbClr val="FFFFFF">
+                  <a:alpha val="0"/>
+                </a:srgbClr>
+              </a:clrTo>
+            </a:clrChange>
+            <a:extLst>
+              <a:ext uri="{28A0092B-C50C-407E-A947-70E740481C1C}">
+                <a14:useLocalDpi xmlns:a14="http://schemas.microsoft.com/office/drawing/2010/main" val="0"/>
+              </a:ext>
+            </a:extLst>
+          </a:blip>
+          <a:stretch>
+            <a:fillRect/>
+          </a:stretch>
+        </p:blipFill>
+        <p:spPr>
+          <a:xfrm>
+            <a:off x="696457" y="1902996"/>
+            <a:ext cx="10799086" cy="3599695"/>
+          </a:xfrm>
+        </p:spPr>
+      </p:pic>
     </p:spTree>
     <p:extLst>
       <p:ext uri="{BB962C8B-B14F-4D97-AF65-F5344CB8AC3E}">
@@ -6844,7 +6741,7 @@
 </file>
 
 <file path=ppt/slides/slide20.xml><?xml version="1.0" encoding="utf-8"?>
-<p:sld xmlns:a="http://schemas.openxmlformats.org/drawingml/2006/main" xmlns:r="http://schemas.openxmlformats.org/officeDocument/2006/relationships" xmlns:p="http://schemas.openxmlformats.org/presentationml/2006/main">
+<p:sld xmlns:a="http://schemas.openxmlformats.org/drawingml/2006/main" xmlns:r="http://schemas.openxmlformats.org/officeDocument/2006/relationships" xmlns:p="http://schemas.openxmlformats.org/presentationml/2006/main" show="0">
   <p:cSld>
     <p:spTree>
       <p:nvGrpSpPr>
@@ -6885,34 +6782,9 @@
           <a:p>
             <a:r>
               <a:rPr lang="he-IL" dirty="0"/>
-              <a:t>עמדות עו"ד בנוגע לתביעות ייצוגיות</a:t>
+              <a:t>תחומי התביעות שבהם שכר הטרחה הכי משתלם</a:t>
             </a:r>
             <a:endParaRPr lang="en-IL" dirty="0"/>
-          </a:p>
-        </p:txBody>
-      </p:sp>
-      <p:sp>
-        <p:nvSpPr>
-          <p:cNvPr id="3" name="Content Placeholder 2">
-            <a:extLst>
-              <a:ext uri="{FF2B5EF4-FFF2-40B4-BE49-F238E27FC236}">
-                <a16:creationId xmlns:a16="http://schemas.microsoft.com/office/drawing/2014/main" id="{D006A046-C976-4B84-BA30-D490DFD8C8BD}"/>
-              </a:ext>
-            </a:extLst>
-          </p:cNvPr>
-          <p:cNvSpPr>
-            <a:spLocks noGrp="1"/>
-          </p:cNvSpPr>
-          <p:nvPr>
-            <p:ph idx="1"/>
-          </p:nvPr>
-        </p:nvSpPr>
-        <p:spPr/>
-        <p:txBody>
-          <a:bodyPr/>
-          <a:lstStyle/>
-          <a:p>
-            <a:endParaRPr lang="en-IL"/>
           </a:p>
         </p:txBody>
       </p:sp>
@@ -6986,60 +6858,347 @@
           </a:prstGeom>
         </p:spPr>
       </p:pic>
-      <p:sp>
-        <p:nvSpPr>
-          <p:cNvPr id="6" name="Rectangle: Rounded Corners 5">
-            <a:extLst>
-              <a:ext uri="{FF2B5EF4-FFF2-40B4-BE49-F238E27FC236}">
-                <a16:creationId xmlns:a16="http://schemas.microsoft.com/office/drawing/2014/main" id="{20C465D4-C22A-4094-BC37-013458685D43}"/>
-              </a:ext>
-            </a:extLst>
-          </p:cNvPr>
-          <p:cNvSpPr/>
-          <p:nvPr/>
-        </p:nvSpPr>
+      <p:pic>
+        <p:nvPicPr>
+          <p:cNvPr id="16" name="Content Placeholder 15">
+            <a:extLst>
+              <a:ext uri="{FF2B5EF4-FFF2-40B4-BE49-F238E27FC236}">
+                <a16:creationId xmlns:a16="http://schemas.microsoft.com/office/drawing/2014/main" id="{5610152C-5BF3-4F0C-8898-DEC4EDE74422}"/>
+              </a:ext>
+            </a:extLst>
+          </p:cNvPr>
+          <p:cNvPicPr>
+            <a:picLocks noGrp="1" noChangeAspect="1"/>
+          </p:cNvPicPr>
+          <p:nvPr>
+            <p:ph idx="1"/>
+          </p:nvPr>
+        </p:nvPicPr>
+        <p:blipFill>
+          <a:blip r:embed="rId3" cstate="print">
+            <a:clrChange>
+              <a:clrFrom>
+                <a:srgbClr val="FFFFFF"/>
+              </a:clrFrom>
+              <a:clrTo>
+                <a:srgbClr val="FFFFFF">
+                  <a:alpha val="0"/>
+                </a:srgbClr>
+              </a:clrTo>
+            </a:clrChange>
+            <a:extLst>
+              <a:ext uri="{28A0092B-C50C-407E-A947-70E740481C1C}">
+                <a14:useLocalDpi xmlns:a14="http://schemas.microsoft.com/office/drawing/2010/main" val="0"/>
+              </a:ext>
+            </a:extLst>
+          </a:blip>
+          <a:stretch>
+            <a:fillRect/>
+          </a:stretch>
+        </p:blipFill>
         <p:spPr>
           <a:xfrm>
-            <a:off x="4367808" y="2276872"/>
-            <a:ext cx="3528392" cy="1656184"/>
+            <a:off x="696457" y="1902996"/>
+            <a:ext cx="10799086" cy="3599695"/>
           </a:xfrm>
-          <a:prstGeom prst="roundRect">
+        </p:spPr>
+      </p:pic>
+    </p:spTree>
+    <p:extLst>
+      <p:ext uri="{BB962C8B-B14F-4D97-AF65-F5344CB8AC3E}">
+        <p14:creationId xmlns:p14="http://schemas.microsoft.com/office/powerpoint/2010/main" val="3871901291"/>
+      </p:ext>
+    </p:extLst>
+  </p:cSld>
+  <p:clrMapOvr>
+    <a:masterClrMapping/>
+  </p:clrMapOvr>
+</p:sld>
+</file>
+
+<file path=ppt/slides/slide21.xml><?xml version="1.0" encoding="utf-8"?>
+<p:sld xmlns:a="http://schemas.openxmlformats.org/drawingml/2006/main" xmlns:r="http://schemas.openxmlformats.org/officeDocument/2006/relationships" xmlns:p="http://schemas.openxmlformats.org/presentationml/2006/main">
+  <p:cSld>
+    <p:spTree>
+      <p:nvGrpSpPr>
+        <p:cNvPr id="1" name=""/>
+        <p:cNvGrpSpPr/>
+        <p:nvPr/>
+      </p:nvGrpSpPr>
+      <p:grpSpPr>
+        <a:xfrm>
+          <a:off x="0" y="0"/>
+          <a:ext cx="0" cy="0"/>
+          <a:chOff x="0" y="0"/>
+          <a:chExt cx="0" cy="0"/>
+        </a:xfrm>
+      </p:grpSpPr>
+      <p:sp>
+        <p:nvSpPr>
+          <p:cNvPr id="2" name="Title 1">
+            <a:extLst>
+              <a:ext uri="{FF2B5EF4-FFF2-40B4-BE49-F238E27FC236}">
+                <a16:creationId xmlns:a16="http://schemas.microsoft.com/office/drawing/2014/main" id="{EA37C483-BD78-421F-A2FD-3715A004DB36}"/>
+              </a:ext>
+            </a:extLst>
+          </p:cNvPr>
+          <p:cNvSpPr>
+            <a:spLocks noGrp="1"/>
+          </p:cNvSpPr>
+          <p:nvPr>
+            <p:ph type="title"/>
+          </p:nvPr>
+        </p:nvSpPr>
+        <p:spPr/>
+        <p:txBody>
+          <a:bodyPr>
+            <a:normAutofit/>
+          </a:bodyPr>
+          <a:lstStyle/>
+          <a:p>
+            <a:r>
+              <a:rPr lang="he-IL" dirty="0"/>
+              <a:t>עמדות עו"ד בנוגע לתביעות ייצוגיות</a:t>
+            </a:r>
+            <a:endParaRPr lang="en-IL" dirty="0"/>
+          </a:p>
+        </p:txBody>
+      </p:sp>
+      <p:sp>
+        <p:nvSpPr>
+          <p:cNvPr id="4" name="Slide Number Placeholder 3">
+            <a:extLst>
+              <a:ext uri="{FF2B5EF4-FFF2-40B4-BE49-F238E27FC236}">
+                <a16:creationId xmlns:a16="http://schemas.microsoft.com/office/drawing/2014/main" id="{35ECA6D7-189B-43D7-BF1B-0E80C79B5C94}"/>
+              </a:ext>
+            </a:extLst>
+          </p:cNvPr>
+          <p:cNvSpPr>
+            <a:spLocks noGrp="1"/>
+          </p:cNvSpPr>
+          <p:nvPr>
+            <p:ph type="sldNum" sz="quarter" idx="12"/>
+          </p:nvPr>
+        </p:nvSpPr>
+        <p:spPr/>
+        <p:txBody>
+          <a:bodyPr/>
+          <a:lstStyle/>
+          <a:p>
+            <a:fld id="{48C2FE54-953E-4268-8452-225DF8E36AC9}" type="slidenum">
+              <a:rPr lang="he-IL" smtClean="0"/>
+              <a:t>21</a:t>
+            </a:fld>
+            <a:endParaRPr lang="he-IL"/>
+          </a:p>
+        </p:txBody>
+      </p:sp>
+      <p:pic>
+        <p:nvPicPr>
+          <p:cNvPr id="5" name="Picture 4">
+            <a:extLst>
+              <a:ext uri="{FF2B5EF4-FFF2-40B4-BE49-F238E27FC236}">
+                <a16:creationId xmlns:a16="http://schemas.microsoft.com/office/drawing/2014/main" id="{4EC2D3D1-E1F1-4966-9587-70344C55CD0B}"/>
+              </a:ext>
+            </a:extLst>
+          </p:cNvPr>
+          <p:cNvPicPr>
+            <a:picLocks noChangeAspect="1"/>
+          </p:cNvPicPr>
+          <p:nvPr/>
+        </p:nvPicPr>
+        <p:blipFill>
+          <a:blip r:embed="rId2">
+            <a:clrChange>
+              <a:clrFrom>
+                <a:srgbClr val="FFFFFF"/>
+              </a:clrFrom>
+              <a:clrTo>
+                <a:srgbClr val="FFFFFF">
+                  <a:alpha val="0"/>
+                </a:srgbClr>
+              </a:clrTo>
+            </a:clrChange>
+          </a:blip>
+          <a:stretch>
+            <a:fillRect/>
+          </a:stretch>
+        </p:blipFill>
+        <p:spPr>
+          <a:xfrm>
+            <a:off x="6647146" y="6188980"/>
+            <a:ext cx="1186258" cy="543576"/>
+          </a:xfrm>
+          <a:prstGeom prst="rect">
             <a:avLst/>
           </a:prstGeom>
         </p:spPr>
-        <p:style>
-          <a:lnRef idx="2">
-            <a:schemeClr val="accent1">
-              <a:shade val="50000"/>
-            </a:schemeClr>
-          </a:lnRef>
-          <a:fillRef idx="1">
-            <a:schemeClr val="accent1"/>
-          </a:fillRef>
-          <a:effectRef idx="0">
-            <a:schemeClr val="accent1"/>
-          </a:effectRef>
-          <a:fontRef idx="minor">
-            <a:schemeClr val="lt1"/>
-          </a:fontRef>
-        </p:style>
-        <p:txBody>
-          <a:bodyPr rtlCol="0" anchor="ctr"/>
-          <a:lstStyle/>
-          <a:p>
-            <a:pPr algn="ctr"/>
-            <a:r>
-              <a:rPr lang="he-IL" dirty="0"/>
-              <a:t>להכניס + להוסיף עוד שקף שמפצל בין תובעים למייצגים חברות נתבעות</a:t>
-            </a:r>
-            <a:endParaRPr lang="en-IL" dirty="0"/>
-          </a:p>
-        </p:txBody>
-      </p:sp>
+      </p:pic>
+      <p:pic>
+        <p:nvPicPr>
+          <p:cNvPr id="22" name="Picture 21">
+            <a:extLst>
+              <a:ext uri="{FF2B5EF4-FFF2-40B4-BE49-F238E27FC236}">
+                <a16:creationId xmlns:a16="http://schemas.microsoft.com/office/drawing/2014/main" id="{7B8337F5-8416-4A0C-9085-421933088B4F}"/>
+              </a:ext>
+            </a:extLst>
+          </p:cNvPr>
+          <p:cNvPicPr>
+            <a:picLocks noChangeAspect="1"/>
+          </p:cNvPicPr>
+          <p:nvPr/>
+        </p:nvPicPr>
+        <p:blipFill>
+          <a:blip r:embed="rId3" cstate="print">
+            <a:clrChange>
+              <a:clrFrom>
+                <a:srgbClr val="FFFFFF"/>
+              </a:clrFrom>
+              <a:clrTo>
+                <a:srgbClr val="FFFFFF">
+                  <a:alpha val="0"/>
+                </a:srgbClr>
+              </a:clrTo>
+            </a:clrChange>
+            <a:extLst>
+              <a:ext uri="{28A0092B-C50C-407E-A947-70E740481C1C}">
+                <a14:useLocalDpi xmlns:a14="http://schemas.microsoft.com/office/drawing/2010/main" val="0"/>
+              </a:ext>
+            </a:extLst>
+          </a:blip>
+          <a:stretch>
+            <a:fillRect/>
+          </a:stretch>
+        </p:blipFill>
+        <p:spPr>
+          <a:xfrm>
+            <a:off x="696457" y="1629152"/>
+            <a:ext cx="10799086" cy="3599695"/>
+          </a:xfrm>
+          <a:prstGeom prst="rect">
+            <a:avLst/>
+          </a:prstGeom>
+        </p:spPr>
+      </p:pic>
     </p:spTree>
     <p:extLst>
       <p:ext uri="{BB962C8B-B14F-4D97-AF65-F5344CB8AC3E}">
         <p14:creationId xmlns:p14="http://schemas.microsoft.com/office/powerpoint/2010/main" val="3040307342"/>
+      </p:ext>
+    </p:extLst>
+  </p:cSld>
+  <p:clrMapOvr>
+    <a:masterClrMapping/>
+  </p:clrMapOvr>
+</p:sld>
+</file>
+
+<file path=ppt/slides/slide22.xml><?xml version="1.0" encoding="utf-8"?>
+<p:sld xmlns:a="http://schemas.openxmlformats.org/drawingml/2006/main" xmlns:r="http://schemas.openxmlformats.org/officeDocument/2006/relationships" xmlns:p="http://schemas.openxmlformats.org/presentationml/2006/main" show="0">
+  <p:cSld>
+    <p:spTree>
+      <p:nvGrpSpPr>
+        <p:cNvPr id="1" name=""/>
+        <p:cNvGrpSpPr/>
+        <p:nvPr/>
+      </p:nvGrpSpPr>
+      <p:grpSpPr>
+        <a:xfrm>
+          <a:off x="0" y="0"/>
+          <a:ext cx="0" cy="0"/>
+          <a:chOff x="0" y="0"/>
+          <a:chExt cx="0" cy="0"/>
+        </a:xfrm>
+      </p:grpSpPr>
+      <p:sp>
+        <p:nvSpPr>
+          <p:cNvPr id="2" name="Title 1">
+            <a:extLst>
+              <a:ext uri="{FF2B5EF4-FFF2-40B4-BE49-F238E27FC236}">
+                <a16:creationId xmlns:a16="http://schemas.microsoft.com/office/drawing/2014/main" id="{EE49BABD-C7B6-4793-8E64-600E53639E93}"/>
+              </a:ext>
+            </a:extLst>
+          </p:cNvPr>
+          <p:cNvSpPr>
+            <a:spLocks noGrp="1"/>
+          </p:cNvSpPr>
+          <p:nvPr>
+            <p:ph type="title"/>
+          </p:nvPr>
+        </p:nvSpPr>
+        <p:spPr/>
+        <p:txBody>
+          <a:bodyPr>
+            <a:normAutofit fontScale="90000"/>
+          </a:bodyPr>
+          <a:lstStyle/>
+          <a:p>
+            <a:r>
+              <a:rPr lang="he-IL" dirty="0"/>
+              <a:t>עמדות עו"ד בנוגע לתביעות ייצוגיות – פילוח לפי תפקיד</a:t>
+            </a:r>
+            <a:endParaRPr lang="en-IL" dirty="0"/>
+          </a:p>
+        </p:txBody>
+      </p:sp>
+      <p:sp>
+        <p:nvSpPr>
+          <p:cNvPr id="4" name="Slide Number Placeholder 3">
+            <a:extLst>
+              <a:ext uri="{FF2B5EF4-FFF2-40B4-BE49-F238E27FC236}">
+                <a16:creationId xmlns:a16="http://schemas.microsoft.com/office/drawing/2014/main" id="{0EBC6FC0-35A8-4AA3-8990-F300900EA55B}"/>
+              </a:ext>
+            </a:extLst>
+          </p:cNvPr>
+          <p:cNvSpPr>
+            <a:spLocks noGrp="1"/>
+          </p:cNvSpPr>
+          <p:nvPr>
+            <p:ph type="sldNum" sz="quarter" idx="12"/>
+          </p:nvPr>
+        </p:nvSpPr>
+        <p:spPr/>
+        <p:txBody>
+          <a:bodyPr/>
+          <a:lstStyle/>
+          <a:p>
+            <a:fld id="{48C2FE54-953E-4268-8452-225DF8E36AC9}" type="slidenum">
+              <a:rPr lang="he-IL" smtClean="0"/>
+              <a:t>22</a:t>
+            </a:fld>
+            <a:endParaRPr lang="he-IL"/>
+          </a:p>
+        </p:txBody>
+      </p:sp>
+      <p:sp>
+        <p:nvSpPr>
+          <p:cNvPr id="12" name="Content Placeholder 11">
+            <a:extLst>
+              <a:ext uri="{FF2B5EF4-FFF2-40B4-BE49-F238E27FC236}">
+                <a16:creationId xmlns:a16="http://schemas.microsoft.com/office/drawing/2014/main" id="{8F68C404-5EEA-4F4B-9BE4-9FEF561EFCCB}"/>
+              </a:ext>
+            </a:extLst>
+          </p:cNvPr>
+          <p:cNvSpPr>
+            <a:spLocks noGrp="1"/>
+          </p:cNvSpPr>
+          <p:nvPr>
+            <p:ph idx="1"/>
+          </p:nvPr>
+        </p:nvSpPr>
+        <p:spPr/>
+        <p:txBody>
+          <a:bodyPr/>
+          <a:lstStyle/>
+          <a:p>
+            <a:endParaRPr lang="en-IL"/>
+          </a:p>
+        </p:txBody>
+      </p:sp>
+    </p:spTree>
+    <p:extLst>
+      <p:ext uri="{BB962C8B-B14F-4D97-AF65-F5344CB8AC3E}">
+        <p14:creationId xmlns:p14="http://schemas.microsoft.com/office/powerpoint/2010/main" val="1481994598"/>
       </p:ext>
     </p:extLst>
   </p:cSld>
@@ -7820,12 +7979,81 @@
           </a:prstGeom>
         </p:spPr>
       </p:pic>
+      <p:sp>
+        <p:nvSpPr>
+          <p:cNvPr id="22" name="Slide Number Placeholder 21">
+            <a:extLst>
+              <a:ext uri="{FF2B5EF4-FFF2-40B4-BE49-F238E27FC236}">
+                <a16:creationId xmlns:a16="http://schemas.microsoft.com/office/drawing/2014/main" id="{A0C3322C-E483-4FA5-BD2D-DAFEBEA7DA75}"/>
+              </a:ext>
+            </a:extLst>
+          </p:cNvPr>
+          <p:cNvSpPr>
+            <a:spLocks noGrp="1"/>
+          </p:cNvSpPr>
+          <p:nvPr>
+            <p:ph type="sldNum" sz="quarter" idx="12"/>
+          </p:nvPr>
+        </p:nvSpPr>
+        <p:spPr/>
+        <p:txBody>
+          <a:bodyPr/>
+          <a:lstStyle/>
+          <a:p>
+            <a:fld id="{48C2FE54-953E-4268-8452-225DF8E36AC9}" type="slidenum">
+              <a:rPr lang="he-IL" smtClean="0"/>
+              <a:t>4</a:t>
+            </a:fld>
+            <a:endParaRPr lang="he-IL"/>
+          </a:p>
+        </p:txBody>
+      </p:sp>
+      <p:sp>
+        <p:nvSpPr>
+          <p:cNvPr id="23" name="TextBox 22">
+            <a:extLst>
+              <a:ext uri="{FF2B5EF4-FFF2-40B4-BE49-F238E27FC236}">
+                <a16:creationId xmlns:a16="http://schemas.microsoft.com/office/drawing/2014/main" id="{83E3701E-F716-4F62-B52B-D938981AB876}"/>
+              </a:ext>
+            </a:extLst>
+          </p:cNvPr>
+          <p:cNvSpPr txBox="1"/>
+          <p:nvPr/>
+        </p:nvSpPr>
+        <p:spPr>
+          <a:xfrm>
+            <a:off x="2639616" y="6392361"/>
+            <a:ext cx="4892685" cy="276999"/>
+          </a:xfrm>
+          <a:prstGeom prst="rect">
+            <a:avLst/>
+          </a:prstGeom>
+          <a:noFill/>
+        </p:spPr>
+        <p:txBody>
+          <a:bodyPr wrap="none" rtlCol="0">
+            <a:spAutoFit/>
+          </a:bodyPr>
+          <a:lstStyle/>
+          <a:p>
+            <a:r>
+              <a:rPr lang="en-US" sz="1200" dirty="0"/>
+              <a:t>* </a:t>
+            </a:r>
+            <a:r>
+              <a:rPr lang="he-IL" sz="1200" dirty="0"/>
+              <a:t>אחר כולל: שילוב של התשובות; ייצוג כמה תובעים; תביעה של אדם בשם ציבור</a:t>
+            </a:r>
+            <a:endParaRPr lang="en-IL" sz="1200" dirty="0"/>
+          </a:p>
+        </p:txBody>
+      </p:sp>
       <p:pic>
         <p:nvPicPr>
-          <p:cNvPr id="21" name="Picture 20">
-            <a:extLst>
-              <a:ext uri="{FF2B5EF4-FFF2-40B4-BE49-F238E27FC236}">
-                <a16:creationId xmlns:a16="http://schemas.microsoft.com/office/drawing/2014/main" id="{A08C8CB2-C2BE-4730-AE73-82F8A6445C2E}"/>
+          <p:cNvPr id="3" name="Picture 2">
+            <a:extLst>
+              <a:ext uri="{FF2B5EF4-FFF2-40B4-BE49-F238E27FC236}">
+                <a16:creationId xmlns:a16="http://schemas.microsoft.com/office/drawing/2014/main" id="{9C955739-11A2-4DEA-A2DA-B7F76CA9514D}"/>
               </a:ext>
             </a:extLst>
           </p:cNvPr>
@@ -7858,7 +8086,7 @@
         </p:blipFill>
         <p:spPr>
           <a:xfrm>
-            <a:off x="1487488" y="2637617"/>
+            <a:off x="1597143" y="2687637"/>
             <a:ext cx="8997714" cy="3599695"/>
           </a:xfrm>
           <a:prstGeom prst="rect">
@@ -7866,75 +8094,6 @@
           </a:prstGeom>
         </p:spPr>
       </p:pic>
-      <p:sp>
-        <p:nvSpPr>
-          <p:cNvPr id="22" name="Slide Number Placeholder 21">
-            <a:extLst>
-              <a:ext uri="{FF2B5EF4-FFF2-40B4-BE49-F238E27FC236}">
-                <a16:creationId xmlns:a16="http://schemas.microsoft.com/office/drawing/2014/main" id="{A0C3322C-E483-4FA5-BD2D-DAFEBEA7DA75}"/>
-              </a:ext>
-            </a:extLst>
-          </p:cNvPr>
-          <p:cNvSpPr>
-            <a:spLocks noGrp="1"/>
-          </p:cNvSpPr>
-          <p:nvPr>
-            <p:ph type="sldNum" sz="quarter" idx="12"/>
-          </p:nvPr>
-        </p:nvSpPr>
-        <p:spPr/>
-        <p:txBody>
-          <a:bodyPr/>
-          <a:lstStyle/>
-          <a:p>
-            <a:fld id="{48C2FE54-953E-4268-8452-225DF8E36AC9}" type="slidenum">
-              <a:rPr lang="he-IL" smtClean="0"/>
-              <a:t>4</a:t>
-            </a:fld>
-            <a:endParaRPr lang="he-IL"/>
-          </a:p>
-        </p:txBody>
-      </p:sp>
-      <p:sp>
-        <p:nvSpPr>
-          <p:cNvPr id="23" name="TextBox 22">
-            <a:extLst>
-              <a:ext uri="{FF2B5EF4-FFF2-40B4-BE49-F238E27FC236}">
-                <a16:creationId xmlns:a16="http://schemas.microsoft.com/office/drawing/2014/main" id="{83E3701E-F716-4F62-B52B-D938981AB876}"/>
-              </a:ext>
-            </a:extLst>
-          </p:cNvPr>
-          <p:cNvSpPr txBox="1"/>
-          <p:nvPr/>
-        </p:nvSpPr>
-        <p:spPr>
-          <a:xfrm>
-            <a:off x="2639616" y="6392361"/>
-            <a:ext cx="4892685" cy="276999"/>
-          </a:xfrm>
-          <a:prstGeom prst="rect">
-            <a:avLst/>
-          </a:prstGeom>
-          <a:noFill/>
-        </p:spPr>
-        <p:txBody>
-          <a:bodyPr wrap="none" rtlCol="0">
-            <a:spAutoFit/>
-          </a:bodyPr>
-          <a:lstStyle/>
-          <a:p>
-            <a:r>
-              <a:rPr lang="en-US" sz="1200" dirty="0"/>
-              <a:t>* </a:t>
-            </a:r>
-            <a:r>
-              <a:rPr lang="he-IL" sz="1200" dirty="0"/>
-              <a:t>אחר כולל: שילוב של התשובות; ייצוג כמה תובעים; תביעה של אדם בשם ציבור</a:t>
-            </a:r>
-            <a:endParaRPr lang="en-IL" sz="1200" dirty="0"/>
-          </a:p>
-        </p:txBody>
-      </p:sp>
     </p:spTree>
     <p:extLst>
       <p:ext uri="{BB962C8B-B14F-4D97-AF65-F5344CB8AC3E}">
@@ -7965,53 +8124,19 @@
           <a:chExt cx="0" cy="0"/>
         </a:xfrm>
       </p:grpSpPr>
-      <p:sp>
-        <p:nvSpPr>
-          <p:cNvPr id="2" name="Title 1">
-            <a:extLst>
-              <a:ext uri="{FF2B5EF4-FFF2-40B4-BE49-F238E27FC236}">
-                <a16:creationId xmlns:a16="http://schemas.microsoft.com/office/drawing/2014/main" id="{2609094E-9AF4-4201-AA85-247329965CA6}"/>
-              </a:ext>
-            </a:extLst>
-          </p:cNvPr>
-          <p:cNvSpPr>
-            <a:spLocks noGrp="1"/>
-          </p:cNvSpPr>
-          <p:nvPr>
-            <p:ph type="title"/>
-          </p:nvPr>
-        </p:nvSpPr>
-        <p:spPr/>
-        <p:txBody>
-          <a:bodyPr>
-            <a:noAutofit/>
-          </a:bodyPr>
-          <a:lstStyle/>
-          <a:p>
-            <a:pPr rtl="0"/>
-            <a:r>
-              <a:rPr lang="he-IL" sz="2800" dirty="0"/>
-              <a:t>האם ב-5 השנים האחרונות קיבלת הטבה כלשהי או פיצוי בגין תובענה ייצוגית?</a:t>
-            </a:r>
-            <a:endParaRPr lang="en-IL" sz="2800" dirty="0"/>
-          </a:p>
-        </p:txBody>
-      </p:sp>
       <p:pic>
         <p:nvPicPr>
-          <p:cNvPr id="5" name="Content Placeholder 4">
-            <a:extLst>
-              <a:ext uri="{FF2B5EF4-FFF2-40B4-BE49-F238E27FC236}">
-                <a16:creationId xmlns:a16="http://schemas.microsoft.com/office/drawing/2014/main" id="{2FD69A99-DBF5-4FC1-93B3-BCE110DDCB8D}"/>
+          <p:cNvPr id="14" name="Picture 13">
+            <a:extLst>
+              <a:ext uri="{FF2B5EF4-FFF2-40B4-BE49-F238E27FC236}">
+                <a16:creationId xmlns:a16="http://schemas.microsoft.com/office/drawing/2014/main" id="{B43DC1A8-5F9C-4BEE-BAC8-67D9E3EEE582}"/>
               </a:ext>
             </a:extLst>
           </p:cNvPr>
           <p:cNvPicPr>
-            <a:picLocks noGrp="1" noChangeAspect="1"/>
+            <a:picLocks noChangeAspect="1"/>
           </p:cNvPicPr>
-          <p:nvPr>
-            <p:ph idx="1"/>
-          </p:nvPr>
+          <p:nvPr/>
         </p:nvPicPr>
         <p:blipFill>
           <a:blip r:embed="rId2" cstate="print">
@@ -8037,11 +8162,46 @@
         </p:blipFill>
         <p:spPr>
           <a:xfrm>
-            <a:off x="7117727" y="1484784"/>
-            <a:ext cx="4896545" cy="2448272"/>
+            <a:off x="6934929" y="1437011"/>
+            <a:ext cx="5136107" cy="2568053"/>
           </a:xfrm>
+          <a:prstGeom prst="rect">
+            <a:avLst/>
+          </a:prstGeom>
         </p:spPr>
       </p:pic>
+      <p:sp>
+        <p:nvSpPr>
+          <p:cNvPr id="2" name="Title 1">
+            <a:extLst>
+              <a:ext uri="{FF2B5EF4-FFF2-40B4-BE49-F238E27FC236}">
+                <a16:creationId xmlns:a16="http://schemas.microsoft.com/office/drawing/2014/main" id="{2609094E-9AF4-4201-AA85-247329965CA6}"/>
+              </a:ext>
+            </a:extLst>
+          </p:cNvPr>
+          <p:cNvSpPr>
+            <a:spLocks noGrp="1"/>
+          </p:cNvSpPr>
+          <p:nvPr>
+            <p:ph type="title"/>
+          </p:nvPr>
+        </p:nvSpPr>
+        <p:spPr/>
+        <p:txBody>
+          <a:bodyPr>
+            <a:noAutofit/>
+          </a:bodyPr>
+          <a:lstStyle/>
+          <a:p>
+            <a:pPr rtl="0"/>
+            <a:r>
+              <a:rPr lang="he-IL" sz="2800" dirty="0"/>
+              <a:t>האם ב-5 השנים האחרונות קיבלת הטבה כלשהי או פיצוי בגין תובענה ייצוגית?</a:t>
+            </a:r>
+            <a:endParaRPr lang="en-IL" sz="2800" dirty="0"/>
+          </a:p>
+        </p:txBody>
+      </p:sp>
       <p:pic>
         <p:nvPicPr>
           <p:cNvPr id="8" name="Picture 7">
@@ -8112,52 +8272,6 @@
           </a:p>
         </p:txBody>
       </p:sp>
-      <p:pic>
-        <p:nvPicPr>
-          <p:cNvPr id="7" name="Picture 6">
-            <a:extLst>
-              <a:ext uri="{FF2B5EF4-FFF2-40B4-BE49-F238E27FC236}">
-                <a16:creationId xmlns:a16="http://schemas.microsoft.com/office/drawing/2014/main" id="{40CD9A5C-695C-4330-AD25-208E0542715A}"/>
-              </a:ext>
-            </a:extLst>
-          </p:cNvPr>
-          <p:cNvPicPr>
-            <a:picLocks noChangeAspect="1"/>
-          </p:cNvPicPr>
-          <p:nvPr/>
-        </p:nvPicPr>
-        <p:blipFill>
-          <a:blip r:embed="rId4" cstate="print">
-            <a:clrChange>
-              <a:clrFrom>
-                <a:srgbClr val="FFFFFF"/>
-              </a:clrFrom>
-              <a:clrTo>
-                <a:srgbClr val="FFFFFF">
-                  <a:alpha val="0"/>
-                </a:srgbClr>
-              </a:clrTo>
-            </a:clrChange>
-            <a:extLst>
-              <a:ext uri="{28A0092B-C50C-407E-A947-70E740481C1C}">
-                <a14:useLocalDpi xmlns:a14="http://schemas.microsoft.com/office/drawing/2010/main" val="0"/>
-              </a:ext>
-            </a:extLst>
-          </a:blip>
-          <a:stretch>
-            <a:fillRect/>
-          </a:stretch>
-        </p:blipFill>
-        <p:spPr>
-          <a:xfrm>
-            <a:off x="170598" y="3524890"/>
-            <a:ext cx="6659097" cy="2664090"/>
-          </a:xfrm>
-          <a:prstGeom prst="rect">
-            <a:avLst/>
-          </a:prstGeom>
-        </p:spPr>
-      </p:pic>
       <p:sp>
         <p:nvSpPr>
           <p:cNvPr id="11" name="Rectangle 10">
@@ -8210,6 +8324,52 @@
           </a:p>
         </p:txBody>
       </p:sp>
+      <p:pic>
+        <p:nvPicPr>
+          <p:cNvPr id="9" name="Picture 8">
+            <a:extLst>
+              <a:ext uri="{FF2B5EF4-FFF2-40B4-BE49-F238E27FC236}">
+                <a16:creationId xmlns:a16="http://schemas.microsoft.com/office/drawing/2014/main" id="{BB243D7A-58B6-44FE-B3A3-8EC63A4E1C6C}"/>
+              </a:ext>
+            </a:extLst>
+          </p:cNvPr>
+          <p:cNvPicPr>
+            <a:picLocks noChangeAspect="1"/>
+          </p:cNvPicPr>
+          <p:nvPr/>
+        </p:nvPicPr>
+        <p:blipFill>
+          <a:blip r:embed="rId4" cstate="print">
+            <a:clrChange>
+              <a:clrFrom>
+                <a:srgbClr val="FFFFFF"/>
+              </a:clrFrom>
+              <a:clrTo>
+                <a:srgbClr val="FFFFFF">
+                  <a:alpha val="0"/>
+                </a:srgbClr>
+              </a:clrTo>
+            </a:clrChange>
+            <a:extLst>
+              <a:ext uri="{28A0092B-C50C-407E-A947-70E740481C1C}">
+                <a14:useLocalDpi xmlns:a14="http://schemas.microsoft.com/office/drawing/2010/main" val="0"/>
+              </a:ext>
+            </a:extLst>
+          </a:blip>
+          <a:stretch>
+            <a:fillRect/>
+          </a:stretch>
+        </p:blipFill>
+        <p:spPr>
+          <a:xfrm>
+            <a:off x="311622" y="3789039"/>
+            <a:ext cx="6265491" cy="2506621"/>
+          </a:xfrm>
+          <a:prstGeom prst="rect">
+            <a:avLst/>
+          </a:prstGeom>
+        </p:spPr>
+      </p:pic>
       <p:cxnSp>
         <p:nvCxnSpPr>
           <p:cNvPr id="13" name="Connector: Elbow 12">
@@ -8220,7 +8380,7 @@
             </a:extLst>
           </p:cNvPr>
           <p:cNvCxnSpPr>
-            <a:endCxn id="7" idx="3"/>
+            <a:cxnSpLocks/>
           </p:cNvCxnSpPr>
           <p:nvPr/>
         </p:nvCxnSpPr>
@@ -8426,51 +8586,6 @@
           </a:p>
         </p:txBody>
       </p:sp>
-      <p:pic>
-        <p:nvPicPr>
-          <p:cNvPr id="28" name="Content Placeholder 27">
-            <a:extLst>
-              <a:ext uri="{FF2B5EF4-FFF2-40B4-BE49-F238E27FC236}">
-                <a16:creationId xmlns:a16="http://schemas.microsoft.com/office/drawing/2014/main" id="{57FFDA3E-E137-4474-9355-005C2554EECD}"/>
-              </a:ext>
-            </a:extLst>
-          </p:cNvPr>
-          <p:cNvPicPr>
-            <a:picLocks noGrp="1" noChangeAspect="1"/>
-          </p:cNvPicPr>
-          <p:nvPr>
-            <p:ph idx="1"/>
-          </p:nvPr>
-        </p:nvPicPr>
-        <p:blipFill>
-          <a:blip r:embed="rId4" cstate="print">
-            <a:clrChange>
-              <a:clrFrom>
-                <a:srgbClr val="FFFFFF"/>
-              </a:clrFrom>
-              <a:clrTo>
-                <a:srgbClr val="FFFFFF">
-                  <a:alpha val="0"/>
-                </a:srgbClr>
-              </a:clrTo>
-            </a:clrChange>
-            <a:extLst>
-              <a:ext uri="{28A0092B-C50C-407E-A947-70E740481C1C}">
-                <a14:useLocalDpi xmlns:a14="http://schemas.microsoft.com/office/drawing/2010/main" val="0"/>
-              </a:ext>
-            </a:extLst>
-          </a:blip>
-          <a:stretch>
-            <a:fillRect/>
-          </a:stretch>
-        </p:blipFill>
-        <p:spPr>
-          <a:xfrm>
-            <a:off x="2868657" y="1902996"/>
-            <a:ext cx="8997714" cy="3599695"/>
-          </a:xfrm>
-        </p:spPr>
-      </p:pic>
       <p:grpSp>
         <p:nvGrpSpPr>
           <p:cNvPr id="36" name="Group 35">
@@ -8701,6 +8816,51 @@
           </p:txBody>
         </p:sp>
       </p:grpSp>
+      <p:pic>
+        <p:nvPicPr>
+          <p:cNvPr id="6" name="Content Placeholder 5">
+            <a:extLst>
+              <a:ext uri="{FF2B5EF4-FFF2-40B4-BE49-F238E27FC236}">
+                <a16:creationId xmlns:a16="http://schemas.microsoft.com/office/drawing/2014/main" id="{DE68F522-B02D-4706-B568-6418E9EAFF7D}"/>
+              </a:ext>
+            </a:extLst>
+          </p:cNvPr>
+          <p:cNvPicPr>
+            <a:picLocks noGrp="1" noChangeAspect="1"/>
+          </p:cNvPicPr>
+          <p:nvPr>
+            <p:ph idx="1"/>
+          </p:nvPr>
+        </p:nvPicPr>
+        <p:blipFill>
+          <a:blip r:embed="rId4" cstate="print">
+            <a:clrChange>
+              <a:clrFrom>
+                <a:srgbClr val="FFFFFF"/>
+              </a:clrFrom>
+              <a:clrTo>
+                <a:srgbClr val="FFFFFF">
+                  <a:alpha val="0"/>
+                </a:srgbClr>
+              </a:clrTo>
+            </a:clrChange>
+            <a:extLst>
+              <a:ext uri="{28A0092B-C50C-407E-A947-70E740481C1C}">
+                <a14:useLocalDpi xmlns:a14="http://schemas.microsoft.com/office/drawing/2010/main" val="0"/>
+              </a:ext>
+            </a:extLst>
+          </a:blip>
+          <a:stretch>
+            <a:fillRect/>
+          </a:stretch>
+        </p:blipFill>
+        <p:spPr>
+          <a:xfrm>
+            <a:off x="2635664" y="1961047"/>
+            <a:ext cx="8997714" cy="3599695"/>
+          </a:xfrm>
+        </p:spPr>
+      </p:pic>
     </p:spTree>
     <p:extLst>
       <p:ext uri="{BB962C8B-B14F-4D97-AF65-F5344CB8AC3E}">
@@ -8941,52 +9101,6 @@
           </a:p>
         </p:txBody>
       </p:sp>
-      <p:pic>
-        <p:nvPicPr>
-          <p:cNvPr id="6" name="Picture 5">
-            <a:extLst>
-              <a:ext uri="{FF2B5EF4-FFF2-40B4-BE49-F238E27FC236}">
-                <a16:creationId xmlns:a16="http://schemas.microsoft.com/office/drawing/2014/main" id="{9E3AA7A1-67AB-4E25-86ED-8C444253EFEF}"/>
-              </a:ext>
-            </a:extLst>
-          </p:cNvPr>
-          <p:cNvPicPr>
-            <a:picLocks noChangeAspect="1"/>
-          </p:cNvPicPr>
-          <p:nvPr/>
-        </p:nvPicPr>
-        <p:blipFill>
-          <a:blip r:embed="rId3" cstate="print">
-            <a:clrChange>
-              <a:clrFrom>
-                <a:srgbClr val="FFFFFF"/>
-              </a:clrFrom>
-              <a:clrTo>
-                <a:srgbClr val="FFFFFF">
-                  <a:alpha val="0"/>
-                </a:srgbClr>
-              </a:clrTo>
-            </a:clrChange>
-            <a:extLst>
-              <a:ext uri="{28A0092B-C50C-407E-A947-70E740481C1C}">
-                <a14:useLocalDpi xmlns:a14="http://schemas.microsoft.com/office/drawing/2010/main" val="0"/>
-              </a:ext>
-            </a:extLst>
-          </a:blip>
-          <a:stretch>
-            <a:fillRect/>
-          </a:stretch>
-        </p:blipFill>
-        <p:spPr>
-          <a:xfrm>
-            <a:off x="2999656" y="2258972"/>
-            <a:ext cx="8997714" cy="3599695"/>
-          </a:xfrm>
-          <a:prstGeom prst="rect">
-            <a:avLst/>
-          </a:prstGeom>
-        </p:spPr>
-      </p:pic>
       <p:sp>
         <p:nvSpPr>
           <p:cNvPr id="7" name="Rectangle: Rounded Corners 6">
@@ -9053,6 +9167,52 @@
           </a:p>
         </p:txBody>
       </p:sp>
+      <p:pic>
+        <p:nvPicPr>
+          <p:cNvPr id="5" name="Picture 4">
+            <a:extLst>
+              <a:ext uri="{FF2B5EF4-FFF2-40B4-BE49-F238E27FC236}">
+                <a16:creationId xmlns:a16="http://schemas.microsoft.com/office/drawing/2014/main" id="{47FF2E50-D486-4745-962B-A7DBC570D325}"/>
+              </a:ext>
+            </a:extLst>
+          </p:cNvPr>
+          <p:cNvPicPr>
+            <a:picLocks noChangeAspect="1"/>
+          </p:cNvPicPr>
+          <p:nvPr/>
+        </p:nvPicPr>
+        <p:blipFill>
+          <a:blip r:embed="rId3" cstate="print">
+            <a:clrChange>
+              <a:clrFrom>
+                <a:srgbClr val="FFFFFF"/>
+              </a:clrFrom>
+              <a:clrTo>
+                <a:srgbClr val="FFFFFF">
+                  <a:alpha val="0"/>
+                </a:srgbClr>
+              </a:clrTo>
+            </a:clrChange>
+            <a:extLst>
+              <a:ext uri="{28A0092B-C50C-407E-A947-70E740481C1C}">
+                <a14:useLocalDpi xmlns:a14="http://schemas.microsoft.com/office/drawing/2010/main" val="0"/>
+              </a:ext>
+            </a:extLst>
+          </a:blip>
+          <a:stretch>
+            <a:fillRect/>
+          </a:stretch>
+        </p:blipFill>
+        <p:spPr>
+          <a:xfrm>
+            <a:off x="2782726" y="2379616"/>
+            <a:ext cx="8997714" cy="3599695"/>
+          </a:xfrm>
+          <a:prstGeom prst="rect">
+            <a:avLst/>
+          </a:prstGeom>
+        </p:spPr>
+      </p:pic>
     </p:spTree>
     <p:extLst>
       <p:ext uri="{BB962C8B-B14F-4D97-AF65-F5344CB8AC3E}">
@@ -9152,8 +9312,8 @@
         </p:blipFill>
         <p:spPr>
           <a:xfrm>
-            <a:off x="4341575" y="1902996"/>
-            <a:ext cx="7199391" cy="3599695"/>
+            <a:off x="6645831" y="1562374"/>
+            <a:ext cx="5300950" cy="2650475"/>
           </a:xfrm>
         </p:spPr>
       </p:pic>
@@ -9227,56 +9387,52 @@
           </a:prstGeom>
         </p:spPr>
       </p:pic>
-      <p:sp>
-        <p:nvSpPr>
-          <p:cNvPr id="3" name="Rectangle 2">
-            <a:extLst>
-              <a:ext uri="{FF2B5EF4-FFF2-40B4-BE49-F238E27FC236}">
-                <a16:creationId xmlns:a16="http://schemas.microsoft.com/office/drawing/2014/main" id="{DF15A6A8-4711-4F2A-84C6-2A021AF4B3CE}"/>
-              </a:ext>
-            </a:extLst>
-          </p:cNvPr>
-          <p:cNvSpPr/>
+      <p:pic>
+        <p:nvPicPr>
+          <p:cNvPr id="8" name="Picture 7">
+            <a:extLst>
+              <a:ext uri="{FF2B5EF4-FFF2-40B4-BE49-F238E27FC236}">
+                <a16:creationId xmlns:a16="http://schemas.microsoft.com/office/drawing/2014/main" id="{7A2FDFA1-EFEE-4BB8-99A6-3FFEE086E6F4}"/>
+              </a:ext>
+            </a:extLst>
+          </p:cNvPr>
+          <p:cNvPicPr>
+            <a:picLocks noChangeAspect="1"/>
+          </p:cNvPicPr>
           <p:nvPr/>
-        </p:nvSpPr>
+        </p:nvPicPr>
+        <p:blipFill>
+          <a:blip r:embed="rId4" cstate="print">
+            <a:clrChange>
+              <a:clrFrom>
+                <a:srgbClr val="FFFFFF"/>
+              </a:clrFrom>
+              <a:clrTo>
+                <a:srgbClr val="FFFFFF">
+                  <a:alpha val="0"/>
+                </a:srgbClr>
+              </a:clrTo>
+            </a:clrChange>
+            <a:extLst>
+              <a:ext uri="{28A0092B-C50C-407E-A947-70E740481C1C}">
+                <a14:useLocalDpi xmlns:a14="http://schemas.microsoft.com/office/drawing/2010/main" val="0"/>
+              </a:ext>
+            </a:extLst>
+          </a:blip>
+          <a:stretch>
+            <a:fillRect/>
+          </a:stretch>
+        </p:blipFill>
         <p:spPr>
           <a:xfrm>
-            <a:off x="479376" y="2996952"/>
-            <a:ext cx="3600400" cy="1641643"/>
+            <a:off x="218182" y="3717032"/>
+            <a:ext cx="5300950" cy="2650475"/>
           </a:xfrm>
           <a:prstGeom prst="rect">
             <a:avLst/>
           </a:prstGeom>
         </p:spPr>
-        <p:style>
-          <a:lnRef idx="2">
-            <a:schemeClr val="accent2">
-              <a:shade val="50000"/>
-            </a:schemeClr>
-          </a:lnRef>
-          <a:fillRef idx="1">
-            <a:schemeClr val="accent2"/>
-          </a:fillRef>
-          <a:effectRef idx="0">
-            <a:schemeClr val="accent2"/>
-          </a:effectRef>
-          <a:fontRef idx="minor">
-            <a:schemeClr val="lt1"/>
-          </a:fontRef>
-        </p:style>
-        <p:txBody>
-          <a:bodyPr rtlCol="0" anchor="ctr"/>
-          <a:lstStyle/>
-          <a:p>
-            <a:pPr algn="ctr"/>
-            <a:r>
-              <a:rPr lang="he-IL" dirty="0"/>
-              <a:t>להוסיף את הכן/לא/לא יודע של האם זה ימנע ממך...</a:t>
-            </a:r>
-            <a:endParaRPr lang="en-IL" dirty="0"/>
-          </a:p>
-        </p:txBody>
-      </p:sp>
+      </p:pic>
     </p:spTree>
     <p:extLst>
       <p:ext uri="{BB962C8B-B14F-4D97-AF65-F5344CB8AC3E}">

</xml_diff>

<commit_message>
Fine tunning presentation and charts (updated charts and summary)
</commit_message>
<xml_diff>
--- a/presentation/2019-02-03 - Presentation for the 9th class action conference.pptx
+++ b/presentation/2019-02-03 - Presentation for the 9th class action conference.pptx
@@ -5,32 +5,34 @@
     <p:sldMasterId id="2147483648" r:id="rId1"/>
   </p:sldMasterIdLst>
   <p:notesMasterIdLst>
-    <p:notesMasterId r:id="rId25"/>
+    <p:notesMasterId r:id="rId27"/>
   </p:notesMasterIdLst>
   <p:sldIdLst>
     <p:sldId id="256" r:id="rId2"/>
     <p:sldId id="257" r:id="rId3"/>
     <p:sldId id="258" r:id="rId4"/>
     <p:sldId id="259" r:id="rId5"/>
-    <p:sldId id="262" r:id="rId6"/>
-    <p:sldId id="260" r:id="rId7"/>
-    <p:sldId id="263" r:id="rId8"/>
-    <p:sldId id="266" r:id="rId9"/>
-    <p:sldId id="264" r:id="rId10"/>
-    <p:sldId id="261" r:id="rId11"/>
-    <p:sldId id="280" r:id="rId12"/>
-    <p:sldId id="267" r:id="rId13"/>
-    <p:sldId id="269" r:id="rId14"/>
-    <p:sldId id="270" r:id="rId15"/>
-    <p:sldId id="271" r:id="rId16"/>
-    <p:sldId id="272" r:id="rId17"/>
-    <p:sldId id="273" r:id="rId18"/>
-    <p:sldId id="274" r:id="rId19"/>
-    <p:sldId id="276" r:id="rId20"/>
-    <p:sldId id="281" r:id="rId21"/>
-    <p:sldId id="279" r:id="rId22"/>
-    <p:sldId id="284" r:id="rId23"/>
-    <p:sldId id="282" r:id="rId24"/>
+    <p:sldId id="285" r:id="rId6"/>
+    <p:sldId id="262" r:id="rId7"/>
+    <p:sldId id="260" r:id="rId8"/>
+    <p:sldId id="263" r:id="rId9"/>
+    <p:sldId id="266" r:id="rId10"/>
+    <p:sldId id="286" r:id="rId11"/>
+    <p:sldId id="264" r:id="rId12"/>
+    <p:sldId id="261" r:id="rId13"/>
+    <p:sldId id="280" r:id="rId14"/>
+    <p:sldId id="267" r:id="rId15"/>
+    <p:sldId id="269" r:id="rId16"/>
+    <p:sldId id="270" r:id="rId17"/>
+    <p:sldId id="271" r:id="rId18"/>
+    <p:sldId id="272" r:id="rId19"/>
+    <p:sldId id="273" r:id="rId20"/>
+    <p:sldId id="274" r:id="rId21"/>
+    <p:sldId id="276" r:id="rId22"/>
+    <p:sldId id="281" r:id="rId23"/>
+    <p:sldId id="279" r:id="rId24"/>
+    <p:sldId id="284" r:id="rId25"/>
+    <p:sldId id="282" r:id="rId26"/>
   </p:sldIdLst>
   <p:sldSz cx="12192000" cy="6858000"/>
   <p:notesSz cx="6858000" cy="9144000"/>
@@ -2696,7 +2698,7 @@
 </file>
 
 <file path=ppt/slides/slide10.xml><?xml version="1.0" encoding="utf-8"?>
-<p:sld xmlns:a="http://schemas.openxmlformats.org/drawingml/2006/main" xmlns:r="http://schemas.openxmlformats.org/officeDocument/2006/relationships" xmlns:p="http://schemas.openxmlformats.org/presentationml/2006/main" show="0">
+<p:sld xmlns:a="http://schemas.openxmlformats.org/drawingml/2006/main" xmlns:r="http://schemas.openxmlformats.org/officeDocument/2006/relationships" xmlns:p="http://schemas.openxmlformats.org/presentationml/2006/main">
   <p:cSld>
     <p:spTree>
       <p:nvGrpSpPr>
@@ -2717,7 +2719,7 @@
           <p:cNvPr id="2" name="Title 1">
             <a:extLst>
               <a:ext uri="{FF2B5EF4-FFF2-40B4-BE49-F238E27FC236}">
-                <a16:creationId xmlns:a16="http://schemas.microsoft.com/office/drawing/2014/main" id="{2609094E-9AF4-4201-AA85-247329965CA6}"/>
+                <a16:creationId xmlns:a16="http://schemas.microsoft.com/office/drawing/2014/main" id="{E4B864D7-1630-4EFF-B791-001F641BC476}"/>
               </a:ext>
             </a:extLst>
           </p:cNvPr>
@@ -2735,12 +2737,633 @@
           <a:p>
             <a:r>
               <a:rPr lang="he-IL" dirty="0"/>
-              <a:t>ועכשיו שאלה... איזה פיצוי מעדיף (התובע)?</a:t>
+              <a:t>תקנות אגרת הגשה</a:t>
             </a:r>
             <a:endParaRPr lang="en-IL" dirty="0"/>
           </a:p>
         </p:txBody>
       </p:sp>
+      <p:pic>
+        <p:nvPicPr>
+          <p:cNvPr id="6" name="Content Placeholder 5">
+            <a:extLst>
+              <a:ext uri="{FF2B5EF4-FFF2-40B4-BE49-F238E27FC236}">
+                <a16:creationId xmlns:a16="http://schemas.microsoft.com/office/drawing/2014/main" id="{20E0EED0-F2F4-4479-8F82-0FE945772955}"/>
+              </a:ext>
+            </a:extLst>
+          </p:cNvPr>
+          <p:cNvPicPr>
+            <a:picLocks noGrp="1" noChangeAspect="1"/>
+          </p:cNvPicPr>
+          <p:nvPr>
+            <p:ph idx="1"/>
+          </p:nvPr>
+        </p:nvPicPr>
+        <p:blipFill>
+          <a:blip r:embed="rId2" cstate="print">
+            <a:clrChange>
+              <a:clrFrom>
+                <a:srgbClr val="FFFFFF"/>
+              </a:clrFrom>
+              <a:clrTo>
+                <a:srgbClr val="FFFFFF">
+                  <a:alpha val="0"/>
+                </a:srgbClr>
+              </a:clrTo>
+            </a:clrChange>
+            <a:extLst>
+              <a:ext uri="{28A0092B-C50C-407E-A947-70E740481C1C}">
+                <a14:useLocalDpi xmlns:a14="http://schemas.microsoft.com/office/drawing/2010/main" val="0"/>
+              </a:ext>
+            </a:extLst>
+          </a:blip>
+          <a:stretch>
+            <a:fillRect/>
+          </a:stretch>
+        </p:blipFill>
+        <p:spPr>
+          <a:xfrm>
+            <a:off x="9221641" y="1562375"/>
+            <a:ext cx="2725140" cy="1362570"/>
+          </a:xfrm>
+        </p:spPr>
+      </p:pic>
+      <p:sp>
+        <p:nvSpPr>
+          <p:cNvPr id="4" name="Slide Number Placeholder 3">
+            <a:extLst>
+              <a:ext uri="{FF2B5EF4-FFF2-40B4-BE49-F238E27FC236}">
+                <a16:creationId xmlns:a16="http://schemas.microsoft.com/office/drawing/2014/main" id="{9B20F513-0B7C-4A18-9405-A85E3C35F9F3}"/>
+              </a:ext>
+            </a:extLst>
+          </p:cNvPr>
+          <p:cNvSpPr>
+            <a:spLocks noGrp="1"/>
+          </p:cNvSpPr>
+          <p:nvPr>
+            <p:ph type="sldNum" sz="quarter" idx="12"/>
+          </p:nvPr>
+        </p:nvSpPr>
+        <p:spPr/>
+        <p:txBody>
+          <a:bodyPr/>
+          <a:lstStyle/>
+          <a:p>
+            <a:fld id="{48C2FE54-953E-4268-8452-225DF8E36AC9}" type="slidenum">
+              <a:rPr lang="he-IL" smtClean="0"/>
+              <a:t>10</a:t>
+            </a:fld>
+            <a:endParaRPr lang="he-IL"/>
+          </a:p>
+        </p:txBody>
+      </p:sp>
+      <p:pic>
+        <p:nvPicPr>
+          <p:cNvPr id="7" name="Picture 6">
+            <a:extLst>
+              <a:ext uri="{FF2B5EF4-FFF2-40B4-BE49-F238E27FC236}">
+                <a16:creationId xmlns:a16="http://schemas.microsoft.com/office/drawing/2014/main" id="{190D1D7F-22CC-403E-9C80-3D12C9235F51}"/>
+              </a:ext>
+            </a:extLst>
+          </p:cNvPr>
+          <p:cNvPicPr>
+            <a:picLocks noChangeAspect="1"/>
+          </p:cNvPicPr>
+          <p:nvPr/>
+        </p:nvPicPr>
+        <p:blipFill>
+          <a:blip r:embed="rId3">
+            <a:clrChange>
+              <a:clrFrom>
+                <a:srgbClr val="FFFFFF"/>
+              </a:clrFrom>
+              <a:clrTo>
+                <a:srgbClr val="FFFFFF">
+                  <a:alpha val="0"/>
+                </a:srgbClr>
+              </a:clrTo>
+            </a:clrChange>
+          </a:blip>
+          <a:stretch>
+            <a:fillRect/>
+          </a:stretch>
+        </p:blipFill>
+        <p:spPr>
+          <a:xfrm>
+            <a:off x="7941271" y="6101166"/>
+            <a:ext cx="946613" cy="631390"/>
+          </a:xfrm>
+          <a:prstGeom prst="rect">
+            <a:avLst/>
+          </a:prstGeom>
+        </p:spPr>
+      </p:pic>
+      <p:cxnSp>
+        <p:nvCxnSpPr>
+          <p:cNvPr id="9" name="Connector: Elbow 8">
+            <a:extLst>
+              <a:ext uri="{FF2B5EF4-FFF2-40B4-BE49-F238E27FC236}">
+                <a16:creationId xmlns:a16="http://schemas.microsoft.com/office/drawing/2014/main" id="{EBE2661B-BEA2-4C59-89E4-A86C1BBE4359}"/>
+              </a:ext>
+            </a:extLst>
+          </p:cNvPr>
+          <p:cNvCxnSpPr>
+            <a:cxnSpLocks/>
+            <a:stCxn id="6" idx="2"/>
+          </p:cNvCxnSpPr>
+          <p:nvPr/>
+        </p:nvCxnSpPr>
+        <p:spPr>
+          <a:xfrm rot="5400000">
+            <a:off x="9063742" y="2693508"/>
+            <a:ext cx="1289032" cy="1751907"/>
+          </a:xfrm>
+          <a:prstGeom prst="bentConnector2">
+            <a:avLst/>
+          </a:prstGeom>
+          <a:ln>
+            <a:tailEnd type="triangle"/>
+          </a:ln>
+        </p:spPr>
+        <p:style>
+          <a:lnRef idx="2">
+            <a:schemeClr val="dk1"/>
+          </a:lnRef>
+          <a:fillRef idx="0">
+            <a:schemeClr val="dk1"/>
+          </a:fillRef>
+          <a:effectRef idx="1">
+            <a:schemeClr val="dk1"/>
+          </a:effectRef>
+          <a:fontRef idx="minor">
+            <a:schemeClr val="tx1"/>
+          </a:fontRef>
+        </p:style>
+      </p:cxnSp>
+      <p:pic>
+        <p:nvPicPr>
+          <p:cNvPr id="11" name="Picture 10">
+            <a:extLst>
+              <a:ext uri="{FF2B5EF4-FFF2-40B4-BE49-F238E27FC236}">
+                <a16:creationId xmlns:a16="http://schemas.microsoft.com/office/drawing/2014/main" id="{C13E4E7F-6ED8-4FED-BE71-7798C938A3A8}"/>
+              </a:ext>
+            </a:extLst>
+          </p:cNvPr>
+          <p:cNvPicPr>
+            <a:picLocks noChangeAspect="1"/>
+          </p:cNvPicPr>
+          <p:nvPr/>
+        </p:nvPicPr>
+        <p:blipFill>
+          <a:blip r:embed="rId4" cstate="print">
+            <a:clrChange>
+              <a:clrFrom>
+                <a:srgbClr val="FFFFFF"/>
+              </a:clrFrom>
+              <a:clrTo>
+                <a:srgbClr val="FFFFFF">
+                  <a:alpha val="0"/>
+                </a:srgbClr>
+              </a:clrTo>
+            </a:clrChange>
+            <a:extLst>
+              <a:ext uri="{28A0092B-C50C-407E-A947-70E740481C1C}">
+                <a14:useLocalDpi xmlns:a14="http://schemas.microsoft.com/office/drawing/2010/main" val="0"/>
+              </a:ext>
+            </a:extLst>
+          </a:blip>
+          <a:stretch>
+            <a:fillRect/>
+          </a:stretch>
+        </p:blipFill>
+        <p:spPr>
+          <a:xfrm>
+            <a:off x="1215186" y="2414130"/>
+            <a:ext cx="7199391" cy="3599695"/>
+          </a:xfrm>
+          <a:prstGeom prst="rect">
+            <a:avLst/>
+          </a:prstGeom>
+        </p:spPr>
+      </p:pic>
+    </p:spTree>
+    <p:extLst>
+      <p:ext uri="{BB962C8B-B14F-4D97-AF65-F5344CB8AC3E}">
+        <p14:creationId xmlns:p14="http://schemas.microsoft.com/office/powerpoint/2010/main" val="2822515980"/>
+      </p:ext>
+    </p:extLst>
+  </p:cSld>
+  <p:clrMapOvr>
+    <a:masterClrMapping/>
+  </p:clrMapOvr>
+</p:sld>
+</file>
+
+<file path=ppt/slides/slide11.xml><?xml version="1.0" encoding="utf-8"?>
+<p:sld xmlns:a="http://schemas.openxmlformats.org/drawingml/2006/main" xmlns:r="http://schemas.openxmlformats.org/officeDocument/2006/relationships" xmlns:p="http://schemas.openxmlformats.org/presentationml/2006/main">
+  <p:cSld>
+    <p:spTree>
+      <p:nvGrpSpPr>
+        <p:cNvPr id="1" name=""/>
+        <p:cNvGrpSpPr/>
+        <p:nvPr/>
+      </p:nvGrpSpPr>
+      <p:grpSpPr>
+        <a:xfrm>
+          <a:off x="0" y="0"/>
+          <a:ext cx="0" cy="0"/>
+          <a:chOff x="0" y="0"/>
+          <a:chExt cx="0" cy="0"/>
+        </a:xfrm>
+      </p:grpSpPr>
+      <p:sp>
+        <p:nvSpPr>
+          <p:cNvPr id="2" name="Title 1">
+            <a:extLst>
+              <a:ext uri="{FF2B5EF4-FFF2-40B4-BE49-F238E27FC236}">
+                <a16:creationId xmlns:a16="http://schemas.microsoft.com/office/drawing/2014/main" id="{2609094E-9AF4-4201-AA85-247329965CA6}"/>
+              </a:ext>
+            </a:extLst>
+          </p:cNvPr>
+          <p:cNvSpPr>
+            <a:spLocks noGrp="1"/>
+          </p:cNvSpPr>
+          <p:nvPr>
+            <p:ph type="title"/>
+          </p:nvPr>
+        </p:nvSpPr>
+        <p:spPr/>
+        <p:txBody>
+          <a:bodyPr/>
+          <a:lstStyle/>
+          <a:p>
+            <a:r>
+              <a:rPr lang="he-IL" dirty="0"/>
+              <a:t>ועכשיו שאלה... איזה פיצוי עדיף (לציבור הרחב)?</a:t>
+            </a:r>
+            <a:endParaRPr lang="en-IL" dirty="0"/>
+          </a:p>
+        </p:txBody>
+      </p:sp>
+      <p:graphicFrame>
+        <p:nvGraphicFramePr>
+          <p:cNvPr id="4" name="Content Placeholder 3">
+            <a:extLst>
+              <a:ext uri="{FF2B5EF4-FFF2-40B4-BE49-F238E27FC236}">
+                <a16:creationId xmlns:a16="http://schemas.microsoft.com/office/drawing/2014/main" id="{7146B6F7-D50E-408D-AED8-EDD81718C351}"/>
+              </a:ext>
+            </a:extLst>
+          </p:cNvPr>
+          <p:cNvGraphicFramePr>
+            <a:graphicFrameLocks noGrp="1"/>
+          </p:cNvGraphicFramePr>
+          <p:nvPr>
+            <p:ph idx="1"/>
+            <p:extLst>
+              <p:ext uri="{D42A27DB-BD31-4B8C-83A1-F6EECF244321}">
+                <p14:modId xmlns:p14="http://schemas.microsoft.com/office/powerpoint/2010/main" val="3875507951"/>
+              </p:ext>
+            </p:extLst>
+          </p:nvPr>
+        </p:nvGraphicFramePr>
+        <p:xfrm>
+          <a:off x="609600" y="1676400"/>
+          <a:ext cx="10972800" cy="1752600"/>
+        </p:xfrm>
+        <a:graphic>
+          <a:graphicData uri="http://schemas.openxmlformats.org/drawingml/2006/table">
+            <a:tbl>
+              <a:tblPr rtl="1" firstRow="1" bandRow="1">
+                <a:tableStyleId>{5C22544A-7EE6-4342-B048-85BDC9FD1C3A}</a:tableStyleId>
+              </a:tblPr>
+              <a:tblGrid>
+                <a:gridCol w="2743200">
+                  <a:extLst>
+                    <a:ext uri="{9D8B030D-6E8A-4147-A177-3AD203B41FA5}">
+                      <a16:colId xmlns:a16="http://schemas.microsoft.com/office/drawing/2014/main" val="4045501347"/>
+                    </a:ext>
+                  </a:extLst>
+                </a:gridCol>
+                <a:gridCol w="2743200">
+                  <a:extLst>
+                    <a:ext uri="{9D8B030D-6E8A-4147-A177-3AD203B41FA5}">
+                      <a16:colId xmlns:a16="http://schemas.microsoft.com/office/drawing/2014/main" val="4201506355"/>
+                    </a:ext>
+                  </a:extLst>
+                </a:gridCol>
+                <a:gridCol w="2743200">
+                  <a:extLst>
+                    <a:ext uri="{9D8B030D-6E8A-4147-A177-3AD203B41FA5}">
+                      <a16:colId xmlns:a16="http://schemas.microsoft.com/office/drawing/2014/main" val="131704702"/>
+                    </a:ext>
+                  </a:extLst>
+                </a:gridCol>
+                <a:gridCol w="2743200">
+                  <a:extLst>
+                    <a:ext uri="{9D8B030D-6E8A-4147-A177-3AD203B41FA5}">
+                      <a16:colId xmlns:a16="http://schemas.microsoft.com/office/drawing/2014/main" val="131490105"/>
+                    </a:ext>
+                  </a:extLst>
+                </a:gridCol>
+              </a:tblGrid>
+              <a:tr h="370840">
+                <a:tc>
+                  <a:txBody>
+                    <a:bodyPr/>
+                    <a:lstStyle/>
+                    <a:p>
+                      <a:endParaRPr lang="en-IL" dirty="0"/>
+                    </a:p>
+                  </a:txBody>
+                  <a:tcPr anchor="ctr"/>
+                </a:tc>
+                <a:tc>
+                  <a:txBody>
+                    <a:bodyPr/>
+                    <a:lstStyle/>
+                    <a:p>
+                      <a:r>
+                        <a:rPr lang="he-IL" dirty="0"/>
+                        <a:t>אפשרות א'</a:t>
+                      </a:r>
+                      <a:endParaRPr lang="en-IL" dirty="0"/>
+                    </a:p>
+                  </a:txBody>
+                  <a:tcPr anchor="ctr"/>
+                </a:tc>
+                <a:tc>
+                  <a:txBody>
+                    <a:bodyPr/>
+                    <a:lstStyle/>
+                    <a:p>
+                      <a:r>
+                        <a:rPr lang="he-IL" dirty="0"/>
+                        <a:t>אפשרות ב'</a:t>
+                      </a:r>
+                      <a:endParaRPr lang="en-IL" dirty="0"/>
+                    </a:p>
+                  </a:txBody>
+                  <a:tcPr anchor="ctr"/>
+                </a:tc>
+                <a:tc>
+                  <a:txBody>
+                    <a:bodyPr/>
+                    <a:lstStyle/>
+                    <a:p>
+                      <a:r>
+                        <a:rPr lang="he-IL" dirty="0"/>
+                        <a:t>אפשרות ג'</a:t>
+                      </a:r>
+                      <a:endParaRPr lang="en-IL" dirty="0"/>
+                    </a:p>
+                  </a:txBody>
+                  <a:tcPr anchor="ctr"/>
+                </a:tc>
+                <a:extLst>
+                  <a:ext uri="{0D108BD9-81ED-4DB2-BD59-A6C34878D82A}">
+                    <a16:rowId xmlns:a16="http://schemas.microsoft.com/office/drawing/2014/main" val="3562553276"/>
+                  </a:ext>
+                </a:extLst>
+              </a:tr>
+              <a:tr h="370840">
+                <a:tc>
+                  <a:txBody>
+                    <a:bodyPr/>
+                    <a:lstStyle/>
+                    <a:p>
+                      <a:r>
+                        <a:rPr lang="he-IL" dirty="0"/>
+                        <a:t>שיטת הפיצוי</a:t>
+                      </a:r>
+                      <a:endParaRPr lang="en-IL" dirty="0"/>
+                    </a:p>
+                  </a:txBody>
+                  <a:tcPr anchor="ctr"/>
+                </a:tc>
+                <a:tc>
+                  <a:txBody>
+                    <a:bodyPr/>
+                    <a:lstStyle/>
+                    <a:p>
+                      <a:r>
+                        <a:rPr lang="he-IL" dirty="0"/>
+                        <a:t>אתה צריך לבקש</a:t>
+                      </a:r>
+                    </a:p>
+                    <a:p>
+                      <a:r>
+                        <a:rPr lang="he-IL" dirty="0"/>
+                        <a:t>(דורש פעולה אקטיבית)</a:t>
+                      </a:r>
+                      <a:endParaRPr lang="en-IL" dirty="0"/>
+                    </a:p>
+                  </a:txBody>
+                  <a:tcPr anchor="ctr"/>
+                </a:tc>
+                <a:tc>
+                  <a:txBody>
+                    <a:bodyPr/>
+                    <a:lstStyle/>
+                    <a:p>
+                      <a:r>
+                        <a:rPr lang="he-IL" dirty="0"/>
+                        <a:t>אתה צריך לבקש</a:t>
+                      </a:r>
+                    </a:p>
+                    <a:p>
+                      <a:r>
+                        <a:rPr lang="he-IL" dirty="0"/>
+                        <a:t>(דורש פעולה אקטיבית)</a:t>
+                      </a:r>
+                      <a:endParaRPr lang="en-IL" dirty="0"/>
+                    </a:p>
+                  </a:txBody>
+                  <a:tcPr anchor="ctr"/>
+                </a:tc>
+                <a:tc>
+                  <a:txBody>
+                    <a:bodyPr/>
+                    <a:lstStyle/>
+                    <a:p>
+                      <a:r>
+                        <a:rPr lang="he-IL" dirty="0"/>
+                        <a:t>אתה מקבל מבלי שתבקש (פסיבי – מקבל ב"דחיפה")</a:t>
+                      </a:r>
+                      <a:endParaRPr lang="en-IL" dirty="0"/>
+                    </a:p>
+                  </a:txBody>
+                  <a:tcPr anchor="ctr"/>
+                </a:tc>
+                <a:extLst>
+                  <a:ext uri="{0D108BD9-81ED-4DB2-BD59-A6C34878D82A}">
+                    <a16:rowId xmlns:a16="http://schemas.microsoft.com/office/drawing/2014/main" val="1349676725"/>
+                  </a:ext>
+                </a:extLst>
+              </a:tr>
+              <a:tr h="370840">
+                <a:tc>
+                  <a:txBody>
+                    <a:bodyPr/>
+                    <a:lstStyle/>
+                    <a:p>
+                      <a:r>
+                        <a:rPr lang="he-IL" dirty="0"/>
+                        <a:t>גובה הפיצוי (שווה ערך)</a:t>
+                      </a:r>
+                      <a:endParaRPr lang="en-IL" dirty="0"/>
+                    </a:p>
+                  </a:txBody>
+                  <a:tcPr anchor="ctr"/>
+                </a:tc>
+                <a:tc>
+                  <a:txBody>
+                    <a:bodyPr/>
+                    <a:lstStyle/>
+                    <a:p>
+                      <a:r>
+                        <a:rPr lang="he-IL" dirty="0"/>
+                        <a:t>75 ש"ח</a:t>
+                      </a:r>
+                      <a:endParaRPr lang="en-IL" dirty="0"/>
+                    </a:p>
+                  </a:txBody>
+                  <a:tcPr anchor="ctr"/>
+                </a:tc>
+                <a:tc>
+                  <a:txBody>
+                    <a:bodyPr/>
+                    <a:lstStyle/>
+                    <a:p>
+                      <a:r>
+                        <a:rPr lang="he-IL" dirty="0"/>
+                        <a:t>50 ש"ח</a:t>
+                      </a:r>
+                      <a:endParaRPr lang="en-IL" dirty="0"/>
+                    </a:p>
+                  </a:txBody>
+                  <a:tcPr anchor="ctr"/>
+                </a:tc>
+                <a:tc>
+                  <a:txBody>
+                    <a:bodyPr/>
+                    <a:lstStyle/>
+                    <a:p>
+                      <a:r>
+                        <a:rPr lang="he-IL" dirty="0"/>
+                        <a:t>25 ש"ח</a:t>
+                      </a:r>
+                      <a:endParaRPr lang="en-IL" dirty="0"/>
+                    </a:p>
+                  </a:txBody>
+                  <a:tcPr anchor="ctr"/>
+                </a:tc>
+                <a:extLst>
+                  <a:ext uri="{0D108BD9-81ED-4DB2-BD59-A6C34878D82A}">
+                    <a16:rowId xmlns:a16="http://schemas.microsoft.com/office/drawing/2014/main" val="1857164235"/>
+                  </a:ext>
+                </a:extLst>
+              </a:tr>
+              <a:tr h="370840">
+                <a:tc>
+                  <a:txBody>
+                    <a:bodyPr/>
+                    <a:lstStyle/>
+                    <a:p>
+                      <a:r>
+                        <a:rPr lang="he-IL" dirty="0"/>
+                        <a:t>אופן קבלת הפיצוי</a:t>
+                      </a:r>
+                      <a:endParaRPr lang="en-IL" dirty="0"/>
+                    </a:p>
+                  </a:txBody>
+                  <a:tcPr anchor="ctr"/>
+                </a:tc>
+                <a:tc>
+                  <a:txBody>
+                    <a:bodyPr/>
+                    <a:lstStyle/>
+                    <a:p>
+                      <a:pPr marL="0" marR="0" lvl="0" indent="0" algn="r" defTabSz="914400" rtl="1" eaLnBrk="1" fontAlgn="auto" latinLnBrk="0" hangingPunct="1">
+                        <a:lnSpc>
+                          <a:spcPct val="100000"/>
+                        </a:lnSpc>
+                        <a:spcBef>
+                          <a:spcPts val="0"/>
+                        </a:spcBef>
+                        <a:spcAft>
+                          <a:spcPts val="0"/>
+                        </a:spcAft>
+                        <a:buClrTx/>
+                        <a:buSzTx/>
+                        <a:buFontTx/>
+                        <a:buNone/>
+                        <a:tabLst/>
+                        <a:defRPr/>
+                      </a:pPr>
+                      <a:r>
+                        <a:rPr lang="he-IL" dirty="0"/>
+                        <a:t>החזר/זיכוי ברכישה הבאה</a:t>
+                      </a:r>
+                      <a:endParaRPr lang="en-IL" dirty="0"/>
+                    </a:p>
+                  </a:txBody>
+                  <a:tcPr anchor="ctr"/>
+                </a:tc>
+                <a:tc>
+                  <a:txBody>
+                    <a:bodyPr/>
+                    <a:lstStyle/>
+                    <a:p>
+                      <a:pPr marL="0" marR="0" lvl="0" indent="0" algn="r" defTabSz="914400" rtl="1" eaLnBrk="1" fontAlgn="auto" latinLnBrk="0" hangingPunct="1">
+                        <a:lnSpc>
+                          <a:spcPct val="100000"/>
+                        </a:lnSpc>
+                        <a:spcBef>
+                          <a:spcPts val="0"/>
+                        </a:spcBef>
+                        <a:spcAft>
+                          <a:spcPts val="0"/>
+                        </a:spcAft>
+                        <a:buClrTx/>
+                        <a:buSzTx/>
+                        <a:buFontTx/>
+                        <a:buNone/>
+                        <a:tabLst/>
+                        <a:defRPr/>
+                      </a:pPr>
+                      <a:r>
+                        <a:rPr lang="he-IL" dirty="0"/>
+                        <a:t>קבלת צ'ק</a:t>
+                      </a:r>
+                      <a:endParaRPr lang="en-IL" dirty="0"/>
+                    </a:p>
+                  </a:txBody>
+                  <a:tcPr anchor="ctr"/>
+                </a:tc>
+                <a:tc>
+                  <a:txBody>
+                    <a:bodyPr/>
+                    <a:lstStyle/>
+                    <a:p>
+                      <a:r>
+                        <a:rPr lang="he-IL" dirty="0"/>
+                        <a:t>זיכוי בכרטיס אשראי</a:t>
+                      </a:r>
+                      <a:endParaRPr lang="en-IL" dirty="0"/>
+                    </a:p>
+                  </a:txBody>
+                  <a:tcPr anchor="ctr"/>
+                </a:tc>
+                <a:extLst>
+                  <a:ext uri="{0D108BD9-81ED-4DB2-BD59-A6C34878D82A}">
+                    <a16:rowId xmlns:a16="http://schemas.microsoft.com/office/drawing/2014/main" val="253583456"/>
+                  </a:ext>
+                </a:extLst>
+              </a:tr>
+            </a:tbl>
+          </a:graphicData>
+        </a:graphic>
+      </p:graphicFrame>
       <p:pic>
         <p:nvPicPr>
           <p:cNvPr id="8" name="Picture 7">
@@ -2805,7 +3428,571 @@
           <a:p>
             <a:fld id="{48C2FE54-953E-4268-8452-225DF8E36AC9}" type="slidenum">
               <a:rPr lang="he-IL" smtClean="0"/>
-              <a:t>10</a:t>
+              <a:t>11</a:t>
+            </a:fld>
+            <a:endParaRPr lang="he-IL"/>
+          </a:p>
+        </p:txBody>
+      </p:sp>
+      <p:sp>
+        <p:nvSpPr>
+          <p:cNvPr id="5" name="TextBox 4">
+            <a:extLst>
+              <a:ext uri="{FF2B5EF4-FFF2-40B4-BE49-F238E27FC236}">
+                <a16:creationId xmlns:a16="http://schemas.microsoft.com/office/drawing/2014/main" id="{66EC3763-B42C-4E99-8C1A-2ADABA3D4356}"/>
+              </a:ext>
+            </a:extLst>
+          </p:cNvPr>
+          <p:cNvSpPr txBox="1"/>
+          <p:nvPr/>
+        </p:nvSpPr>
+        <p:spPr>
+          <a:xfrm>
+            <a:off x="3448378" y="3651408"/>
+            <a:ext cx="8134022" cy="2369880"/>
+          </a:xfrm>
+          <a:prstGeom prst="rect">
+            <a:avLst/>
+          </a:prstGeom>
+          <a:noFill/>
+        </p:spPr>
+        <p:txBody>
+          <a:bodyPr wrap="none" rtlCol="0">
+            <a:spAutoFit/>
+          </a:bodyPr>
+          <a:lstStyle/>
+          <a:p>
+            <a:r>
+              <a:rPr lang="he-IL" sz="1600" dirty="0"/>
+              <a:t>הצגנו למשיבים סדרה של 5 שאלות. בכל שאלה 3 אפשרויות בטבלה.</a:t>
+            </a:r>
+          </a:p>
+          <a:p>
+            <a:r>
+              <a:rPr lang="he-IL" sz="1600" dirty="0"/>
+              <a:t>סה"כ יש 40 צירופים שונים אפשריים (כל משיב ענה על חלק מהם).</a:t>
+            </a:r>
+          </a:p>
+          <a:p>
+            <a:endParaRPr lang="he-IL" sz="1600" dirty="0"/>
+          </a:p>
+          <a:p>
+            <a:r>
+              <a:rPr lang="he-IL" sz="1600" dirty="0"/>
+              <a:t>השילובים מתייחסים לשלושת הקטגוריות:</a:t>
+            </a:r>
+          </a:p>
+          <a:p>
+            <a:r>
+              <a:rPr lang="he-IL" sz="1600" dirty="0"/>
+              <a:t>	שיטת הפיצוי (בקשה / דחיפה) </a:t>
+            </a:r>
+            <a:br>
+              <a:rPr lang="en-US" sz="1600" dirty="0"/>
+            </a:br>
+            <a:r>
+              <a:rPr lang="he-IL" sz="1600" dirty="0"/>
+              <a:t>	סכום הפיצוי (25, 50, 75, 100)</a:t>
+            </a:r>
+          </a:p>
+          <a:p>
+            <a:r>
+              <a:rPr lang="he-IL" sz="1600" dirty="0"/>
+              <a:t>	אופן קבלת הפיצוי (מוצר משלים לרכישה, כרטיס אשראי, צ'ק, החזר ברכישה הבאה, קופון)</a:t>
+            </a:r>
+          </a:p>
+          <a:p>
+            <a:endParaRPr lang="he-IL" sz="1600" dirty="0"/>
+          </a:p>
+          <a:p>
+            <a:r>
+              <a:rPr lang="he-IL" sz="1600" dirty="0"/>
+              <a:t>זה מאפשר לנו לנתח מהם הגורמים העדיפים ביותר מבחינת תובעים.</a:t>
+            </a:r>
+            <a:endParaRPr lang="en-IL" sz="1600" dirty="0"/>
+          </a:p>
+        </p:txBody>
+      </p:sp>
+      <p:sp>
+        <p:nvSpPr>
+          <p:cNvPr id="3" name="Rectangle 2">
+            <a:extLst>
+              <a:ext uri="{FF2B5EF4-FFF2-40B4-BE49-F238E27FC236}">
+                <a16:creationId xmlns:a16="http://schemas.microsoft.com/office/drawing/2014/main" id="{62ECF144-14A2-4184-91C1-E4318CC5A7D0}"/>
+              </a:ext>
+            </a:extLst>
+          </p:cNvPr>
+          <p:cNvSpPr/>
+          <p:nvPr/>
+        </p:nvSpPr>
+        <p:spPr>
+          <a:xfrm>
+            <a:off x="609600" y="1671067"/>
+            <a:ext cx="5486400" cy="1752600"/>
+          </a:xfrm>
+          <a:prstGeom prst="rect">
+            <a:avLst/>
+          </a:prstGeom>
+        </p:spPr>
+        <p:style>
+          <a:lnRef idx="2">
+            <a:schemeClr val="accent1">
+              <a:shade val="50000"/>
+            </a:schemeClr>
+          </a:lnRef>
+          <a:fillRef idx="1">
+            <a:schemeClr val="accent1"/>
+          </a:fillRef>
+          <a:effectRef idx="0">
+            <a:schemeClr val="accent1"/>
+          </a:effectRef>
+          <a:fontRef idx="minor">
+            <a:schemeClr val="lt1"/>
+          </a:fontRef>
+        </p:style>
+        <p:txBody>
+          <a:bodyPr rtlCol="0" anchor="ctr"/>
+          <a:lstStyle/>
+          <a:p>
+            <a:pPr algn="ctr"/>
+            <a:endParaRPr lang="en-IL"/>
+          </a:p>
+        </p:txBody>
+      </p:sp>
+      <p:sp>
+        <p:nvSpPr>
+          <p:cNvPr id="11" name="Rectangle 10">
+            <a:extLst>
+              <a:ext uri="{FF2B5EF4-FFF2-40B4-BE49-F238E27FC236}">
+                <a16:creationId xmlns:a16="http://schemas.microsoft.com/office/drawing/2014/main" id="{4C63CD56-6337-49E1-A43D-FA09F0EA3DDC}"/>
+              </a:ext>
+            </a:extLst>
+          </p:cNvPr>
+          <p:cNvSpPr/>
+          <p:nvPr/>
+        </p:nvSpPr>
+        <p:spPr>
+          <a:xfrm>
+            <a:off x="609600" y="1671067"/>
+            <a:ext cx="2750096" cy="1752600"/>
+          </a:xfrm>
+          <a:prstGeom prst="rect">
+            <a:avLst/>
+          </a:prstGeom>
+        </p:spPr>
+        <p:style>
+          <a:lnRef idx="2">
+            <a:schemeClr val="accent1">
+              <a:shade val="50000"/>
+            </a:schemeClr>
+          </a:lnRef>
+          <a:fillRef idx="1">
+            <a:schemeClr val="accent1"/>
+          </a:fillRef>
+          <a:effectRef idx="0">
+            <a:schemeClr val="accent1"/>
+          </a:effectRef>
+          <a:fontRef idx="minor">
+            <a:schemeClr val="lt1"/>
+          </a:fontRef>
+        </p:style>
+        <p:txBody>
+          <a:bodyPr rtlCol="0" anchor="ctr"/>
+          <a:lstStyle/>
+          <a:p>
+            <a:pPr algn="ctr"/>
+            <a:endParaRPr lang="en-IL"/>
+          </a:p>
+        </p:txBody>
+      </p:sp>
+      <p:sp>
+        <p:nvSpPr>
+          <p:cNvPr id="6" name="Rectangle: Rounded Corners 5">
+            <a:extLst>
+              <a:ext uri="{FF2B5EF4-FFF2-40B4-BE49-F238E27FC236}">
+                <a16:creationId xmlns:a16="http://schemas.microsoft.com/office/drawing/2014/main" id="{6E1363FC-05A2-4DD1-BE14-E93E816E7976}"/>
+              </a:ext>
+            </a:extLst>
+          </p:cNvPr>
+          <p:cNvSpPr/>
+          <p:nvPr/>
+        </p:nvSpPr>
+        <p:spPr>
+          <a:xfrm rot="19800000">
+            <a:off x="696930" y="4504442"/>
+            <a:ext cx="2462064" cy="658790"/>
+          </a:xfrm>
+          <a:prstGeom prst="roundRect">
+            <a:avLst/>
+          </a:prstGeom>
+        </p:spPr>
+        <p:style>
+          <a:lnRef idx="1">
+            <a:schemeClr val="accent6"/>
+          </a:lnRef>
+          <a:fillRef idx="2">
+            <a:schemeClr val="accent6"/>
+          </a:fillRef>
+          <a:effectRef idx="1">
+            <a:schemeClr val="accent6"/>
+          </a:effectRef>
+          <a:fontRef idx="minor">
+            <a:schemeClr val="dk1"/>
+          </a:fontRef>
+        </p:style>
+        <p:txBody>
+          <a:bodyPr rtlCol="0" anchor="ctr"/>
+          <a:lstStyle/>
+          <a:p>
+            <a:pPr algn="ctr"/>
+            <a:r>
+              <a:rPr lang="en-US" dirty="0"/>
+              <a:t>Conjoint Analysis</a:t>
+            </a:r>
+            <a:endParaRPr lang="en-IL" dirty="0"/>
+          </a:p>
+        </p:txBody>
+      </p:sp>
+    </p:spTree>
+    <p:extLst>
+      <p:ext uri="{BB962C8B-B14F-4D97-AF65-F5344CB8AC3E}">
+        <p14:creationId xmlns:p14="http://schemas.microsoft.com/office/powerpoint/2010/main" val="2360038099"/>
+      </p:ext>
+    </p:extLst>
+  </p:cSld>
+  <p:clrMapOvr>
+    <a:masterClrMapping/>
+  </p:clrMapOvr>
+  <p:timing>
+    <p:tnLst>
+      <p:par>
+        <p:cTn id="1" dur="indefinite" restart="never" nodeType="tmRoot">
+          <p:childTnLst>
+            <p:seq concurrent="1" nextAc="seek">
+              <p:cTn id="2" dur="indefinite" nodeType="mainSeq">
+                <p:childTnLst>
+                  <p:par>
+                    <p:cTn id="3" fill="hold">
+                      <p:stCondLst>
+                        <p:cond delay="indefinite"/>
+                      </p:stCondLst>
+                      <p:childTnLst>
+                        <p:par>
+                          <p:cTn id="4" fill="hold">
+                            <p:stCondLst>
+                              <p:cond delay="0"/>
+                            </p:stCondLst>
+                            <p:childTnLst>
+                              <p:par>
+                                <p:cTn id="5" presetID="1" presetClass="exit" presetSubtype="0" fill="hold" grpId="0" nodeType="clickEffect">
+                                  <p:stCondLst>
+                                    <p:cond delay="0"/>
+                                  </p:stCondLst>
+                                  <p:childTnLst>
+                                    <p:set>
+                                      <p:cBhvr>
+                                        <p:cTn id="6" dur="1" fill="hold">
+                                          <p:stCondLst>
+                                            <p:cond delay="0"/>
+                                          </p:stCondLst>
+                                        </p:cTn>
+                                        <p:tgtEl>
+                                          <p:spTgt spid="3"/>
+                                        </p:tgtEl>
+                                        <p:attrNameLst>
+                                          <p:attrName>style.visibility</p:attrName>
+                                        </p:attrNameLst>
+                                      </p:cBhvr>
+                                      <p:to>
+                                        <p:strVal val="hidden"/>
+                                      </p:to>
+                                    </p:set>
+                                  </p:childTnLst>
+                                </p:cTn>
+                              </p:par>
+                            </p:childTnLst>
+                          </p:cTn>
+                        </p:par>
+                      </p:childTnLst>
+                    </p:cTn>
+                  </p:par>
+                  <p:par>
+                    <p:cTn id="7" fill="hold">
+                      <p:stCondLst>
+                        <p:cond delay="indefinite"/>
+                      </p:stCondLst>
+                      <p:childTnLst>
+                        <p:par>
+                          <p:cTn id="8" fill="hold">
+                            <p:stCondLst>
+                              <p:cond delay="0"/>
+                            </p:stCondLst>
+                            <p:childTnLst>
+                              <p:par>
+                                <p:cTn id="9" presetID="1" presetClass="exit" presetSubtype="0" fill="hold" grpId="0" nodeType="clickEffect">
+                                  <p:stCondLst>
+                                    <p:cond delay="0"/>
+                                  </p:stCondLst>
+                                  <p:childTnLst>
+                                    <p:set>
+                                      <p:cBhvr>
+                                        <p:cTn id="10" dur="1" fill="hold">
+                                          <p:stCondLst>
+                                            <p:cond delay="0"/>
+                                          </p:stCondLst>
+                                        </p:cTn>
+                                        <p:tgtEl>
+                                          <p:spTgt spid="11"/>
+                                        </p:tgtEl>
+                                        <p:attrNameLst>
+                                          <p:attrName>style.visibility</p:attrName>
+                                        </p:attrNameLst>
+                                      </p:cBhvr>
+                                      <p:to>
+                                        <p:strVal val="hidden"/>
+                                      </p:to>
+                                    </p:set>
+                                  </p:childTnLst>
+                                </p:cTn>
+                              </p:par>
+                            </p:childTnLst>
+                          </p:cTn>
+                        </p:par>
+                      </p:childTnLst>
+                    </p:cTn>
+                  </p:par>
+                  <p:par>
+                    <p:cTn id="11" fill="hold">
+                      <p:stCondLst>
+                        <p:cond delay="indefinite"/>
+                      </p:stCondLst>
+                      <p:childTnLst>
+                        <p:par>
+                          <p:cTn id="12" fill="hold">
+                            <p:stCondLst>
+                              <p:cond delay="0"/>
+                            </p:stCondLst>
+                            <p:childTnLst>
+                              <p:par>
+                                <p:cTn id="13" presetID="1" presetClass="entr" presetSubtype="0" fill="hold" grpId="0" nodeType="clickEffect">
+                                  <p:stCondLst>
+                                    <p:cond delay="0"/>
+                                  </p:stCondLst>
+                                  <p:childTnLst>
+                                    <p:set>
+                                      <p:cBhvr>
+                                        <p:cTn id="14" dur="1" fill="hold">
+                                          <p:stCondLst>
+                                            <p:cond delay="0"/>
+                                          </p:stCondLst>
+                                        </p:cTn>
+                                        <p:tgtEl>
+                                          <p:spTgt spid="5"/>
+                                        </p:tgtEl>
+                                        <p:attrNameLst>
+                                          <p:attrName>style.visibility</p:attrName>
+                                        </p:attrNameLst>
+                                      </p:cBhvr>
+                                      <p:to>
+                                        <p:strVal val="visible"/>
+                                      </p:to>
+                                    </p:set>
+                                  </p:childTnLst>
+                                </p:cTn>
+                              </p:par>
+                            </p:childTnLst>
+                          </p:cTn>
+                        </p:par>
+                      </p:childTnLst>
+                    </p:cTn>
+                  </p:par>
+                  <p:par>
+                    <p:cTn id="15" fill="hold">
+                      <p:stCondLst>
+                        <p:cond delay="indefinite"/>
+                      </p:stCondLst>
+                      <p:childTnLst>
+                        <p:par>
+                          <p:cTn id="16" fill="hold">
+                            <p:stCondLst>
+                              <p:cond delay="0"/>
+                            </p:stCondLst>
+                            <p:childTnLst>
+                              <p:par>
+                                <p:cTn id="17" presetID="1" presetClass="entr" presetSubtype="0" fill="hold" grpId="0" nodeType="clickEffect">
+                                  <p:stCondLst>
+                                    <p:cond delay="0"/>
+                                  </p:stCondLst>
+                                  <p:childTnLst>
+                                    <p:set>
+                                      <p:cBhvr>
+                                        <p:cTn id="18" dur="1" fill="hold">
+                                          <p:stCondLst>
+                                            <p:cond delay="0"/>
+                                          </p:stCondLst>
+                                        </p:cTn>
+                                        <p:tgtEl>
+                                          <p:spTgt spid="6"/>
+                                        </p:tgtEl>
+                                        <p:attrNameLst>
+                                          <p:attrName>style.visibility</p:attrName>
+                                        </p:attrNameLst>
+                                      </p:cBhvr>
+                                      <p:to>
+                                        <p:strVal val="visible"/>
+                                      </p:to>
+                                    </p:set>
+                                  </p:childTnLst>
+                                </p:cTn>
+                              </p:par>
+                            </p:childTnLst>
+                          </p:cTn>
+                        </p:par>
+                      </p:childTnLst>
+                    </p:cTn>
+                  </p:par>
+                </p:childTnLst>
+              </p:cTn>
+              <p:prevCondLst>
+                <p:cond evt="onPrev" delay="0">
+                  <p:tgtEl>
+                    <p:sldTgt/>
+                  </p:tgtEl>
+                </p:cond>
+              </p:prevCondLst>
+              <p:nextCondLst>
+                <p:cond evt="onNext" delay="0">
+                  <p:tgtEl>
+                    <p:sldTgt/>
+                  </p:tgtEl>
+                </p:cond>
+              </p:nextCondLst>
+            </p:seq>
+          </p:childTnLst>
+        </p:cTn>
+      </p:par>
+    </p:tnLst>
+    <p:bldLst>
+      <p:bldP spid="5" grpId="0"/>
+      <p:bldP spid="3" grpId="0" animBg="1"/>
+      <p:bldP spid="11" grpId="0" animBg="1"/>
+      <p:bldP spid="6" grpId="0" animBg="1"/>
+    </p:bldLst>
+  </p:timing>
+</p:sld>
+</file>
+
+<file path=ppt/slides/slide12.xml><?xml version="1.0" encoding="utf-8"?>
+<p:sld xmlns:a="http://schemas.openxmlformats.org/drawingml/2006/main" xmlns:r="http://schemas.openxmlformats.org/officeDocument/2006/relationships" xmlns:p="http://schemas.openxmlformats.org/presentationml/2006/main" show="0">
+  <p:cSld>
+    <p:spTree>
+      <p:nvGrpSpPr>
+        <p:cNvPr id="1" name=""/>
+        <p:cNvGrpSpPr/>
+        <p:nvPr/>
+      </p:nvGrpSpPr>
+      <p:grpSpPr>
+        <a:xfrm>
+          <a:off x="0" y="0"/>
+          <a:ext cx="0" cy="0"/>
+          <a:chOff x="0" y="0"/>
+          <a:chExt cx="0" cy="0"/>
+        </a:xfrm>
+      </p:grpSpPr>
+      <p:sp>
+        <p:nvSpPr>
+          <p:cNvPr id="2" name="Title 1">
+            <a:extLst>
+              <a:ext uri="{FF2B5EF4-FFF2-40B4-BE49-F238E27FC236}">
+                <a16:creationId xmlns:a16="http://schemas.microsoft.com/office/drawing/2014/main" id="{2609094E-9AF4-4201-AA85-247329965CA6}"/>
+              </a:ext>
+            </a:extLst>
+          </p:cNvPr>
+          <p:cNvSpPr>
+            <a:spLocks noGrp="1"/>
+          </p:cNvSpPr>
+          <p:nvPr>
+            <p:ph type="title"/>
+          </p:nvPr>
+        </p:nvSpPr>
+        <p:spPr/>
+        <p:txBody>
+          <a:bodyPr/>
+          <a:lstStyle/>
+          <a:p>
+            <a:r>
+              <a:rPr lang="he-IL" dirty="0"/>
+              <a:t>ועכשיו שאלה... איזה פיצוי מעדיף (לציבור הרחב)?</a:t>
+            </a:r>
+            <a:endParaRPr lang="en-IL" dirty="0"/>
+          </a:p>
+        </p:txBody>
+      </p:sp>
+      <p:pic>
+        <p:nvPicPr>
+          <p:cNvPr id="8" name="Picture 7">
+            <a:extLst>
+              <a:ext uri="{FF2B5EF4-FFF2-40B4-BE49-F238E27FC236}">
+                <a16:creationId xmlns:a16="http://schemas.microsoft.com/office/drawing/2014/main" id="{BD14DDC7-4338-4359-B609-615DFFC0238D}"/>
+              </a:ext>
+            </a:extLst>
+          </p:cNvPr>
+          <p:cNvPicPr>
+            <a:picLocks noChangeAspect="1"/>
+          </p:cNvPicPr>
+          <p:nvPr/>
+        </p:nvPicPr>
+        <p:blipFill>
+          <a:blip r:embed="rId2">
+            <a:clrChange>
+              <a:clrFrom>
+                <a:srgbClr val="FFFFFF"/>
+              </a:clrFrom>
+              <a:clrTo>
+                <a:srgbClr val="FFFFFF">
+                  <a:alpha val="0"/>
+                </a:srgbClr>
+              </a:clrTo>
+            </a:clrChange>
+          </a:blip>
+          <a:stretch>
+            <a:fillRect/>
+          </a:stretch>
+        </p:blipFill>
+        <p:spPr>
+          <a:xfrm>
+            <a:off x="7941271" y="6101166"/>
+            <a:ext cx="946613" cy="631390"/>
+          </a:xfrm>
+          <a:prstGeom prst="rect">
+            <a:avLst/>
+          </a:prstGeom>
+        </p:spPr>
+      </p:pic>
+      <p:sp>
+        <p:nvSpPr>
+          <p:cNvPr id="10" name="Slide Number Placeholder 9">
+            <a:extLst>
+              <a:ext uri="{FF2B5EF4-FFF2-40B4-BE49-F238E27FC236}">
+                <a16:creationId xmlns:a16="http://schemas.microsoft.com/office/drawing/2014/main" id="{687C9A4A-7E2D-4B6C-AB42-465F35240765}"/>
+              </a:ext>
+            </a:extLst>
+          </p:cNvPr>
+          <p:cNvSpPr>
+            <a:spLocks noGrp="1"/>
+          </p:cNvSpPr>
+          <p:nvPr>
+            <p:ph type="sldNum" sz="quarter" idx="12"/>
+          </p:nvPr>
+        </p:nvSpPr>
+        <p:spPr/>
+        <p:txBody>
+          <a:bodyPr/>
+          <a:lstStyle/>
+          <a:p>
+            <a:fld id="{48C2FE54-953E-4268-8452-225DF8E36AC9}" type="slidenum">
+              <a:rPr lang="he-IL" smtClean="0"/>
+              <a:t>12</a:t>
             </a:fld>
             <a:endParaRPr lang="he-IL"/>
           </a:p>
@@ -3226,7 +4413,7 @@
 </p:sld>
 </file>
 
-<file path=ppt/slides/slide11.xml><?xml version="1.0" encoding="utf-8"?>
+<file path=ppt/slides/slide13.xml><?xml version="1.0" encoding="utf-8"?>
 <p:sld xmlns:a="http://schemas.openxmlformats.org/drawingml/2006/main" xmlns:r="http://schemas.openxmlformats.org/officeDocument/2006/relationships" xmlns:p="http://schemas.openxmlformats.org/presentationml/2006/main">
   <p:cSld>
     <p:spTree>
@@ -3266,7 +4453,7 @@
           <a:p>
             <a:r>
               <a:rPr lang="he-IL" dirty="0"/>
-              <a:t>איזה פיצוי מעדיף התובע?</a:t>
+              <a:t>איזה פיצוי מעדיף הציבור הרחב?</a:t>
             </a:r>
             <a:endParaRPr lang="en-IL" dirty="0"/>
           </a:p>
@@ -3295,7 +4482,7 @@
           <a:p>
             <a:fld id="{48C2FE54-953E-4268-8452-225DF8E36AC9}" type="slidenum">
               <a:rPr lang="he-IL" smtClean="0"/>
-              <a:t>11</a:t>
+              <a:t>13</a:t>
             </a:fld>
             <a:endParaRPr lang="he-IL"/>
           </a:p>
@@ -4387,6 +5574,72 @@
           </p:txBody>
         </p:sp>
       </p:grpSp>
+      <p:sp>
+        <p:nvSpPr>
+          <p:cNvPr id="3" name="Rectangle: Rounded Corners 2">
+            <a:extLst>
+              <a:ext uri="{FF2B5EF4-FFF2-40B4-BE49-F238E27FC236}">
+                <a16:creationId xmlns:a16="http://schemas.microsoft.com/office/drawing/2014/main" id="{237B2E7F-FEE1-432C-AB75-48807035A2E6}"/>
+              </a:ext>
+            </a:extLst>
+          </p:cNvPr>
+          <p:cNvSpPr/>
+          <p:nvPr/>
+        </p:nvSpPr>
+        <p:spPr>
+          <a:xfrm>
+            <a:off x="251441" y="4856586"/>
+            <a:ext cx="7644759" cy="1236710"/>
+          </a:xfrm>
+          <a:prstGeom prst="roundRect">
+            <a:avLst>
+              <a:gd name="adj" fmla="val 9151"/>
+            </a:avLst>
+          </a:prstGeom>
+        </p:spPr>
+        <p:style>
+          <a:lnRef idx="1">
+            <a:schemeClr val="accent6"/>
+          </a:lnRef>
+          <a:fillRef idx="2">
+            <a:schemeClr val="accent6"/>
+          </a:fillRef>
+          <a:effectRef idx="1">
+            <a:schemeClr val="accent6"/>
+          </a:effectRef>
+          <a:fontRef idx="minor">
+            <a:schemeClr val="dk1"/>
+          </a:fontRef>
+        </p:style>
+        <p:txBody>
+          <a:bodyPr rtlCol="0" anchor="ctr"/>
+          <a:lstStyle/>
+          <a:p>
+            <a:r>
+              <a:rPr lang="he-IL" dirty="0"/>
+              <a:t>"כסף הכי חשוב", אבל גם איך מקבלים אותו.</a:t>
+            </a:r>
+          </a:p>
+          <a:p>
+            <a:r>
+              <a:rPr lang="he-IL" dirty="0"/>
+              <a:t>זיכוי בכרטיס אשראי בערך של 25 ש"ח "עדיף" על 75 ש"ח שניתנים כמוצר משלים.</a:t>
+            </a:r>
+          </a:p>
+          <a:p>
+            <a:r>
+              <a:rPr lang="he-IL" dirty="0"/>
+              <a:t>למרבה ההפתעה, קבלת הפיצוי "בדחיפה" פחות משמעותי מהיבטים אחרים.</a:t>
+            </a:r>
+          </a:p>
+          <a:p>
+            <a:r>
+              <a:rPr lang="he-IL" dirty="0"/>
+              <a:t>סקר יכול להיות עזר להחלטה על המנגנון שבו יבוצע הפיצוי.</a:t>
+            </a:r>
+          </a:p>
+        </p:txBody>
+      </p:sp>
     </p:spTree>
     <p:extLst>
       <p:ext uri="{BB962C8B-B14F-4D97-AF65-F5344CB8AC3E}">
@@ -4765,6 +6018,51 @@
                       </p:childTnLst>
                     </p:cTn>
                   </p:par>
+                  <p:par>
+                    <p:cTn id="35" fill="hold">
+                      <p:stCondLst>
+                        <p:cond delay="indefinite"/>
+                      </p:stCondLst>
+                      <p:childTnLst>
+                        <p:par>
+                          <p:cTn id="36" fill="hold">
+                            <p:stCondLst>
+                              <p:cond delay="0"/>
+                            </p:stCondLst>
+                            <p:childTnLst>
+                              <p:par>
+                                <p:cTn id="37" presetID="1" presetClass="entr" presetSubtype="0" fill="hold" grpId="0" nodeType="clickEffect">
+                                  <p:stCondLst>
+                                    <p:cond delay="0"/>
+                                  </p:stCondLst>
+                                  <p:childTnLst>
+                                    <p:set>
+                                      <p:cBhvr>
+                                        <p:cTn id="38" dur="1" fill="hold">
+                                          <p:stCondLst>
+                                            <p:cond delay="0"/>
+                                          </p:stCondLst>
+                                        </p:cTn>
+                                        <p:tgtEl>
+                                          <p:spTgt spid="3"/>
+                                        </p:tgtEl>
+                                        <p:attrNameLst>
+                                          <p:attrName>style.visibility</p:attrName>
+                                        </p:attrNameLst>
+                                      </p:cBhvr>
+                                      <p:to>
+                                        <p:strVal val="visible"/>
+                                      </p:to>
+                                    </p:set>
+                                  </p:childTnLst>
+                                </p:cTn>
+                              </p:par>
+                            </p:childTnLst>
+                          </p:cTn>
+                        </p:par>
+                      </p:childTnLst>
+                    </p:cTn>
+                  </p:par>
                 </p:childTnLst>
               </p:cTn>
               <p:prevCondLst>
@@ -4786,11 +6084,14 @@
         </p:cTn>
       </p:par>
     </p:tnLst>
+    <p:bldLst>
+      <p:bldP spid="3" grpId="0" animBg="1"/>
+    </p:bldLst>
   </p:timing>
 </p:sld>
 </file>
 
-<file path=ppt/slides/slide12.xml><?xml version="1.0" encoding="utf-8"?>
+<file path=ppt/slides/slide14.xml><?xml version="1.0" encoding="utf-8"?>
 <p:sld xmlns:a="http://schemas.openxmlformats.org/drawingml/2006/main" xmlns:r="http://schemas.openxmlformats.org/officeDocument/2006/relationships" xmlns:p="http://schemas.openxmlformats.org/presentationml/2006/main">
   <p:cSld>
     <p:spTree>
@@ -4902,7 +6203,7 @@
           <a:p>
             <a:fld id="{48C2FE54-953E-4268-8452-225DF8E36AC9}" type="slidenum">
               <a:rPr lang="he-IL" smtClean="0"/>
-              <a:t>12</a:t>
+              <a:t>14</a:t>
             </a:fld>
             <a:endParaRPr lang="he-IL"/>
           </a:p>
@@ -4933,7 +6234,7 @@
           <a:p>
             <a:r>
               <a:rPr lang="he-IL" sz="2400" dirty="0"/>
-              <a:t>מוצגים עשרת משרדים בעלי הדירוג הגבוה ביותר</a:t>
+              <a:t>מוצגים עשרת המשרדים בעלי הדירוג הגבוה ביותר</a:t>
             </a:r>
             <a:endParaRPr lang="en-US" sz="2400" dirty="0"/>
           </a:p>
@@ -5006,7 +6307,7 @@
 </p:sld>
 </file>
 
-<file path=ppt/slides/slide13.xml><?xml version="1.0" encoding="utf-8"?>
+<file path=ppt/slides/slide15.xml><?xml version="1.0" encoding="utf-8"?>
 <p:sld xmlns:a="http://schemas.openxmlformats.org/drawingml/2006/main" xmlns:r="http://schemas.openxmlformats.org/officeDocument/2006/relationships" xmlns:p="http://schemas.openxmlformats.org/presentationml/2006/main" show="0">
   <p:cSld>
     <p:spTree>
@@ -5118,7 +6419,7 @@
           <a:p>
             <a:fld id="{48C2FE54-953E-4268-8452-225DF8E36AC9}" type="slidenum">
               <a:rPr lang="he-IL" smtClean="0"/>
-              <a:t>13</a:t>
+              <a:t>15</a:t>
             </a:fld>
             <a:endParaRPr lang="he-IL"/>
           </a:p>
@@ -5221,7 +6522,7 @@
 </p:sld>
 </file>
 
-<file path=ppt/slides/slide14.xml><?xml version="1.0" encoding="utf-8"?>
+<file path=ppt/slides/slide16.xml><?xml version="1.0" encoding="utf-8"?>
 <p:sld xmlns:a="http://schemas.openxmlformats.org/drawingml/2006/main" xmlns:r="http://schemas.openxmlformats.org/officeDocument/2006/relationships" xmlns:p="http://schemas.openxmlformats.org/presentationml/2006/main">
   <p:cSld>
     <p:spTree>
@@ -5331,7 +6632,7 @@
           <a:p>
             <a:fld id="{48C2FE54-953E-4268-8452-225DF8E36AC9}" type="slidenum">
               <a:rPr lang="he-IL" smtClean="0"/>
-              <a:t>14</a:t>
+              <a:t>16</a:t>
             </a:fld>
             <a:endParaRPr lang="he-IL"/>
           </a:p>
@@ -5362,17 +6663,16 @@
           <a:p>
             <a:r>
               <a:rPr lang="he-IL" sz="2400" dirty="0"/>
-              <a:t>מוצגים משרדים שקיבלו לפחות 5% מהקולות</a:t>
-            </a:r>
-            <a:endParaRPr lang="en-US" sz="2400" dirty="0"/>
+              <a:t>מוצגים עשרת המשרדים בעלי הדירוג הגבוה ביותר</a:t>
+            </a:r>
           </a:p>
           <a:p>
             <a:pPr lvl="1"/>
             <a:r>
-              <a:rPr lang="he-IL" sz="2000" dirty="0"/>
+              <a:rPr lang="he-IL" sz="1600" dirty="0"/>
               <a:t>סכום האחוזים מעל 100%, ניתן היה לבחור עד 5 משרדים</a:t>
             </a:r>
-            <a:endParaRPr lang="en-IL" sz="2000" dirty="0"/>
+            <a:endParaRPr lang="en-IL" sz="1600" dirty="0"/>
           </a:p>
         </p:txBody>
       </p:sp>
@@ -5435,7 +6735,7 @@
 </p:sld>
 </file>
 
-<file path=ppt/slides/slide15.xml><?xml version="1.0" encoding="utf-8"?>
+<file path=ppt/slides/slide17.xml><?xml version="1.0" encoding="utf-8"?>
 <p:sld xmlns:a="http://schemas.openxmlformats.org/drawingml/2006/main" xmlns:r="http://schemas.openxmlformats.org/officeDocument/2006/relationships" xmlns:p="http://schemas.openxmlformats.org/presentationml/2006/main" show="0">
   <p:cSld>
     <p:spTree>
@@ -5545,7 +6845,7 @@
           <a:p>
             <a:fld id="{48C2FE54-953E-4268-8452-225DF8E36AC9}" type="slidenum">
               <a:rPr lang="he-IL" smtClean="0"/>
-              <a:t>15</a:t>
+              <a:t>17</a:t>
             </a:fld>
             <a:endParaRPr lang="he-IL"/>
           </a:p>
@@ -5649,7 +6949,7 @@
 </p:sld>
 </file>
 
-<file path=ppt/slides/slide16.xml><?xml version="1.0" encoding="utf-8"?>
+<file path=ppt/slides/slide18.xml><?xml version="1.0" encoding="utf-8"?>
 <p:sld xmlns:a="http://schemas.openxmlformats.org/drawingml/2006/main" xmlns:r="http://schemas.openxmlformats.org/officeDocument/2006/relationships" xmlns:p="http://schemas.openxmlformats.org/presentationml/2006/main">
   <p:cSld>
     <p:spTree>
@@ -5761,7 +7061,7 @@
           <a:p>
             <a:fld id="{48C2FE54-953E-4268-8452-225DF8E36AC9}" type="slidenum">
               <a:rPr lang="he-IL" smtClean="0"/>
-              <a:t>16</a:t>
+              <a:t>18</a:t>
             </a:fld>
             <a:endParaRPr lang="he-IL"/>
           </a:p>
@@ -5827,8 +7127,8 @@
         </p:nvSpPr>
         <p:spPr>
           <a:xfrm>
-            <a:off x="191344" y="5085184"/>
-            <a:ext cx="4536504" cy="1008112"/>
+            <a:off x="335459" y="4600230"/>
+            <a:ext cx="4464496" cy="1421057"/>
           </a:xfrm>
           <a:prstGeom prst="rect">
             <a:avLst/>
@@ -5853,22 +7153,28 @@
           <a:lstStyle/>
           <a:p>
             <a:r>
-              <a:rPr lang="he-IL" sz="1400" dirty="0"/>
+              <a:rPr lang="he-IL" dirty="0"/>
               <a:t>המתנגדים: צילה צפת, הדס עובדיה</a:t>
             </a:r>
           </a:p>
           <a:p>
             <a:r>
-              <a:rPr lang="he-IL" sz="1400" dirty="0"/>
-              <a:t>האוהדים: שושנה אלמגור, תמר בזק רפפורט, מיכל אגמון גונן</a:t>
-            </a:r>
-          </a:p>
-          <a:p>
-            <a:r>
-              <a:rPr lang="he-IL" sz="1400" dirty="0"/>
+              <a:rPr lang="he-IL" dirty="0"/>
+              <a:t>האוהדים: שושנה אלמגור, תמר בזק רפפורט, </a:t>
+            </a:r>
+          </a:p>
+          <a:p>
+            <a:r>
+              <a:rPr lang="he-IL" dirty="0"/>
+              <a:t>מיכל אגמון גונן</a:t>
+            </a:r>
+          </a:p>
+          <a:p>
+            <a:r>
+              <a:rPr lang="he-IL" dirty="0"/>
               <a:t>דעות חלוקות: אסתר שטמר, מנחם רניאל</a:t>
             </a:r>
-            <a:endParaRPr lang="en-IL" sz="1400" dirty="0"/>
+            <a:endParaRPr lang="en-IL" dirty="0"/>
           </a:p>
         </p:txBody>
       </p:sp>
@@ -5882,10 +7188,88 @@
   <p:clrMapOvr>
     <a:masterClrMapping/>
   </p:clrMapOvr>
+  <p:timing>
+    <p:tnLst>
+      <p:par>
+        <p:cTn id="1" dur="indefinite" restart="never" nodeType="tmRoot">
+          <p:childTnLst>
+            <p:seq concurrent="1" nextAc="seek">
+              <p:cTn id="2" dur="indefinite" nodeType="mainSeq">
+                <p:childTnLst>
+                  <p:par>
+                    <p:cTn id="3" fill="hold">
+                      <p:stCondLst>
+                        <p:cond delay="indefinite"/>
+                      </p:stCondLst>
+                      <p:childTnLst>
+                        <p:par>
+                          <p:cTn id="4" fill="hold">
+                            <p:stCondLst>
+                              <p:cond delay="0"/>
+                            </p:stCondLst>
+                            <p:childTnLst>
+                              <p:par>
+                                <p:cTn id="5" presetID="1" presetClass="entr" presetSubtype="0" fill="hold" grpId="0" nodeType="clickEffect">
+                                  <p:stCondLst>
+                                    <p:cond delay="0"/>
+                                  </p:stCondLst>
+                                  <p:childTnLst>
+                                    <p:set>
+                                      <p:cBhvr>
+                                        <p:cTn id="6" dur="1" fill="hold">
+                                          <p:stCondLst>
+                                            <p:cond delay="0"/>
+                                          </p:stCondLst>
+                                        </p:cTn>
+                                        <p:tgtEl>
+                                          <p:spTgt spid="3"/>
+                                        </p:tgtEl>
+                                        <p:attrNameLst>
+                                          <p:attrName>style.visibility</p:attrName>
+                                        </p:attrNameLst>
+                                      </p:cBhvr>
+                                      <p:to>
+                                        <p:strVal val="visible"/>
+                                      </p:to>
+                                    </p:set>
+                                  </p:childTnLst>
+                                </p:cTn>
+                              </p:par>
+                            </p:childTnLst>
+                          </p:cTn>
+                        </p:par>
+                      </p:childTnLst>
+                    </p:cTn>
+                  </p:par>
+                </p:childTnLst>
+              </p:cTn>
+              <p:prevCondLst>
+                <p:cond evt="onPrev" delay="0">
+                  <p:tgtEl>
+                    <p:sldTgt/>
+                  </p:tgtEl>
+                </p:cond>
+              </p:prevCondLst>
+              <p:nextCondLst>
+                <p:cond evt="onNext" delay="0">
+                  <p:tgtEl>
+                    <p:sldTgt/>
+                  </p:tgtEl>
+                </p:cond>
+              </p:nextCondLst>
+            </p:seq>
+          </p:childTnLst>
+        </p:cTn>
+      </p:par>
+    </p:tnLst>
+    <p:bldLst>
+      <p:bldP spid="3" grpId="0" animBg="1"/>
+    </p:bldLst>
+  </p:timing>
 </p:sld>
 </file>
 
-<file path=ppt/slides/slide17.xml><?xml version="1.0" encoding="utf-8"?>
+<file path=ppt/slides/slide19.xml><?xml version="1.0" encoding="utf-8"?>
 <p:sld xmlns:a="http://schemas.openxmlformats.org/drawingml/2006/main" xmlns:r="http://schemas.openxmlformats.org/officeDocument/2006/relationships" xmlns:p="http://schemas.openxmlformats.org/presentationml/2006/main" show="0">
   <p:cSld>
     <p:spTree>
@@ -6004,7 +7388,7 @@
           <a:p>
             <a:fld id="{48C2FE54-953E-4268-8452-225DF8E36AC9}" type="slidenum">
               <a:rPr lang="he-IL" smtClean="0"/>
-              <a:t>17</a:t>
+              <a:t>19</a:t>
             </a:fld>
             <a:endParaRPr lang="he-IL"/>
           </a:p>
@@ -6069,7 +7453,329 @@
 </p:sld>
 </file>
 
-<file path=ppt/slides/slide18.xml><?xml version="1.0" encoding="utf-8"?>
+<file path=ppt/slides/slide2.xml><?xml version="1.0" encoding="utf-8"?>
+<p:sld xmlns:a="http://schemas.openxmlformats.org/drawingml/2006/main" xmlns:r="http://schemas.openxmlformats.org/officeDocument/2006/relationships" xmlns:p="http://schemas.openxmlformats.org/presentationml/2006/main">
+  <p:cSld>
+    <p:spTree>
+      <p:nvGrpSpPr>
+        <p:cNvPr id="1" name=""/>
+        <p:cNvGrpSpPr/>
+        <p:nvPr/>
+      </p:nvGrpSpPr>
+      <p:grpSpPr>
+        <a:xfrm>
+          <a:off x="0" y="0"/>
+          <a:ext cx="0" cy="0"/>
+          <a:chOff x="0" y="0"/>
+          <a:chExt cx="0" cy="0"/>
+        </a:xfrm>
+      </p:grpSpPr>
+      <p:sp>
+        <p:nvSpPr>
+          <p:cNvPr id="4" name="Title 3">
+            <a:extLst>
+              <a:ext uri="{FF2B5EF4-FFF2-40B4-BE49-F238E27FC236}">
+                <a16:creationId xmlns:a16="http://schemas.microsoft.com/office/drawing/2014/main" id="{59A013BF-0ECE-4D49-82A7-54CD04597FAB}"/>
+              </a:ext>
+            </a:extLst>
+          </p:cNvPr>
+          <p:cNvSpPr>
+            <a:spLocks noGrp="1"/>
+          </p:cNvSpPr>
+          <p:nvPr>
+            <p:ph type="title"/>
+          </p:nvPr>
+        </p:nvSpPr>
+        <p:spPr/>
+        <p:txBody>
+          <a:bodyPr/>
+          <a:lstStyle/>
+          <a:p>
+            <a:r>
+              <a:rPr lang="he-IL" dirty="0"/>
+              <a:t>מה בדקנו?</a:t>
+            </a:r>
+            <a:endParaRPr lang="en-IL" dirty="0"/>
+          </a:p>
+        </p:txBody>
+      </p:sp>
+      <p:sp>
+        <p:nvSpPr>
+          <p:cNvPr id="6" name="Text Placeholder 5">
+            <a:extLst>
+              <a:ext uri="{FF2B5EF4-FFF2-40B4-BE49-F238E27FC236}">
+                <a16:creationId xmlns:a16="http://schemas.microsoft.com/office/drawing/2014/main" id="{C3FE6766-65AE-404B-9000-3D580CAED7EC}"/>
+              </a:ext>
+            </a:extLst>
+          </p:cNvPr>
+          <p:cNvSpPr>
+            <a:spLocks noGrp="1"/>
+          </p:cNvSpPr>
+          <p:nvPr>
+            <p:ph type="body" idx="1"/>
+          </p:nvPr>
+        </p:nvSpPr>
+        <p:spPr/>
+        <p:txBody>
+          <a:bodyPr>
+            <a:normAutofit fontScale="92500"/>
+          </a:bodyPr>
+          <a:lstStyle/>
+          <a:p>
+            <a:r>
+              <a:rPr lang="he-IL" dirty="0"/>
+              <a:t>עו"ד </a:t>
+            </a:r>
+            <a:r>
+              <a:rPr lang="he-IL" sz="2200" dirty="0"/>
+              <a:t>(עסקו בתובענות ייצוגיות, כ-200 משיבים)</a:t>
+            </a:r>
+            <a:endParaRPr lang="en-IL" sz="2200" dirty="0"/>
+          </a:p>
+        </p:txBody>
+      </p:sp>
+      <p:sp>
+        <p:nvSpPr>
+          <p:cNvPr id="7" name="Content Placeholder 6">
+            <a:extLst>
+              <a:ext uri="{FF2B5EF4-FFF2-40B4-BE49-F238E27FC236}">
+                <a16:creationId xmlns:a16="http://schemas.microsoft.com/office/drawing/2014/main" id="{24F0CF8E-B502-420F-B719-E86CF7C06E9A}"/>
+              </a:ext>
+            </a:extLst>
+          </p:cNvPr>
+          <p:cNvSpPr>
+            <a:spLocks noGrp="1"/>
+          </p:cNvSpPr>
+          <p:nvPr>
+            <p:ph sz="half" idx="2"/>
+          </p:nvPr>
+        </p:nvSpPr>
+        <p:spPr/>
+        <p:txBody>
+          <a:bodyPr>
+            <a:normAutofit lnSpcReduction="10000"/>
+          </a:bodyPr>
+          <a:lstStyle/>
+          <a:p>
+            <a:r>
+              <a:rPr lang="he-IL" dirty="0"/>
+              <a:t>משרדים מובילים</a:t>
+            </a:r>
+          </a:p>
+          <a:p>
+            <a:pPr lvl="1"/>
+            <a:r>
+              <a:rPr lang="he-IL" dirty="0"/>
+              <a:t>באיכות התובענות</a:t>
+            </a:r>
+          </a:p>
+          <a:p>
+            <a:pPr lvl="1"/>
+            <a:r>
+              <a:rPr lang="he-IL" dirty="0"/>
+              <a:t>באיכות הייצוג</a:t>
+            </a:r>
+          </a:p>
+          <a:p>
+            <a:r>
+              <a:rPr lang="he-IL" dirty="0"/>
+              <a:t>שופטים</a:t>
+            </a:r>
+          </a:p>
+          <a:p>
+            <a:pPr lvl="1"/>
+            <a:r>
+              <a:rPr lang="he-IL" dirty="0"/>
+              <a:t>אוהדים</a:t>
+            </a:r>
+          </a:p>
+          <a:p>
+            <a:pPr lvl="1"/>
+            <a:r>
+              <a:rPr lang="he-IL" dirty="0"/>
+              <a:t>מתנגדים</a:t>
+            </a:r>
+          </a:p>
+          <a:p>
+            <a:r>
+              <a:rPr lang="he-IL" dirty="0"/>
+              <a:t>בתי דין</a:t>
+            </a:r>
+          </a:p>
+          <a:p>
+            <a:r>
+              <a:rPr lang="he-IL" dirty="0"/>
+              <a:t>שכר טרחה, העדפות בנושא התגמול</a:t>
+            </a:r>
+          </a:p>
+          <a:p>
+            <a:r>
+              <a:rPr lang="he-IL" dirty="0"/>
+              <a:t>תחומים שבהם שכר הטרחה הכי משתלם</a:t>
+            </a:r>
+          </a:p>
+          <a:p>
+            <a:r>
+              <a:rPr lang="he-IL" dirty="0"/>
+              <a:t>ועוד...</a:t>
+            </a:r>
+            <a:endParaRPr lang="en-IL" dirty="0"/>
+          </a:p>
+        </p:txBody>
+      </p:sp>
+      <p:sp>
+        <p:nvSpPr>
+          <p:cNvPr id="8" name="Text Placeholder 7">
+            <a:extLst>
+              <a:ext uri="{FF2B5EF4-FFF2-40B4-BE49-F238E27FC236}">
+                <a16:creationId xmlns:a16="http://schemas.microsoft.com/office/drawing/2014/main" id="{BF4DBBCD-15C8-4957-AB41-4944473C6111}"/>
+              </a:ext>
+            </a:extLst>
+          </p:cNvPr>
+          <p:cNvSpPr>
+            <a:spLocks noGrp="1"/>
+          </p:cNvSpPr>
+          <p:nvPr>
+            <p:ph type="body" sz="quarter" idx="3"/>
+          </p:nvPr>
+        </p:nvSpPr>
+        <p:spPr/>
+        <p:txBody>
+          <a:bodyPr>
+            <a:normAutofit fontScale="92500"/>
+          </a:bodyPr>
+          <a:lstStyle/>
+          <a:p>
+            <a:r>
+              <a:rPr lang="he-IL" dirty="0"/>
+              <a:t>בציבור הכללי (500 משיבים)</a:t>
+            </a:r>
+            <a:endParaRPr lang="en-IL" dirty="0"/>
+          </a:p>
+        </p:txBody>
+      </p:sp>
+      <p:sp>
+        <p:nvSpPr>
+          <p:cNvPr id="9" name="Content Placeholder 8">
+            <a:extLst>
+              <a:ext uri="{FF2B5EF4-FFF2-40B4-BE49-F238E27FC236}">
+                <a16:creationId xmlns:a16="http://schemas.microsoft.com/office/drawing/2014/main" id="{3947E5E5-81D0-4BD9-97C2-6F77E877BA05}"/>
+              </a:ext>
+            </a:extLst>
+          </p:cNvPr>
+          <p:cNvSpPr>
+            <a:spLocks noGrp="1"/>
+          </p:cNvSpPr>
+          <p:nvPr>
+            <p:ph sz="quarter" idx="4"/>
+          </p:nvPr>
+        </p:nvSpPr>
+        <p:spPr/>
+        <p:txBody>
+          <a:bodyPr>
+            <a:normAutofit lnSpcReduction="10000"/>
+          </a:bodyPr>
+          <a:lstStyle/>
+          <a:p>
+            <a:r>
+              <a:rPr lang="he-IL" dirty="0"/>
+              <a:t>איך תופסים / מבינים תובענות</a:t>
+            </a:r>
+          </a:p>
+          <a:p>
+            <a:r>
+              <a:rPr lang="he-IL" dirty="0"/>
+              <a:t>מודעות וידע, חשיפה</a:t>
+            </a:r>
+          </a:p>
+          <a:p>
+            <a:r>
+              <a:rPr lang="he-IL" dirty="0"/>
+              <a:t>הגנה על זכויות הציבור</a:t>
+            </a:r>
+          </a:p>
+          <a:p>
+            <a:r>
+              <a:rPr lang="he-IL" dirty="0"/>
+              <a:t>פיצוי שהתקבל (זכירות)</a:t>
+            </a:r>
+          </a:p>
+          <a:p>
+            <a:r>
+              <a:rPr lang="he-IL" dirty="0"/>
+              <a:t>פיצוי מועדף ואופן קבלה</a:t>
+            </a:r>
+          </a:p>
+          <a:p>
+            <a:r>
+              <a:rPr lang="he-IL" dirty="0"/>
+              <a:t>תחומים בהם היו רוצים להגיש</a:t>
+            </a:r>
+          </a:p>
+          <a:p>
+            <a:r>
+              <a:rPr lang="he-IL" dirty="0"/>
+              <a:t>הצהרת כוונות</a:t>
+            </a:r>
+          </a:p>
+          <a:p>
+            <a:pPr lvl="1"/>
+            <a:r>
+              <a:rPr lang="he-IL" dirty="0"/>
+              <a:t>אגרות</a:t>
+            </a:r>
+          </a:p>
+          <a:p>
+            <a:r>
+              <a:rPr lang="he-IL" dirty="0"/>
+              <a:t>ועוד...</a:t>
+            </a:r>
+          </a:p>
+        </p:txBody>
+      </p:sp>
+      <p:sp>
+        <p:nvSpPr>
+          <p:cNvPr id="10" name="Slide Number Placeholder 9">
+            <a:extLst>
+              <a:ext uri="{FF2B5EF4-FFF2-40B4-BE49-F238E27FC236}">
+                <a16:creationId xmlns:a16="http://schemas.microsoft.com/office/drawing/2014/main" id="{A1AE5B23-8F72-4FC4-9F62-2161BAA5D751}"/>
+              </a:ext>
+            </a:extLst>
+          </p:cNvPr>
+          <p:cNvSpPr>
+            <a:spLocks noGrp="1"/>
+          </p:cNvSpPr>
+          <p:nvPr>
+            <p:ph type="sldNum" sz="quarter" idx="12"/>
+          </p:nvPr>
+        </p:nvSpPr>
+        <p:spPr/>
+        <p:txBody>
+          <a:bodyPr/>
+          <a:lstStyle/>
+          <a:p>
+            <a:fld id="{48C2FE54-953E-4268-8452-225DF8E36AC9}" type="slidenum">
+              <a:rPr lang="he-IL" smtClean="0"/>
+              <a:t>2</a:t>
+            </a:fld>
+            <a:endParaRPr lang="he-IL"/>
+          </a:p>
+        </p:txBody>
+      </p:sp>
+    </p:spTree>
+    <p:extLst>
+      <p:ext uri="{BB962C8B-B14F-4D97-AF65-F5344CB8AC3E}">
+        <p14:creationId xmlns:p14="http://schemas.microsoft.com/office/powerpoint/2010/main" val="357464988"/>
+      </p:ext>
+    </p:extLst>
+  </p:cSld>
+  <p:clrMapOvr>
+    <a:masterClrMapping/>
+  </p:clrMapOvr>
+</p:sld>
+</file>
+
+<file path=ppt/slides/slide20.xml><?xml version="1.0" encoding="utf-8"?>
 <p:sld xmlns:a="http://schemas.openxmlformats.org/drawingml/2006/main" xmlns:r="http://schemas.openxmlformats.org/officeDocument/2006/relationships" xmlns:p="http://schemas.openxmlformats.org/presentationml/2006/main" show="0">
   <p:cSld>
     <p:spTree>
@@ -6183,7 +7889,7 @@
           <a:p>
             <a:fld id="{48C2FE54-953E-4268-8452-225DF8E36AC9}" type="slidenum">
               <a:rPr lang="he-IL" smtClean="0"/>
-              <a:t>18</a:t>
+              <a:t>20</a:t>
             </a:fld>
             <a:endParaRPr lang="he-IL"/>
           </a:p>
@@ -6243,7 +7949,7 @@
 </p:sld>
 </file>
 
-<file path=ppt/slides/slide19.xml><?xml version="1.0" encoding="utf-8"?>
+<file path=ppt/slides/slide21.xml><?xml version="1.0" encoding="utf-8"?>
 <p:sld xmlns:a="http://schemas.openxmlformats.org/drawingml/2006/main" xmlns:r="http://schemas.openxmlformats.org/officeDocument/2006/relationships" xmlns:p="http://schemas.openxmlformats.org/presentationml/2006/main">
   <p:cSld>
     <p:spTree>
@@ -6314,7 +8020,7 @@
           <a:p>
             <a:fld id="{48C2FE54-953E-4268-8452-225DF8E36AC9}" type="slidenum">
               <a:rPr lang="he-IL" smtClean="0"/>
-              <a:t>19</a:t>
+              <a:t>21</a:t>
             </a:fld>
             <a:endParaRPr lang="he-IL"/>
           </a:p>
@@ -6363,10 +8069,10 @@
       </p:pic>
       <p:pic>
         <p:nvPicPr>
-          <p:cNvPr id="27" name="Content Placeholder 26">
-            <a:extLst>
-              <a:ext uri="{FF2B5EF4-FFF2-40B4-BE49-F238E27FC236}">
-                <a16:creationId xmlns:a16="http://schemas.microsoft.com/office/drawing/2014/main" id="{88DF7759-6FF1-4273-B4FE-31CACB708529}"/>
+          <p:cNvPr id="9" name="Content Placeholder 8">
+            <a:extLst>
+              <a:ext uri="{FF2B5EF4-FFF2-40B4-BE49-F238E27FC236}">
+                <a16:creationId xmlns:a16="http://schemas.microsoft.com/office/drawing/2014/main" id="{24100A9E-D1F9-419D-A4AB-E2B1E800B813}"/>
               </a:ext>
             </a:extLst>
           </p:cNvPr>
@@ -6406,6 +8112,42 @@
           </a:xfrm>
         </p:spPr>
       </p:pic>
+      <p:sp>
+        <p:nvSpPr>
+          <p:cNvPr id="10" name="TextBox 9">
+            <a:extLst>
+              <a:ext uri="{FF2B5EF4-FFF2-40B4-BE49-F238E27FC236}">
+                <a16:creationId xmlns:a16="http://schemas.microsoft.com/office/drawing/2014/main" id="{647B444F-7893-4FB7-94BE-BCFD0346C0FD}"/>
+              </a:ext>
+            </a:extLst>
+          </p:cNvPr>
+          <p:cNvSpPr txBox="1"/>
+          <p:nvPr/>
+        </p:nvSpPr>
+        <p:spPr>
+          <a:xfrm>
+            <a:off x="4799856" y="5517232"/>
+            <a:ext cx="6695687" cy="261610"/>
+          </a:xfrm>
+          <a:prstGeom prst="rect">
+            <a:avLst/>
+          </a:prstGeom>
+          <a:noFill/>
+        </p:spPr>
+        <p:txBody>
+          <a:bodyPr wrap="square" rtlCol="0">
+            <a:spAutoFit/>
+          </a:bodyPr>
+          <a:lstStyle/>
+          <a:p>
+            <a:r>
+              <a:rPr lang="he-IL" sz="1100" dirty="0"/>
+              <a:t>סכום האחוזים מעל 100% משום שניתן היה לבחור ביותר מתשובה אחת.</a:t>
+            </a:r>
+            <a:endParaRPr lang="en-IL" sz="1100" dirty="0"/>
+          </a:p>
+        </p:txBody>
+      </p:sp>
     </p:spTree>
     <p:extLst>
       <p:ext uri="{BB962C8B-B14F-4D97-AF65-F5344CB8AC3E}">
@@ -6419,329 +8161,7 @@
 </p:sld>
 </file>
 
-<file path=ppt/slides/slide2.xml><?xml version="1.0" encoding="utf-8"?>
-<p:sld xmlns:a="http://schemas.openxmlformats.org/drawingml/2006/main" xmlns:r="http://schemas.openxmlformats.org/officeDocument/2006/relationships" xmlns:p="http://schemas.openxmlformats.org/presentationml/2006/main">
-  <p:cSld>
-    <p:spTree>
-      <p:nvGrpSpPr>
-        <p:cNvPr id="1" name=""/>
-        <p:cNvGrpSpPr/>
-        <p:nvPr/>
-      </p:nvGrpSpPr>
-      <p:grpSpPr>
-        <a:xfrm>
-          <a:off x="0" y="0"/>
-          <a:ext cx="0" cy="0"/>
-          <a:chOff x="0" y="0"/>
-          <a:chExt cx="0" cy="0"/>
-        </a:xfrm>
-      </p:grpSpPr>
-      <p:sp>
-        <p:nvSpPr>
-          <p:cNvPr id="4" name="Title 3">
-            <a:extLst>
-              <a:ext uri="{FF2B5EF4-FFF2-40B4-BE49-F238E27FC236}">
-                <a16:creationId xmlns:a16="http://schemas.microsoft.com/office/drawing/2014/main" id="{59A013BF-0ECE-4D49-82A7-54CD04597FAB}"/>
-              </a:ext>
-            </a:extLst>
-          </p:cNvPr>
-          <p:cNvSpPr>
-            <a:spLocks noGrp="1"/>
-          </p:cNvSpPr>
-          <p:nvPr>
-            <p:ph type="title"/>
-          </p:nvPr>
-        </p:nvSpPr>
-        <p:spPr/>
-        <p:txBody>
-          <a:bodyPr/>
-          <a:lstStyle/>
-          <a:p>
-            <a:r>
-              <a:rPr lang="he-IL" dirty="0"/>
-              <a:t>מה בדקנו?</a:t>
-            </a:r>
-            <a:endParaRPr lang="en-IL" dirty="0"/>
-          </a:p>
-        </p:txBody>
-      </p:sp>
-      <p:sp>
-        <p:nvSpPr>
-          <p:cNvPr id="6" name="Text Placeholder 5">
-            <a:extLst>
-              <a:ext uri="{FF2B5EF4-FFF2-40B4-BE49-F238E27FC236}">
-                <a16:creationId xmlns:a16="http://schemas.microsoft.com/office/drawing/2014/main" id="{C3FE6766-65AE-404B-9000-3D580CAED7EC}"/>
-              </a:ext>
-            </a:extLst>
-          </p:cNvPr>
-          <p:cNvSpPr>
-            <a:spLocks noGrp="1"/>
-          </p:cNvSpPr>
-          <p:nvPr>
-            <p:ph type="body" idx="1"/>
-          </p:nvPr>
-        </p:nvSpPr>
-        <p:spPr/>
-        <p:txBody>
-          <a:bodyPr>
-            <a:normAutofit fontScale="92500"/>
-          </a:bodyPr>
-          <a:lstStyle/>
-          <a:p>
-            <a:r>
-              <a:rPr lang="he-IL" dirty="0"/>
-              <a:t>עו"ד </a:t>
-            </a:r>
-            <a:r>
-              <a:rPr lang="he-IL" sz="2200" dirty="0"/>
-              <a:t>(עסקו בתובענות ייצוגיות, כ-200 משיבים)</a:t>
-            </a:r>
-            <a:endParaRPr lang="en-IL" sz="2200" dirty="0"/>
-          </a:p>
-        </p:txBody>
-      </p:sp>
-      <p:sp>
-        <p:nvSpPr>
-          <p:cNvPr id="7" name="Content Placeholder 6">
-            <a:extLst>
-              <a:ext uri="{FF2B5EF4-FFF2-40B4-BE49-F238E27FC236}">
-                <a16:creationId xmlns:a16="http://schemas.microsoft.com/office/drawing/2014/main" id="{24F0CF8E-B502-420F-B719-E86CF7C06E9A}"/>
-              </a:ext>
-            </a:extLst>
-          </p:cNvPr>
-          <p:cNvSpPr>
-            <a:spLocks noGrp="1"/>
-          </p:cNvSpPr>
-          <p:nvPr>
-            <p:ph sz="half" idx="2"/>
-          </p:nvPr>
-        </p:nvSpPr>
-        <p:spPr/>
-        <p:txBody>
-          <a:bodyPr>
-            <a:normAutofit lnSpcReduction="10000"/>
-          </a:bodyPr>
-          <a:lstStyle/>
-          <a:p>
-            <a:r>
-              <a:rPr lang="he-IL" dirty="0"/>
-              <a:t>משרדים מובילים</a:t>
-            </a:r>
-          </a:p>
-          <a:p>
-            <a:pPr lvl="1"/>
-            <a:r>
-              <a:rPr lang="he-IL" dirty="0"/>
-              <a:t>באיכות התובענות</a:t>
-            </a:r>
-          </a:p>
-          <a:p>
-            <a:pPr lvl="1"/>
-            <a:r>
-              <a:rPr lang="he-IL" dirty="0"/>
-              <a:t>באיכות הייצוג</a:t>
-            </a:r>
-          </a:p>
-          <a:p>
-            <a:r>
-              <a:rPr lang="he-IL" dirty="0"/>
-              <a:t>שופטים</a:t>
-            </a:r>
-          </a:p>
-          <a:p>
-            <a:pPr lvl="1"/>
-            <a:r>
-              <a:rPr lang="he-IL" dirty="0"/>
-              <a:t>אוהדים</a:t>
-            </a:r>
-          </a:p>
-          <a:p>
-            <a:pPr lvl="1"/>
-            <a:r>
-              <a:rPr lang="he-IL" dirty="0"/>
-              <a:t>מתנגדים</a:t>
-            </a:r>
-          </a:p>
-          <a:p>
-            <a:r>
-              <a:rPr lang="he-IL" dirty="0"/>
-              <a:t>בתי דין</a:t>
-            </a:r>
-          </a:p>
-          <a:p>
-            <a:r>
-              <a:rPr lang="he-IL" dirty="0"/>
-              <a:t>שכר טרחה, העדפות בנושא התגמול</a:t>
-            </a:r>
-          </a:p>
-          <a:p>
-            <a:r>
-              <a:rPr lang="he-IL" dirty="0"/>
-              <a:t>תחומים שבהם שכר הטרחה הכי משתלם</a:t>
-            </a:r>
-          </a:p>
-          <a:p>
-            <a:r>
-              <a:rPr lang="he-IL" dirty="0"/>
-              <a:t>ועוד...</a:t>
-            </a:r>
-            <a:endParaRPr lang="en-IL" dirty="0"/>
-          </a:p>
-        </p:txBody>
-      </p:sp>
-      <p:sp>
-        <p:nvSpPr>
-          <p:cNvPr id="8" name="Text Placeholder 7">
-            <a:extLst>
-              <a:ext uri="{FF2B5EF4-FFF2-40B4-BE49-F238E27FC236}">
-                <a16:creationId xmlns:a16="http://schemas.microsoft.com/office/drawing/2014/main" id="{BF4DBBCD-15C8-4957-AB41-4944473C6111}"/>
-              </a:ext>
-            </a:extLst>
-          </p:cNvPr>
-          <p:cNvSpPr>
-            <a:spLocks noGrp="1"/>
-          </p:cNvSpPr>
-          <p:nvPr>
-            <p:ph type="body" sz="quarter" idx="3"/>
-          </p:nvPr>
-        </p:nvSpPr>
-        <p:spPr/>
-        <p:txBody>
-          <a:bodyPr>
-            <a:normAutofit fontScale="92500"/>
-          </a:bodyPr>
-          <a:lstStyle/>
-          <a:p>
-            <a:r>
-              <a:rPr lang="he-IL" dirty="0"/>
-              <a:t>בציבור הכללי (500 משיבים)</a:t>
-            </a:r>
-            <a:endParaRPr lang="en-IL" dirty="0"/>
-          </a:p>
-        </p:txBody>
-      </p:sp>
-      <p:sp>
-        <p:nvSpPr>
-          <p:cNvPr id="9" name="Content Placeholder 8">
-            <a:extLst>
-              <a:ext uri="{FF2B5EF4-FFF2-40B4-BE49-F238E27FC236}">
-                <a16:creationId xmlns:a16="http://schemas.microsoft.com/office/drawing/2014/main" id="{3947E5E5-81D0-4BD9-97C2-6F77E877BA05}"/>
-              </a:ext>
-            </a:extLst>
-          </p:cNvPr>
-          <p:cNvSpPr>
-            <a:spLocks noGrp="1"/>
-          </p:cNvSpPr>
-          <p:nvPr>
-            <p:ph sz="quarter" idx="4"/>
-          </p:nvPr>
-        </p:nvSpPr>
-        <p:spPr/>
-        <p:txBody>
-          <a:bodyPr>
-            <a:normAutofit lnSpcReduction="10000"/>
-          </a:bodyPr>
-          <a:lstStyle/>
-          <a:p>
-            <a:r>
-              <a:rPr lang="he-IL" dirty="0"/>
-              <a:t>איך תופסים / מבינים תובענות</a:t>
-            </a:r>
-          </a:p>
-          <a:p>
-            <a:r>
-              <a:rPr lang="he-IL" dirty="0"/>
-              <a:t>מודעות וידע, חשיפה</a:t>
-            </a:r>
-          </a:p>
-          <a:p>
-            <a:r>
-              <a:rPr lang="he-IL" dirty="0"/>
-              <a:t>הגנה על זכויות הציבור</a:t>
-            </a:r>
-          </a:p>
-          <a:p>
-            <a:r>
-              <a:rPr lang="he-IL" dirty="0"/>
-              <a:t>פיצוי שהתקבל (זכירות)</a:t>
-            </a:r>
-          </a:p>
-          <a:p>
-            <a:r>
-              <a:rPr lang="he-IL" dirty="0"/>
-              <a:t>פיצוי מועדף ואופן קבלה</a:t>
-            </a:r>
-          </a:p>
-          <a:p>
-            <a:r>
-              <a:rPr lang="he-IL" dirty="0"/>
-              <a:t>תחומים בהם היו רוצים להגיש</a:t>
-            </a:r>
-          </a:p>
-          <a:p>
-            <a:r>
-              <a:rPr lang="he-IL" dirty="0"/>
-              <a:t>הצהרת כוונות</a:t>
-            </a:r>
-          </a:p>
-          <a:p>
-            <a:pPr lvl="1"/>
-            <a:r>
-              <a:rPr lang="he-IL" dirty="0"/>
-              <a:t>אגרות</a:t>
-            </a:r>
-          </a:p>
-          <a:p>
-            <a:r>
-              <a:rPr lang="he-IL" dirty="0"/>
-              <a:t>ועוד...</a:t>
-            </a:r>
-          </a:p>
-        </p:txBody>
-      </p:sp>
-      <p:sp>
-        <p:nvSpPr>
-          <p:cNvPr id="10" name="Slide Number Placeholder 9">
-            <a:extLst>
-              <a:ext uri="{FF2B5EF4-FFF2-40B4-BE49-F238E27FC236}">
-                <a16:creationId xmlns:a16="http://schemas.microsoft.com/office/drawing/2014/main" id="{A1AE5B23-8F72-4FC4-9F62-2161BAA5D751}"/>
-              </a:ext>
-            </a:extLst>
-          </p:cNvPr>
-          <p:cNvSpPr>
-            <a:spLocks noGrp="1"/>
-          </p:cNvSpPr>
-          <p:nvPr>
-            <p:ph type="sldNum" sz="quarter" idx="12"/>
-          </p:nvPr>
-        </p:nvSpPr>
-        <p:spPr/>
-        <p:txBody>
-          <a:bodyPr/>
-          <a:lstStyle/>
-          <a:p>
-            <a:fld id="{48C2FE54-953E-4268-8452-225DF8E36AC9}" type="slidenum">
-              <a:rPr lang="he-IL" smtClean="0"/>
-              <a:t>2</a:t>
-            </a:fld>
-            <a:endParaRPr lang="he-IL"/>
-          </a:p>
-        </p:txBody>
-      </p:sp>
-    </p:spTree>
-    <p:extLst>
-      <p:ext uri="{BB962C8B-B14F-4D97-AF65-F5344CB8AC3E}">
-        <p14:creationId xmlns:p14="http://schemas.microsoft.com/office/powerpoint/2010/main" val="357464988"/>
-      </p:ext>
-    </p:extLst>
-  </p:cSld>
-  <p:clrMapOvr>
-    <a:masterClrMapping/>
-  </p:clrMapOvr>
-</p:sld>
-</file>
-
-<file path=ppt/slides/slide20.xml><?xml version="1.0" encoding="utf-8"?>
+<file path=ppt/slides/slide22.xml><?xml version="1.0" encoding="utf-8"?>
 <p:sld xmlns:a="http://schemas.openxmlformats.org/drawingml/2006/main" xmlns:r="http://schemas.openxmlformats.org/officeDocument/2006/relationships" xmlns:p="http://schemas.openxmlformats.org/presentationml/2006/main" show="0">
   <p:cSld>
     <p:spTree>
@@ -6812,7 +8232,7 @@
           <a:p>
             <a:fld id="{48C2FE54-953E-4268-8452-225DF8E36AC9}" type="slidenum">
               <a:rPr lang="he-IL" smtClean="0"/>
-              <a:t>20</a:t>
+              <a:t>22</a:t>
             </a:fld>
             <a:endParaRPr lang="he-IL"/>
           </a:p>
@@ -6917,7 +8337,7 @@
 </p:sld>
 </file>
 
-<file path=ppt/slides/slide21.xml><?xml version="1.0" encoding="utf-8"?>
+<file path=ppt/slides/slide23.xml><?xml version="1.0" encoding="utf-8"?>
 <p:sld xmlns:a="http://schemas.openxmlformats.org/drawingml/2006/main" xmlns:r="http://schemas.openxmlformats.org/officeDocument/2006/relationships" xmlns:p="http://schemas.openxmlformats.org/presentationml/2006/main">
   <p:cSld>
     <p:spTree>
@@ -6988,7 +8408,7 @@
           <a:p>
             <a:fld id="{48C2FE54-953E-4268-8452-225DF8E36AC9}" type="slidenum">
               <a:rPr lang="he-IL" smtClean="0"/>
-              <a:t>21</a:t>
+              <a:t>23</a:t>
             </a:fld>
             <a:endParaRPr lang="he-IL"/>
           </a:p>
@@ -7037,10 +8457,10 @@
       </p:pic>
       <p:pic>
         <p:nvPicPr>
-          <p:cNvPr id="6" name="Picture 5">
-            <a:extLst>
-              <a:ext uri="{FF2B5EF4-FFF2-40B4-BE49-F238E27FC236}">
-                <a16:creationId xmlns:a16="http://schemas.microsoft.com/office/drawing/2014/main" id="{EC8D3832-27CB-4A01-A633-8F1FE6B87EB0}"/>
+          <p:cNvPr id="11" name="Picture 10">
+            <a:extLst>
+              <a:ext uri="{FF2B5EF4-FFF2-40B4-BE49-F238E27FC236}">
+                <a16:creationId xmlns:a16="http://schemas.microsoft.com/office/drawing/2014/main" id="{ED583CE3-36A0-492F-A0A3-B7B49FC1E45E}"/>
               </a:ext>
             </a:extLst>
           </p:cNvPr>
@@ -7094,7 +8514,7 @@
 </p:sld>
 </file>
 
-<file path=ppt/slides/slide22.xml><?xml version="1.0" encoding="utf-8"?>
+<file path=ppt/slides/slide24.xml><?xml version="1.0" encoding="utf-8"?>
 <p:sld xmlns:a="http://schemas.openxmlformats.org/drawingml/2006/main" xmlns:r="http://schemas.openxmlformats.org/officeDocument/2006/relationships" xmlns:p="http://schemas.openxmlformats.org/presentationml/2006/main">
   <p:cSld>
     <p:spTree>
@@ -7113,226 +8533,6 @@
       </p:grpSpPr>
       <p:sp>
         <p:nvSpPr>
-          <p:cNvPr id="14" name="Rectangle: Rounded Corners 13">
-            <a:extLst>
-              <a:ext uri="{FF2B5EF4-FFF2-40B4-BE49-F238E27FC236}">
-                <a16:creationId xmlns:a16="http://schemas.microsoft.com/office/drawing/2014/main" id="{36D46471-166B-4DA0-B1A7-B7B8EF13A0B2}"/>
-              </a:ext>
-            </a:extLst>
-          </p:cNvPr>
-          <p:cNvSpPr/>
-          <p:nvPr/>
-        </p:nvSpPr>
-        <p:spPr>
-          <a:xfrm>
-            <a:off x="3143672" y="1844824"/>
-            <a:ext cx="7992888" cy="504056"/>
-          </a:xfrm>
-          <a:prstGeom prst="roundRect">
-            <a:avLst/>
-          </a:prstGeom>
-        </p:spPr>
-        <p:style>
-          <a:lnRef idx="1">
-            <a:schemeClr val="accent6"/>
-          </a:lnRef>
-          <a:fillRef idx="2">
-            <a:schemeClr val="accent6"/>
-          </a:fillRef>
-          <a:effectRef idx="1">
-            <a:schemeClr val="accent6"/>
-          </a:effectRef>
-          <a:fontRef idx="minor">
-            <a:schemeClr val="dk1"/>
-          </a:fontRef>
-        </p:style>
-        <p:txBody>
-          <a:bodyPr rtlCol="0" anchor="ctr"/>
-          <a:lstStyle/>
-          <a:p>
-            <a:pPr algn="ctr"/>
-            <a:endParaRPr lang="en-IL"/>
-          </a:p>
-        </p:txBody>
-      </p:sp>
-      <p:sp>
-        <p:nvSpPr>
-          <p:cNvPr id="15" name="Rectangle: Rounded Corners 14">
-            <a:extLst>
-              <a:ext uri="{FF2B5EF4-FFF2-40B4-BE49-F238E27FC236}">
-                <a16:creationId xmlns:a16="http://schemas.microsoft.com/office/drawing/2014/main" id="{A9F07A7F-17E8-4A35-94B6-FB60F9C434B2}"/>
-              </a:ext>
-            </a:extLst>
-          </p:cNvPr>
-          <p:cNvSpPr/>
-          <p:nvPr/>
-        </p:nvSpPr>
-        <p:spPr>
-          <a:xfrm>
-            <a:off x="3143672" y="2780928"/>
-            <a:ext cx="7992888" cy="504056"/>
-          </a:xfrm>
-          <a:prstGeom prst="roundRect">
-            <a:avLst/>
-          </a:prstGeom>
-        </p:spPr>
-        <p:style>
-          <a:lnRef idx="1">
-            <a:schemeClr val="accent6"/>
-          </a:lnRef>
-          <a:fillRef idx="2">
-            <a:schemeClr val="accent6"/>
-          </a:fillRef>
-          <a:effectRef idx="1">
-            <a:schemeClr val="accent6"/>
-          </a:effectRef>
-          <a:fontRef idx="minor">
-            <a:schemeClr val="dk1"/>
-          </a:fontRef>
-        </p:style>
-        <p:txBody>
-          <a:bodyPr rtlCol="0" anchor="ctr"/>
-          <a:lstStyle/>
-          <a:p>
-            <a:pPr algn="ctr"/>
-            <a:endParaRPr lang="en-IL"/>
-          </a:p>
-        </p:txBody>
-      </p:sp>
-      <p:sp>
-        <p:nvSpPr>
-          <p:cNvPr id="17" name="Rectangle: Rounded Corners 16">
-            <a:extLst>
-              <a:ext uri="{FF2B5EF4-FFF2-40B4-BE49-F238E27FC236}">
-                <a16:creationId xmlns:a16="http://schemas.microsoft.com/office/drawing/2014/main" id="{1607CFB5-2362-4D28-8F8C-58791EABBE65}"/>
-              </a:ext>
-            </a:extLst>
-          </p:cNvPr>
-          <p:cNvSpPr/>
-          <p:nvPr/>
-        </p:nvSpPr>
-        <p:spPr>
-          <a:xfrm>
-            <a:off x="3143672" y="3284984"/>
-            <a:ext cx="7992888" cy="504056"/>
-          </a:xfrm>
-          <a:prstGeom prst="roundRect">
-            <a:avLst/>
-          </a:prstGeom>
-        </p:spPr>
-        <p:style>
-          <a:lnRef idx="1">
-            <a:schemeClr val="accent6"/>
-          </a:lnRef>
-          <a:fillRef idx="2">
-            <a:schemeClr val="accent6"/>
-          </a:fillRef>
-          <a:effectRef idx="1">
-            <a:schemeClr val="accent6"/>
-          </a:effectRef>
-          <a:fontRef idx="minor">
-            <a:schemeClr val="dk1"/>
-          </a:fontRef>
-        </p:style>
-        <p:txBody>
-          <a:bodyPr rtlCol="0" anchor="ctr"/>
-          <a:lstStyle/>
-          <a:p>
-            <a:pPr algn="ctr"/>
-            <a:endParaRPr lang="en-IL"/>
-          </a:p>
-        </p:txBody>
-      </p:sp>
-      <p:sp>
-        <p:nvSpPr>
-          <p:cNvPr id="18" name="Rectangle: Rounded Corners 17">
-            <a:extLst>
-              <a:ext uri="{FF2B5EF4-FFF2-40B4-BE49-F238E27FC236}">
-                <a16:creationId xmlns:a16="http://schemas.microsoft.com/office/drawing/2014/main" id="{E7BBB1B0-7773-4643-B92E-EAAE5728BEDF}"/>
-              </a:ext>
-            </a:extLst>
-          </p:cNvPr>
-          <p:cNvSpPr/>
-          <p:nvPr/>
-        </p:nvSpPr>
-        <p:spPr>
-          <a:xfrm>
-            <a:off x="3143672" y="4244764"/>
-            <a:ext cx="7992888" cy="504056"/>
-          </a:xfrm>
-          <a:prstGeom prst="roundRect">
-            <a:avLst/>
-          </a:prstGeom>
-        </p:spPr>
-        <p:style>
-          <a:lnRef idx="1">
-            <a:schemeClr val="accent6"/>
-          </a:lnRef>
-          <a:fillRef idx="2">
-            <a:schemeClr val="accent6"/>
-          </a:fillRef>
-          <a:effectRef idx="1">
-            <a:schemeClr val="accent6"/>
-          </a:effectRef>
-          <a:fontRef idx="minor">
-            <a:schemeClr val="dk1"/>
-          </a:fontRef>
-        </p:style>
-        <p:txBody>
-          <a:bodyPr rtlCol="0" anchor="ctr"/>
-          <a:lstStyle/>
-          <a:p>
-            <a:pPr algn="ctr"/>
-            <a:endParaRPr lang="en-IL"/>
-          </a:p>
-        </p:txBody>
-      </p:sp>
-      <p:sp>
-        <p:nvSpPr>
-          <p:cNvPr id="19" name="Rectangle: Rounded Corners 18">
-            <a:extLst>
-              <a:ext uri="{FF2B5EF4-FFF2-40B4-BE49-F238E27FC236}">
-                <a16:creationId xmlns:a16="http://schemas.microsoft.com/office/drawing/2014/main" id="{8C5C72A6-E445-48EC-89BD-A50E34663AEB}"/>
-              </a:ext>
-            </a:extLst>
-          </p:cNvPr>
-          <p:cNvSpPr/>
-          <p:nvPr/>
-        </p:nvSpPr>
-        <p:spPr>
-          <a:xfrm>
-            <a:off x="3143672" y="4767764"/>
-            <a:ext cx="7992888" cy="436780"/>
-          </a:xfrm>
-          <a:prstGeom prst="roundRect">
-            <a:avLst/>
-          </a:prstGeom>
-        </p:spPr>
-        <p:style>
-          <a:lnRef idx="1">
-            <a:schemeClr val="accent6"/>
-          </a:lnRef>
-          <a:fillRef idx="2">
-            <a:schemeClr val="accent6"/>
-          </a:fillRef>
-          <a:effectRef idx="1">
-            <a:schemeClr val="accent6"/>
-          </a:effectRef>
-          <a:fontRef idx="minor">
-            <a:schemeClr val="dk1"/>
-          </a:fontRef>
-        </p:style>
-        <p:txBody>
-          <a:bodyPr rtlCol="0" anchor="ctr"/>
-          <a:lstStyle/>
-          <a:p>
-            <a:pPr algn="ctr"/>
-            <a:endParaRPr lang="en-IL"/>
-          </a:p>
-        </p:txBody>
-      </p:sp>
-      <p:sp>
-        <p:nvSpPr>
           <p:cNvPr id="2" name="Title 1">
             <a:extLst>
               <a:ext uri="{FF2B5EF4-FFF2-40B4-BE49-F238E27FC236}">
@@ -7392,7 +8592,7 @@
           <a:p>
             <a:fld id="{48C2FE54-953E-4268-8452-225DF8E36AC9}" type="slidenum">
               <a:rPr lang="he-IL" smtClean="0"/>
-              <a:t>22</a:t>
+              <a:t>24</a:t>
             </a:fld>
             <a:endParaRPr lang="he-IL"/>
           </a:p>
@@ -7441,10 +8641,10 @@
       </p:pic>
       <p:pic>
         <p:nvPicPr>
-          <p:cNvPr id="13" name="Picture 12">
-            <a:extLst>
-              <a:ext uri="{FF2B5EF4-FFF2-40B4-BE49-F238E27FC236}">
-                <a16:creationId xmlns:a16="http://schemas.microsoft.com/office/drawing/2014/main" id="{3F12DFF8-9C14-414F-A9B2-0592DF11050D}"/>
+          <p:cNvPr id="12" name="Picture 11">
+            <a:extLst>
+              <a:ext uri="{FF2B5EF4-FFF2-40B4-BE49-F238E27FC236}">
+                <a16:creationId xmlns:a16="http://schemas.microsoft.com/office/drawing/2014/main" id="{1616B038-1BA0-4343-9770-74BF331CBBF0}"/>
               </a:ext>
             </a:extLst>
           </p:cNvPr>
@@ -7477,8 +8677,8 @@
         </p:blipFill>
         <p:spPr>
           <a:xfrm>
-            <a:off x="3000713" y="1586180"/>
-            <a:ext cx="8855927" cy="4721662"/>
+            <a:off x="696457" y="1637519"/>
+            <a:ext cx="10799086" cy="4319025"/>
           </a:xfrm>
           <a:prstGeom prst="rect">
             <a:avLst/>
@@ -7495,430 +8695,10 @@
   <p:clrMapOvr>
     <a:masterClrMapping/>
   </p:clrMapOvr>
-  <p:timing>
-    <p:tnLst>
-      <p:par>
-        <p:cTn id="1" dur="indefinite" restart="never" nodeType="tmRoot">
-          <p:childTnLst>
-            <p:seq concurrent="1" nextAc="seek">
-              <p:cTn id="2" dur="indefinite" nodeType="mainSeq">
-                <p:childTnLst>
-                  <p:par>
-                    <p:cTn id="3" fill="hold">
-                      <p:stCondLst>
-                        <p:cond delay="indefinite"/>
-                      </p:stCondLst>
-                      <p:childTnLst>
-                        <p:par>
-                          <p:cTn id="4" fill="hold">
-                            <p:stCondLst>
-                              <p:cond delay="0"/>
-                            </p:stCondLst>
-                            <p:childTnLst>
-                              <p:par>
-                                <p:cTn id="5" presetID="1" presetClass="entr" presetSubtype="0" fill="hold" grpId="0" nodeType="clickEffect">
-                                  <p:stCondLst>
-                                    <p:cond delay="0"/>
-                                  </p:stCondLst>
-                                  <p:childTnLst>
-                                    <p:set>
-                                      <p:cBhvr>
-                                        <p:cTn id="6" dur="1" fill="hold">
-                                          <p:stCondLst>
-                                            <p:cond delay="0"/>
-                                          </p:stCondLst>
-                                        </p:cTn>
-                                        <p:tgtEl>
-                                          <p:spTgt spid="14"/>
-                                        </p:tgtEl>
-                                        <p:attrNameLst>
-                                          <p:attrName>style.visibility</p:attrName>
-                                        </p:attrNameLst>
-                                      </p:cBhvr>
-                                      <p:to>
-                                        <p:strVal val="visible"/>
-                                      </p:to>
-                                    </p:set>
-                                  </p:childTnLst>
-                                </p:cTn>
-                              </p:par>
-                            </p:childTnLst>
-                          </p:cTn>
-                        </p:par>
-                      </p:childTnLst>
-                    </p:cTn>
-                  </p:par>
-                  <p:par>
-                    <p:cTn id="7" fill="hold">
-                      <p:stCondLst>
-                        <p:cond delay="indefinite"/>
-                      </p:stCondLst>
-                      <p:childTnLst>
-                        <p:par>
-                          <p:cTn id="8" fill="hold">
-                            <p:stCondLst>
-                              <p:cond delay="0"/>
-                            </p:stCondLst>
-                            <p:childTnLst>
-                              <p:par>
-                                <p:cTn id="9" presetID="1" presetClass="exit" presetSubtype="0" fill="hold" grpId="1" nodeType="clickEffect">
-                                  <p:stCondLst>
-                                    <p:cond delay="0"/>
-                                  </p:stCondLst>
-                                  <p:childTnLst>
-                                    <p:set>
-                                      <p:cBhvr>
-                                        <p:cTn id="10" dur="1" fill="hold">
-                                          <p:stCondLst>
-                                            <p:cond delay="0"/>
-                                          </p:stCondLst>
-                                        </p:cTn>
-                                        <p:tgtEl>
-                                          <p:spTgt spid="14"/>
-                                        </p:tgtEl>
-                                        <p:attrNameLst>
-                                          <p:attrName>style.visibility</p:attrName>
-                                        </p:attrNameLst>
-                                      </p:cBhvr>
-                                      <p:to>
-                                        <p:strVal val="hidden"/>
-                                      </p:to>
-                                    </p:set>
-                                  </p:childTnLst>
-                                </p:cTn>
-                              </p:par>
-                              <p:par>
-                                <p:cTn id="11" presetID="1" presetClass="entr" presetSubtype="0" fill="hold" grpId="0" nodeType="withEffect">
-                                  <p:stCondLst>
-                                    <p:cond delay="0"/>
-                                  </p:stCondLst>
-                                  <p:childTnLst>
-                                    <p:set>
-                                      <p:cBhvr>
-                                        <p:cTn id="12" dur="1" fill="hold">
-                                          <p:stCondLst>
-                                            <p:cond delay="0"/>
-                                          </p:stCondLst>
-                                        </p:cTn>
-                                        <p:tgtEl>
-                                          <p:spTgt spid="15"/>
-                                        </p:tgtEl>
-                                        <p:attrNameLst>
-                                          <p:attrName>style.visibility</p:attrName>
-                                        </p:attrNameLst>
-                                      </p:cBhvr>
-                                      <p:to>
-                                        <p:strVal val="visible"/>
-                                      </p:to>
-                                    </p:set>
-                                  </p:childTnLst>
-                                </p:cTn>
-                              </p:par>
-                            </p:childTnLst>
-                          </p:cTn>
-                        </p:par>
-                      </p:childTnLst>
-                    </p:cTn>
-                  </p:par>
-                  <p:par>
-                    <p:cTn id="13" fill="hold">
-                      <p:stCondLst>
-                        <p:cond delay="indefinite"/>
-                      </p:stCondLst>
-                      <p:childTnLst>
-                        <p:par>
-                          <p:cTn id="14" fill="hold">
-                            <p:stCondLst>
-                              <p:cond delay="0"/>
-                            </p:stCondLst>
-                            <p:childTnLst>
-                              <p:par>
-                                <p:cTn id="15" presetID="1" presetClass="exit" presetSubtype="0" fill="hold" grpId="1" nodeType="clickEffect">
-                                  <p:stCondLst>
-                                    <p:cond delay="0"/>
-                                  </p:stCondLst>
-                                  <p:childTnLst>
-                                    <p:set>
-                                      <p:cBhvr>
-                                        <p:cTn id="16" dur="1" fill="hold">
-                                          <p:stCondLst>
-                                            <p:cond delay="0"/>
-                                          </p:stCondLst>
-                                        </p:cTn>
-                                        <p:tgtEl>
-                                          <p:spTgt spid="15"/>
-                                        </p:tgtEl>
-                                        <p:attrNameLst>
-                                          <p:attrName>style.visibility</p:attrName>
-                                        </p:attrNameLst>
-                                      </p:cBhvr>
-                                      <p:to>
-                                        <p:strVal val="hidden"/>
-                                      </p:to>
-                                    </p:set>
-                                  </p:childTnLst>
-                                </p:cTn>
-                              </p:par>
-                              <p:par>
-                                <p:cTn id="17" presetID="1" presetClass="entr" presetSubtype="0" fill="hold" grpId="0" nodeType="withEffect">
-                                  <p:stCondLst>
-                                    <p:cond delay="0"/>
-                                  </p:stCondLst>
-                                  <p:childTnLst>
-                                    <p:set>
-                                      <p:cBhvr>
-                                        <p:cTn id="18" dur="1" fill="hold">
-                                          <p:stCondLst>
-                                            <p:cond delay="0"/>
-                                          </p:stCondLst>
-                                        </p:cTn>
-                                        <p:tgtEl>
-                                          <p:spTgt spid="17"/>
-                                        </p:tgtEl>
-                                        <p:attrNameLst>
-                                          <p:attrName>style.visibility</p:attrName>
-                                        </p:attrNameLst>
-                                      </p:cBhvr>
-                                      <p:to>
-                                        <p:strVal val="visible"/>
-                                      </p:to>
-                                    </p:set>
-                                  </p:childTnLst>
-                                </p:cTn>
-                              </p:par>
-                            </p:childTnLst>
-                          </p:cTn>
-                        </p:par>
-                      </p:childTnLst>
-                    </p:cTn>
-                  </p:par>
-                  <p:par>
-                    <p:cTn id="19" fill="hold">
-                      <p:stCondLst>
-                        <p:cond delay="indefinite"/>
-                      </p:stCondLst>
-                      <p:childTnLst>
-                        <p:par>
-                          <p:cTn id="20" fill="hold">
-                            <p:stCondLst>
-                              <p:cond delay="0"/>
-                            </p:stCondLst>
-                            <p:childTnLst>
-                              <p:par>
-                                <p:cTn id="21" presetID="1" presetClass="exit" presetSubtype="0" fill="hold" grpId="1" nodeType="clickEffect">
-                                  <p:stCondLst>
-                                    <p:cond delay="0"/>
-                                  </p:stCondLst>
-                                  <p:childTnLst>
-                                    <p:set>
-                                      <p:cBhvr>
-                                        <p:cTn id="22" dur="1" fill="hold">
-                                          <p:stCondLst>
-                                            <p:cond delay="0"/>
-                                          </p:stCondLst>
-                                        </p:cTn>
-                                        <p:tgtEl>
-                                          <p:spTgt spid="17"/>
-                                        </p:tgtEl>
-                                        <p:attrNameLst>
-                                          <p:attrName>style.visibility</p:attrName>
-                                        </p:attrNameLst>
-                                      </p:cBhvr>
-                                      <p:to>
-                                        <p:strVal val="hidden"/>
-                                      </p:to>
-                                    </p:set>
-                                  </p:childTnLst>
-                                </p:cTn>
-                              </p:par>
-                              <p:par>
-                                <p:cTn id="23" presetID="1" presetClass="entr" presetSubtype="0" fill="hold" grpId="0" nodeType="withEffect">
-                                  <p:stCondLst>
-                                    <p:cond delay="0"/>
-                                  </p:stCondLst>
-                                  <p:childTnLst>
-                                    <p:set>
-                                      <p:cBhvr>
-                                        <p:cTn id="24" dur="1" fill="hold">
-                                          <p:stCondLst>
-                                            <p:cond delay="0"/>
-                                          </p:stCondLst>
-                                        </p:cTn>
-                                        <p:tgtEl>
-                                          <p:spTgt spid="18"/>
-                                        </p:tgtEl>
-                                        <p:attrNameLst>
-                                          <p:attrName>style.visibility</p:attrName>
-                                        </p:attrNameLst>
-                                      </p:cBhvr>
-                                      <p:to>
-                                        <p:strVal val="visible"/>
-                                      </p:to>
-                                    </p:set>
-                                  </p:childTnLst>
-                                </p:cTn>
-                              </p:par>
-                            </p:childTnLst>
-                          </p:cTn>
-                        </p:par>
-                      </p:childTnLst>
-                    </p:cTn>
-                  </p:par>
-                  <p:par>
-                    <p:cTn id="25" fill="hold">
-                      <p:stCondLst>
-                        <p:cond delay="indefinite"/>
-                      </p:stCondLst>
-                      <p:childTnLst>
-                        <p:par>
-                          <p:cTn id="26" fill="hold">
-                            <p:stCondLst>
-                              <p:cond delay="0"/>
-                            </p:stCondLst>
-                            <p:childTnLst>
-                              <p:par>
-                                <p:cTn id="27" presetID="1" presetClass="exit" presetSubtype="0" fill="hold" grpId="1" nodeType="clickEffect">
-                                  <p:stCondLst>
-                                    <p:cond delay="0"/>
-                                  </p:stCondLst>
-                                  <p:childTnLst>
-                                    <p:set>
-                                      <p:cBhvr>
-                                        <p:cTn id="28" dur="1" fill="hold">
-                                          <p:stCondLst>
-                                            <p:cond delay="0"/>
-                                          </p:stCondLst>
-                                        </p:cTn>
-                                        <p:tgtEl>
-                                          <p:spTgt spid="18"/>
-                                        </p:tgtEl>
-                                        <p:attrNameLst>
-                                          <p:attrName>style.visibility</p:attrName>
-                                        </p:attrNameLst>
-                                      </p:cBhvr>
-                                      <p:to>
-                                        <p:strVal val="hidden"/>
-                                      </p:to>
-                                    </p:set>
-                                  </p:childTnLst>
-                                </p:cTn>
-                              </p:par>
-                              <p:par>
-                                <p:cTn id="29" presetID="1" presetClass="entr" presetSubtype="0" fill="hold" grpId="0" nodeType="withEffect">
-                                  <p:stCondLst>
-                                    <p:cond delay="0"/>
-                                  </p:stCondLst>
-                                  <p:childTnLst>
-                                    <p:set>
-                                      <p:cBhvr>
-                                        <p:cTn id="30" dur="1" fill="hold">
-                                          <p:stCondLst>
-                                            <p:cond delay="0"/>
-                                          </p:stCondLst>
-                                        </p:cTn>
-                                        <p:tgtEl>
-                                          <p:spTgt spid="19"/>
-                                        </p:tgtEl>
-                                        <p:attrNameLst>
-                                          <p:attrName>style.visibility</p:attrName>
-                                        </p:attrNameLst>
-                                      </p:cBhvr>
-                                      <p:to>
-                                        <p:strVal val="visible"/>
-                                      </p:to>
-                                    </p:set>
-                                  </p:childTnLst>
-                                </p:cTn>
-                              </p:par>
-                            </p:childTnLst>
-                          </p:cTn>
-                        </p:par>
-                      </p:childTnLst>
-                    </p:cTn>
-                  </p:par>
-                  <p:par>
-                    <p:cTn id="31" fill="hold">
-                      <p:stCondLst>
-                        <p:cond delay="indefinite"/>
-                      </p:stCondLst>
-                      <p:childTnLst>
-                        <p:par>
-                          <p:cTn id="32" fill="hold">
-                            <p:stCondLst>
-                              <p:cond delay="0"/>
-                            </p:stCondLst>
-                            <p:childTnLst>
-                              <p:par>
-                                <p:cTn id="33" presetID="1" presetClass="exit" presetSubtype="0" fill="hold" grpId="1" nodeType="clickEffect">
-                                  <p:stCondLst>
-                                    <p:cond delay="0"/>
-                                  </p:stCondLst>
-                                  <p:childTnLst>
-                                    <p:set>
-                                      <p:cBhvr>
-                                        <p:cTn id="34" dur="1" fill="hold">
-                                          <p:stCondLst>
-                                            <p:cond delay="0"/>
-                                          </p:stCondLst>
-                                        </p:cTn>
-                                        <p:tgtEl>
-                                          <p:spTgt spid="19"/>
-                                        </p:tgtEl>
-                                        <p:attrNameLst>
-                                          <p:attrName>style.visibility</p:attrName>
-                                        </p:attrNameLst>
-                                      </p:cBhvr>
-                                      <p:to>
-                                        <p:strVal val="hidden"/>
-                                      </p:to>
-                                    </p:set>
-                                  </p:childTnLst>
-                                </p:cTn>
-                              </p:par>
-                            </p:childTnLst>
-                          </p:cTn>
-                        </p:par>
-                      </p:childTnLst>
-                    </p:cTn>
-                  </p:par>
-                </p:childTnLst>
-              </p:cTn>
-              <p:prevCondLst>
-                <p:cond evt="onPrev" delay="0">
-                  <p:tgtEl>
-                    <p:sldTgt/>
-                  </p:tgtEl>
-                </p:cond>
-              </p:prevCondLst>
-              <p:nextCondLst>
-                <p:cond evt="onNext" delay="0">
-                  <p:tgtEl>
-                    <p:sldTgt/>
-                  </p:tgtEl>
-                </p:cond>
-              </p:nextCondLst>
-            </p:seq>
-          </p:childTnLst>
-        </p:cTn>
-      </p:par>
-    </p:tnLst>
-    <p:bldLst>
-      <p:bldP spid="14" grpId="0" animBg="1"/>
-      <p:bldP spid="14" grpId="1" animBg="1"/>
-      <p:bldP spid="15" grpId="0" animBg="1"/>
-      <p:bldP spid="15" grpId="1" animBg="1"/>
-      <p:bldP spid="17" grpId="0" animBg="1"/>
-      <p:bldP spid="17" grpId="1" animBg="1"/>
-      <p:bldP spid="18" grpId="0" animBg="1"/>
-      <p:bldP spid="18" grpId="1" animBg="1"/>
-      <p:bldP spid="19" grpId="0" animBg="1"/>
-      <p:bldP spid="19" grpId="1" animBg="1"/>
-    </p:bldLst>
-  </p:timing>
 </p:sld>
 </file>
 
-<file path=ppt/slides/slide23.xml><?xml version="1.0" encoding="utf-8"?>
+<file path=ppt/slides/slide25.xml><?xml version="1.0" encoding="utf-8"?>
 <p:sld xmlns:a="http://schemas.openxmlformats.org/drawingml/2006/main" xmlns:r="http://schemas.openxmlformats.org/officeDocument/2006/relationships" xmlns:p="http://schemas.openxmlformats.org/presentationml/2006/main" show="0">
   <p:cSld>
     <p:spTree>
@@ -7989,7 +8769,7 @@
           <a:p>
             <a:fld id="{48C2FE54-953E-4268-8452-225DF8E36AC9}" type="slidenum">
               <a:rPr lang="he-IL" smtClean="0"/>
-              <a:t>23</a:t>
+              <a:t>25</a:t>
             </a:fld>
             <a:endParaRPr lang="he-IL"/>
           </a:p>
@@ -7997,10 +8777,10 @@
       </p:sp>
       <p:pic>
         <p:nvPicPr>
-          <p:cNvPr id="7" name="Content Placeholder 6">
-            <a:extLst>
-              <a:ext uri="{FF2B5EF4-FFF2-40B4-BE49-F238E27FC236}">
-                <a16:creationId xmlns:a16="http://schemas.microsoft.com/office/drawing/2014/main" id="{70FDF990-9719-4FB8-98DF-6AABBF8A6DA9}"/>
+          <p:cNvPr id="12" name="Content Placeholder 11">
+            <a:extLst>
+              <a:ext uri="{FF2B5EF4-FFF2-40B4-BE49-F238E27FC236}">
+                <a16:creationId xmlns:a16="http://schemas.microsoft.com/office/drawing/2014/main" id="{71D2E7DA-9A9C-4D47-A49B-2A902E176DDD}"/>
               </a:ext>
             </a:extLst>
           </p:cNvPr>
@@ -8622,6 +9402,60 @@
           </a:p>
         </p:txBody>
       </p:sp>
+      <p:sp>
+        <p:nvSpPr>
+          <p:cNvPr id="5" name="Rectangle: Rounded Corners 4">
+            <a:extLst>
+              <a:ext uri="{FF2B5EF4-FFF2-40B4-BE49-F238E27FC236}">
+                <a16:creationId xmlns:a16="http://schemas.microsoft.com/office/drawing/2014/main" id="{5A20A579-2CA9-4D7C-A36B-00CAA1464402}"/>
+              </a:ext>
+            </a:extLst>
+          </p:cNvPr>
+          <p:cNvSpPr/>
+          <p:nvPr/>
+        </p:nvSpPr>
+        <p:spPr>
+          <a:xfrm>
+            <a:off x="2351584" y="6109978"/>
+            <a:ext cx="3888432" cy="631390"/>
+          </a:xfrm>
+          <a:prstGeom prst="roundRect">
+            <a:avLst/>
+          </a:prstGeom>
+        </p:spPr>
+        <p:style>
+          <a:lnRef idx="1">
+            <a:schemeClr val="accent6"/>
+          </a:lnRef>
+          <a:fillRef idx="2">
+            <a:schemeClr val="accent6"/>
+          </a:fillRef>
+          <a:effectRef idx="1">
+            <a:schemeClr val="accent6"/>
+          </a:effectRef>
+          <a:fontRef idx="minor">
+            <a:schemeClr val="dk1"/>
+          </a:fontRef>
+        </p:style>
+        <p:txBody>
+          <a:bodyPr rtlCol="0" anchor="ctr"/>
+          <a:lstStyle/>
+          <a:p>
+            <a:pPr algn="ctr"/>
+            <a:r>
+              <a:rPr lang="he-IL" dirty="0"/>
+              <a:t>בשאלון ציבור כללי מרווח טעות כ-4.4%</a:t>
+            </a:r>
+          </a:p>
+          <a:p>
+            <a:pPr algn="ctr"/>
+            <a:r>
+              <a:rPr lang="he-IL" dirty="0"/>
+              <a:t>בשאלון עו"ד מרווח טעות כ-7%</a:t>
+            </a:r>
+          </a:p>
+        </p:txBody>
+      </p:sp>
     </p:spTree>
     <p:extLst>
       <p:ext uri="{BB962C8B-B14F-4D97-AF65-F5344CB8AC3E}">
@@ -8685,6 +9519,51 @@
                       </p:childTnLst>
                     </p:cTn>
                   </p:par>
+                  <p:par>
+                    <p:cTn id="7" fill="hold">
+                      <p:stCondLst>
+                        <p:cond delay="indefinite"/>
+                      </p:stCondLst>
+                      <p:childTnLst>
+                        <p:par>
+                          <p:cTn id="8" fill="hold">
+                            <p:stCondLst>
+                              <p:cond delay="0"/>
+                            </p:stCondLst>
+                            <p:childTnLst>
+                              <p:par>
+                                <p:cTn id="9" presetID="1" presetClass="entr" presetSubtype="0" fill="hold" grpId="0" nodeType="clickEffect">
+                                  <p:stCondLst>
+                                    <p:cond delay="0"/>
+                                  </p:stCondLst>
+                                  <p:childTnLst>
+                                    <p:set>
+                                      <p:cBhvr>
+                                        <p:cTn id="10" dur="1" fill="hold">
+                                          <p:stCondLst>
+                                            <p:cond delay="0"/>
+                                          </p:stCondLst>
+                                        </p:cTn>
+                                        <p:tgtEl>
+                                          <p:spTgt spid="5"/>
+                                        </p:tgtEl>
+                                        <p:attrNameLst>
+                                          <p:attrName>style.visibility</p:attrName>
+                                        </p:attrNameLst>
+                                      </p:cBhvr>
+                                      <p:to>
+                                        <p:strVal val="visible"/>
+                                      </p:to>
+                                    </p:set>
+                                  </p:childTnLst>
+                                </p:cTn>
+                              </p:par>
+                            </p:childTnLst>
+                          </p:cTn>
+                        </p:par>
+                      </p:childTnLst>
+                    </p:cTn>
+                  </p:par>
                 </p:childTnLst>
               </p:cTn>
               <p:prevCondLst>
@@ -8708,6 +9587,7 @@
     </p:tnLst>
     <p:bldLst>
       <p:bldP spid="2" grpId="0" animBg="1"/>
+      <p:bldP spid="5" grpId="0" animBg="1"/>
     </p:bldLst>
   </p:timing>
 </p:sld>
@@ -9019,8 +9899,8 @@
         </p:blipFill>
         <p:spPr>
           <a:xfrm>
-            <a:off x="6934929" y="1437011"/>
-            <a:ext cx="5136107" cy="2568053"/>
+            <a:off x="2231801" y="1916833"/>
+            <a:ext cx="7728398" cy="3864196"/>
           </a:xfrm>
           <a:prstGeom prst="rect">
             <a:avLst/>
@@ -9129,6 +10009,184 @@
           </a:p>
         </p:txBody>
       </p:sp>
+    </p:spTree>
+    <p:extLst>
+      <p:ext uri="{BB962C8B-B14F-4D97-AF65-F5344CB8AC3E}">
+        <p14:creationId xmlns:p14="http://schemas.microsoft.com/office/powerpoint/2010/main" val="72308901"/>
+      </p:ext>
+    </p:extLst>
+  </p:cSld>
+  <p:clrMapOvr>
+    <a:masterClrMapping/>
+  </p:clrMapOvr>
+</p:sld>
+</file>
+
+<file path=ppt/slides/slide6.xml><?xml version="1.0" encoding="utf-8"?>
+<p:sld xmlns:a="http://schemas.openxmlformats.org/drawingml/2006/main" xmlns:r="http://schemas.openxmlformats.org/officeDocument/2006/relationships" xmlns:p="http://schemas.openxmlformats.org/presentationml/2006/main">
+  <p:cSld>
+    <p:spTree>
+      <p:nvGrpSpPr>
+        <p:cNvPr id="1" name=""/>
+        <p:cNvGrpSpPr/>
+        <p:nvPr/>
+      </p:nvGrpSpPr>
+      <p:grpSpPr>
+        <a:xfrm>
+          <a:off x="0" y="0"/>
+          <a:ext cx="0" cy="0"/>
+          <a:chOff x="0" y="0"/>
+          <a:chExt cx="0" cy="0"/>
+        </a:xfrm>
+      </p:grpSpPr>
+      <p:pic>
+        <p:nvPicPr>
+          <p:cNvPr id="14" name="Picture 13">
+            <a:extLst>
+              <a:ext uri="{FF2B5EF4-FFF2-40B4-BE49-F238E27FC236}">
+                <a16:creationId xmlns:a16="http://schemas.microsoft.com/office/drawing/2014/main" id="{B43DC1A8-5F9C-4BEE-BAC8-67D9E3EEE582}"/>
+              </a:ext>
+            </a:extLst>
+          </p:cNvPr>
+          <p:cNvPicPr>
+            <a:picLocks noChangeAspect="1"/>
+          </p:cNvPicPr>
+          <p:nvPr/>
+        </p:nvPicPr>
+        <p:blipFill>
+          <a:blip r:embed="rId2" cstate="print">
+            <a:clrChange>
+              <a:clrFrom>
+                <a:srgbClr val="FFFFFF"/>
+              </a:clrFrom>
+              <a:clrTo>
+                <a:srgbClr val="FFFFFF">
+                  <a:alpha val="0"/>
+                </a:srgbClr>
+              </a:clrTo>
+            </a:clrChange>
+            <a:extLst>
+              <a:ext uri="{28A0092B-C50C-407E-A947-70E740481C1C}">
+                <a14:useLocalDpi xmlns:a14="http://schemas.microsoft.com/office/drawing/2010/main" val="0"/>
+              </a:ext>
+            </a:extLst>
+          </a:blip>
+          <a:stretch>
+            <a:fillRect/>
+          </a:stretch>
+        </p:blipFill>
+        <p:spPr>
+          <a:xfrm>
+            <a:off x="9204331" y="1437012"/>
+            <a:ext cx="2866705" cy="1433352"/>
+          </a:xfrm>
+          <a:prstGeom prst="rect">
+            <a:avLst/>
+          </a:prstGeom>
+        </p:spPr>
+      </p:pic>
+      <p:sp>
+        <p:nvSpPr>
+          <p:cNvPr id="2" name="Title 1">
+            <a:extLst>
+              <a:ext uri="{FF2B5EF4-FFF2-40B4-BE49-F238E27FC236}">
+                <a16:creationId xmlns:a16="http://schemas.microsoft.com/office/drawing/2014/main" id="{2609094E-9AF4-4201-AA85-247329965CA6}"/>
+              </a:ext>
+            </a:extLst>
+          </p:cNvPr>
+          <p:cNvSpPr>
+            <a:spLocks noGrp="1"/>
+          </p:cNvSpPr>
+          <p:nvPr>
+            <p:ph type="title"/>
+          </p:nvPr>
+        </p:nvSpPr>
+        <p:spPr/>
+        <p:txBody>
+          <a:bodyPr>
+            <a:noAutofit/>
+          </a:bodyPr>
+          <a:lstStyle/>
+          <a:p>
+            <a:pPr rtl="0"/>
+            <a:r>
+              <a:rPr lang="he-IL" sz="2800" dirty="0"/>
+              <a:t>האם ב-5 השנים האחרונות קיבלת הטבה כלשהי או פיצוי בגין תובענה ייצוגית?</a:t>
+            </a:r>
+            <a:endParaRPr lang="en-IL" sz="2800" dirty="0"/>
+          </a:p>
+        </p:txBody>
+      </p:sp>
+      <p:pic>
+        <p:nvPicPr>
+          <p:cNvPr id="8" name="Picture 7">
+            <a:extLst>
+              <a:ext uri="{FF2B5EF4-FFF2-40B4-BE49-F238E27FC236}">
+                <a16:creationId xmlns:a16="http://schemas.microsoft.com/office/drawing/2014/main" id="{BD14DDC7-4338-4359-B609-615DFFC0238D}"/>
+              </a:ext>
+            </a:extLst>
+          </p:cNvPr>
+          <p:cNvPicPr>
+            <a:picLocks noChangeAspect="1"/>
+          </p:cNvPicPr>
+          <p:nvPr/>
+        </p:nvPicPr>
+        <p:blipFill>
+          <a:blip r:embed="rId3">
+            <a:clrChange>
+              <a:clrFrom>
+                <a:srgbClr val="FFFFFF"/>
+              </a:clrFrom>
+              <a:clrTo>
+                <a:srgbClr val="FFFFFF">
+                  <a:alpha val="0"/>
+                </a:srgbClr>
+              </a:clrTo>
+            </a:clrChange>
+          </a:blip>
+          <a:stretch>
+            <a:fillRect/>
+          </a:stretch>
+        </p:blipFill>
+        <p:spPr>
+          <a:xfrm>
+            <a:off x="7941271" y="6101166"/>
+            <a:ext cx="946613" cy="631390"/>
+          </a:xfrm>
+          <a:prstGeom prst="rect">
+            <a:avLst/>
+          </a:prstGeom>
+        </p:spPr>
+      </p:pic>
+      <p:sp>
+        <p:nvSpPr>
+          <p:cNvPr id="10" name="Slide Number Placeholder 9">
+            <a:extLst>
+              <a:ext uri="{FF2B5EF4-FFF2-40B4-BE49-F238E27FC236}">
+                <a16:creationId xmlns:a16="http://schemas.microsoft.com/office/drawing/2014/main" id="{687C9A4A-7E2D-4B6C-AB42-465F35240765}"/>
+              </a:ext>
+            </a:extLst>
+          </p:cNvPr>
+          <p:cNvSpPr>
+            <a:spLocks noGrp="1"/>
+          </p:cNvSpPr>
+          <p:nvPr>
+            <p:ph type="sldNum" sz="quarter" idx="12"/>
+          </p:nvPr>
+        </p:nvSpPr>
+        <p:spPr/>
+        <p:txBody>
+          <a:bodyPr/>
+          <a:lstStyle/>
+          <a:p>
+            <a:fld id="{48C2FE54-953E-4268-8452-225DF8E36AC9}" type="slidenum">
+              <a:rPr lang="he-IL" smtClean="0"/>
+              <a:t>6</a:t>
+            </a:fld>
+            <a:endParaRPr lang="he-IL"/>
+          </a:p>
+        </p:txBody>
+      </p:sp>
       <p:sp>
         <p:nvSpPr>
           <p:cNvPr id="11" name="Rectangle 10">
@@ -9143,8 +10201,8 @@
         </p:nvSpPr>
         <p:spPr>
           <a:xfrm>
-            <a:off x="8887884" y="1916832"/>
-            <a:ext cx="1600604" cy="1872208"/>
+            <a:off x="10319305" y="1505615"/>
+            <a:ext cx="787641" cy="1296145"/>
           </a:xfrm>
           <a:prstGeom prst="rect">
             <a:avLst/>
@@ -9219,8 +10277,8 @@
         </p:blipFill>
         <p:spPr>
           <a:xfrm>
-            <a:off x="311622" y="3789039"/>
-            <a:ext cx="6265491" cy="2506621"/>
+            <a:off x="547317" y="2420888"/>
+            <a:ext cx="8099528" cy="3240360"/>
           </a:xfrm>
           <a:prstGeom prst="rect">
             <a:avLst/>
@@ -9238,15 +10296,17 @@
           </p:cNvPr>
           <p:cNvCxnSpPr>
             <a:cxnSpLocks/>
+            <a:stCxn id="14" idx="2"/>
+            <a:endCxn id="9" idx="3"/>
           </p:cNvCxnSpPr>
           <p:nvPr/>
         </p:nvCxnSpPr>
         <p:spPr>
-          <a:xfrm rot="10800000" flipV="1">
-            <a:off x="6829696" y="3789039"/>
-            <a:ext cx="2866705" cy="1067895"/>
+          <a:xfrm rot="5400000">
+            <a:off x="9056913" y="2460297"/>
+            <a:ext cx="1170704" cy="1990839"/>
           </a:xfrm>
-          <a:prstGeom prst="bentConnector3">
+          <a:prstGeom prst="bentConnector2">
             <a:avLst/>
           </a:prstGeom>
           <a:ln w="28575">
@@ -9284,7 +10344,7 @@
 </p:sld>
 </file>
 
-<file path=ppt/slides/slide6.xml><?xml version="1.0" encoding="utf-8"?>
+<file path=ppt/slides/slide7.xml><?xml version="1.0" encoding="utf-8"?>
 <p:sld xmlns:a="http://schemas.openxmlformats.org/drawingml/2006/main" xmlns:r="http://schemas.openxmlformats.org/officeDocument/2006/relationships" xmlns:p="http://schemas.openxmlformats.org/presentationml/2006/main">
   <p:cSld>
     <p:spTree>
@@ -9437,7 +10497,7 @@
           <a:p>
             <a:fld id="{48C2FE54-953E-4268-8452-225DF8E36AC9}" type="slidenum">
               <a:rPr lang="he-IL" smtClean="0"/>
-              <a:t>6</a:t>
+              <a:t>7</a:t>
             </a:fld>
             <a:endParaRPr lang="he-IL"/>
           </a:p>
@@ -9806,7 +10866,7 @@
 </p:sld>
 </file>
 
-<file path=ppt/slides/slide7.xml><?xml version="1.0" encoding="utf-8"?>
+<file path=ppt/slides/slide8.xml><?xml version="1.0" encoding="utf-8"?>
 <p:sld xmlns:a="http://schemas.openxmlformats.org/drawingml/2006/main" xmlns:r="http://schemas.openxmlformats.org/officeDocument/2006/relationships" xmlns:p="http://schemas.openxmlformats.org/presentationml/2006/main">
   <p:cSld>
     <p:spTree>
@@ -9918,7 +10978,7 @@
           <a:p>
             <a:fld id="{48C2FE54-953E-4268-8452-225DF8E36AC9}" type="slidenum">
               <a:rPr lang="he-IL" smtClean="0"/>
-              <a:t>7</a:t>
+              <a:t>8</a:t>
             </a:fld>
             <a:endParaRPr lang="he-IL"/>
           </a:p>
@@ -9952,7 +11012,7 @@
           <a:p>
             <a:r>
               <a:rPr lang="he-IL" dirty="0"/>
-              <a:t>השוואה בין תובעים לבין מייצגי נתבעים</a:t>
+              <a:t>השוואה בין מייצגי תובעים לבין מייצגי נתבעים</a:t>
             </a:r>
             <a:endParaRPr lang="en-IL" dirty="0"/>
           </a:p>
@@ -10083,7 +11143,7 @@
 </p:sld>
 </file>
 
-<file path=ppt/slides/slide8.xml><?xml version="1.0" encoding="utf-8"?>
+<file path=ppt/slides/slide9.xml><?xml version="1.0" encoding="utf-8"?>
 <p:sld xmlns:a="http://schemas.openxmlformats.org/drawingml/2006/main" xmlns:r="http://schemas.openxmlformats.org/officeDocument/2006/relationships" xmlns:p="http://schemas.openxmlformats.org/presentationml/2006/main">
   <p:cSld>
     <p:spTree>
@@ -10169,8 +11229,8 @@
         </p:blipFill>
         <p:spPr>
           <a:xfrm>
-            <a:off x="6645831" y="1562374"/>
-            <a:ext cx="5300950" cy="2650475"/>
+            <a:off x="1775520" y="1922680"/>
+            <a:ext cx="8037254" cy="4018627"/>
           </a:xfrm>
         </p:spPr>
       </p:pic>
@@ -10197,7 +11257,7 @@
           <a:p>
             <a:fld id="{48C2FE54-953E-4268-8452-225DF8E36AC9}" type="slidenum">
               <a:rPr lang="he-IL" smtClean="0"/>
-              <a:t>8</a:t>
+              <a:t>9</a:t>
             </a:fld>
             <a:endParaRPr lang="he-IL"/>
           </a:p>
@@ -10244,94 +11304,6 @@
           </a:prstGeom>
         </p:spPr>
       </p:pic>
-      <p:pic>
-        <p:nvPicPr>
-          <p:cNvPr id="8" name="Picture 7">
-            <a:extLst>
-              <a:ext uri="{FF2B5EF4-FFF2-40B4-BE49-F238E27FC236}">
-                <a16:creationId xmlns:a16="http://schemas.microsoft.com/office/drawing/2014/main" id="{7A2FDFA1-EFEE-4BB8-99A6-3FFEE086E6F4}"/>
-              </a:ext>
-            </a:extLst>
-          </p:cNvPr>
-          <p:cNvPicPr>
-            <a:picLocks noChangeAspect="1"/>
-          </p:cNvPicPr>
-          <p:nvPr/>
-        </p:nvPicPr>
-        <p:blipFill>
-          <a:blip r:embed="rId4" cstate="print">
-            <a:clrChange>
-              <a:clrFrom>
-                <a:srgbClr val="FFFFFF"/>
-              </a:clrFrom>
-              <a:clrTo>
-                <a:srgbClr val="FFFFFF">
-                  <a:alpha val="0"/>
-                </a:srgbClr>
-              </a:clrTo>
-            </a:clrChange>
-            <a:extLst>
-              <a:ext uri="{28A0092B-C50C-407E-A947-70E740481C1C}">
-                <a14:useLocalDpi xmlns:a14="http://schemas.microsoft.com/office/drawing/2010/main" val="0"/>
-              </a:ext>
-            </a:extLst>
-          </a:blip>
-          <a:stretch>
-            <a:fillRect/>
-          </a:stretch>
-        </p:blipFill>
-        <p:spPr>
-          <a:xfrm>
-            <a:off x="218182" y="3717032"/>
-            <a:ext cx="5300950" cy="2650475"/>
-          </a:xfrm>
-          <a:prstGeom prst="rect">
-            <a:avLst/>
-          </a:prstGeom>
-        </p:spPr>
-      </p:pic>
-      <p:cxnSp>
-        <p:nvCxnSpPr>
-          <p:cNvPr id="9" name="Connector: Elbow 8">
-            <a:extLst>
-              <a:ext uri="{FF2B5EF4-FFF2-40B4-BE49-F238E27FC236}">
-                <a16:creationId xmlns:a16="http://schemas.microsoft.com/office/drawing/2014/main" id="{EBE2661B-BEA2-4C59-89E4-A86C1BBE4359}"/>
-              </a:ext>
-            </a:extLst>
-          </p:cNvPr>
-          <p:cNvCxnSpPr>
-            <a:stCxn id="6" idx="2"/>
-            <a:endCxn id="8" idx="3"/>
-          </p:cNvCxnSpPr>
-          <p:nvPr/>
-        </p:nvCxnSpPr>
-        <p:spPr>
-          <a:xfrm rot="5400000">
-            <a:off x="6993009" y="2738972"/>
-            <a:ext cx="829421" cy="3777174"/>
-          </a:xfrm>
-          <a:prstGeom prst="bentConnector2">
-            <a:avLst/>
-          </a:prstGeom>
-          <a:ln>
-            <a:tailEnd type="triangle"/>
-          </a:ln>
-        </p:spPr>
-        <p:style>
-          <a:lnRef idx="2">
-            <a:schemeClr val="dk1"/>
-          </a:lnRef>
-          <a:fillRef idx="0">
-            <a:schemeClr val="dk1"/>
-          </a:fillRef>
-          <a:effectRef idx="1">
-            <a:schemeClr val="dk1"/>
-          </a:effectRef>
-          <a:fontRef idx="minor">
-            <a:schemeClr val="tx1"/>
-          </a:fontRef>
-        </p:style>
-      </p:cxnSp>
     </p:spTree>
     <p:extLst>
       <p:ext uri="{BB962C8B-B14F-4D97-AF65-F5344CB8AC3E}">
@@ -10342,929 +11314,6 @@
   <p:clrMapOvr>
     <a:masterClrMapping/>
   </p:clrMapOvr>
-</p:sld>
-</file>
-
-<file path=ppt/slides/slide9.xml><?xml version="1.0" encoding="utf-8"?>
-<p:sld xmlns:a="http://schemas.openxmlformats.org/drawingml/2006/main" xmlns:r="http://schemas.openxmlformats.org/officeDocument/2006/relationships" xmlns:p="http://schemas.openxmlformats.org/presentationml/2006/main">
-  <p:cSld>
-    <p:spTree>
-      <p:nvGrpSpPr>
-        <p:cNvPr id="1" name=""/>
-        <p:cNvGrpSpPr/>
-        <p:nvPr/>
-      </p:nvGrpSpPr>
-      <p:grpSpPr>
-        <a:xfrm>
-          <a:off x="0" y="0"/>
-          <a:ext cx="0" cy="0"/>
-          <a:chOff x="0" y="0"/>
-          <a:chExt cx="0" cy="0"/>
-        </a:xfrm>
-      </p:grpSpPr>
-      <p:sp>
-        <p:nvSpPr>
-          <p:cNvPr id="2" name="Title 1">
-            <a:extLst>
-              <a:ext uri="{FF2B5EF4-FFF2-40B4-BE49-F238E27FC236}">
-                <a16:creationId xmlns:a16="http://schemas.microsoft.com/office/drawing/2014/main" id="{2609094E-9AF4-4201-AA85-247329965CA6}"/>
-              </a:ext>
-            </a:extLst>
-          </p:cNvPr>
-          <p:cNvSpPr>
-            <a:spLocks noGrp="1"/>
-          </p:cNvSpPr>
-          <p:nvPr>
-            <p:ph type="title"/>
-          </p:nvPr>
-        </p:nvSpPr>
-        <p:spPr/>
-        <p:txBody>
-          <a:bodyPr/>
-          <a:lstStyle/>
-          <a:p>
-            <a:r>
-              <a:rPr lang="he-IL" dirty="0"/>
-              <a:t>ועכשיו שאלה... איזה פיצוי עדיף (לתובע)?</a:t>
-            </a:r>
-            <a:endParaRPr lang="en-IL" dirty="0"/>
-          </a:p>
-        </p:txBody>
-      </p:sp>
-      <p:graphicFrame>
-        <p:nvGraphicFramePr>
-          <p:cNvPr id="4" name="Content Placeholder 3">
-            <a:extLst>
-              <a:ext uri="{FF2B5EF4-FFF2-40B4-BE49-F238E27FC236}">
-                <a16:creationId xmlns:a16="http://schemas.microsoft.com/office/drawing/2014/main" id="{7146B6F7-D50E-408D-AED8-EDD81718C351}"/>
-              </a:ext>
-            </a:extLst>
-          </p:cNvPr>
-          <p:cNvGraphicFramePr>
-            <a:graphicFrameLocks noGrp="1"/>
-          </p:cNvGraphicFramePr>
-          <p:nvPr>
-            <p:ph idx="1"/>
-            <p:extLst>
-              <p:ext uri="{D42A27DB-BD31-4B8C-83A1-F6EECF244321}">
-                <p14:modId xmlns:p14="http://schemas.microsoft.com/office/powerpoint/2010/main" val="3875507951"/>
-              </p:ext>
-            </p:extLst>
-          </p:nvPr>
-        </p:nvGraphicFramePr>
-        <p:xfrm>
-          <a:off x="609600" y="1676400"/>
-          <a:ext cx="10972800" cy="1752600"/>
-        </p:xfrm>
-        <a:graphic>
-          <a:graphicData uri="http://schemas.openxmlformats.org/drawingml/2006/table">
-            <a:tbl>
-              <a:tblPr rtl="1" firstRow="1" bandRow="1">
-                <a:tableStyleId>{5C22544A-7EE6-4342-B048-85BDC9FD1C3A}</a:tableStyleId>
-              </a:tblPr>
-              <a:tblGrid>
-                <a:gridCol w="2743200">
-                  <a:extLst>
-                    <a:ext uri="{9D8B030D-6E8A-4147-A177-3AD203B41FA5}">
-                      <a16:colId xmlns:a16="http://schemas.microsoft.com/office/drawing/2014/main" val="4045501347"/>
-                    </a:ext>
-                  </a:extLst>
-                </a:gridCol>
-                <a:gridCol w="2743200">
-                  <a:extLst>
-                    <a:ext uri="{9D8B030D-6E8A-4147-A177-3AD203B41FA5}">
-                      <a16:colId xmlns:a16="http://schemas.microsoft.com/office/drawing/2014/main" val="4201506355"/>
-                    </a:ext>
-                  </a:extLst>
-                </a:gridCol>
-                <a:gridCol w="2743200">
-                  <a:extLst>
-                    <a:ext uri="{9D8B030D-6E8A-4147-A177-3AD203B41FA5}">
-                      <a16:colId xmlns:a16="http://schemas.microsoft.com/office/drawing/2014/main" val="131704702"/>
-                    </a:ext>
-                  </a:extLst>
-                </a:gridCol>
-                <a:gridCol w="2743200">
-                  <a:extLst>
-                    <a:ext uri="{9D8B030D-6E8A-4147-A177-3AD203B41FA5}">
-                      <a16:colId xmlns:a16="http://schemas.microsoft.com/office/drawing/2014/main" val="131490105"/>
-                    </a:ext>
-                  </a:extLst>
-                </a:gridCol>
-              </a:tblGrid>
-              <a:tr h="370840">
-                <a:tc>
-                  <a:txBody>
-                    <a:bodyPr/>
-                    <a:lstStyle/>
-                    <a:p>
-                      <a:endParaRPr lang="en-IL" dirty="0"/>
-                    </a:p>
-                  </a:txBody>
-                  <a:tcPr anchor="ctr"/>
-                </a:tc>
-                <a:tc>
-                  <a:txBody>
-                    <a:bodyPr/>
-                    <a:lstStyle/>
-                    <a:p>
-                      <a:r>
-                        <a:rPr lang="he-IL" dirty="0"/>
-                        <a:t>אפשרות א'</a:t>
-                      </a:r>
-                      <a:endParaRPr lang="en-IL" dirty="0"/>
-                    </a:p>
-                  </a:txBody>
-                  <a:tcPr anchor="ctr"/>
-                </a:tc>
-                <a:tc>
-                  <a:txBody>
-                    <a:bodyPr/>
-                    <a:lstStyle/>
-                    <a:p>
-                      <a:r>
-                        <a:rPr lang="he-IL" dirty="0"/>
-                        <a:t>אפשרות ב'</a:t>
-                      </a:r>
-                      <a:endParaRPr lang="en-IL" dirty="0"/>
-                    </a:p>
-                  </a:txBody>
-                  <a:tcPr anchor="ctr"/>
-                </a:tc>
-                <a:tc>
-                  <a:txBody>
-                    <a:bodyPr/>
-                    <a:lstStyle/>
-                    <a:p>
-                      <a:r>
-                        <a:rPr lang="he-IL" dirty="0"/>
-                        <a:t>אפשרות ג'</a:t>
-                      </a:r>
-                      <a:endParaRPr lang="en-IL" dirty="0"/>
-                    </a:p>
-                  </a:txBody>
-                  <a:tcPr anchor="ctr"/>
-                </a:tc>
-                <a:extLst>
-                  <a:ext uri="{0D108BD9-81ED-4DB2-BD59-A6C34878D82A}">
-                    <a16:rowId xmlns:a16="http://schemas.microsoft.com/office/drawing/2014/main" val="3562553276"/>
-                  </a:ext>
-                </a:extLst>
-              </a:tr>
-              <a:tr h="370840">
-                <a:tc>
-                  <a:txBody>
-                    <a:bodyPr/>
-                    <a:lstStyle/>
-                    <a:p>
-                      <a:r>
-                        <a:rPr lang="he-IL" dirty="0"/>
-                        <a:t>שיטת הפיצוי</a:t>
-                      </a:r>
-                      <a:endParaRPr lang="en-IL" dirty="0"/>
-                    </a:p>
-                  </a:txBody>
-                  <a:tcPr anchor="ctr"/>
-                </a:tc>
-                <a:tc>
-                  <a:txBody>
-                    <a:bodyPr/>
-                    <a:lstStyle/>
-                    <a:p>
-                      <a:r>
-                        <a:rPr lang="he-IL" dirty="0"/>
-                        <a:t>אתה צריך לבקש</a:t>
-                      </a:r>
-                    </a:p>
-                    <a:p>
-                      <a:r>
-                        <a:rPr lang="he-IL" dirty="0"/>
-                        <a:t>(דורש פעולה אקטיבית)</a:t>
-                      </a:r>
-                      <a:endParaRPr lang="en-IL" dirty="0"/>
-                    </a:p>
-                  </a:txBody>
-                  <a:tcPr anchor="ctr"/>
-                </a:tc>
-                <a:tc>
-                  <a:txBody>
-                    <a:bodyPr/>
-                    <a:lstStyle/>
-                    <a:p>
-                      <a:r>
-                        <a:rPr lang="he-IL" dirty="0"/>
-                        <a:t>אתה צריך לבקש</a:t>
-                      </a:r>
-                    </a:p>
-                    <a:p>
-                      <a:r>
-                        <a:rPr lang="he-IL" dirty="0"/>
-                        <a:t>(דורש פעולה אקטיבית)</a:t>
-                      </a:r>
-                      <a:endParaRPr lang="en-IL" dirty="0"/>
-                    </a:p>
-                  </a:txBody>
-                  <a:tcPr anchor="ctr"/>
-                </a:tc>
-                <a:tc>
-                  <a:txBody>
-                    <a:bodyPr/>
-                    <a:lstStyle/>
-                    <a:p>
-                      <a:r>
-                        <a:rPr lang="he-IL" dirty="0"/>
-                        <a:t>אתה מקבל מבלי שתבקש (פסיבי – מקבל ב"דחיפה")</a:t>
-                      </a:r>
-                      <a:endParaRPr lang="en-IL" dirty="0"/>
-                    </a:p>
-                  </a:txBody>
-                  <a:tcPr anchor="ctr"/>
-                </a:tc>
-                <a:extLst>
-                  <a:ext uri="{0D108BD9-81ED-4DB2-BD59-A6C34878D82A}">
-                    <a16:rowId xmlns:a16="http://schemas.microsoft.com/office/drawing/2014/main" val="1349676725"/>
-                  </a:ext>
-                </a:extLst>
-              </a:tr>
-              <a:tr h="370840">
-                <a:tc>
-                  <a:txBody>
-                    <a:bodyPr/>
-                    <a:lstStyle/>
-                    <a:p>
-                      <a:r>
-                        <a:rPr lang="he-IL" dirty="0"/>
-                        <a:t>גובה הפיצוי (שווה ערך)</a:t>
-                      </a:r>
-                      <a:endParaRPr lang="en-IL" dirty="0"/>
-                    </a:p>
-                  </a:txBody>
-                  <a:tcPr anchor="ctr"/>
-                </a:tc>
-                <a:tc>
-                  <a:txBody>
-                    <a:bodyPr/>
-                    <a:lstStyle/>
-                    <a:p>
-                      <a:r>
-                        <a:rPr lang="he-IL" dirty="0"/>
-                        <a:t>75 ש"ח</a:t>
-                      </a:r>
-                      <a:endParaRPr lang="en-IL" dirty="0"/>
-                    </a:p>
-                  </a:txBody>
-                  <a:tcPr anchor="ctr"/>
-                </a:tc>
-                <a:tc>
-                  <a:txBody>
-                    <a:bodyPr/>
-                    <a:lstStyle/>
-                    <a:p>
-                      <a:r>
-                        <a:rPr lang="he-IL" dirty="0"/>
-                        <a:t>50 ש"ח</a:t>
-                      </a:r>
-                      <a:endParaRPr lang="en-IL" dirty="0"/>
-                    </a:p>
-                  </a:txBody>
-                  <a:tcPr anchor="ctr"/>
-                </a:tc>
-                <a:tc>
-                  <a:txBody>
-                    <a:bodyPr/>
-                    <a:lstStyle/>
-                    <a:p>
-                      <a:r>
-                        <a:rPr lang="he-IL" dirty="0"/>
-                        <a:t>25 ש"ח</a:t>
-                      </a:r>
-                      <a:endParaRPr lang="en-IL" dirty="0"/>
-                    </a:p>
-                  </a:txBody>
-                  <a:tcPr anchor="ctr"/>
-                </a:tc>
-                <a:extLst>
-                  <a:ext uri="{0D108BD9-81ED-4DB2-BD59-A6C34878D82A}">
-                    <a16:rowId xmlns:a16="http://schemas.microsoft.com/office/drawing/2014/main" val="1857164235"/>
-                  </a:ext>
-                </a:extLst>
-              </a:tr>
-              <a:tr h="370840">
-                <a:tc>
-                  <a:txBody>
-                    <a:bodyPr/>
-                    <a:lstStyle/>
-                    <a:p>
-                      <a:r>
-                        <a:rPr lang="he-IL" dirty="0"/>
-                        <a:t>אופן קבלת הפיצוי</a:t>
-                      </a:r>
-                      <a:endParaRPr lang="en-IL" dirty="0"/>
-                    </a:p>
-                  </a:txBody>
-                  <a:tcPr anchor="ctr"/>
-                </a:tc>
-                <a:tc>
-                  <a:txBody>
-                    <a:bodyPr/>
-                    <a:lstStyle/>
-                    <a:p>
-                      <a:pPr marL="0" marR="0" lvl="0" indent="0" algn="r" defTabSz="914400" rtl="1" eaLnBrk="1" fontAlgn="auto" latinLnBrk="0" hangingPunct="1">
-                        <a:lnSpc>
-                          <a:spcPct val="100000"/>
-                        </a:lnSpc>
-                        <a:spcBef>
-                          <a:spcPts val="0"/>
-                        </a:spcBef>
-                        <a:spcAft>
-                          <a:spcPts val="0"/>
-                        </a:spcAft>
-                        <a:buClrTx/>
-                        <a:buSzTx/>
-                        <a:buFontTx/>
-                        <a:buNone/>
-                        <a:tabLst/>
-                        <a:defRPr/>
-                      </a:pPr>
-                      <a:r>
-                        <a:rPr lang="he-IL" dirty="0"/>
-                        <a:t>החזר/זיכוי ברכישה הבאה</a:t>
-                      </a:r>
-                      <a:endParaRPr lang="en-IL" dirty="0"/>
-                    </a:p>
-                  </a:txBody>
-                  <a:tcPr anchor="ctr"/>
-                </a:tc>
-                <a:tc>
-                  <a:txBody>
-                    <a:bodyPr/>
-                    <a:lstStyle/>
-                    <a:p>
-                      <a:pPr marL="0" marR="0" lvl="0" indent="0" algn="r" defTabSz="914400" rtl="1" eaLnBrk="1" fontAlgn="auto" latinLnBrk="0" hangingPunct="1">
-                        <a:lnSpc>
-                          <a:spcPct val="100000"/>
-                        </a:lnSpc>
-                        <a:spcBef>
-                          <a:spcPts val="0"/>
-                        </a:spcBef>
-                        <a:spcAft>
-                          <a:spcPts val="0"/>
-                        </a:spcAft>
-                        <a:buClrTx/>
-                        <a:buSzTx/>
-                        <a:buFontTx/>
-                        <a:buNone/>
-                        <a:tabLst/>
-                        <a:defRPr/>
-                      </a:pPr>
-                      <a:r>
-                        <a:rPr lang="he-IL" dirty="0"/>
-                        <a:t>קבלת צ'ק</a:t>
-                      </a:r>
-                      <a:endParaRPr lang="en-IL" dirty="0"/>
-                    </a:p>
-                  </a:txBody>
-                  <a:tcPr anchor="ctr"/>
-                </a:tc>
-                <a:tc>
-                  <a:txBody>
-                    <a:bodyPr/>
-                    <a:lstStyle/>
-                    <a:p>
-                      <a:r>
-                        <a:rPr lang="he-IL" dirty="0"/>
-                        <a:t>זיכוי בכרטיס אשראי</a:t>
-                      </a:r>
-                      <a:endParaRPr lang="en-IL" dirty="0"/>
-                    </a:p>
-                  </a:txBody>
-                  <a:tcPr anchor="ctr"/>
-                </a:tc>
-                <a:extLst>
-                  <a:ext uri="{0D108BD9-81ED-4DB2-BD59-A6C34878D82A}">
-                    <a16:rowId xmlns:a16="http://schemas.microsoft.com/office/drawing/2014/main" val="253583456"/>
-                  </a:ext>
-                </a:extLst>
-              </a:tr>
-            </a:tbl>
-          </a:graphicData>
-        </a:graphic>
-      </p:graphicFrame>
-      <p:pic>
-        <p:nvPicPr>
-          <p:cNvPr id="8" name="Picture 7">
-            <a:extLst>
-              <a:ext uri="{FF2B5EF4-FFF2-40B4-BE49-F238E27FC236}">
-                <a16:creationId xmlns:a16="http://schemas.microsoft.com/office/drawing/2014/main" id="{BD14DDC7-4338-4359-B609-615DFFC0238D}"/>
-              </a:ext>
-            </a:extLst>
-          </p:cNvPr>
-          <p:cNvPicPr>
-            <a:picLocks noChangeAspect="1"/>
-          </p:cNvPicPr>
-          <p:nvPr/>
-        </p:nvPicPr>
-        <p:blipFill>
-          <a:blip r:embed="rId2">
-            <a:clrChange>
-              <a:clrFrom>
-                <a:srgbClr val="FFFFFF"/>
-              </a:clrFrom>
-              <a:clrTo>
-                <a:srgbClr val="FFFFFF">
-                  <a:alpha val="0"/>
-                </a:srgbClr>
-              </a:clrTo>
-            </a:clrChange>
-          </a:blip>
-          <a:stretch>
-            <a:fillRect/>
-          </a:stretch>
-        </p:blipFill>
-        <p:spPr>
-          <a:xfrm>
-            <a:off x="7941271" y="6101166"/>
-            <a:ext cx="946613" cy="631390"/>
-          </a:xfrm>
-          <a:prstGeom prst="rect">
-            <a:avLst/>
-          </a:prstGeom>
-        </p:spPr>
-      </p:pic>
-      <p:sp>
-        <p:nvSpPr>
-          <p:cNvPr id="10" name="Slide Number Placeholder 9">
-            <a:extLst>
-              <a:ext uri="{FF2B5EF4-FFF2-40B4-BE49-F238E27FC236}">
-                <a16:creationId xmlns:a16="http://schemas.microsoft.com/office/drawing/2014/main" id="{687C9A4A-7E2D-4B6C-AB42-465F35240765}"/>
-              </a:ext>
-            </a:extLst>
-          </p:cNvPr>
-          <p:cNvSpPr>
-            <a:spLocks noGrp="1"/>
-          </p:cNvSpPr>
-          <p:nvPr>
-            <p:ph type="sldNum" sz="quarter" idx="12"/>
-          </p:nvPr>
-        </p:nvSpPr>
-        <p:spPr/>
-        <p:txBody>
-          <a:bodyPr/>
-          <a:lstStyle/>
-          <a:p>
-            <a:fld id="{48C2FE54-953E-4268-8452-225DF8E36AC9}" type="slidenum">
-              <a:rPr lang="he-IL" smtClean="0"/>
-              <a:t>9</a:t>
-            </a:fld>
-            <a:endParaRPr lang="he-IL"/>
-          </a:p>
-        </p:txBody>
-      </p:sp>
-      <p:sp>
-        <p:nvSpPr>
-          <p:cNvPr id="5" name="TextBox 4">
-            <a:extLst>
-              <a:ext uri="{FF2B5EF4-FFF2-40B4-BE49-F238E27FC236}">
-                <a16:creationId xmlns:a16="http://schemas.microsoft.com/office/drawing/2014/main" id="{66EC3763-B42C-4E99-8C1A-2ADABA3D4356}"/>
-              </a:ext>
-            </a:extLst>
-          </p:cNvPr>
-          <p:cNvSpPr txBox="1"/>
-          <p:nvPr/>
-        </p:nvSpPr>
-        <p:spPr>
-          <a:xfrm>
-            <a:off x="3448378" y="3651408"/>
-            <a:ext cx="8134022" cy="2369880"/>
-          </a:xfrm>
-          <a:prstGeom prst="rect">
-            <a:avLst/>
-          </a:prstGeom>
-          <a:noFill/>
-        </p:spPr>
-        <p:txBody>
-          <a:bodyPr wrap="none" rtlCol="0">
-            <a:spAutoFit/>
-          </a:bodyPr>
-          <a:lstStyle/>
-          <a:p>
-            <a:r>
-              <a:rPr lang="he-IL" sz="1600" dirty="0"/>
-              <a:t>הצגנו למשיבים סדרה של 5 שאלות. בכל שאלה 3 אפשרויות בטבלה.</a:t>
-            </a:r>
-          </a:p>
-          <a:p>
-            <a:r>
-              <a:rPr lang="he-IL" sz="1600" dirty="0"/>
-              <a:t>סה"כ יש 40 צירופים שונים אפשריים (כל משיב ענה על חלק מהם).</a:t>
-            </a:r>
-          </a:p>
-          <a:p>
-            <a:endParaRPr lang="he-IL" sz="1600" dirty="0"/>
-          </a:p>
-          <a:p>
-            <a:r>
-              <a:rPr lang="he-IL" sz="1600" dirty="0"/>
-              <a:t>השילובים מתייחסים לשלושת הקטגוריות:</a:t>
-            </a:r>
-          </a:p>
-          <a:p>
-            <a:r>
-              <a:rPr lang="he-IL" sz="1600" dirty="0"/>
-              <a:t>	שיטת הפיצוי (בקשה / דחיפה) </a:t>
-            </a:r>
-            <a:br>
-              <a:rPr lang="en-US" sz="1600" dirty="0"/>
-            </a:br>
-            <a:r>
-              <a:rPr lang="he-IL" sz="1600" dirty="0"/>
-              <a:t>	סכום הפיצוי (25, 50, 75, 100)</a:t>
-            </a:r>
-          </a:p>
-          <a:p>
-            <a:r>
-              <a:rPr lang="he-IL" sz="1600" dirty="0"/>
-              <a:t>	אופן קבלת הפיצוי (מוצר משלים לרכישה, כרטיס אשראי, צ'ק, החזר ברכישה הבאה, קופון)</a:t>
-            </a:r>
-          </a:p>
-          <a:p>
-            <a:endParaRPr lang="he-IL" sz="1600" dirty="0"/>
-          </a:p>
-          <a:p>
-            <a:r>
-              <a:rPr lang="he-IL" sz="1600" dirty="0"/>
-              <a:t>זה מאפשר לנו לנתח מהם הגורמים העדיפים ביותר מבחינת תובעים.</a:t>
-            </a:r>
-            <a:endParaRPr lang="en-IL" sz="1600" dirty="0"/>
-          </a:p>
-        </p:txBody>
-      </p:sp>
-      <p:sp>
-        <p:nvSpPr>
-          <p:cNvPr id="3" name="Rectangle 2">
-            <a:extLst>
-              <a:ext uri="{FF2B5EF4-FFF2-40B4-BE49-F238E27FC236}">
-                <a16:creationId xmlns:a16="http://schemas.microsoft.com/office/drawing/2014/main" id="{62ECF144-14A2-4184-91C1-E4318CC5A7D0}"/>
-              </a:ext>
-            </a:extLst>
-          </p:cNvPr>
-          <p:cNvSpPr/>
-          <p:nvPr/>
-        </p:nvSpPr>
-        <p:spPr>
-          <a:xfrm>
-            <a:off x="609600" y="1671067"/>
-            <a:ext cx="5486400" cy="1752600"/>
-          </a:xfrm>
-          <a:prstGeom prst="rect">
-            <a:avLst/>
-          </a:prstGeom>
-        </p:spPr>
-        <p:style>
-          <a:lnRef idx="2">
-            <a:schemeClr val="accent1">
-              <a:shade val="50000"/>
-            </a:schemeClr>
-          </a:lnRef>
-          <a:fillRef idx="1">
-            <a:schemeClr val="accent1"/>
-          </a:fillRef>
-          <a:effectRef idx="0">
-            <a:schemeClr val="accent1"/>
-          </a:effectRef>
-          <a:fontRef idx="minor">
-            <a:schemeClr val="lt1"/>
-          </a:fontRef>
-        </p:style>
-        <p:txBody>
-          <a:bodyPr rtlCol="0" anchor="ctr"/>
-          <a:lstStyle/>
-          <a:p>
-            <a:pPr algn="ctr"/>
-            <a:endParaRPr lang="en-IL"/>
-          </a:p>
-        </p:txBody>
-      </p:sp>
-      <p:sp>
-        <p:nvSpPr>
-          <p:cNvPr id="11" name="Rectangle 10">
-            <a:extLst>
-              <a:ext uri="{FF2B5EF4-FFF2-40B4-BE49-F238E27FC236}">
-                <a16:creationId xmlns:a16="http://schemas.microsoft.com/office/drawing/2014/main" id="{4C63CD56-6337-49E1-A43D-FA09F0EA3DDC}"/>
-              </a:ext>
-            </a:extLst>
-          </p:cNvPr>
-          <p:cNvSpPr/>
-          <p:nvPr/>
-        </p:nvSpPr>
-        <p:spPr>
-          <a:xfrm>
-            <a:off x="609600" y="1671067"/>
-            <a:ext cx="2750096" cy="1752600"/>
-          </a:xfrm>
-          <a:prstGeom prst="rect">
-            <a:avLst/>
-          </a:prstGeom>
-        </p:spPr>
-        <p:style>
-          <a:lnRef idx="2">
-            <a:schemeClr val="accent1">
-              <a:shade val="50000"/>
-            </a:schemeClr>
-          </a:lnRef>
-          <a:fillRef idx="1">
-            <a:schemeClr val="accent1"/>
-          </a:fillRef>
-          <a:effectRef idx="0">
-            <a:schemeClr val="accent1"/>
-          </a:effectRef>
-          <a:fontRef idx="minor">
-            <a:schemeClr val="lt1"/>
-          </a:fontRef>
-        </p:style>
-        <p:txBody>
-          <a:bodyPr rtlCol="0" anchor="ctr"/>
-          <a:lstStyle/>
-          <a:p>
-            <a:pPr algn="ctr"/>
-            <a:endParaRPr lang="en-IL"/>
-          </a:p>
-        </p:txBody>
-      </p:sp>
-      <p:sp>
-        <p:nvSpPr>
-          <p:cNvPr id="6" name="Rectangle: Rounded Corners 5">
-            <a:extLst>
-              <a:ext uri="{FF2B5EF4-FFF2-40B4-BE49-F238E27FC236}">
-                <a16:creationId xmlns:a16="http://schemas.microsoft.com/office/drawing/2014/main" id="{6E1363FC-05A2-4DD1-BE14-E93E816E7976}"/>
-              </a:ext>
-            </a:extLst>
-          </p:cNvPr>
-          <p:cNvSpPr/>
-          <p:nvPr/>
-        </p:nvSpPr>
-        <p:spPr>
-          <a:xfrm rot="19800000">
-            <a:off x="696930" y="4504442"/>
-            <a:ext cx="2462064" cy="658790"/>
-          </a:xfrm>
-          <a:prstGeom prst="roundRect">
-            <a:avLst/>
-          </a:prstGeom>
-        </p:spPr>
-        <p:style>
-          <a:lnRef idx="1">
-            <a:schemeClr val="accent6"/>
-          </a:lnRef>
-          <a:fillRef idx="2">
-            <a:schemeClr val="accent6"/>
-          </a:fillRef>
-          <a:effectRef idx="1">
-            <a:schemeClr val="accent6"/>
-          </a:effectRef>
-          <a:fontRef idx="minor">
-            <a:schemeClr val="dk1"/>
-          </a:fontRef>
-        </p:style>
-        <p:txBody>
-          <a:bodyPr rtlCol="0" anchor="ctr"/>
-          <a:lstStyle/>
-          <a:p>
-            <a:pPr algn="ctr"/>
-            <a:r>
-              <a:rPr lang="en-US" dirty="0"/>
-              <a:t>Conjoint Analysis</a:t>
-            </a:r>
-            <a:endParaRPr lang="en-IL" dirty="0"/>
-          </a:p>
-        </p:txBody>
-      </p:sp>
-    </p:spTree>
-    <p:extLst>
-      <p:ext uri="{BB962C8B-B14F-4D97-AF65-F5344CB8AC3E}">
-        <p14:creationId xmlns:p14="http://schemas.microsoft.com/office/powerpoint/2010/main" val="2360038099"/>
-      </p:ext>
-    </p:extLst>
-  </p:cSld>
-  <p:clrMapOvr>
-    <a:masterClrMapping/>
-  </p:clrMapOvr>
-  <p:timing>
-    <p:tnLst>
-      <p:par>
-        <p:cTn id="1" dur="indefinite" restart="never" nodeType="tmRoot">
-          <p:childTnLst>
-            <p:seq concurrent="1" nextAc="seek">
-              <p:cTn id="2" dur="indefinite" nodeType="mainSeq">
-                <p:childTnLst>
-                  <p:par>
-                    <p:cTn id="3" fill="hold">
-                      <p:stCondLst>
-                        <p:cond delay="indefinite"/>
-                      </p:stCondLst>
-                      <p:childTnLst>
-                        <p:par>
-                          <p:cTn id="4" fill="hold">
-                            <p:stCondLst>
-                              <p:cond delay="0"/>
-                            </p:stCondLst>
-                            <p:childTnLst>
-                              <p:par>
-                                <p:cTn id="5" presetID="1" presetClass="exit" presetSubtype="0" fill="hold" grpId="0" nodeType="clickEffect">
-                                  <p:stCondLst>
-                                    <p:cond delay="0"/>
-                                  </p:stCondLst>
-                                  <p:childTnLst>
-                                    <p:set>
-                                      <p:cBhvr>
-                                        <p:cTn id="6" dur="1" fill="hold">
-                                          <p:stCondLst>
-                                            <p:cond delay="0"/>
-                                          </p:stCondLst>
-                                        </p:cTn>
-                                        <p:tgtEl>
-                                          <p:spTgt spid="3"/>
-                                        </p:tgtEl>
-                                        <p:attrNameLst>
-                                          <p:attrName>style.visibility</p:attrName>
-                                        </p:attrNameLst>
-                                      </p:cBhvr>
-                                      <p:to>
-                                        <p:strVal val="hidden"/>
-                                      </p:to>
-                                    </p:set>
-                                  </p:childTnLst>
-                                </p:cTn>
-                              </p:par>
-                            </p:childTnLst>
-                          </p:cTn>
-                        </p:par>
-                      </p:childTnLst>
-                    </p:cTn>
-                  </p:par>
-                  <p:par>
-                    <p:cTn id="7" fill="hold">
-                      <p:stCondLst>
-                        <p:cond delay="indefinite"/>
-                      </p:stCondLst>
-                      <p:childTnLst>
-                        <p:par>
-                          <p:cTn id="8" fill="hold">
-                            <p:stCondLst>
-                              <p:cond delay="0"/>
-                            </p:stCondLst>
-                            <p:childTnLst>
-                              <p:par>
-                                <p:cTn id="9" presetID="1" presetClass="exit" presetSubtype="0" fill="hold" grpId="0" nodeType="clickEffect">
-                                  <p:stCondLst>
-                                    <p:cond delay="0"/>
-                                  </p:stCondLst>
-                                  <p:childTnLst>
-                                    <p:set>
-                                      <p:cBhvr>
-                                        <p:cTn id="10" dur="1" fill="hold">
-                                          <p:stCondLst>
-                                            <p:cond delay="0"/>
-                                          </p:stCondLst>
-                                        </p:cTn>
-                                        <p:tgtEl>
-                                          <p:spTgt spid="11"/>
-                                        </p:tgtEl>
-                                        <p:attrNameLst>
-                                          <p:attrName>style.visibility</p:attrName>
-                                        </p:attrNameLst>
-                                      </p:cBhvr>
-                                      <p:to>
-                                        <p:strVal val="hidden"/>
-                                      </p:to>
-                                    </p:set>
-                                  </p:childTnLst>
-                                </p:cTn>
-                              </p:par>
-                            </p:childTnLst>
-                          </p:cTn>
-                        </p:par>
-                      </p:childTnLst>
-                    </p:cTn>
-                  </p:par>
-                  <p:par>
-                    <p:cTn id="11" fill="hold">
-                      <p:stCondLst>
-                        <p:cond delay="indefinite"/>
-                      </p:stCondLst>
-                      <p:childTnLst>
-                        <p:par>
-                          <p:cTn id="12" fill="hold">
-                            <p:stCondLst>
-                              <p:cond delay="0"/>
-                            </p:stCondLst>
-                            <p:childTnLst>
-                              <p:par>
-                                <p:cTn id="13" presetID="1" presetClass="entr" presetSubtype="0" fill="hold" grpId="0" nodeType="clickEffect">
-                                  <p:stCondLst>
-                                    <p:cond delay="0"/>
-                                  </p:stCondLst>
-                                  <p:childTnLst>
-                                    <p:set>
-                                      <p:cBhvr>
-                                        <p:cTn id="14" dur="1" fill="hold">
-                                          <p:stCondLst>
-                                            <p:cond delay="0"/>
-                                          </p:stCondLst>
-                                        </p:cTn>
-                                        <p:tgtEl>
-                                          <p:spTgt spid="5"/>
-                                        </p:tgtEl>
-                                        <p:attrNameLst>
-                                          <p:attrName>style.visibility</p:attrName>
-                                        </p:attrNameLst>
-                                      </p:cBhvr>
-                                      <p:to>
-                                        <p:strVal val="visible"/>
-                                      </p:to>
-                                    </p:set>
-                                  </p:childTnLst>
-                                </p:cTn>
-                              </p:par>
-                            </p:childTnLst>
-                          </p:cTn>
-                        </p:par>
-                      </p:childTnLst>
-                    </p:cTn>
-                  </p:par>
-                  <p:par>
-                    <p:cTn id="15" fill="hold">
-                      <p:stCondLst>
-                        <p:cond delay="indefinite"/>
-                      </p:stCondLst>
-                      <p:childTnLst>
-                        <p:par>
-                          <p:cTn id="16" fill="hold">
-                            <p:stCondLst>
-                              <p:cond delay="0"/>
-                            </p:stCondLst>
-                            <p:childTnLst>
-                              <p:par>
-                                <p:cTn id="17" presetID="1" presetClass="entr" presetSubtype="0" fill="hold" grpId="0" nodeType="clickEffect">
-                                  <p:stCondLst>
-                                    <p:cond delay="0"/>
-                                  </p:stCondLst>
-                                  <p:childTnLst>
-                                    <p:set>
-                                      <p:cBhvr>
-                                        <p:cTn id="18" dur="1" fill="hold">
-                                          <p:stCondLst>
-                                            <p:cond delay="0"/>
-                                          </p:stCondLst>
-                                        </p:cTn>
-                                        <p:tgtEl>
-                                          <p:spTgt spid="6"/>
-                                        </p:tgtEl>
-                                        <p:attrNameLst>
-                                          <p:attrName>style.visibility</p:attrName>
-                                        </p:attrNameLst>
-                                      </p:cBhvr>
-                                      <p:to>
-                                        <p:strVal val="visible"/>
-                                      </p:to>
-                                    </p:set>
-                                  </p:childTnLst>
-                                </p:cTn>
-                              </p:par>
-                            </p:childTnLst>
-                          </p:cTn>
-                        </p:par>
-                      </p:childTnLst>
-                    </p:cTn>
-                  </p:par>
-                </p:childTnLst>
-              </p:cTn>
-              <p:prevCondLst>
-                <p:cond evt="onPrev" delay="0">
-                  <p:tgtEl>
-                    <p:sldTgt/>
-                  </p:tgtEl>
-                </p:cond>
-              </p:prevCondLst>
-              <p:nextCondLst>
-                <p:cond evt="onNext" delay="0">
-                  <p:tgtEl>
-                    <p:sldTgt/>
-                  </p:tgtEl>
-                </p:cond>
-              </p:nextCondLst>
-            </p:seq>
-          </p:childTnLst>
-        </p:cTn>
-      </p:par>
-    </p:tnLst>
-    <p:bldLst>
-      <p:bldP spid="5" grpId="0"/>
-      <p:bldP spid="3" grpId="0" animBg="1"/>
-      <p:bldP spid="11" grpId="0" animBg="1"/>
-      <p:bldP spid="6" grpId="0" animBg="1"/>
-    </p:bldLst>
-  </p:timing>
 </p:sld>
 </file>
 

</xml_diff>

<commit_message>
Added link to download files
</commit_message>
<xml_diff>
--- a/presentation/2019-02-03 - Presentation for the 9th class action conference.pptx
+++ b/presentation/2019-02-03 - Presentation for the 9th class action conference.pptx
@@ -5,7 +5,7 @@
     <p:sldMasterId id="2147483648" r:id="rId1"/>
   </p:sldMasterIdLst>
   <p:notesMasterIdLst>
-    <p:notesMasterId r:id="rId28"/>
+    <p:notesMasterId r:id="rId29"/>
   </p:notesMasterIdLst>
   <p:sldIdLst>
     <p:sldId id="256" r:id="rId2"/>
@@ -34,6 +34,7 @@
     <p:sldId id="284" r:id="rId25"/>
     <p:sldId id="282" r:id="rId26"/>
     <p:sldId id="287" r:id="rId27"/>
+    <p:sldId id="288" r:id="rId28"/>
   </p:sldIdLst>
   <p:sldSz cx="12192000" cy="6858000"/>
   <p:notesSz cx="6858000" cy="9144000"/>
@@ -3115,7 +3116,7 @@
           <a:p>
             <a:fld id="{73BF8E3D-5E22-4059-9A35-78124FC50279}" type="datetimeFigureOut">
               <a:rPr lang="en-IL" smtClean="0"/>
-              <a:t>01/02/2019</a:t>
+              <a:t>02/02/2019</a:t>
             </a:fld>
             <a:endParaRPr lang="en-IL"/>
           </a:p>
@@ -3582,7 +3583,7 @@
           <a:p>
             <a:fld id="{F76F7359-3BC2-4986-8A2B-31103FDDAE1C}" type="datetime8">
               <a:rPr lang="he-IL" smtClean="0"/>
-              <a:t>01 פברואר 19</a:t>
+              <a:t>02 פברואר 19</a:t>
             </a:fld>
             <a:endParaRPr lang="he-IL"/>
           </a:p>
@@ -3756,7 +3757,7 @@
           <a:p>
             <a:fld id="{5C1CAD4F-A081-4FDA-92F2-AA51A957AE39}" type="datetime8">
               <a:rPr lang="he-IL" smtClean="0"/>
-              <a:t>01 פברואר 19</a:t>
+              <a:t>02 פברואר 19</a:t>
             </a:fld>
             <a:endParaRPr lang="he-IL"/>
           </a:p>
@@ -4103,7 +4104,7 @@
           <a:p>
             <a:fld id="{D07BAE3C-A9EF-4863-8620-284FD195C69B}" type="datetime8">
               <a:rPr lang="he-IL" smtClean="0"/>
-              <a:t>01 פברואר 19</a:t>
+              <a:t>02 פברואר 19</a:t>
             </a:fld>
             <a:endParaRPr lang="he-IL"/>
           </a:p>
@@ -4555,7 +4556,7 @@
           <a:p>
             <a:fld id="{3C55EC17-C85B-464F-8188-434EB50AC50E}" type="datetime8">
               <a:rPr lang="he-IL" smtClean="0"/>
-              <a:t>01 פברואר 19</a:t>
+              <a:t>02 פברואר 19</a:t>
             </a:fld>
             <a:endParaRPr lang="he-IL"/>
           </a:p>
@@ -4703,7 +4704,7 @@
           <a:p>
             <a:fld id="{C30FEFB3-9777-4A1D-AF5C-BE325C0489A5}" type="datetime8">
               <a:rPr lang="he-IL" smtClean="0"/>
-              <a:t>01 פברואר 19</a:t>
+              <a:t>02 פברואר 19</a:t>
             </a:fld>
             <a:endParaRPr lang="he-IL"/>
           </a:p>
@@ -4828,7 +4829,7 @@
           <a:p>
             <a:fld id="{588A6826-0F8D-44BE-84F0-748C5D8D10C4}" type="datetime8">
               <a:rPr lang="he-IL" smtClean="0"/>
-              <a:t>01 פברואר 19</a:t>
+              <a:t>02 פברואר 19</a:t>
             </a:fld>
             <a:endParaRPr lang="he-IL"/>
           </a:p>
@@ -5080,7 +5081,7 @@
           <a:p>
             <a:fld id="{EF44FB19-2E14-401A-9632-489004493145}" type="datetime8">
               <a:rPr lang="he-IL" smtClean="0"/>
-              <a:t>01 פברואר 19</a:t>
+              <a:t>02 פברואר 19</a:t>
             </a:fld>
             <a:endParaRPr lang="he-IL" dirty="0"/>
           </a:p>
@@ -11800,6 +11801,267 @@
     <p:extLst>
       <p:ext uri="{BB962C8B-B14F-4D97-AF65-F5344CB8AC3E}">
         <p14:creationId xmlns:p14="http://schemas.microsoft.com/office/powerpoint/2010/main" val="4024806867"/>
+      </p:ext>
+    </p:extLst>
+  </p:cSld>
+  <p:clrMapOvr>
+    <a:masterClrMapping/>
+  </p:clrMapOvr>
+</p:sld>
+</file>
+
+<file path=ppt/slides/slide27.xml><?xml version="1.0" encoding="utf-8"?>
+<p:sld xmlns:a="http://schemas.openxmlformats.org/drawingml/2006/main" xmlns:r="http://schemas.openxmlformats.org/officeDocument/2006/relationships" xmlns:p="http://schemas.openxmlformats.org/presentationml/2006/main">
+  <p:cSld>
+    <p:spTree>
+      <p:nvGrpSpPr>
+        <p:cNvPr id="1" name=""/>
+        <p:cNvGrpSpPr/>
+        <p:nvPr/>
+      </p:nvGrpSpPr>
+      <p:grpSpPr>
+        <a:xfrm>
+          <a:off x="0" y="0"/>
+          <a:ext cx="0" cy="0"/>
+          <a:chOff x="0" y="0"/>
+          <a:chExt cx="0" cy="0"/>
+        </a:xfrm>
+      </p:grpSpPr>
+      <p:sp>
+        <p:nvSpPr>
+          <p:cNvPr id="5" name="Title 4">
+            <a:extLst>
+              <a:ext uri="{FF2B5EF4-FFF2-40B4-BE49-F238E27FC236}">
+                <a16:creationId xmlns:a16="http://schemas.microsoft.com/office/drawing/2014/main" id="{E8A233B0-93A5-40E3-A23A-76D9403BDA49}"/>
+              </a:ext>
+            </a:extLst>
+          </p:cNvPr>
+          <p:cNvSpPr>
+            <a:spLocks noGrp="1"/>
+          </p:cNvSpPr>
+          <p:nvPr>
+            <p:ph type="ctrTitle"/>
+          </p:nvPr>
+        </p:nvSpPr>
+        <p:spPr/>
+        <p:txBody>
+          <a:bodyPr>
+            <a:normAutofit/>
+          </a:bodyPr>
+          <a:lstStyle/>
+          <a:p>
+            <a:r>
+              <a:rPr lang="he-IL" dirty="0"/>
+              <a:t>להורדת הנתונים:</a:t>
+            </a:r>
+            <a:br>
+              <a:rPr lang="he-IL" dirty="0"/>
+            </a:br>
+            <a:r>
+              <a:rPr lang="en-US" dirty="0">
+                <a:hlinkClick r:id="rId2"/>
+              </a:rPr>
+              <a:t>http://bit.ly/class-action-IL</a:t>
+            </a:r>
+            <a:endParaRPr lang="en-IL" dirty="0"/>
+          </a:p>
+        </p:txBody>
+      </p:sp>
+      <p:sp>
+        <p:nvSpPr>
+          <p:cNvPr id="6" name="Subtitle 5">
+            <a:extLst>
+              <a:ext uri="{FF2B5EF4-FFF2-40B4-BE49-F238E27FC236}">
+                <a16:creationId xmlns:a16="http://schemas.microsoft.com/office/drawing/2014/main" id="{D30F0D9E-A9A9-4A4F-80A8-55B814554828}"/>
+              </a:ext>
+            </a:extLst>
+          </p:cNvPr>
+          <p:cNvSpPr>
+            <a:spLocks noGrp="1"/>
+          </p:cNvSpPr>
+          <p:nvPr>
+            <p:ph type="subTitle" idx="1"/>
+          </p:nvPr>
+        </p:nvSpPr>
+        <p:spPr/>
+        <p:txBody>
+          <a:bodyPr/>
+          <a:lstStyle/>
+          <a:p>
+            <a:r>
+              <a:rPr lang="he-IL" dirty="0"/>
+              <a:t>או "מכון שריד" בגוגל -&gt; ובתפריט הבלוג</a:t>
+            </a:r>
+            <a:endParaRPr lang="en-IL" dirty="0"/>
+          </a:p>
+        </p:txBody>
+      </p:sp>
+      <p:sp>
+        <p:nvSpPr>
+          <p:cNvPr id="4" name="Slide Number Placeholder 3">
+            <a:extLst>
+              <a:ext uri="{FF2B5EF4-FFF2-40B4-BE49-F238E27FC236}">
+                <a16:creationId xmlns:a16="http://schemas.microsoft.com/office/drawing/2014/main" id="{F625415C-6C72-4149-90B9-8DD71070E960}"/>
+              </a:ext>
+            </a:extLst>
+          </p:cNvPr>
+          <p:cNvSpPr>
+            <a:spLocks noGrp="1"/>
+          </p:cNvSpPr>
+          <p:nvPr>
+            <p:ph type="sldNum" sz="quarter" idx="12"/>
+          </p:nvPr>
+        </p:nvSpPr>
+        <p:spPr/>
+        <p:txBody>
+          <a:bodyPr/>
+          <a:lstStyle/>
+          <a:p>
+            <a:fld id="{48C2FE54-953E-4268-8452-225DF8E36AC9}" type="slidenum">
+              <a:rPr lang="he-IL" smtClean="0"/>
+              <a:t>27</a:t>
+            </a:fld>
+            <a:endParaRPr lang="he-IL"/>
+          </a:p>
+        </p:txBody>
+      </p:sp>
+      <p:grpSp>
+        <p:nvGrpSpPr>
+          <p:cNvPr id="3" name="Group 2">
+            <a:extLst>
+              <a:ext uri="{FF2B5EF4-FFF2-40B4-BE49-F238E27FC236}">
+                <a16:creationId xmlns:a16="http://schemas.microsoft.com/office/drawing/2014/main" id="{31C6E376-705A-4916-B608-01CAF5E265F5}"/>
+              </a:ext>
+            </a:extLst>
+          </p:cNvPr>
+          <p:cNvGrpSpPr/>
+          <p:nvPr/>
+        </p:nvGrpSpPr>
+        <p:grpSpPr>
+          <a:xfrm>
+            <a:off x="3791744" y="5233458"/>
+            <a:ext cx="3600400" cy="931846"/>
+            <a:chOff x="3791744" y="5373216"/>
+            <a:chExt cx="3600400" cy="931846"/>
+          </a:xfrm>
+        </p:grpSpPr>
+        <p:sp>
+          <p:nvSpPr>
+            <p:cNvPr id="2" name="TextBox 1">
+              <a:extLst>
+                <a:ext uri="{FF2B5EF4-FFF2-40B4-BE49-F238E27FC236}">
+                  <a16:creationId xmlns:a16="http://schemas.microsoft.com/office/drawing/2014/main" id="{C912B3F2-F7B8-4E0B-8126-6DDE1B8B84DB}"/>
+                </a:ext>
+              </a:extLst>
+            </p:cNvPr>
+            <p:cNvSpPr txBox="1"/>
+            <p:nvPr/>
+          </p:nvSpPr>
+          <p:spPr>
+            <a:xfrm>
+              <a:off x="3791744" y="5373216"/>
+              <a:ext cx="3600400" cy="923330"/>
+            </a:xfrm>
+            <a:prstGeom prst="rect">
+              <a:avLst/>
+            </a:prstGeom>
+            <a:noFill/>
+          </p:spPr>
+          <p:txBody>
+            <a:bodyPr wrap="square" rtlCol="0">
+              <a:spAutoFit/>
+            </a:bodyPr>
+            <a:lstStyle/>
+            <a:p>
+              <a:pPr algn="l" rtl="0"/>
+              <a:r>
+                <a:rPr lang="en-US" dirty="0">
+                  <a:hlinkClick r:id="rId3"/>
+                </a:rPr>
+                <a:t>adi@sarid-ins.co.il</a:t>
+              </a:r>
+              <a:endParaRPr lang="en-US" dirty="0"/>
+            </a:p>
+            <a:p>
+              <a:pPr algn="l" rtl="0"/>
+              <a:endParaRPr lang="en-US" dirty="0"/>
+            </a:p>
+            <a:p>
+              <a:pPr algn="l" rtl="0"/>
+              <a:r>
+                <a:rPr lang="en-US" dirty="0"/>
+                <a:t>@</a:t>
+              </a:r>
+              <a:r>
+                <a:rPr lang="en-US" dirty="0" err="1"/>
+                <a:t>SaridResearch</a:t>
+              </a:r>
+              <a:endParaRPr lang="en-IL" dirty="0"/>
+            </a:p>
+          </p:txBody>
+        </p:sp>
+        <p:pic>
+          <p:nvPicPr>
+            <p:cNvPr id="1028" name="Picture 4" descr="Twitter Logo">
+              <a:extLst>
+                <a:ext uri="{FF2B5EF4-FFF2-40B4-BE49-F238E27FC236}">
+                  <a16:creationId xmlns:a16="http://schemas.microsoft.com/office/drawing/2014/main" id="{65ED48E3-2E51-42B1-AA03-77347CE4FF72}"/>
+                </a:ext>
+              </a:extLst>
+            </p:cNvPr>
+            <p:cNvPicPr>
+              <a:picLocks noChangeAspect="1" noChangeArrowheads="1"/>
+            </p:cNvPicPr>
+            <p:nvPr/>
+          </p:nvPicPr>
+          <p:blipFill>
+            <a:blip r:embed="rId4" cstate="print">
+              <a:clrChange>
+                <a:clrFrom>
+                  <a:srgbClr val="F2F2F2"/>
+                </a:clrFrom>
+                <a:clrTo>
+                  <a:srgbClr val="F2F2F2">
+                    <a:alpha val="0"/>
+                  </a:srgbClr>
+                </a:clrTo>
+              </a:clrChange>
+              <a:extLst>
+                <a:ext uri="{28A0092B-C50C-407E-A947-70E740481C1C}">
+                  <a14:useLocalDpi xmlns:a14="http://schemas.microsoft.com/office/drawing/2010/main" val="0"/>
+                </a:ext>
+              </a:extLst>
+            </a:blip>
+            <a:srcRect/>
+            <a:stretch>
+              <a:fillRect/>
+            </a:stretch>
+          </p:blipFill>
+          <p:spPr bwMode="auto">
+            <a:xfrm>
+              <a:off x="5289213" y="5885870"/>
+              <a:ext cx="745893" cy="419192"/>
+            </a:xfrm>
+            <a:prstGeom prst="rect">
+              <a:avLst/>
+            </a:prstGeom>
+            <a:noFill/>
+            <a:extLst>
+              <a:ext uri="{909E8E84-426E-40DD-AFC4-6F175D3DCCD1}">
+                <a14:hiddenFill xmlns:a14="http://schemas.microsoft.com/office/drawing/2010/main">
+                  <a:solidFill>
+                    <a:srgbClr val="FFFFFF"/>
+                  </a:solidFill>
+                </a14:hiddenFill>
+              </a:ext>
+            </a:extLst>
+          </p:spPr>
+        </p:pic>
+      </p:grpSp>
+    </p:spTree>
+    <p:extLst>
+      <p:ext uri="{BB962C8B-B14F-4D97-AF65-F5344CB8AC3E}">
+        <p14:creationId xmlns:p14="http://schemas.microsoft.com/office/powerpoint/2010/main" val="4134208221"/>
       </p:ext>
     </p:extLst>
   </p:cSld>

</xml_diff>

<commit_message>
Added link to shiny app
</commit_message>
<xml_diff>
--- a/presentation/2019-02-03 - Presentation for the 9th class action conference.pptx
+++ b/presentation/2019-02-03 - Presentation for the 9th class action conference.pptx
@@ -3116,7 +3116,7 @@
           <a:p>
             <a:fld id="{73BF8E3D-5E22-4059-9A35-78124FC50279}" type="datetimeFigureOut">
               <a:rPr lang="en-IL" smtClean="0"/>
-              <a:t>02/02/2019</a:t>
+              <a:t>03/02/2019</a:t>
             </a:fld>
             <a:endParaRPr lang="en-IL"/>
           </a:p>
@@ -3583,7 +3583,7 @@
           <a:p>
             <a:fld id="{F76F7359-3BC2-4986-8A2B-31103FDDAE1C}" type="datetime8">
               <a:rPr lang="he-IL" smtClean="0"/>
-              <a:t>02 פברואר 19</a:t>
+              <a:t>03 פברואר 19</a:t>
             </a:fld>
             <a:endParaRPr lang="he-IL"/>
           </a:p>
@@ -3757,7 +3757,7 @@
           <a:p>
             <a:fld id="{5C1CAD4F-A081-4FDA-92F2-AA51A957AE39}" type="datetime8">
               <a:rPr lang="he-IL" smtClean="0"/>
-              <a:t>02 פברואר 19</a:t>
+              <a:t>03 פברואר 19</a:t>
             </a:fld>
             <a:endParaRPr lang="he-IL"/>
           </a:p>
@@ -4104,7 +4104,7 @@
           <a:p>
             <a:fld id="{D07BAE3C-A9EF-4863-8620-284FD195C69B}" type="datetime8">
               <a:rPr lang="he-IL" smtClean="0"/>
-              <a:t>02 פברואר 19</a:t>
+              <a:t>03 פברואר 19</a:t>
             </a:fld>
             <a:endParaRPr lang="he-IL"/>
           </a:p>
@@ -4556,7 +4556,7 @@
           <a:p>
             <a:fld id="{3C55EC17-C85B-464F-8188-434EB50AC50E}" type="datetime8">
               <a:rPr lang="he-IL" smtClean="0"/>
-              <a:t>02 פברואר 19</a:t>
+              <a:t>03 פברואר 19</a:t>
             </a:fld>
             <a:endParaRPr lang="he-IL"/>
           </a:p>
@@ -4704,7 +4704,7 @@
           <a:p>
             <a:fld id="{C30FEFB3-9777-4A1D-AF5C-BE325C0489A5}" type="datetime8">
               <a:rPr lang="he-IL" smtClean="0"/>
-              <a:t>02 פברואר 19</a:t>
+              <a:t>03 פברואר 19</a:t>
             </a:fld>
             <a:endParaRPr lang="he-IL"/>
           </a:p>
@@ -4829,7 +4829,7 @@
           <a:p>
             <a:fld id="{588A6826-0F8D-44BE-84F0-748C5D8D10C4}" type="datetime8">
               <a:rPr lang="he-IL" smtClean="0"/>
-              <a:t>02 פברואר 19</a:t>
+              <a:t>03 פברואר 19</a:t>
             </a:fld>
             <a:endParaRPr lang="he-IL"/>
           </a:p>
@@ -5081,7 +5081,7 @@
           <a:p>
             <a:fld id="{EF44FB19-2E14-401A-9632-489004493145}" type="datetime8">
               <a:rPr lang="he-IL" smtClean="0"/>
-              <a:t>02 פברואר 19</a:t>
+              <a:t>03 פברואר 19</a:t>
             </a:fld>
             <a:endParaRPr lang="he-IL" dirty="0"/>
           </a:p>
@@ -7306,12 +7306,29 @@
         </p:nvSpPr>
         <p:spPr/>
         <p:txBody>
-          <a:bodyPr/>
+          <a:bodyPr>
+            <a:normAutofit fontScale="90000"/>
+          </a:bodyPr>
           <a:lstStyle/>
           <a:p>
             <a:r>
               <a:rPr lang="he-IL" dirty="0"/>
               <a:t>איזה פיצוי מעדיף הציבור הרחב?</a:t>
+            </a:r>
+            <a:br>
+              <a:rPr lang="he-IL" dirty="0"/>
+            </a:br>
+            <a:r>
+              <a:rPr lang="he-IL" sz="3100" dirty="0"/>
+              <a:t>(מבוסס על תוצאות חישוב ה-</a:t>
+            </a:r>
+            <a:r>
+              <a:rPr lang="en-US" sz="3100" dirty="0"/>
+              <a:t>Conjoint</a:t>
+            </a:r>
+            <a:r>
+              <a:rPr lang="he-IL" sz="3100" dirty="0"/>
+              <a:t>)</a:t>
             </a:r>
             <a:endParaRPr lang="en-IL" dirty="0"/>
           </a:p>
@@ -8495,6 +8512,45 @@
               <a:rPr lang="he-IL" dirty="0"/>
               <a:t>סקר יכול להיות עזר להחלטה על המנגנון שבו יבוצע הפיצוי.</a:t>
             </a:r>
+          </a:p>
+        </p:txBody>
+      </p:sp>
+      <p:sp>
+        <p:nvSpPr>
+          <p:cNvPr id="9" name="TextBox 8">
+            <a:extLst>
+              <a:ext uri="{FF2B5EF4-FFF2-40B4-BE49-F238E27FC236}">
+                <a16:creationId xmlns:a16="http://schemas.microsoft.com/office/drawing/2014/main" id="{F01238FB-D6B5-4E3E-8291-58DAC81EBD7C}"/>
+              </a:ext>
+            </a:extLst>
+          </p:cNvPr>
+          <p:cNvSpPr txBox="1"/>
+          <p:nvPr/>
+        </p:nvSpPr>
+        <p:spPr>
+          <a:xfrm>
+            <a:off x="2567608" y="6381328"/>
+            <a:ext cx="3037354" cy="307777"/>
+          </a:xfrm>
+          <a:prstGeom prst="rect">
+            <a:avLst/>
+          </a:prstGeom>
+          <a:noFill/>
+        </p:spPr>
+        <p:txBody>
+          <a:bodyPr wrap="square" rtlCol="0">
+            <a:spAutoFit/>
+          </a:bodyPr>
+          <a:lstStyle/>
+          <a:p>
+            <a:pPr algn="l" rtl="0"/>
+            <a:r>
+              <a:rPr lang="en-US" sz="1400" dirty="0">
+                <a:hlinkClick r:id="rId2"/>
+              </a:rPr>
+              <a:t>https://sarid.shinyapps.io/class-action/</a:t>
+            </a:r>
+            <a:endParaRPr lang="en-IL" sz="1400" dirty="0"/>
           </a:p>
         </p:txBody>
       </p:sp>

</xml_diff>